<commit_message>
Starting the part on llvm
</commit_message>
<xml_diff>
--- a/MasterThesis/Figures/holzle.pptx
+++ b/MasterThesis/Figures/holzle.pptx
@@ -7,6 +7,7 @@
   <p:sldIdLst>
     <p:sldId id="256" r:id="rId2"/>
     <p:sldId id="257" r:id="rId3"/>
+    <p:sldId id="258" r:id="rId4"/>
   </p:sldIdLst>
   <p:sldSz cx="12192000" cy="6858000"/>
   <p:notesSz cx="6858000" cy="9144000"/>
@@ -244,7 +245,7 @@
           <a:p>
             <a:fld id="{39514751-6C89-194E-A652-4BD3C8EB45FC}" type="datetimeFigureOut">
               <a:rPr lang="en-US" smtClean="0"/>
-              <a:t>12/27/15</a:t>
+              <a:t>12/28/15</a:t>
             </a:fld>
             <a:endParaRPr lang="en-US"/>
           </a:p>
@@ -414,7 +415,7 @@
           <a:p>
             <a:fld id="{39514751-6C89-194E-A652-4BD3C8EB45FC}" type="datetimeFigureOut">
               <a:rPr lang="en-US" smtClean="0"/>
-              <a:t>12/27/15</a:t>
+              <a:t>12/28/15</a:t>
             </a:fld>
             <a:endParaRPr lang="en-US"/>
           </a:p>
@@ -594,7 +595,7 @@
           <a:p>
             <a:fld id="{39514751-6C89-194E-A652-4BD3C8EB45FC}" type="datetimeFigureOut">
               <a:rPr lang="en-US" smtClean="0"/>
-              <a:t>12/27/15</a:t>
+              <a:t>12/28/15</a:t>
             </a:fld>
             <a:endParaRPr lang="en-US"/>
           </a:p>
@@ -764,7 +765,7 @@
           <a:p>
             <a:fld id="{39514751-6C89-194E-A652-4BD3C8EB45FC}" type="datetimeFigureOut">
               <a:rPr lang="en-US" smtClean="0"/>
-              <a:t>12/27/15</a:t>
+              <a:t>12/28/15</a:t>
             </a:fld>
             <a:endParaRPr lang="en-US"/>
           </a:p>
@@ -1010,7 +1011,7 @@
           <a:p>
             <a:fld id="{39514751-6C89-194E-A652-4BD3C8EB45FC}" type="datetimeFigureOut">
               <a:rPr lang="en-US" smtClean="0"/>
-              <a:t>12/27/15</a:t>
+              <a:t>12/28/15</a:t>
             </a:fld>
             <a:endParaRPr lang="en-US"/>
           </a:p>
@@ -1242,7 +1243,7 @@
           <a:p>
             <a:fld id="{39514751-6C89-194E-A652-4BD3C8EB45FC}" type="datetimeFigureOut">
               <a:rPr lang="en-US" smtClean="0"/>
-              <a:t>12/27/15</a:t>
+              <a:t>12/28/15</a:t>
             </a:fld>
             <a:endParaRPr lang="en-US"/>
           </a:p>
@@ -1609,7 +1610,7 @@
           <a:p>
             <a:fld id="{39514751-6C89-194E-A652-4BD3C8EB45FC}" type="datetimeFigureOut">
               <a:rPr lang="en-US" smtClean="0"/>
-              <a:t>12/27/15</a:t>
+              <a:t>12/28/15</a:t>
             </a:fld>
             <a:endParaRPr lang="en-US"/>
           </a:p>
@@ -1727,7 +1728,7 @@
           <a:p>
             <a:fld id="{39514751-6C89-194E-A652-4BD3C8EB45FC}" type="datetimeFigureOut">
               <a:rPr lang="en-US" smtClean="0"/>
-              <a:t>12/27/15</a:t>
+              <a:t>12/28/15</a:t>
             </a:fld>
             <a:endParaRPr lang="en-US"/>
           </a:p>
@@ -1822,7 +1823,7 @@
           <a:p>
             <a:fld id="{39514751-6C89-194E-A652-4BD3C8EB45FC}" type="datetimeFigureOut">
               <a:rPr lang="en-US" smtClean="0"/>
-              <a:t>12/27/15</a:t>
+              <a:t>12/28/15</a:t>
             </a:fld>
             <a:endParaRPr lang="en-US"/>
           </a:p>
@@ -2099,7 +2100,7 @@
           <a:p>
             <a:fld id="{39514751-6C89-194E-A652-4BD3C8EB45FC}" type="datetimeFigureOut">
               <a:rPr lang="en-US" smtClean="0"/>
-              <a:t>12/27/15</a:t>
+              <a:t>12/28/15</a:t>
             </a:fld>
             <a:endParaRPr lang="en-US"/>
           </a:p>
@@ -2352,7 +2353,7 @@
           <a:p>
             <a:fld id="{39514751-6C89-194E-A652-4BD3C8EB45FC}" type="datetimeFigureOut">
               <a:rPr lang="en-US" smtClean="0"/>
-              <a:t>12/27/15</a:t>
+              <a:t>12/28/15</a:t>
             </a:fld>
             <a:endParaRPr lang="en-US"/>
           </a:p>
@@ -2565,7 +2566,7 @@
           <a:p>
             <a:fld id="{39514751-6C89-194E-A652-4BD3C8EB45FC}" type="datetimeFigureOut">
               <a:rPr lang="en-US" smtClean="0"/>
-              <a:t>12/27/15</a:t>
+              <a:t>12/28/15</a:t>
             </a:fld>
             <a:endParaRPr lang="en-US"/>
           </a:p>
@@ -3957,11 +3958,6 @@
               </a:rPr>
               <a:t>Stack frame of optimized method</a:t>
             </a:r>
-            <a:endParaRPr lang="en-US" sz="1400" dirty="0">
-              <a:solidFill>
-                <a:schemeClr val="tx1"/>
-              </a:solidFill>
-            </a:endParaRPr>
           </a:p>
         </p:txBody>
       </p:sp>
@@ -4327,11 +4323,6 @@
               </a:rPr>
               <a:t>PC: 28</a:t>
             </a:r>
-            <a:endParaRPr lang="en-US" dirty="0">
-              <a:solidFill>
-                <a:schemeClr val="tx1"/>
-              </a:solidFill>
-            </a:endParaRPr>
           </a:p>
         </p:txBody>
       </p:sp>
@@ -4387,11 +4378,6 @@
               </a:rPr>
               <a:t>Scope B, line 5</a:t>
             </a:r>
-            <a:endParaRPr lang="en-US" dirty="0">
-              <a:solidFill>
-                <a:schemeClr val="tx1"/>
-              </a:solidFill>
-            </a:endParaRPr>
           </a:p>
         </p:txBody>
       </p:sp>
@@ -4447,11 +4433,6 @@
               </a:rPr>
               <a:t>PC: 42</a:t>
             </a:r>
-            <a:endParaRPr lang="en-US" dirty="0">
-              <a:solidFill>
-                <a:schemeClr val="tx1"/>
-              </a:solidFill>
-            </a:endParaRPr>
           </a:p>
         </p:txBody>
       </p:sp>
@@ -4507,11 +4488,6 @@
               </a:rPr>
               <a:t>Scope D, line 1</a:t>
             </a:r>
-            <a:endParaRPr lang="en-US" dirty="0">
-              <a:solidFill>
-                <a:schemeClr val="tx1"/>
-              </a:solidFill>
-            </a:endParaRPr>
           </a:p>
         </p:txBody>
       </p:sp>
@@ -5316,11 +5292,6 @@
               </a:rPr>
               <a:t>B</a:t>
             </a:r>
-            <a:endParaRPr lang="en-US" dirty="0">
-              <a:solidFill>
-                <a:schemeClr val="tx1"/>
-              </a:solidFill>
-            </a:endParaRPr>
           </a:p>
         </p:txBody>
       </p:sp>
@@ -6452,6 +6423,954 @@
     <p:extLst>
       <p:ext uri="{BB962C8B-B14F-4D97-AF65-F5344CB8AC3E}">
         <p14:creationId xmlns:p14="http://schemas.microsoft.com/office/powerpoint/2010/main" val="954043038"/>
+      </p:ext>
+    </p:extLst>
+  </p:cSld>
+  <p:clrMapOvr>
+    <a:masterClrMapping/>
+  </p:clrMapOvr>
+</p:sld>
+</file>
+
+<file path=ppt/slides/slide3.xml><?xml version="1.0" encoding="utf-8"?>
+<p:sld xmlns:a="http://schemas.openxmlformats.org/drawingml/2006/main" xmlns:r="http://schemas.openxmlformats.org/officeDocument/2006/relationships" xmlns:p="http://schemas.openxmlformats.org/presentationml/2006/main">
+  <p:cSld>
+    <p:spTree>
+      <p:nvGrpSpPr>
+        <p:cNvPr id="1" name=""/>
+        <p:cNvGrpSpPr/>
+        <p:nvPr/>
+      </p:nvGrpSpPr>
+      <p:grpSpPr>
+        <a:xfrm>
+          <a:off x="0" y="0"/>
+          <a:ext cx="0" cy="0"/>
+          <a:chOff x="0" y="0"/>
+          <a:chExt cx="0" cy="0"/>
+        </a:xfrm>
+      </p:grpSpPr>
+      <p:sp>
+        <p:nvSpPr>
+          <p:cNvPr id="4" name="Rectangle 3"/>
+          <p:cNvSpPr/>
+          <p:nvPr/>
+        </p:nvSpPr>
+        <p:spPr>
+          <a:xfrm>
+            <a:off x="7692647" y="1202821"/>
+            <a:ext cx="1636776" cy="1033272"/>
+          </a:xfrm>
+          <a:prstGeom prst="rect">
+            <a:avLst/>
+          </a:prstGeom>
+          <a:solidFill>
+            <a:schemeClr val="bg1"/>
+          </a:solidFill>
+          <a:ln>
+            <a:solidFill>
+              <a:schemeClr val="tx1"/>
+            </a:solidFill>
+          </a:ln>
+        </p:spPr>
+        <p:style>
+          <a:lnRef idx="2">
+            <a:schemeClr val="accent1">
+              <a:shade val="50000"/>
+            </a:schemeClr>
+          </a:lnRef>
+          <a:fillRef idx="1">
+            <a:schemeClr val="accent1"/>
+          </a:fillRef>
+          <a:effectRef idx="0">
+            <a:schemeClr val="accent1"/>
+          </a:effectRef>
+          <a:fontRef idx="minor">
+            <a:schemeClr val="lt1"/>
+          </a:fontRef>
+        </p:style>
+        <p:txBody>
+          <a:bodyPr rtlCol="0" anchor="ctr"/>
+          <a:lstStyle/>
+          <a:p>
+            <a:pPr algn="ctr"/>
+            <a:r>
+              <a:rPr lang="en-US" dirty="0">
+                <a:solidFill>
+                  <a:schemeClr val="tx1"/>
+                </a:solidFill>
+              </a:rPr>
+              <a:t>X</a:t>
+            </a:r>
+            <a:r>
+              <a:rPr lang="en-US" dirty="0" smtClean="0">
+                <a:solidFill>
+                  <a:schemeClr val="tx1"/>
+                </a:solidFill>
+              </a:rPr>
+              <a:t>1 &lt;- 6</a:t>
+            </a:r>
+          </a:p>
+          <a:p>
+            <a:pPr algn="ctr"/>
+            <a:r>
+              <a:rPr lang="en-US" dirty="0" smtClean="0">
+                <a:solidFill>
+                  <a:schemeClr val="tx1"/>
+                </a:solidFill>
+              </a:rPr>
+              <a:t>X2 &lt;- X1 – 4</a:t>
+            </a:r>
+          </a:p>
+          <a:p>
+            <a:pPr algn="ctr"/>
+            <a:r>
+              <a:rPr lang="en-US" dirty="0" smtClean="0">
+                <a:solidFill>
+                  <a:schemeClr val="tx1"/>
+                </a:solidFill>
+              </a:rPr>
+              <a:t>X2 &lt; 0?</a:t>
+            </a:r>
+            <a:endParaRPr lang="en-US" dirty="0">
+              <a:solidFill>
+                <a:schemeClr val="tx1"/>
+              </a:solidFill>
+            </a:endParaRPr>
+          </a:p>
+        </p:txBody>
+      </p:sp>
+      <p:sp>
+        <p:nvSpPr>
+          <p:cNvPr id="5" name="Rectangle 4"/>
+          <p:cNvSpPr/>
+          <p:nvPr/>
+        </p:nvSpPr>
+        <p:spPr>
+          <a:xfrm>
+            <a:off x="6055871" y="2553085"/>
+            <a:ext cx="1636776" cy="1033272"/>
+          </a:xfrm>
+          <a:prstGeom prst="rect">
+            <a:avLst/>
+          </a:prstGeom>
+          <a:solidFill>
+            <a:schemeClr val="bg1"/>
+          </a:solidFill>
+          <a:ln>
+            <a:solidFill>
+              <a:schemeClr val="tx1"/>
+            </a:solidFill>
+          </a:ln>
+        </p:spPr>
+        <p:style>
+          <a:lnRef idx="2">
+            <a:schemeClr val="accent1">
+              <a:shade val="50000"/>
+            </a:schemeClr>
+          </a:lnRef>
+          <a:fillRef idx="1">
+            <a:schemeClr val="accent1"/>
+          </a:fillRef>
+          <a:effectRef idx="0">
+            <a:schemeClr val="accent1"/>
+          </a:effectRef>
+          <a:fontRef idx="minor">
+            <a:schemeClr val="lt1"/>
+          </a:fontRef>
+        </p:style>
+        <p:txBody>
+          <a:bodyPr rtlCol="0" anchor="ctr"/>
+          <a:lstStyle/>
+          <a:p>
+            <a:pPr algn="ctr"/>
+            <a:r>
+              <a:rPr lang="en-US" dirty="0" smtClean="0">
+                <a:solidFill>
+                  <a:schemeClr val="tx1"/>
+                </a:solidFill>
+              </a:rPr>
+              <a:t>Y1 &lt;-X2 * 3</a:t>
+            </a:r>
+          </a:p>
+        </p:txBody>
+      </p:sp>
+      <p:sp>
+        <p:nvSpPr>
+          <p:cNvPr id="6" name="Rectangle 5"/>
+          <p:cNvSpPr/>
+          <p:nvPr/>
+        </p:nvSpPr>
+        <p:spPr>
+          <a:xfrm>
+            <a:off x="9329423" y="2553085"/>
+            <a:ext cx="1636776" cy="1033272"/>
+          </a:xfrm>
+          <a:prstGeom prst="rect">
+            <a:avLst/>
+          </a:prstGeom>
+          <a:solidFill>
+            <a:schemeClr val="bg1"/>
+          </a:solidFill>
+          <a:ln>
+            <a:solidFill>
+              <a:schemeClr val="tx1"/>
+            </a:solidFill>
+          </a:ln>
+        </p:spPr>
+        <p:style>
+          <a:lnRef idx="2">
+            <a:schemeClr val="accent1">
+              <a:shade val="50000"/>
+            </a:schemeClr>
+          </a:lnRef>
+          <a:fillRef idx="1">
+            <a:schemeClr val="accent1"/>
+          </a:fillRef>
+          <a:effectRef idx="0">
+            <a:schemeClr val="accent1"/>
+          </a:effectRef>
+          <a:fontRef idx="minor">
+            <a:schemeClr val="lt1"/>
+          </a:fontRef>
+        </p:style>
+        <p:txBody>
+          <a:bodyPr rtlCol="0" anchor="ctr"/>
+          <a:lstStyle/>
+          <a:p>
+            <a:pPr algn="ctr"/>
+            <a:r>
+              <a:rPr lang="en-US" dirty="0" smtClean="0">
+                <a:solidFill>
+                  <a:schemeClr val="tx1"/>
+                </a:solidFill>
+              </a:rPr>
+              <a:t>Y2 &lt;- x2 - 5 </a:t>
+            </a:r>
+            <a:endParaRPr lang="en-US" dirty="0">
+              <a:solidFill>
+                <a:schemeClr val="tx1"/>
+              </a:solidFill>
+            </a:endParaRPr>
+          </a:p>
+        </p:txBody>
+      </p:sp>
+      <p:sp>
+        <p:nvSpPr>
+          <p:cNvPr id="7" name="Rectangle 6"/>
+          <p:cNvSpPr/>
+          <p:nvPr/>
+        </p:nvSpPr>
+        <p:spPr>
+          <a:xfrm>
+            <a:off x="7692647" y="3903349"/>
+            <a:ext cx="1636776" cy="1033272"/>
+          </a:xfrm>
+          <a:prstGeom prst="rect">
+            <a:avLst/>
+          </a:prstGeom>
+          <a:solidFill>
+            <a:schemeClr val="bg1"/>
+          </a:solidFill>
+          <a:ln>
+            <a:solidFill>
+              <a:schemeClr val="tx1"/>
+            </a:solidFill>
+          </a:ln>
+        </p:spPr>
+        <p:style>
+          <a:lnRef idx="2">
+            <a:schemeClr val="accent1">
+              <a:shade val="50000"/>
+            </a:schemeClr>
+          </a:lnRef>
+          <a:fillRef idx="1">
+            <a:schemeClr val="accent1"/>
+          </a:fillRef>
+          <a:effectRef idx="0">
+            <a:schemeClr val="accent1"/>
+          </a:effectRef>
+          <a:fontRef idx="minor">
+            <a:schemeClr val="lt1"/>
+          </a:fontRef>
+        </p:style>
+        <p:txBody>
+          <a:bodyPr rtlCol="0" anchor="ctr"/>
+          <a:lstStyle/>
+          <a:p>
+            <a:pPr algn="ctr"/>
+            <a:r>
+              <a:rPr lang="en-US" dirty="0" smtClean="0">
+                <a:solidFill>
+                  <a:schemeClr val="tx1"/>
+                </a:solidFill>
+              </a:rPr>
+              <a:t>Y3 &lt;- </a:t>
+            </a:r>
+            <a:r>
+              <a:rPr lang="en-US" dirty="0" err="1" smtClean="0">
+                <a:solidFill>
+                  <a:schemeClr val="tx1"/>
+                </a:solidFill>
+              </a:rPr>
+              <a:t>ɸ</a:t>
+            </a:r>
+            <a:r>
+              <a:rPr lang="en-US" dirty="0" smtClean="0">
+                <a:solidFill>
+                  <a:schemeClr val="tx1"/>
+                </a:solidFill>
+              </a:rPr>
+              <a:t>(y1, y2)</a:t>
+            </a:r>
+            <a:endParaRPr lang="en-US" dirty="0">
+              <a:solidFill>
+                <a:schemeClr val="tx1"/>
+              </a:solidFill>
+            </a:endParaRPr>
+          </a:p>
+        </p:txBody>
+      </p:sp>
+      <p:cxnSp>
+        <p:nvCxnSpPr>
+          <p:cNvPr id="9" name="Straight Arrow Connector 8"/>
+          <p:cNvCxnSpPr>
+            <a:stCxn id="4" idx="2"/>
+            <a:endCxn id="5" idx="0"/>
+          </p:cNvCxnSpPr>
+          <p:nvPr/>
+        </p:nvCxnSpPr>
+        <p:spPr>
+          <a:xfrm flipH="1">
+            <a:off x="6874259" y="2236093"/>
+            <a:ext cx="1636776" cy="316992"/>
+          </a:xfrm>
+          <a:prstGeom prst="straightConnector1">
+            <a:avLst/>
+          </a:prstGeom>
+          <a:ln>
+            <a:solidFill>
+              <a:schemeClr val="tx1"/>
+            </a:solidFill>
+            <a:tailEnd type="triangle"/>
+          </a:ln>
+        </p:spPr>
+        <p:style>
+          <a:lnRef idx="1">
+            <a:schemeClr val="accent1"/>
+          </a:lnRef>
+          <a:fillRef idx="0">
+            <a:schemeClr val="accent1"/>
+          </a:fillRef>
+          <a:effectRef idx="0">
+            <a:schemeClr val="accent1"/>
+          </a:effectRef>
+          <a:fontRef idx="minor">
+            <a:schemeClr val="tx1"/>
+          </a:fontRef>
+        </p:style>
+      </p:cxnSp>
+      <p:cxnSp>
+        <p:nvCxnSpPr>
+          <p:cNvPr id="11" name="Straight Arrow Connector 10"/>
+          <p:cNvCxnSpPr>
+            <a:stCxn id="4" idx="2"/>
+            <a:endCxn id="6" idx="0"/>
+          </p:cNvCxnSpPr>
+          <p:nvPr/>
+        </p:nvCxnSpPr>
+        <p:spPr>
+          <a:xfrm>
+            <a:off x="8511035" y="2236093"/>
+            <a:ext cx="1636776" cy="316992"/>
+          </a:xfrm>
+          <a:prstGeom prst="straightConnector1">
+            <a:avLst/>
+          </a:prstGeom>
+          <a:ln>
+            <a:solidFill>
+              <a:schemeClr val="tx1"/>
+            </a:solidFill>
+            <a:tailEnd type="triangle"/>
+          </a:ln>
+        </p:spPr>
+        <p:style>
+          <a:lnRef idx="1">
+            <a:schemeClr val="accent1"/>
+          </a:lnRef>
+          <a:fillRef idx="0">
+            <a:schemeClr val="accent1"/>
+          </a:fillRef>
+          <a:effectRef idx="0">
+            <a:schemeClr val="accent1"/>
+          </a:effectRef>
+          <a:fontRef idx="minor">
+            <a:schemeClr val="tx1"/>
+          </a:fontRef>
+        </p:style>
+      </p:cxnSp>
+      <p:cxnSp>
+        <p:nvCxnSpPr>
+          <p:cNvPr id="13" name="Straight Arrow Connector 12"/>
+          <p:cNvCxnSpPr>
+            <a:stCxn id="5" idx="2"/>
+            <a:endCxn id="7" idx="0"/>
+          </p:cNvCxnSpPr>
+          <p:nvPr/>
+        </p:nvCxnSpPr>
+        <p:spPr>
+          <a:xfrm>
+            <a:off x="6874259" y="3586357"/>
+            <a:ext cx="1636776" cy="316992"/>
+          </a:xfrm>
+          <a:prstGeom prst="straightConnector1">
+            <a:avLst/>
+          </a:prstGeom>
+          <a:ln>
+            <a:solidFill>
+              <a:schemeClr val="tx1"/>
+            </a:solidFill>
+            <a:tailEnd type="triangle"/>
+          </a:ln>
+        </p:spPr>
+        <p:style>
+          <a:lnRef idx="1">
+            <a:schemeClr val="accent1"/>
+          </a:lnRef>
+          <a:fillRef idx="0">
+            <a:schemeClr val="accent1"/>
+          </a:fillRef>
+          <a:effectRef idx="0">
+            <a:schemeClr val="accent1"/>
+          </a:effectRef>
+          <a:fontRef idx="minor">
+            <a:schemeClr val="tx1"/>
+          </a:fontRef>
+        </p:style>
+      </p:cxnSp>
+      <p:cxnSp>
+        <p:nvCxnSpPr>
+          <p:cNvPr id="15" name="Straight Arrow Connector 14"/>
+          <p:cNvCxnSpPr>
+            <a:stCxn id="6" idx="2"/>
+            <a:endCxn id="7" idx="0"/>
+          </p:cNvCxnSpPr>
+          <p:nvPr/>
+        </p:nvCxnSpPr>
+        <p:spPr>
+          <a:xfrm flipH="1">
+            <a:off x="8511035" y="3586357"/>
+            <a:ext cx="1636776" cy="316992"/>
+          </a:xfrm>
+          <a:prstGeom prst="straightConnector1">
+            <a:avLst/>
+          </a:prstGeom>
+          <a:ln>
+            <a:solidFill>
+              <a:schemeClr val="tx1"/>
+            </a:solidFill>
+            <a:tailEnd type="triangle"/>
+          </a:ln>
+        </p:spPr>
+        <p:style>
+          <a:lnRef idx="1">
+            <a:schemeClr val="accent1"/>
+          </a:lnRef>
+          <a:fillRef idx="0">
+            <a:schemeClr val="accent1"/>
+          </a:fillRef>
+          <a:effectRef idx="0">
+            <a:schemeClr val="accent1"/>
+          </a:effectRef>
+          <a:fontRef idx="minor">
+            <a:schemeClr val="tx1"/>
+          </a:fontRef>
+        </p:style>
+      </p:cxnSp>
+      <p:sp>
+        <p:nvSpPr>
+          <p:cNvPr id="16" name="Rectangle 15"/>
+          <p:cNvSpPr/>
+          <p:nvPr/>
+        </p:nvSpPr>
+        <p:spPr>
+          <a:xfrm>
+            <a:off x="2215428" y="1202821"/>
+            <a:ext cx="1636776" cy="1033272"/>
+          </a:xfrm>
+          <a:prstGeom prst="rect">
+            <a:avLst/>
+          </a:prstGeom>
+          <a:solidFill>
+            <a:schemeClr val="bg1"/>
+          </a:solidFill>
+          <a:ln>
+            <a:solidFill>
+              <a:schemeClr val="tx1"/>
+            </a:solidFill>
+          </a:ln>
+        </p:spPr>
+        <p:style>
+          <a:lnRef idx="2">
+            <a:schemeClr val="accent1">
+              <a:shade val="50000"/>
+            </a:schemeClr>
+          </a:lnRef>
+          <a:fillRef idx="1">
+            <a:schemeClr val="accent1"/>
+          </a:fillRef>
+          <a:effectRef idx="0">
+            <a:schemeClr val="accent1"/>
+          </a:effectRef>
+          <a:fontRef idx="minor">
+            <a:schemeClr val="lt1"/>
+          </a:fontRef>
+        </p:style>
+        <p:txBody>
+          <a:bodyPr rtlCol="0" anchor="ctr"/>
+          <a:lstStyle/>
+          <a:p>
+            <a:pPr algn="ctr"/>
+            <a:r>
+              <a:rPr lang="en-US" dirty="0" smtClean="0">
+                <a:solidFill>
+                  <a:schemeClr val="tx1"/>
+                </a:solidFill>
+              </a:rPr>
+              <a:t>X &lt;- 6</a:t>
+            </a:r>
+          </a:p>
+          <a:p>
+            <a:pPr algn="ctr"/>
+            <a:r>
+              <a:rPr lang="en-US" dirty="0" smtClean="0">
+                <a:solidFill>
+                  <a:schemeClr val="tx1"/>
+                </a:solidFill>
+              </a:rPr>
+              <a:t>X &lt;- X – 4</a:t>
+            </a:r>
+          </a:p>
+          <a:p>
+            <a:pPr algn="ctr"/>
+            <a:r>
+              <a:rPr lang="en-US" dirty="0" smtClean="0">
+                <a:solidFill>
+                  <a:schemeClr val="tx1"/>
+                </a:solidFill>
+              </a:rPr>
+              <a:t>X &lt; 0?</a:t>
+            </a:r>
+            <a:endParaRPr lang="en-US" dirty="0">
+              <a:solidFill>
+                <a:schemeClr val="tx1"/>
+              </a:solidFill>
+            </a:endParaRPr>
+          </a:p>
+        </p:txBody>
+      </p:sp>
+      <p:sp>
+        <p:nvSpPr>
+          <p:cNvPr id="17" name="Rectangle 16"/>
+          <p:cNvSpPr/>
+          <p:nvPr/>
+        </p:nvSpPr>
+        <p:spPr>
+          <a:xfrm>
+            <a:off x="578652" y="2553085"/>
+            <a:ext cx="1636776" cy="1033272"/>
+          </a:xfrm>
+          <a:prstGeom prst="rect">
+            <a:avLst/>
+          </a:prstGeom>
+          <a:solidFill>
+            <a:schemeClr val="bg1"/>
+          </a:solidFill>
+          <a:ln>
+            <a:solidFill>
+              <a:schemeClr val="tx1"/>
+            </a:solidFill>
+          </a:ln>
+        </p:spPr>
+        <p:style>
+          <a:lnRef idx="2">
+            <a:schemeClr val="accent1">
+              <a:shade val="50000"/>
+            </a:schemeClr>
+          </a:lnRef>
+          <a:fillRef idx="1">
+            <a:schemeClr val="accent1"/>
+          </a:fillRef>
+          <a:effectRef idx="0">
+            <a:schemeClr val="accent1"/>
+          </a:effectRef>
+          <a:fontRef idx="minor">
+            <a:schemeClr val="lt1"/>
+          </a:fontRef>
+        </p:style>
+        <p:txBody>
+          <a:bodyPr rtlCol="0" anchor="ctr"/>
+          <a:lstStyle/>
+          <a:p>
+            <a:pPr algn="ctr"/>
+            <a:r>
+              <a:rPr lang="en-US" dirty="0" smtClean="0">
+                <a:solidFill>
+                  <a:schemeClr val="tx1"/>
+                </a:solidFill>
+              </a:rPr>
+              <a:t>Y &lt;-X * 3</a:t>
+            </a:r>
+          </a:p>
+        </p:txBody>
+      </p:sp>
+      <p:sp>
+        <p:nvSpPr>
+          <p:cNvPr id="18" name="Rectangle 17"/>
+          <p:cNvSpPr/>
+          <p:nvPr/>
+        </p:nvSpPr>
+        <p:spPr>
+          <a:xfrm>
+            <a:off x="3852204" y="2553085"/>
+            <a:ext cx="1636776" cy="1033272"/>
+          </a:xfrm>
+          <a:prstGeom prst="rect">
+            <a:avLst/>
+          </a:prstGeom>
+          <a:solidFill>
+            <a:schemeClr val="bg1"/>
+          </a:solidFill>
+          <a:ln>
+            <a:solidFill>
+              <a:schemeClr val="tx1"/>
+            </a:solidFill>
+          </a:ln>
+        </p:spPr>
+        <p:style>
+          <a:lnRef idx="2">
+            <a:schemeClr val="accent1">
+              <a:shade val="50000"/>
+            </a:schemeClr>
+          </a:lnRef>
+          <a:fillRef idx="1">
+            <a:schemeClr val="accent1"/>
+          </a:fillRef>
+          <a:effectRef idx="0">
+            <a:schemeClr val="accent1"/>
+          </a:effectRef>
+          <a:fontRef idx="minor">
+            <a:schemeClr val="lt1"/>
+          </a:fontRef>
+        </p:style>
+        <p:txBody>
+          <a:bodyPr rtlCol="0" anchor="ctr"/>
+          <a:lstStyle/>
+          <a:p>
+            <a:pPr algn="ctr"/>
+            <a:r>
+              <a:rPr lang="en-US" dirty="0" smtClean="0">
+                <a:solidFill>
+                  <a:schemeClr val="tx1"/>
+                </a:solidFill>
+              </a:rPr>
+              <a:t>Y &lt;- X - 5 </a:t>
+            </a:r>
+            <a:endParaRPr lang="en-US" dirty="0">
+              <a:solidFill>
+                <a:schemeClr val="tx1"/>
+              </a:solidFill>
+            </a:endParaRPr>
+          </a:p>
+        </p:txBody>
+      </p:sp>
+      <p:sp>
+        <p:nvSpPr>
+          <p:cNvPr id="19" name="Rectangle 18"/>
+          <p:cNvSpPr/>
+          <p:nvPr/>
+        </p:nvSpPr>
+        <p:spPr>
+          <a:xfrm>
+            <a:off x="2215428" y="3903349"/>
+            <a:ext cx="1636776" cy="1033272"/>
+          </a:xfrm>
+          <a:prstGeom prst="rect">
+            <a:avLst/>
+          </a:prstGeom>
+          <a:solidFill>
+            <a:schemeClr val="bg1"/>
+          </a:solidFill>
+          <a:ln>
+            <a:solidFill>
+              <a:schemeClr val="tx1"/>
+            </a:solidFill>
+          </a:ln>
+        </p:spPr>
+        <p:style>
+          <a:lnRef idx="2">
+            <a:schemeClr val="accent1">
+              <a:shade val="50000"/>
+            </a:schemeClr>
+          </a:lnRef>
+          <a:fillRef idx="1">
+            <a:schemeClr val="accent1"/>
+          </a:fillRef>
+          <a:effectRef idx="0">
+            <a:schemeClr val="accent1"/>
+          </a:effectRef>
+          <a:fontRef idx="minor">
+            <a:schemeClr val="lt1"/>
+          </a:fontRef>
+        </p:style>
+        <p:txBody>
+          <a:bodyPr rtlCol="0" anchor="ctr"/>
+          <a:lstStyle/>
+          <a:p>
+            <a:pPr algn="ctr"/>
+            <a:r>
+              <a:rPr lang="en-US" dirty="0" smtClean="0">
+                <a:solidFill>
+                  <a:schemeClr val="tx1"/>
+                </a:solidFill>
+              </a:rPr>
+              <a:t>Y </a:t>
+            </a:r>
+            <a:endParaRPr lang="en-US" dirty="0">
+              <a:solidFill>
+                <a:schemeClr val="tx1"/>
+              </a:solidFill>
+            </a:endParaRPr>
+          </a:p>
+        </p:txBody>
+      </p:sp>
+      <p:cxnSp>
+        <p:nvCxnSpPr>
+          <p:cNvPr id="20" name="Straight Arrow Connector 19"/>
+          <p:cNvCxnSpPr>
+            <a:stCxn id="18" idx="2"/>
+            <a:endCxn id="19" idx="0"/>
+          </p:cNvCxnSpPr>
+          <p:nvPr/>
+        </p:nvCxnSpPr>
+        <p:spPr>
+          <a:xfrm flipH="1">
+            <a:off x="1397040" y="2236093"/>
+            <a:ext cx="1636776" cy="316992"/>
+          </a:xfrm>
+          <a:prstGeom prst="straightConnector1">
+            <a:avLst/>
+          </a:prstGeom>
+          <a:ln>
+            <a:solidFill>
+              <a:schemeClr val="tx1"/>
+            </a:solidFill>
+            <a:tailEnd type="triangle"/>
+          </a:ln>
+        </p:spPr>
+        <p:style>
+          <a:lnRef idx="1">
+            <a:schemeClr val="accent1"/>
+          </a:lnRef>
+          <a:fillRef idx="0">
+            <a:schemeClr val="accent1"/>
+          </a:fillRef>
+          <a:effectRef idx="0">
+            <a:schemeClr val="accent1"/>
+          </a:effectRef>
+          <a:fontRef idx="minor">
+            <a:schemeClr val="tx1"/>
+          </a:fontRef>
+        </p:style>
+      </p:cxnSp>
+      <p:cxnSp>
+        <p:nvCxnSpPr>
+          <p:cNvPr id="21" name="Straight Arrow Connector 20"/>
+          <p:cNvCxnSpPr>
+            <a:stCxn id="18" idx="2"/>
+            <a:endCxn id="20" idx="0"/>
+          </p:cNvCxnSpPr>
+          <p:nvPr/>
+        </p:nvCxnSpPr>
+        <p:spPr>
+          <a:xfrm>
+            <a:off x="3033816" y="2236093"/>
+            <a:ext cx="1636776" cy="316992"/>
+          </a:xfrm>
+          <a:prstGeom prst="straightConnector1">
+            <a:avLst/>
+          </a:prstGeom>
+          <a:ln>
+            <a:solidFill>
+              <a:schemeClr val="tx1"/>
+            </a:solidFill>
+            <a:tailEnd type="triangle"/>
+          </a:ln>
+        </p:spPr>
+        <p:style>
+          <a:lnRef idx="1">
+            <a:schemeClr val="accent1"/>
+          </a:lnRef>
+          <a:fillRef idx="0">
+            <a:schemeClr val="accent1"/>
+          </a:fillRef>
+          <a:effectRef idx="0">
+            <a:schemeClr val="accent1"/>
+          </a:effectRef>
+          <a:fontRef idx="minor">
+            <a:schemeClr val="tx1"/>
+          </a:fontRef>
+        </p:style>
+      </p:cxnSp>
+      <p:cxnSp>
+        <p:nvCxnSpPr>
+          <p:cNvPr id="22" name="Straight Arrow Connector 21"/>
+          <p:cNvCxnSpPr>
+            <a:stCxn id="19" idx="2"/>
+            <a:endCxn id="21" idx="0"/>
+          </p:cNvCxnSpPr>
+          <p:nvPr/>
+        </p:nvCxnSpPr>
+        <p:spPr>
+          <a:xfrm>
+            <a:off x="1397040" y="3586357"/>
+            <a:ext cx="1636776" cy="316992"/>
+          </a:xfrm>
+          <a:prstGeom prst="straightConnector1">
+            <a:avLst/>
+          </a:prstGeom>
+          <a:ln>
+            <a:solidFill>
+              <a:schemeClr val="tx1"/>
+            </a:solidFill>
+            <a:tailEnd type="triangle"/>
+          </a:ln>
+        </p:spPr>
+        <p:style>
+          <a:lnRef idx="1">
+            <a:schemeClr val="accent1"/>
+          </a:lnRef>
+          <a:fillRef idx="0">
+            <a:schemeClr val="accent1"/>
+          </a:fillRef>
+          <a:effectRef idx="0">
+            <a:schemeClr val="accent1"/>
+          </a:effectRef>
+          <a:fontRef idx="minor">
+            <a:schemeClr val="tx1"/>
+          </a:fontRef>
+        </p:style>
+      </p:cxnSp>
+      <p:cxnSp>
+        <p:nvCxnSpPr>
+          <p:cNvPr id="23" name="Straight Arrow Connector 22"/>
+          <p:cNvCxnSpPr>
+            <a:stCxn id="20" idx="2"/>
+            <a:endCxn id="21" idx="0"/>
+          </p:cNvCxnSpPr>
+          <p:nvPr/>
+        </p:nvCxnSpPr>
+        <p:spPr>
+          <a:xfrm flipH="1">
+            <a:off x="3033816" y="3586357"/>
+            <a:ext cx="1636776" cy="316992"/>
+          </a:xfrm>
+          <a:prstGeom prst="straightConnector1">
+            <a:avLst/>
+          </a:prstGeom>
+          <a:ln>
+            <a:solidFill>
+              <a:schemeClr val="tx1"/>
+            </a:solidFill>
+            <a:tailEnd type="triangle"/>
+          </a:ln>
+        </p:spPr>
+        <p:style>
+          <a:lnRef idx="1">
+            <a:schemeClr val="accent1"/>
+          </a:lnRef>
+          <a:fillRef idx="0">
+            <a:schemeClr val="accent1"/>
+          </a:fillRef>
+          <a:effectRef idx="0">
+            <a:schemeClr val="accent1"/>
+          </a:effectRef>
+          <a:fontRef idx="minor">
+            <a:schemeClr val="tx1"/>
+          </a:fontRef>
+        </p:style>
+      </p:cxnSp>
+      <p:sp>
+        <p:nvSpPr>
+          <p:cNvPr id="24" name="TextBox 23"/>
+          <p:cNvSpPr txBox="1"/>
+          <p:nvPr/>
+        </p:nvSpPr>
+        <p:spPr>
+          <a:xfrm>
+            <a:off x="2285758" y="490327"/>
+            <a:ext cx="1496115" cy="369332"/>
+          </a:xfrm>
+          <a:prstGeom prst="rect">
+            <a:avLst/>
+          </a:prstGeom>
+          <a:noFill/>
+        </p:spPr>
+        <p:txBody>
+          <a:bodyPr wrap="none" rtlCol="0">
+            <a:spAutoFit/>
+          </a:bodyPr>
+          <a:lstStyle/>
+          <a:p>
+            <a:r>
+              <a:rPr lang="en-US" smtClean="0"/>
+              <a:t>Non-SSA form</a:t>
+            </a:r>
+            <a:endParaRPr lang="en-US" dirty="0"/>
+          </a:p>
+        </p:txBody>
+      </p:sp>
+      <p:sp>
+        <p:nvSpPr>
+          <p:cNvPr id="25" name="TextBox 24"/>
+          <p:cNvSpPr txBox="1"/>
+          <p:nvPr/>
+        </p:nvSpPr>
+        <p:spPr>
+          <a:xfrm>
+            <a:off x="7346196" y="490327"/>
+            <a:ext cx="2329677" cy="369332"/>
+          </a:xfrm>
+          <a:prstGeom prst="rect">
+            <a:avLst/>
+          </a:prstGeom>
+          <a:noFill/>
+        </p:spPr>
+        <p:txBody>
+          <a:bodyPr wrap="none" rtlCol="0">
+            <a:spAutoFit/>
+          </a:bodyPr>
+          <a:lstStyle/>
+          <a:p>
+            <a:r>
+              <a:rPr lang="en-US" dirty="0" smtClean="0"/>
+              <a:t>SSA form with </a:t>
+            </a:r>
+            <a:r>
+              <a:rPr lang="en-US" dirty="0" err="1" smtClean="0"/>
+              <a:t>ɸ</a:t>
+            </a:r>
+            <a:r>
+              <a:rPr lang="en-US" dirty="0" smtClean="0"/>
+              <a:t> nodes</a:t>
+            </a:r>
+            <a:endParaRPr lang="en-US" dirty="0"/>
+          </a:p>
+        </p:txBody>
+      </p:sp>
+    </p:spTree>
+    <p:extLst>
+      <p:ext uri="{BB962C8B-B14F-4D97-AF65-F5344CB8AC3E}">
+        <p14:creationId xmlns:p14="http://schemas.microsoft.com/office/powerpoint/2010/main" val="1248896238"/>
       </p:ext>
     </p:extLst>
   </p:cSld>

</xml_diff>

<commit_message>
Adding Figures and writing 2.3
</commit_message>
<xml_diff>
--- a/MasterThesis/Figures/holzle.pptx
+++ b/MasterThesis/Figures/holzle.pptx
@@ -8,6 +8,7 @@
     <p:sldId id="256" r:id="rId2"/>
     <p:sldId id="257" r:id="rId3"/>
     <p:sldId id="258" r:id="rId4"/>
+    <p:sldId id="259" r:id="rId5"/>
   </p:sldIdLst>
   <p:sldSz cx="12192000" cy="6858000"/>
   <p:notesSz cx="6858000" cy="9144000"/>
@@ -7380,6 +7381,624 @@
 </p:sld>
 </file>
 
+<file path=ppt/slides/slide4.xml><?xml version="1.0" encoding="utf-8"?>
+<p:sld xmlns:a="http://schemas.openxmlformats.org/drawingml/2006/main" xmlns:r="http://schemas.openxmlformats.org/officeDocument/2006/relationships" xmlns:p="http://schemas.openxmlformats.org/presentationml/2006/main">
+  <p:cSld>
+    <p:spTree>
+      <p:nvGrpSpPr>
+        <p:cNvPr id="1" name=""/>
+        <p:cNvGrpSpPr/>
+        <p:nvPr/>
+      </p:nvGrpSpPr>
+      <p:grpSpPr>
+        <a:xfrm>
+          <a:off x="0" y="0"/>
+          <a:ext cx="0" cy="0"/>
+          <a:chOff x="0" y="0"/>
+          <a:chExt cx="0" cy="0"/>
+        </a:xfrm>
+      </p:grpSpPr>
+      <p:sp>
+        <p:nvSpPr>
+          <p:cNvPr id="4" name="Rectangle 3"/>
+          <p:cNvSpPr/>
+          <p:nvPr/>
+        </p:nvSpPr>
+        <p:spPr>
+          <a:xfrm>
+            <a:off x="539496" y="2331720"/>
+            <a:ext cx="1737360" cy="877824"/>
+          </a:xfrm>
+          <a:prstGeom prst="rect">
+            <a:avLst/>
+          </a:prstGeom>
+          <a:solidFill>
+            <a:schemeClr val="bg1"/>
+          </a:solidFill>
+          <a:ln>
+            <a:solidFill>
+              <a:schemeClr val="tx1"/>
+            </a:solidFill>
+          </a:ln>
+        </p:spPr>
+        <p:style>
+          <a:lnRef idx="2">
+            <a:schemeClr val="accent1">
+              <a:shade val="50000"/>
+            </a:schemeClr>
+          </a:lnRef>
+          <a:fillRef idx="1">
+            <a:schemeClr val="accent1"/>
+          </a:fillRef>
+          <a:effectRef idx="0">
+            <a:schemeClr val="accent1"/>
+          </a:effectRef>
+          <a:fontRef idx="minor">
+            <a:schemeClr val="lt1"/>
+          </a:fontRef>
+        </p:style>
+        <p:txBody>
+          <a:bodyPr rtlCol="0" anchor="ctr"/>
+          <a:lstStyle/>
+          <a:p>
+            <a:pPr algn="ctr"/>
+            <a:r>
+              <a:rPr lang="en-US" dirty="0" err="1" smtClean="0">
+                <a:solidFill>
+                  <a:schemeClr val="tx1"/>
+                </a:solidFill>
+              </a:rPr>
+              <a:t>LLInt</a:t>
+            </a:r>
+            <a:endParaRPr lang="en-US" dirty="0">
+              <a:solidFill>
+                <a:schemeClr val="tx1"/>
+              </a:solidFill>
+            </a:endParaRPr>
+          </a:p>
+        </p:txBody>
+      </p:sp>
+      <p:sp>
+        <p:nvSpPr>
+          <p:cNvPr id="5" name="Rectangle 4"/>
+          <p:cNvSpPr/>
+          <p:nvPr/>
+        </p:nvSpPr>
+        <p:spPr>
+          <a:xfrm>
+            <a:off x="3553968" y="2331720"/>
+            <a:ext cx="1737360" cy="877824"/>
+          </a:xfrm>
+          <a:prstGeom prst="rect">
+            <a:avLst/>
+          </a:prstGeom>
+          <a:solidFill>
+            <a:schemeClr val="bg1"/>
+          </a:solidFill>
+          <a:ln>
+            <a:solidFill>
+              <a:schemeClr val="tx1"/>
+            </a:solidFill>
+          </a:ln>
+        </p:spPr>
+        <p:style>
+          <a:lnRef idx="2">
+            <a:schemeClr val="accent1">
+              <a:shade val="50000"/>
+            </a:schemeClr>
+          </a:lnRef>
+          <a:fillRef idx="1">
+            <a:schemeClr val="accent1"/>
+          </a:fillRef>
+          <a:effectRef idx="0">
+            <a:schemeClr val="accent1"/>
+          </a:effectRef>
+          <a:fontRef idx="minor">
+            <a:schemeClr val="lt1"/>
+          </a:fontRef>
+        </p:style>
+        <p:txBody>
+          <a:bodyPr rtlCol="0" anchor="ctr"/>
+          <a:lstStyle/>
+          <a:p>
+            <a:pPr algn="ctr"/>
+            <a:r>
+              <a:rPr lang="en-US" dirty="0" smtClean="0">
+                <a:solidFill>
+                  <a:schemeClr val="tx1"/>
+                </a:solidFill>
+              </a:rPr>
+              <a:t>Baseline JIT</a:t>
+            </a:r>
+            <a:endParaRPr lang="en-US" dirty="0">
+              <a:solidFill>
+                <a:schemeClr val="tx1"/>
+              </a:solidFill>
+            </a:endParaRPr>
+          </a:p>
+        </p:txBody>
+      </p:sp>
+      <p:sp>
+        <p:nvSpPr>
+          <p:cNvPr id="6" name="Rectangle 5"/>
+          <p:cNvSpPr/>
+          <p:nvPr/>
+        </p:nvSpPr>
+        <p:spPr>
+          <a:xfrm>
+            <a:off x="6568440" y="2331720"/>
+            <a:ext cx="1737360" cy="877824"/>
+          </a:xfrm>
+          <a:prstGeom prst="rect">
+            <a:avLst/>
+          </a:prstGeom>
+          <a:solidFill>
+            <a:schemeClr val="bg1"/>
+          </a:solidFill>
+          <a:ln>
+            <a:solidFill>
+              <a:schemeClr val="tx1"/>
+            </a:solidFill>
+          </a:ln>
+        </p:spPr>
+        <p:style>
+          <a:lnRef idx="2">
+            <a:schemeClr val="accent1">
+              <a:shade val="50000"/>
+            </a:schemeClr>
+          </a:lnRef>
+          <a:fillRef idx="1">
+            <a:schemeClr val="accent1"/>
+          </a:fillRef>
+          <a:effectRef idx="0">
+            <a:schemeClr val="accent1"/>
+          </a:effectRef>
+          <a:fontRef idx="minor">
+            <a:schemeClr val="lt1"/>
+          </a:fontRef>
+        </p:style>
+        <p:txBody>
+          <a:bodyPr rtlCol="0" anchor="ctr"/>
+          <a:lstStyle/>
+          <a:p>
+            <a:pPr algn="ctr"/>
+            <a:r>
+              <a:rPr lang="en-US" dirty="0" smtClean="0">
+                <a:solidFill>
+                  <a:schemeClr val="tx1"/>
+                </a:solidFill>
+              </a:rPr>
+              <a:t>DFG JIT</a:t>
+            </a:r>
+            <a:endParaRPr lang="en-US" dirty="0">
+              <a:solidFill>
+                <a:schemeClr val="tx1"/>
+              </a:solidFill>
+            </a:endParaRPr>
+          </a:p>
+        </p:txBody>
+      </p:sp>
+      <p:sp>
+        <p:nvSpPr>
+          <p:cNvPr id="7" name="Rectangle 6"/>
+          <p:cNvSpPr/>
+          <p:nvPr/>
+        </p:nvSpPr>
+        <p:spPr>
+          <a:xfrm>
+            <a:off x="9582912" y="2331720"/>
+            <a:ext cx="1737360" cy="877824"/>
+          </a:xfrm>
+          <a:prstGeom prst="rect">
+            <a:avLst/>
+          </a:prstGeom>
+          <a:solidFill>
+            <a:schemeClr val="bg1"/>
+          </a:solidFill>
+          <a:ln>
+            <a:solidFill>
+              <a:schemeClr val="tx1"/>
+            </a:solidFill>
+          </a:ln>
+        </p:spPr>
+        <p:style>
+          <a:lnRef idx="2">
+            <a:schemeClr val="accent1">
+              <a:shade val="50000"/>
+            </a:schemeClr>
+          </a:lnRef>
+          <a:fillRef idx="1">
+            <a:schemeClr val="accent1"/>
+          </a:fillRef>
+          <a:effectRef idx="0">
+            <a:schemeClr val="accent1"/>
+          </a:effectRef>
+          <a:fontRef idx="minor">
+            <a:schemeClr val="lt1"/>
+          </a:fontRef>
+        </p:style>
+        <p:txBody>
+          <a:bodyPr rtlCol="0" anchor="ctr"/>
+          <a:lstStyle/>
+          <a:p>
+            <a:pPr algn="ctr"/>
+            <a:r>
+              <a:rPr lang="en-US" dirty="0" smtClean="0">
+                <a:solidFill>
+                  <a:schemeClr val="tx1"/>
+                </a:solidFill>
+              </a:rPr>
+              <a:t>FTL</a:t>
+            </a:r>
+            <a:endParaRPr lang="en-US" dirty="0">
+              <a:solidFill>
+                <a:schemeClr val="tx1"/>
+              </a:solidFill>
+            </a:endParaRPr>
+          </a:p>
+        </p:txBody>
+      </p:sp>
+      <p:sp>
+        <p:nvSpPr>
+          <p:cNvPr id="10" name="Right Arrow 9"/>
+          <p:cNvSpPr/>
+          <p:nvPr/>
+        </p:nvSpPr>
+        <p:spPr>
+          <a:xfrm>
+            <a:off x="2276856" y="2487168"/>
+            <a:ext cx="1277112" cy="566928"/>
+          </a:xfrm>
+          <a:prstGeom prst="rightArrow">
+            <a:avLst/>
+          </a:prstGeom>
+          <a:solidFill>
+            <a:schemeClr val="bg1"/>
+          </a:solidFill>
+          <a:ln>
+            <a:solidFill>
+              <a:schemeClr val="tx1"/>
+            </a:solidFill>
+          </a:ln>
+        </p:spPr>
+        <p:style>
+          <a:lnRef idx="2">
+            <a:schemeClr val="accent1">
+              <a:shade val="50000"/>
+            </a:schemeClr>
+          </a:lnRef>
+          <a:fillRef idx="1">
+            <a:schemeClr val="accent1"/>
+          </a:fillRef>
+          <a:effectRef idx="0">
+            <a:schemeClr val="accent1"/>
+          </a:effectRef>
+          <a:fontRef idx="minor">
+            <a:schemeClr val="lt1"/>
+          </a:fontRef>
+        </p:style>
+        <p:txBody>
+          <a:bodyPr rtlCol="0" anchor="ctr"/>
+          <a:lstStyle/>
+          <a:p>
+            <a:pPr algn="ctr"/>
+            <a:r>
+              <a:rPr lang="en-US" dirty="0" smtClean="0">
+                <a:solidFill>
+                  <a:schemeClr val="tx1"/>
+                </a:solidFill>
+              </a:rPr>
+              <a:t>1</a:t>
+            </a:r>
+            <a:endParaRPr lang="en-US" dirty="0">
+              <a:solidFill>
+                <a:schemeClr val="tx1"/>
+              </a:solidFill>
+            </a:endParaRPr>
+          </a:p>
+        </p:txBody>
+      </p:sp>
+      <p:sp>
+        <p:nvSpPr>
+          <p:cNvPr id="11" name="Right Arrow 10"/>
+          <p:cNvSpPr/>
+          <p:nvPr/>
+        </p:nvSpPr>
+        <p:spPr>
+          <a:xfrm>
+            <a:off x="5291328" y="2487168"/>
+            <a:ext cx="1277112" cy="566928"/>
+          </a:xfrm>
+          <a:prstGeom prst="rightArrow">
+            <a:avLst/>
+          </a:prstGeom>
+          <a:solidFill>
+            <a:schemeClr val="bg1"/>
+          </a:solidFill>
+          <a:ln>
+            <a:solidFill>
+              <a:schemeClr val="tx1"/>
+            </a:solidFill>
+          </a:ln>
+        </p:spPr>
+        <p:style>
+          <a:lnRef idx="2">
+            <a:schemeClr val="accent1">
+              <a:shade val="50000"/>
+            </a:schemeClr>
+          </a:lnRef>
+          <a:fillRef idx="1">
+            <a:schemeClr val="accent1"/>
+          </a:fillRef>
+          <a:effectRef idx="0">
+            <a:schemeClr val="accent1"/>
+          </a:effectRef>
+          <a:fontRef idx="minor">
+            <a:schemeClr val="lt1"/>
+          </a:fontRef>
+        </p:style>
+        <p:txBody>
+          <a:bodyPr rtlCol="0" anchor="ctr"/>
+          <a:lstStyle/>
+          <a:p>
+            <a:pPr algn="ctr"/>
+            <a:r>
+              <a:rPr lang="en-US" dirty="0" smtClean="0">
+                <a:solidFill>
+                  <a:schemeClr val="tx1"/>
+                </a:solidFill>
+              </a:rPr>
+              <a:t>2</a:t>
+            </a:r>
+            <a:endParaRPr lang="en-US" dirty="0">
+              <a:solidFill>
+                <a:schemeClr val="tx1"/>
+              </a:solidFill>
+            </a:endParaRPr>
+          </a:p>
+        </p:txBody>
+      </p:sp>
+      <p:sp>
+        <p:nvSpPr>
+          <p:cNvPr id="12" name="Right Arrow 11"/>
+          <p:cNvSpPr/>
+          <p:nvPr/>
+        </p:nvSpPr>
+        <p:spPr>
+          <a:xfrm>
+            <a:off x="8305800" y="2487168"/>
+            <a:ext cx="1277112" cy="566928"/>
+          </a:xfrm>
+          <a:prstGeom prst="rightArrow">
+            <a:avLst/>
+          </a:prstGeom>
+          <a:solidFill>
+            <a:schemeClr val="bg1"/>
+          </a:solidFill>
+          <a:ln>
+            <a:solidFill>
+              <a:schemeClr val="tx1"/>
+            </a:solidFill>
+          </a:ln>
+        </p:spPr>
+        <p:style>
+          <a:lnRef idx="2">
+            <a:schemeClr val="accent1">
+              <a:shade val="50000"/>
+            </a:schemeClr>
+          </a:lnRef>
+          <a:fillRef idx="1">
+            <a:schemeClr val="accent1"/>
+          </a:fillRef>
+          <a:effectRef idx="0">
+            <a:schemeClr val="accent1"/>
+          </a:effectRef>
+          <a:fontRef idx="minor">
+            <a:schemeClr val="lt1"/>
+          </a:fontRef>
+        </p:style>
+        <p:txBody>
+          <a:bodyPr rtlCol="0" anchor="ctr"/>
+          <a:lstStyle/>
+          <a:p>
+            <a:pPr algn="ctr"/>
+            <a:r>
+              <a:rPr lang="en-US" dirty="0" smtClean="0">
+                <a:solidFill>
+                  <a:schemeClr val="tx1"/>
+                </a:solidFill>
+              </a:rPr>
+              <a:t>3</a:t>
+            </a:r>
+            <a:endParaRPr lang="en-US" dirty="0">
+              <a:solidFill>
+                <a:schemeClr val="tx1"/>
+              </a:solidFill>
+            </a:endParaRPr>
+          </a:p>
+        </p:txBody>
+      </p:sp>
+      <p:sp>
+        <p:nvSpPr>
+          <p:cNvPr id="21" name="Curved Down Arrow 20"/>
+          <p:cNvSpPr/>
+          <p:nvPr/>
+        </p:nvSpPr>
+        <p:spPr>
+          <a:xfrm rot="10800000">
+            <a:off x="4859173" y="3209544"/>
+            <a:ext cx="2577947" cy="954832"/>
+          </a:xfrm>
+          <a:prstGeom prst="curvedDownArrow">
+            <a:avLst/>
+          </a:prstGeom>
+          <a:solidFill>
+            <a:schemeClr val="bg1"/>
+          </a:solidFill>
+          <a:ln>
+            <a:solidFill>
+              <a:schemeClr val="tx1"/>
+            </a:solidFill>
+          </a:ln>
+        </p:spPr>
+        <p:style>
+          <a:lnRef idx="2">
+            <a:schemeClr val="accent1">
+              <a:shade val="50000"/>
+            </a:schemeClr>
+          </a:lnRef>
+          <a:fillRef idx="1">
+            <a:schemeClr val="accent1"/>
+          </a:fillRef>
+          <a:effectRef idx="0">
+            <a:schemeClr val="accent1"/>
+          </a:effectRef>
+          <a:fontRef idx="minor">
+            <a:schemeClr val="lt1"/>
+          </a:fontRef>
+        </p:style>
+        <p:txBody>
+          <a:bodyPr rtlCol="0" anchor="ctr"/>
+          <a:lstStyle/>
+          <a:p>
+            <a:pPr algn="ctr"/>
+            <a:endParaRPr lang="en-US" dirty="0">
+              <a:solidFill>
+                <a:schemeClr val="tx1"/>
+              </a:solidFill>
+            </a:endParaRPr>
+          </a:p>
+        </p:txBody>
+      </p:sp>
+      <p:sp>
+        <p:nvSpPr>
+          <p:cNvPr id="22" name="Curved Down Arrow 21"/>
+          <p:cNvSpPr/>
+          <p:nvPr/>
+        </p:nvSpPr>
+        <p:spPr>
+          <a:xfrm rot="10800000">
+            <a:off x="3734718" y="3209540"/>
+            <a:ext cx="6928432" cy="1340426"/>
+          </a:xfrm>
+          <a:prstGeom prst="curvedDownArrow">
+            <a:avLst>
+              <a:gd name="adj1" fmla="val 20106"/>
+              <a:gd name="adj2" fmla="val 40049"/>
+              <a:gd name="adj3" fmla="val 26455"/>
+            </a:avLst>
+          </a:prstGeom>
+          <a:solidFill>
+            <a:schemeClr val="bg1"/>
+          </a:solidFill>
+          <a:ln>
+            <a:solidFill>
+              <a:schemeClr val="tx1"/>
+            </a:solidFill>
+          </a:ln>
+        </p:spPr>
+        <p:style>
+          <a:lnRef idx="2">
+            <a:schemeClr val="accent1">
+              <a:shade val="50000"/>
+            </a:schemeClr>
+          </a:lnRef>
+          <a:fillRef idx="1">
+            <a:schemeClr val="accent1"/>
+          </a:fillRef>
+          <a:effectRef idx="0">
+            <a:schemeClr val="accent1"/>
+          </a:effectRef>
+          <a:fontRef idx="minor">
+            <a:schemeClr val="lt1"/>
+          </a:fontRef>
+        </p:style>
+        <p:txBody>
+          <a:bodyPr rtlCol="0" anchor="ctr"/>
+          <a:lstStyle/>
+          <a:p>
+            <a:pPr algn="ctr"/>
+            <a:endParaRPr lang="en-US">
+              <a:solidFill>
+                <a:schemeClr val="tx1"/>
+              </a:solidFill>
+            </a:endParaRPr>
+          </a:p>
+        </p:txBody>
+      </p:sp>
+      <p:sp>
+        <p:nvSpPr>
+          <p:cNvPr id="23" name="TextBox 22"/>
+          <p:cNvSpPr txBox="1"/>
+          <p:nvPr/>
+        </p:nvSpPr>
+        <p:spPr>
+          <a:xfrm>
+            <a:off x="5997303" y="3610379"/>
+            <a:ext cx="301686" cy="369332"/>
+          </a:xfrm>
+          <a:prstGeom prst="rect">
+            <a:avLst/>
+          </a:prstGeom>
+          <a:noFill/>
+        </p:spPr>
+        <p:txBody>
+          <a:bodyPr wrap="none" rtlCol="0">
+            <a:spAutoFit/>
+          </a:bodyPr>
+          <a:lstStyle/>
+          <a:p>
+            <a:r>
+              <a:rPr lang="en-US" smtClean="0"/>
+              <a:t>4</a:t>
+            </a:r>
+            <a:endParaRPr lang="en-US"/>
+          </a:p>
+        </p:txBody>
+      </p:sp>
+      <p:sp>
+        <p:nvSpPr>
+          <p:cNvPr id="24" name="TextBox 23"/>
+          <p:cNvSpPr txBox="1"/>
+          <p:nvPr/>
+        </p:nvSpPr>
+        <p:spPr>
+          <a:xfrm>
+            <a:off x="7313152" y="4087363"/>
+            <a:ext cx="301686" cy="369332"/>
+          </a:xfrm>
+          <a:prstGeom prst="rect">
+            <a:avLst/>
+          </a:prstGeom>
+          <a:noFill/>
+        </p:spPr>
+        <p:txBody>
+          <a:bodyPr wrap="none" rtlCol="0">
+            <a:spAutoFit/>
+          </a:bodyPr>
+          <a:lstStyle/>
+          <a:p>
+            <a:r>
+              <a:rPr lang="en-US" smtClean="0"/>
+              <a:t>5</a:t>
+            </a:r>
+            <a:endParaRPr lang="en-US"/>
+          </a:p>
+        </p:txBody>
+      </p:sp>
+    </p:spTree>
+    <p:extLst>
+      <p:ext uri="{BB962C8B-B14F-4D97-AF65-F5344CB8AC3E}">
+        <p14:creationId xmlns:p14="http://schemas.microsoft.com/office/powerpoint/2010/main" val="1642169019"/>
+      </p:ext>
+    </p:extLst>
+  </p:cSld>
+  <p:clrMapOvr>
+    <a:masterClrMapping/>
+  </p:clrMapOvr>
+</p:sld>
+</file>
+
 <file path=ppt/theme/theme1.xml><?xml version="1.0" encoding="utf-8"?>
 <a:theme xmlns:a="http://schemas.openxmlformats.org/drawingml/2006/main" name="Office Theme">
   <a:themeElements>

</xml_diff>

<commit_message>
Writting the part about MCJit
Adding pictures.
Still need to finish this part
</commit_message>
<xml_diff>
--- a/MasterThesis/Figures/holzle.pptx
+++ b/MasterThesis/Figures/holzle.pptx
@@ -9,6 +9,11 @@
     <p:sldId id="257" r:id="rId3"/>
     <p:sldId id="258" r:id="rId4"/>
     <p:sldId id="259" r:id="rId5"/>
+    <p:sldId id="260" r:id="rId6"/>
+    <p:sldId id="261" r:id="rId7"/>
+    <p:sldId id="262" r:id="rId8"/>
+    <p:sldId id="264" r:id="rId9"/>
+    <p:sldId id="263" r:id="rId10"/>
   </p:sldIdLst>
   <p:sldSz cx="12192000" cy="6858000"/>
   <p:notesSz cx="6858000" cy="9144000"/>
@@ -246,7 +251,7 @@
           <a:p>
             <a:fld id="{39514751-6C89-194E-A652-4BD3C8EB45FC}" type="datetimeFigureOut">
               <a:rPr lang="en-US" smtClean="0"/>
-              <a:t>12/28/15</a:t>
+              <a:t>12/29/15</a:t>
             </a:fld>
             <a:endParaRPr lang="en-US"/>
           </a:p>
@@ -416,7 +421,7 @@
           <a:p>
             <a:fld id="{39514751-6C89-194E-A652-4BD3C8EB45FC}" type="datetimeFigureOut">
               <a:rPr lang="en-US" smtClean="0"/>
-              <a:t>12/28/15</a:t>
+              <a:t>12/29/15</a:t>
             </a:fld>
             <a:endParaRPr lang="en-US"/>
           </a:p>
@@ -596,7 +601,7 @@
           <a:p>
             <a:fld id="{39514751-6C89-194E-A652-4BD3C8EB45FC}" type="datetimeFigureOut">
               <a:rPr lang="en-US" smtClean="0"/>
-              <a:t>12/28/15</a:t>
+              <a:t>12/29/15</a:t>
             </a:fld>
             <a:endParaRPr lang="en-US"/>
           </a:p>
@@ -766,7 +771,7 @@
           <a:p>
             <a:fld id="{39514751-6C89-194E-A652-4BD3C8EB45FC}" type="datetimeFigureOut">
               <a:rPr lang="en-US" smtClean="0"/>
-              <a:t>12/28/15</a:t>
+              <a:t>12/29/15</a:t>
             </a:fld>
             <a:endParaRPr lang="en-US"/>
           </a:p>
@@ -1012,7 +1017,7 @@
           <a:p>
             <a:fld id="{39514751-6C89-194E-A652-4BD3C8EB45FC}" type="datetimeFigureOut">
               <a:rPr lang="en-US" smtClean="0"/>
-              <a:t>12/28/15</a:t>
+              <a:t>12/29/15</a:t>
             </a:fld>
             <a:endParaRPr lang="en-US"/>
           </a:p>
@@ -1244,7 +1249,7 @@
           <a:p>
             <a:fld id="{39514751-6C89-194E-A652-4BD3C8EB45FC}" type="datetimeFigureOut">
               <a:rPr lang="en-US" smtClean="0"/>
-              <a:t>12/28/15</a:t>
+              <a:t>12/29/15</a:t>
             </a:fld>
             <a:endParaRPr lang="en-US"/>
           </a:p>
@@ -1611,7 +1616,7 @@
           <a:p>
             <a:fld id="{39514751-6C89-194E-A652-4BD3C8EB45FC}" type="datetimeFigureOut">
               <a:rPr lang="en-US" smtClean="0"/>
-              <a:t>12/28/15</a:t>
+              <a:t>12/29/15</a:t>
             </a:fld>
             <a:endParaRPr lang="en-US"/>
           </a:p>
@@ -1729,7 +1734,7 @@
           <a:p>
             <a:fld id="{39514751-6C89-194E-A652-4BD3C8EB45FC}" type="datetimeFigureOut">
               <a:rPr lang="en-US" smtClean="0"/>
-              <a:t>12/28/15</a:t>
+              <a:t>12/29/15</a:t>
             </a:fld>
             <a:endParaRPr lang="en-US"/>
           </a:p>
@@ -1824,7 +1829,7 @@
           <a:p>
             <a:fld id="{39514751-6C89-194E-A652-4BD3C8EB45FC}" type="datetimeFigureOut">
               <a:rPr lang="en-US" smtClean="0"/>
-              <a:t>12/28/15</a:t>
+              <a:t>12/29/15</a:t>
             </a:fld>
             <a:endParaRPr lang="en-US"/>
           </a:p>
@@ -2101,7 +2106,7 @@
           <a:p>
             <a:fld id="{39514751-6C89-194E-A652-4BD3C8EB45FC}" type="datetimeFigureOut">
               <a:rPr lang="en-US" smtClean="0"/>
-              <a:t>12/28/15</a:t>
+              <a:t>12/29/15</a:t>
             </a:fld>
             <a:endParaRPr lang="en-US"/>
           </a:p>
@@ -2354,7 +2359,7 @@
           <a:p>
             <a:fld id="{39514751-6C89-194E-A652-4BD3C8EB45FC}" type="datetimeFigureOut">
               <a:rPr lang="en-US" smtClean="0"/>
-              <a:t>12/28/15</a:t>
+              <a:t>12/29/15</a:t>
             </a:fld>
             <a:endParaRPr lang="en-US"/>
           </a:p>
@@ -2567,7 +2572,7 @@
           <a:p>
             <a:fld id="{39514751-6C89-194E-A652-4BD3C8EB45FC}" type="datetimeFigureOut">
               <a:rPr lang="en-US" smtClean="0"/>
-              <a:t>12/28/15</a:t>
+              <a:t>12/29/15</a:t>
             </a:fld>
             <a:endParaRPr lang="en-US"/>
           </a:p>
@@ -7999,6 +8004,3940 @@
 </p:sld>
 </file>
 
+<file path=ppt/slides/slide5.xml><?xml version="1.0" encoding="utf-8"?>
+<p:sld xmlns:a="http://schemas.openxmlformats.org/drawingml/2006/main" xmlns:r="http://schemas.openxmlformats.org/officeDocument/2006/relationships" xmlns:p="http://schemas.openxmlformats.org/presentationml/2006/main">
+  <p:cSld>
+    <p:spTree>
+      <p:nvGrpSpPr>
+        <p:cNvPr id="1" name=""/>
+        <p:cNvGrpSpPr/>
+        <p:nvPr/>
+      </p:nvGrpSpPr>
+      <p:grpSpPr>
+        <a:xfrm>
+          <a:off x="0" y="0"/>
+          <a:ext cx="0" cy="0"/>
+          <a:chOff x="0" y="0"/>
+          <a:chExt cx="0" cy="0"/>
+        </a:xfrm>
+      </p:grpSpPr>
+      <p:sp>
+        <p:nvSpPr>
+          <p:cNvPr id="4" name="Rectangle 3"/>
+          <p:cNvSpPr/>
+          <p:nvPr/>
+        </p:nvSpPr>
+        <p:spPr>
+          <a:xfrm>
+            <a:off x="841248" y="2670048"/>
+            <a:ext cx="1645920" cy="960120"/>
+          </a:xfrm>
+          <a:prstGeom prst="rect">
+            <a:avLst/>
+          </a:prstGeom>
+          <a:solidFill>
+            <a:schemeClr val="bg1"/>
+          </a:solidFill>
+          <a:ln>
+            <a:solidFill>
+              <a:schemeClr val="tx1"/>
+            </a:solidFill>
+          </a:ln>
+        </p:spPr>
+        <p:style>
+          <a:lnRef idx="2">
+            <a:schemeClr val="accent1">
+              <a:shade val="50000"/>
+            </a:schemeClr>
+          </a:lnRef>
+          <a:fillRef idx="1">
+            <a:schemeClr val="accent1"/>
+          </a:fillRef>
+          <a:effectRef idx="0">
+            <a:schemeClr val="accent1"/>
+          </a:effectRef>
+          <a:fontRef idx="minor">
+            <a:schemeClr val="lt1"/>
+          </a:fontRef>
+        </p:style>
+        <p:txBody>
+          <a:bodyPr rtlCol="0" anchor="ctr"/>
+          <a:lstStyle/>
+          <a:p>
+            <a:pPr algn="ctr"/>
+            <a:r>
+              <a:rPr lang="en-US" dirty="0" smtClean="0">
+                <a:solidFill>
+                  <a:sysClr val="windowText" lastClr="000000"/>
+                </a:solidFill>
+              </a:rPr>
+              <a:t>Base</a:t>
+            </a:r>
+            <a:endParaRPr lang="en-US" dirty="0">
+              <a:solidFill>
+                <a:sysClr val="windowText" lastClr="000000"/>
+              </a:solidFill>
+            </a:endParaRPr>
+          </a:p>
+        </p:txBody>
+      </p:sp>
+      <p:sp>
+        <p:nvSpPr>
+          <p:cNvPr id="5" name="Rectangle 4"/>
+          <p:cNvSpPr/>
+          <p:nvPr/>
+        </p:nvSpPr>
+        <p:spPr>
+          <a:xfrm>
+            <a:off x="3179064" y="2670048"/>
+            <a:ext cx="1645920" cy="960120"/>
+          </a:xfrm>
+          <a:prstGeom prst="rect">
+            <a:avLst/>
+          </a:prstGeom>
+          <a:solidFill>
+            <a:schemeClr val="bg1"/>
+          </a:solidFill>
+          <a:ln>
+            <a:solidFill>
+              <a:schemeClr val="tx1"/>
+            </a:solidFill>
+          </a:ln>
+        </p:spPr>
+        <p:style>
+          <a:lnRef idx="2">
+            <a:schemeClr val="accent1">
+              <a:shade val="50000"/>
+            </a:schemeClr>
+          </a:lnRef>
+          <a:fillRef idx="1">
+            <a:schemeClr val="accent1"/>
+          </a:fillRef>
+          <a:effectRef idx="0">
+            <a:schemeClr val="accent1"/>
+          </a:effectRef>
+          <a:fontRef idx="minor">
+            <a:schemeClr val="lt1"/>
+          </a:fontRef>
+        </p:style>
+        <p:txBody>
+          <a:bodyPr rtlCol="0" anchor="ctr"/>
+          <a:lstStyle/>
+          <a:p>
+            <a:pPr algn="ctr"/>
+            <a:r>
+              <a:rPr lang="en-US" dirty="0" smtClean="0">
+                <a:solidFill>
+                  <a:sysClr val="windowText" lastClr="000000"/>
+                </a:solidFill>
+              </a:rPr>
+              <a:t>opt1</a:t>
+            </a:r>
+            <a:endParaRPr lang="en-US" dirty="0">
+              <a:solidFill>
+                <a:sysClr val="windowText" lastClr="000000"/>
+              </a:solidFill>
+            </a:endParaRPr>
+          </a:p>
+        </p:txBody>
+      </p:sp>
+      <p:sp>
+        <p:nvSpPr>
+          <p:cNvPr id="6" name="Rectangle 5"/>
+          <p:cNvSpPr/>
+          <p:nvPr/>
+        </p:nvSpPr>
+        <p:spPr>
+          <a:xfrm>
+            <a:off x="5516880" y="2670048"/>
+            <a:ext cx="1645920" cy="960120"/>
+          </a:xfrm>
+          <a:prstGeom prst="rect">
+            <a:avLst/>
+          </a:prstGeom>
+          <a:solidFill>
+            <a:schemeClr val="bg1"/>
+          </a:solidFill>
+          <a:ln>
+            <a:solidFill>
+              <a:schemeClr val="tx1"/>
+            </a:solidFill>
+          </a:ln>
+        </p:spPr>
+        <p:style>
+          <a:lnRef idx="2">
+            <a:schemeClr val="accent1">
+              <a:shade val="50000"/>
+            </a:schemeClr>
+          </a:lnRef>
+          <a:fillRef idx="1">
+            <a:schemeClr val="accent1"/>
+          </a:fillRef>
+          <a:effectRef idx="0">
+            <a:schemeClr val="accent1"/>
+          </a:effectRef>
+          <a:fontRef idx="minor">
+            <a:schemeClr val="lt1"/>
+          </a:fontRef>
+        </p:style>
+        <p:txBody>
+          <a:bodyPr rtlCol="0" anchor="ctr"/>
+          <a:lstStyle/>
+          <a:p>
+            <a:pPr algn="ctr"/>
+            <a:r>
+              <a:rPr lang="en-US" dirty="0" smtClean="0">
+                <a:solidFill>
+                  <a:sysClr val="windowText" lastClr="000000"/>
+                </a:solidFill>
+              </a:rPr>
+              <a:t>opt2</a:t>
+            </a:r>
+            <a:endParaRPr lang="en-US" dirty="0">
+              <a:solidFill>
+                <a:sysClr val="windowText" lastClr="000000"/>
+              </a:solidFill>
+            </a:endParaRPr>
+          </a:p>
+        </p:txBody>
+      </p:sp>
+      <p:cxnSp>
+        <p:nvCxnSpPr>
+          <p:cNvPr id="18" name="Curved Connector 17"/>
+          <p:cNvCxnSpPr>
+            <a:stCxn id="4" idx="0"/>
+            <a:endCxn id="5" idx="0"/>
+          </p:cNvCxnSpPr>
+          <p:nvPr/>
+        </p:nvCxnSpPr>
+        <p:spPr>
+          <a:xfrm rot="5400000" flipH="1" flipV="1">
+            <a:off x="2833116" y="1501140"/>
+            <a:ext cx="12700" cy="2337816"/>
+          </a:xfrm>
+          <a:prstGeom prst="curvedConnector3">
+            <a:avLst>
+              <a:gd name="adj1" fmla="val 1800000"/>
+            </a:avLst>
+          </a:prstGeom>
+          <a:ln>
+            <a:solidFill>
+              <a:schemeClr val="tx1"/>
+            </a:solidFill>
+            <a:tailEnd type="triangle"/>
+          </a:ln>
+        </p:spPr>
+        <p:style>
+          <a:lnRef idx="1">
+            <a:schemeClr val="accent1"/>
+          </a:lnRef>
+          <a:fillRef idx="0">
+            <a:schemeClr val="accent1"/>
+          </a:fillRef>
+          <a:effectRef idx="0">
+            <a:schemeClr val="accent1"/>
+          </a:effectRef>
+          <a:fontRef idx="minor">
+            <a:schemeClr val="tx1"/>
+          </a:fontRef>
+        </p:style>
+      </p:cxnSp>
+      <p:cxnSp>
+        <p:nvCxnSpPr>
+          <p:cNvPr id="20" name="Curved Connector 19"/>
+          <p:cNvCxnSpPr>
+            <a:stCxn id="5" idx="2"/>
+            <a:endCxn id="4" idx="2"/>
+          </p:cNvCxnSpPr>
+          <p:nvPr/>
+        </p:nvCxnSpPr>
+        <p:spPr>
+          <a:xfrm rot="5400000">
+            <a:off x="2833116" y="2461260"/>
+            <a:ext cx="12700" cy="2337816"/>
+          </a:xfrm>
+          <a:prstGeom prst="curvedConnector3">
+            <a:avLst>
+              <a:gd name="adj1" fmla="val 1800000"/>
+            </a:avLst>
+          </a:prstGeom>
+          <a:ln>
+            <a:solidFill>
+              <a:schemeClr val="tx1"/>
+            </a:solidFill>
+            <a:tailEnd type="triangle"/>
+          </a:ln>
+        </p:spPr>
+        <p:style>
+          <a:lnRef idx="1">
+            <a:schemeClr val="accent1"/>
+          </a:lnRef>
+          <a:fillRef idx="0">
+            <a:schemeClr val="accent1"/>
+          </a:fillRef>
+          <a:effectRef idx="0">
+            <a:schemeClr val="accent1"/>
+          </a:effectRef>
+          <a:fontRef idx="minor">
+            <a:schemeClr val="tx1"/>
+          </a:fontRef>
+        </p:style>
+      </p:cxnSp>
+      <p:cxnSp>
+        <p:nvCxnSpPr>
+          <p:cNvPr id="22" name="Curved Connector 21"/>
+          <p:cNvCxnSpPr>
+            <a:stCxn id="5" idx="0"/>
+            <a:endCxn id="6" idx="0"/>
+          </p:cNvCxnSpPr>
+          <p:nvPr/>
+        </p:nvCxnSpPr>
+        <p:spPr>
+          <a:xfrm rot="5400000" flipH="1" flipV="1">
+            <a:off x="5170932" y="1501140"/>
+            <a:ext cx="12700" cy="2337816"/>
+          </a:xfrm>
+          <a:prstGeom prst="curvedConnector3">
+            <a:avLst>
+              <a:gd name="adj1" fmla="val 1800000"/>
+            </a:avLst>
+          </a:prstGeom>
+          <a:ln>
+            <a:solidFill>
+              <a:schemeClr val="tx1"/>
+            </a:solidFill>
+            <a:tailEnd type="triangle"/>
+          </a:ln>
+        </p:spPr>
+        <p:style>
+          <a:lnRef idx="1">
+            <a:schemeClr val="accent1"/>
+          </a:lnRef>
+          <a:fillRef idx="0">
+            <a:schemeClr val="accent1"/>
+          </a:fillRef>
+          <a:effectRef idx="0">
+            <a:schemeClr val="accent1"/>
+          </a:effectRef>
+          <a:fontRef idx="minor">
+            <a:schemeClr val="tx1"/>
+          </a:fontRef>
+        </p:style>
+      </p:cxnSp>
+      <p:cxnSp>
+        <p:nvCxnSpPr>
+          <p:cNvPr id="24" name="Curved Connector 23"/>
+          <p:cNvCxnSpPr>
+            <a:stCxn id="6" idx="2"/>
+            <a:endCxn id="5" idx="2"/>
+          </p:cNvCxnSpPr>
+          <p:nvPr/>
+        </p:nvCxnSpPr>
+        <p:spPr>
+          <a:xfrm rot="5400000">
+            <a:off x="5170932" y="2461260"/>
+            <a:ext cx="12700" cy="2337816"/>
+          </a:xfrm>
+          <a:prstGeom prst="curvedConnector3">
+            <a:avLst>
+              <a:gd name="adj1" fmla="val 1800000"/>
+            </a:avLst>
+          </a:prstGeom>
+          <a:ln>
+            <a:solidFill>
+              <a:schemeClr val="tx1"/>
+            </a:solidFill>
+            <a:tailEnd type="triangle"/>
+          </a:ln>
+        </p:spPr>
+        <p:style>
+          <a:lnRef idx="1">
+            <a:schemeClr val="accent1"/>
+          </a:lnRef>
+          <a:fillRef idx="0">
+            <a:schemeClr val="accent1"/>
+          </a:fillRef>
+          <a:effectRef idx="0">
+            <a:schemeClr val="accent1"/>
+          </a:effectRef>
+          <a:fontRef idx="minor">
+            <a:schemeClr val="tx1"/>
+          </a:fontRef>
+        </p:style>
+      </p:cxnSp>
+      <p:sp>
+        <p:nvSpPr>
+          <p:cNvPr id="26" name="TextBox 25"/>
+          <p:cNvSpPr txBox="1"/>
+          <p:nvPr/>
+        </p:nvSpPr>
+        <p:spPr>
+          <a:xfrm>
+            <a:off x="8567928" y="2875788"/>
+            <a:ext cx="463588" cy="369332"/>
+          </a:xfrm>
+          <a:prstGeom prst="rect">
+            <a:avLst/>
+          </a:prstGeom>
+          <a:solidFill>
+            <a:schemeClr val="bg1"/>
+          </a:solidFill>
+          <a:ln>
+            <a:solidFill>
+              <a:schemeClr val="bg1"/>
+            </a:solidFill>
+          </a:ln>
+        </p:spPr>
+        <p:txBody>
+          <a:bodyPr wrap="none" rtlCol="0">
+            <a:spAutoFit/>
+          </a:bodyPr>
+          <a:lstStyle/>
+          <a:p>
+            <a:r>
+              <a:rPr lang="en-US" dirty="0" smtClean="0">
+                <a:solidFill>
+                  <a:sysClr val="windowText" lastClr="000000"/>
+                </a:solidFill>
+              </a:rPr>
+              <a:t>. . </a:t>
+            </a:r>
+            <a:r>
+              <a:rPr lang="en-US" smtClean="0">
+                <a:solidFill>
+                  <a:sysClr val="windowText" lastClr="000000"/>
+                </a:solidFill>
+              </a:rPr>
+              <a:t>.</a:t>
+            </a:r>
+            <a:endParaRPr lang="en-US">
+              <a:solidFill>
+                <a:sysClr val="windowText" lastClr="000000"/>
+              </a:solidFill>
+            </a:endParaRPr>
+          </a:p>
+        </p:txBody>
+      </p:sp>
+      <p:cxnSp>
+        <p:nvCxnSpPr>
+          <p:cNvPr id="30" name="Curved Connector 29"/>
+          <p:cNvCxnSpPr>
+            <a:stCxn id="6" idx="0"/>
+            <a:endCxn id="26" idx="0"/>
+          </p:cNvCxnSpPr>
+          <p:nvPr/>
+        </p:nvCxnSpPr>
+        <p:spPr>
+          <a:xfrm rot="16200000" flipH="1">
+            <a:off x="7466911" y="1542977"/>
+            <a:ext cx="205740" cy="2459882"/>
+          </a:xfrm>
+          <a:prstGeom prst="curvedConnector3">
+            <a:avLst>
+              <a:gd name="adj1" fmla="val -111111"/>
+            </a:avLst>
+          </a:prstGeom>
+          <a:ln>
+            <a:solidFill>
+              <a:schemeClr val="tx1"/>
+            </a:solidFill>
+            <a:tailEnd type="triangle"/>
+          </a:ln>
+        </p:spPr>
+        <p:style>
+          <a:lnRef idx="1">
+            <a:schemeClr val="accent1"/>
+          </a:lnRef>
+          <a:fillRef idx="0">
+            <a:schemeClr val="accent1"/>
+          </a:fillRef>
+          <a:effectRef idx="0">
+            <a:schemeClr val="accent1"/>
+          </a:effectRef>
+          <a:fontRef idx="minor">
+            <a:schemeClr val="tx1"/>
+          </a:fontRef>
+        </p:style>
+      </p:cxnSp>
+      <p:cxnSp>
+        <p:nvCxnSpPr>
+          <p:cNvPr id="32" name="Curved Connector 31"/>
+          <p:cNvCxnSpPr>
+            <a:stCxn id="26" idx="2"/>
+            <a:endCxn id="6" idx="2"/>
+          </p:cNvCxnSpPr>
+          <p:nvPr/>
+        </p:nvCxnSpPr>
+        <p:spPr>
+          <a:xfrm rot="5400000">
+            <a:off x="7377257" y="2207703"/>
+            <a:ext cx="385048" cy="2459882"/>
+          </a:xfrm>
+          <a:prstGeom prst="curvedConnector3">
+            <a:avLst>
+              <a:gd name="adj1" fmla="val 159369"/>
+            </a:avLst>
+          </a:prstGeom>
+          <a:ln>
+            <a:solidFill>
+              <a:schemeClr val="tx1"/>
+            </a:solidFill>
+            <a:tailEnd type="triangle"/>
+          </a:ln>
+        </p:spPr>
+        <p:style>
+          <a:lnRef idx="1">
+            <a:schemeClr val="accent1"/>
+          </a:lnRef>
+          <a:fillRef idx="0">
+            <a:schemeClr val="accent1"/>
+          </a:fillRef>
+          <a:effectRef idx="0">
+            <a:schemeClr val="accent1"/>
+          </a:effectRef>
+          <a:fontRef idx="minor">
+            <a:schemeClr val="tx1"/>
+          </a:fontRef>
+        </p:style>
+      </p:cxnSp>
+      <p:sp>
+        <p:nvSpPr>
+          <p:cNvPr id="33" name="TextBox 32"/>
+          <p:cNvSpPr txBox="1"/>
+          <p:nvPr/>
+        </p:nvSpPr>
+        <p:spPr>
+          <a:xfrm>
+            <a:off x="2079305" y="2011673"/>
+            <a:ext cx="1462708" cy="369332"/>
+          </a:xfrm>
+          <a:prstGeom prst="rect">
+            <a:avLst/>
+          </a:prstGeom>
+          <a:noFill/>
+        </p:spPr>
+        <p:txBody>
+          <a:bodyPr wrap="none" rtlCol="0">
+            <a:spAutoFit/>
+          </a:bodyPr>
+          <a:lstStyle/>
+          <a:p>
+            <a:r>
+              <a:rPr lang="en-US" smtClean="0"/>
+              <a:t>Optimize OSR</a:t>
+            </a:r>
+            <a:endParaRPr lang="en-US"/>
+          </a:p>
+        </p:txBody>
+      </p:sp>
+      <p:sp>
+        <p:nvSpPr>
+          <p:cNvPr id="34" name="TextBox 33"/>
+          <p:cNvSpPr txBox="1"/>
+          <p:nvPr/>
+        </p:nvSpPr>
+        <p:spPr>
+          <a:xfrm>
+            <a:off x="1851678" y="3910988"/>
+            <a:ext cx="1690335" cy="369332"/>
+          </a:xfrm>
+          <a:prstGeom prst="rect">
+            <a:avLst/>
+          </a:prstGeom>
+          <a:noFill/>
+        </p:spPr>
+        <p:txBody>
+          <a:bodyPr wrap="none" rtlCol="0">
+            <a:spAutoFit/>
+          </a:bodyPr>
+          <a:lstStyle/>
+          <a:p>
+            <a:r>
+              <a:rPr lang="en-US" dirty="0" err="1" smtClean="0"/>
+              <a:t>Deoptimize</a:t>
+            </a:r>
+            <a:r>
+              <a:rPr lang="en-US" dirty="0" smtClean="0"/>
+              <a:t> OSR</a:t>
+            </a:r>
+            <a:endParaRPr lang="en-US" dirty="0"/>
+          </a:p>
+        </p:txBody>
+      </p:sp>
+      <p:sp>
+        <p:nvSpPr>
+          <p:cNvPr id="35" name="TextBox 34"/>
+          <p:cNvSpPr txBox="1"/>
+          <p:nvPr/>
+        </p:nvSpPr>
+        <p:spPr>
+          <a:xfrm>
+            <a:off x="4342887" y="2015655"/>
+            <a:ext cx="1668790" cy="369332"/>
+          </a:xfrm>
+          <a:prstGeom prst="rect">
+            <a:avLst/>
+          </a:prstGeom>
+          <a:noFill/>
+        </p:spPr>
+        <p:txBody>
+          <a:bodyPr wrap="none" rtlCol="0">
+            <a:spAutoFit/>
+          </a:bodyPr>
+          <a:lstStyle/>
+          <a:p>
+            <a:r>
+              <a:rPr lang="en-US" dirty="0" err="1" smtClean="0"/>
+              <a:t>Reoptimize</a:t>
+            </a:r>
+            <a:r>
+              <a:rPr lang="en-US" dirty="0" smtClean="0"/>
+              <a:t> OSR</a:t>
+            </a:r>
+            <a:endParaRPr lang="en-US" dirty="0"/>
+          </a:p>
+        </p:txBody>
+      </p:sp>
+      <p:sp>
+        <p:nvSpPr>
+          <p:cNvPr id="36" name="TextBox 35"/>
+          <p:cNvSpPr txBox="1"/>
+          <p:nvPr/>
+        </p:nvSpPr>
+        <p:spPr>
+          <a:xfrm>
+            <a:off x="4199469" y="3910988"/>
+            <a:ext cx="1735090" cy="369332"/>
+          </a:xfrm>
+          <a:prstGeom prst="rect">
+            <a:avLst/>
+          </a:prstGeom>
+          <a:noFill/>
+        </p:spPr>
+        <p:txBody>
+          <a:bodyPr wrap="none" rtlCol="0">
+            <a:spAutoFit/>
+          </a:bodyPr>
+          <a:lstStyle/>
+          <a:p>
+            <a:r>
+              <a:rPr lang="en-US" smtClean="0"/>
+              <a:t>Last-version OSR</a:t>
+            </a:r>
+            <a:endParaRPr lang="en-US"/>
+          </a:p>
+        </p:txBody>
+      </p:sp>
+    </p:spTree>
+    <p:extLst>
+      <p:ext uri="{BB962C8B-B14F-4D97-AF65-F5344CB8AC3E}">
+        <p14:creationId xmlns:p14="http://schemas.microsoft.com/office/powerpoint/2010/main" val="1077023684"/>
+      </p:ext>
+    </p:extLst>
+  </p:cSld>
+  <p:clrMapOvr>
+    <a:masterClrMapping/>
+  </p:clrMapOvr>
+</p:sld>
+</file>
+
+<file path=ppt/slides/slide6.xml><?xml version="1.0" encoding="utf-8"?>
+<p:sld xmlns:a="http://schemas.openxmlformats.org/drawingml/2006/main" xmlns:r="http://schemas.openxmlformats.org/officeDocument/2006/relationships" xmlns:p="http://schemas.openxmlformats.org/presentationml/2006/main">
+  <p:cSld>
+    <p:spTree>
+      <p:nvGrpSpPr>
+        <p:cNvPr id="1" name=""/>
+        <p:cNvGrpSpPr/>
+        <p:nvPr/>
+      </p:nvGrpSpPr>
+      <p:grpSpPr>
+        <a:xfrm>
+          <a:off x="0" y="0"/>
+          <a:ext cx="0" cy="0"/>
+          <a:chOff x="0" y="0"/>
+          <a:chExt cx="0" cy="0"/>
+        </a:xfrm>
+      </p:grpSpPr>
+      <p:sp>
+        <p:nvSpPr>
+          <p:cNvPr id="4" name="Rectangle 3"/>
+          <p:cNvSpPr/>
+          <p:nvPr/>
+        </p:nvSpPr>
+        <p:spPr>
+          <a:xfrm>
+            <a:off x="1189822" y="539827"/>
+            <a:ext cx="3029638" cy="5662669"/>
+          </a:xfrm>
+          <a:prstGeom prst="rect">
+            <a:avLst/>
+          </a:prstGeom>
+          <a:solidFill>
+            <a:schemeClr val="bg1"/>
+          </a:solidFill>
+          <a:ln>
+            <a:solidFill>
+              <a:schemeClr val="tx1"/>
+            </a:solidFill>
+          </a:ln>
+        </p:spPr>
+        <p:style>
+          <a:lnRef idx="2">
+            <a:schemeClr val="accent1">
+              <a:shade val="50000"/>
+            </a:schemeClr>
+          </a:lnRef>
+          <a:fillRef idx="1">
+            <a:schemeClr val="accent1"/>
+          </a:fillRef>
+          <a:effectRef idx="0">
+            <a:schemeClr val="accent1"/>
+          </a:effectRef>
+          <a:fontRef idx="minor">
+            <a:schemeClr val="lt1"/>
+          </a:fontRef>
+        </p:style>
+        <p:txBody>
+          <a:bodyPr rtlCol="0" anchor="ctr"/>
+          <a:lstStyle/>
+          <a:p>
+            <a:pPr algn="ctr"/>
+            <a:endParaRPr lang="en-US" dirty="0">
+              <a:solidFill>
+                <a:schemeClr val="tx1"/>
+              </a:solidFill>
+            </a:endParaRPr>
+          </a:p>
+        </p:txBody>
+      </p:sp>
+      <p:sp>
+        <p:nvSpPr>
+          <p:cNvPr id="5" name="Rectangle 4"/>
+          <p:cNvSpPr/>
+          <p:nvPr/>
+        </p:nvSpPr>
+        <p:spPr>
+          <a:xfrm>
+            <a:off x="1388125" y="727113"/>
+            <a:ext cx="2633032" cy="1167788"/>
+          </a:xfrm>
+          <a:prstGeom prst="rect">
+            <a:avLst/>
+          </a:prstGeom>
+          <a:solidFill>
+            <a:schemeClr val="bg1"/>
+          </a:solidFill>
+          <a:ln>
+            <a:solidFill>
+              <a:schemeClr val="tx1"/>
+            </a:solidFill>
+          </a:ln>
+        </p:spPr>
+        <p:style>
+          <a:lnRef idx="2">
+            <a:schemeClr val="accent1">
+              <a:shade val="50000"/>
+            </a:schemeClr>
+          </a:lnRef>
+          <a:fillRef idx="1">
+            <a:schemeClr val="accent1"/>
+          </a:fillRef>
+          <a:effectRef idx="0">
+            <a:schemeClr val="accent1"/>
+          </a:effectRef>
+          <a:fontRef idx="minor">
+            <a:schemeClr val="lt1"/>
+          </a:fontRef>
+        </p:style>
+        <p:txBody>
+          <a:bodyPr rtlCol="0" anchor="ctr"/>
+          <a:lstStyle/>
+          <a:p>
+            <a:pPr algn="ctr"/>
+            <a:r>
+              <a:rPr lang="en-US" dirty="0" smtClean="0">
+                <a:solidFill>
+                  <a:schemeClr val="tx1"/>
+                </a:solidFill>
+              </a:rPr>
+              <a:t>LLVM </a:t>
+            </a:r>
+            <a:r>
+              <a:rPr lang="en-US" dirty="0" err="1" smtClean="0">
+                <a:solidFill>
+                  <a:schemeClr val="tx1"/>
+                </a:solidFill>
+              </a:rPr>
+              <a:t>CodeGen</a:t>
+            </a:r>
+            <a:endParaRPr lang="en-US" dirty="0">
+              <a:solidFill>
+                <a:schemeClr val="tx1"/>
+              </a:solidFill>
+            </a:endParaRPr>
+          </a:p>
+        </p:txBody>
+      </p:sp>
+      <p:sp>
+        <p:nvSpPr>
+          <p:cNvPr id="6" name="Rectangle 5"/>
+          <p:cNvSpPr/>
+          <p:nvPr/>
+        </p:nvSpPr>
+        <p:spPr>
+          <a:xfrm>
+            <a:off x="1388125" y="2421875"/>
+            <a:ext cx="2633032" cy="1167788"/>
+          </a:xfrm>
+          <a:prstGeom prst="rect">
+            <a:avLst/>
+          </a:prstGeom>
+          <a:solidFill>
+            <a:schemeClr val="bg1"/>
+          </a:solidFill>
+          <a:ln>
+            <a:solidFill>
+              <a:schemeClr val="tx1"/>
+            </a:solidFill>
+          </a:ln>
+        </p:spPr>
+        <p:style>
+          <a:lnRef idx="2">
+            <a:schemeClr val="accent1">
+              <a:shade val="50000"/>
+            </a:schemeClr>
+          </a:lnRef>
+          <a:fillRef idx="1">
+            <a:schemeClr val="accent1"/>
+          </a:fillRef>
+          <a:effectRef idx="0">
+            <a:schemeClr val="accent1"/>
+          </a:effectRef>
+          <a:fontRef idx="minor">
+            <a:schemeClr val="lt1"/>
+          </a:fontRef>
+        </p:style>
+        <p:txBody>
+          <a:bodyPr rtlCol="0" anchor="ctr"/>
+          <a:lstStyle/>
+          <a:p>
+            <a:pPr algn="ctr"/>
+            <a:r>
+              <a:rPr lang="en-US" dirty="0" smtClean="0">
+                <a:solidFill>
+                  <a:schemeClr val="tx1"/>
+                </a:solidFill>
+              </a:rPr>
+              <a:t>LLVM Optimizer</a:t>
+            </a:r>
+            <a:endParaRPr lang="en-US" dirty="0">
+              <a:solidFill>
+                <a:schemeClr val="tx1"/>
+              </a:solidFill>
+            </a:endParaRPr>
+          </a:p>
+        </p:txBody>
+      </p:sp>
+      <p:sp>
+        <p:nvSpPr>
+          <p:cNvPr id="7" name="Rectangle 6"/>
+          <p:cNvSpPr/>
+          <p:nvPr/>
+        </p:nvSpPr>
+        <p:spPr>
+          <a:xfrm>
+            <a:off x="1388125" y="4116637"/>
+            <a:ext cx="2633032" cy="1167788"/>
+          </a:xfrm>
+          <a:prstGeom prst="rect">
+            <a:avLst/>
+          </a:prstGeom>
+          <a:solidFill>
+            <a:schemeClr val="bg1"/>
+          </a:solidFill>
+          <a:ln>
+            <a:solidFill>
+              <a:schemeClr val="tx1"/>
+            </a:solidFill>
+          </a:ln>
+        </p:spPr>
+        <p:style>
+          <a:lnRef idx="2">
+            <a:schemeClr val="accent1">
+              <a:shade val="50000"/>
+            </a:schemeClr>
+          </a:lnRef>
+          <a:fillRef idx="1">
+            <a:schemeClr val="accent1"/>
+          </a:fillRef>
+          <a:effectRef idx="0">
+            <a:schemeClr val="accent1"/>
+          </a:effectRef>
+          <a:fontRef idx="minor">
+            <a:schemeClr val="lt1"/>
+          </a:fontRef>
+        </p:style>
+        <p:txBody>
+          <a:bodyPr rtlCol="0" anchor="ctr"/>
+          <a:lstStyle/>
+          <a:p>
+            <a:pPr algn="ctr"/>
+            <a:r>
+              <a:rPr lang="en-US" dirty="0" smtClean="0">
+                <a:solidFill>
+                  <a:schemeClr val="tx1"/>
+                </a:solidFill>
+              </a:rPr>
+              <a:t>Target </a:t>
+            </a:r>
+            <a:r>
+              <a:rPr lang="en-US" dirty="0" err="1" smtClean="0">
+                <a:solidFill>
+                  <a:schemeClr val="tx1"/>
+                </a:solidFill>
+              </a:rPr>
+              <a:t>CodeGen</a:t>
+            </a:r>
+            <a:endParaRPr lang="en-US" dirty="0">
+              <a:solidFill>
+                <a:schemeClr val="tx1"/>
+              </a:solidFill>
+            </a:endParaRPr>
+          </a:p>
+        </p:txBody>
+      </p:sp>
+      <p:sp>
+        <p:nvSpPr>
+          <p:cNvPr id="8" name="TextBox 7"/>
+          <p:cNvSpPr txBox="1"/>
+          <p:nvPr/>
+        </p:nvSpPr>
+        <p:spPr>
+          <a:xfrm>
+            <a:off x="1990823" y="6281317"/>
+            <a:ext cx="1427635" cy="369332"/>
+          </a:xfrm>
+          <a:prstGeom prst="rect">
+            <a:avLst/>
+          </a:prstGeom>
+          <a:solidFill>
+            <a:schemeClr val="bg1"/>
+          </a:solidFill>
+          <a:ln>
+            <a:solidFill>
+              <a:schemeClr val="bg1"/>
+            </a:solidFill>
+          </a:ln>
+        </p:spPr>
+        <p:txBody>
+          <a:bodyPr wrap="none" rtlCol="0">
+            <a:spAutoFit/>
+          </a:bodyPr>
+          <a:lstStyle/>
+          <a:p>
+            <a:r>
+              <a:rPr lang="en-US" smtClean="0"/>
+              <a:t>a) Existing JIT</a:t>
+            </a:r>
+            <a:endParaRPr lang="en-US"/>
+          </a:p>
+        </p:txBody>
+      </p:sp>
+      <p:cxnSp>
+        <p:nvCxnSpPr>
+          <p:cNvPr id="10" name="Straight Arrow Connector 9"/>
+          <p:cNvCxnSpPr>
+            <a:stCxn id="5" idx="2"/>
+          </p:cNvCxnSpPr>
+          <p:nvPr/>
+        </p:nvCxnSpPr>
+        <p:spPr>
+          <a:xfrm flipH="1">
+            <a:off x="2704640" y="1894901"/>
+            <a:ext cx="1" cy="526974"/>
+          </a:xfrm>
+          <a:prstGeom prst="straightConnector1">
+            <a:avLst/>
+          </a:prstGeom>
+          <a:ln>
+            <a:solidFill>
+              <a:schemeClr val="tx1"/>
+            </a:solidFill>
+            <a:tailEnd type="triangle"/>
+          </a:ln>
+        </p:spPr>
+        <p:style>
+          <a:lnRef idx="1">
+            <a:schemeClr val="accent1"/>
+          </a:lnRef>
+          <a:fillRef idx="0">
+            <a:schemeClr val="accent1"/>
+          </a:fillRef>
+          <a:effectRef idx="0">
+            <a:schemeClr val="accent1"/>
+          </a:effectRef>
+          <a:fontRef idx="minor">
+            <a:schemeClr val="tx1"/>
+          </a:fontRef>
+        </p:style>
+      </p:cxnSp>
+      <p:cxnSp>
+        <p:nvCxnSpPr>
+          <p:cNvPr id="12" name="Straight Arrow Connector 11"/>
+          <p:cNvCxnSpPr>
+            <a:stCxn id="6" idx="2"/>
+            <a:endCxn id="7" idx="0"/>
+          </p:cNvCxnSpPr>
+          <p:nvPr/>
+        </p:nvCxnSpPr>
+        <p:spPr>
+          <a:xfrm>
+            <a:off x="2704641" y="3589663"/>
+            <a:ext cx="0" cy="526974"/>
+          </a:xfrm>
+          <a:prstGeom prst="straightConnector1">
+            <a:avLst/>
+          </a:prstGeom>
+          <a:ln>
+            <a:solidFill>
+              <a:schemeClr val="tx1"/>
+            </a:solidFill>
+            <a:tailEnd type="triangle"/>
+          </a:ln>
+        </p:spPr>
+        <p:style>
+          <a:lnRef idx="1">
+            <a:schemeClr val="accent1"/>
+          </a:lnRef>
+          <a:fillRef idx="0">
+            <a:schemeClr val="accent1"/>
+          </a:fillRef>
+          <a:effectRef idx="0">
+            <a:schemeClr val="accent1"/>
+          </a:effectRef>
+          <a:fontRef idx="minor">
+            <a:schemeClr val="tx1"/>
+          </a:fontRef>
+        </p:style>
+      </p:cxnSp>
+      <p:cxnSp>
+        <p:nvCxnSpPr>
+          <p:cNvPr id="16" name="Straight Arrow Connector 15"/>
+          <p:cNvCxnSpPr>
+            <a:stCxn id="7" idx="2"/>
+          </p:cNvCxnSpPr>
+          <p:nvPr/>
+        </p:nvCxnSpPr>
+        <p:spPr>
+          <a:xfrm flipH="1">
+            <a:off x="2704640" y="5284425"/>
+            <a:ext cx="1" cy="488414"/>
+          </a:xfrm>
+          <a:prstGeom prst="straightConnector1">
+            <a:avLst/>
+          </a:prstGeom>
+          <a:ln>
+            <a:solidFill>
+              <a:schemeClr val="tx1"/>
+            </a:solidFill>
+            <a:tailEnd type="triangle"/>
+          </a:ln>
+        </p:spPr>
+        <p:style>
+          <a:lnRef idx="1">
+            <a:schemeClr val="accent1"/>
+          </a:lnRef>
+          <a:fillRef idx="0">
+            <a:schemeClr val="accent1"/>
+          </a:fillRef>
+          <a:effectRef idx="0">
+            <a:schemeClr val="accent1"/>
+          </a:effectRef>
+          <a:fontRef idx="minor">
+            <a:schemeClr val="tx1"/>
+          </a:fontRef>
+        </p:style>
+      </p:cxnSp>
+      <p:sp>
+        <p:nvSpPr>
+          <p:cNvPr id="17" name="TextBox 16"/>
+          <p:cNvSpPr txBox="1"/>
+          <p:nvPr/>
+        </p:nvSpPr>
+        <p:spPr>
+          <a:xfrm>
+            <a:off x="1880858" y="5833164"/>
+            <a:ext cx="1537600" cy="369332"/>
+          </a:xfrm>
+          <a:prstGeom prst="rect">
+            <a:avLst/>
+          </a:prstGeom>
+          <a:noFill/>
+        </p:spPr>
+        <p:txBody>
+          <a:bodyPr wrap="none" rtlCol="0">
+            <a:spAutoFit/>
+          </a:bodyPr>
+          <a:lstStyle/>
+          <a:p>
+            <a:r>
+              <a:rPr lang="en-US" smtClean="0"/>
+              <a:t>Machine Code</a:t>
+            </a:r>
+            <a:endParaRPr lang="en-US"/>
+          </a:p>
+        </p:txBody>
+      </p:sp>
+      <p:sp>
+        <p:nvSpPr>
+          <p:cNvPr id="18" name="TextBox 17"/>
+          <p:cNvSpPr txBox="1"/>
+          <p:nvPr/>
+        </p:nvSpPr>
+        <p:spPr>
+          <a:xfrm>
+            <a:off x="1723666" y="1924797"/>
+            <a:ext cx="980974" cy="369332"/>
+          </a:xfrm>
+          <a:prstGeom prst="rect">
+            <a:avLst/>
+          </a:prstGeom>
+          <a:noFill/>
+        </p:spPr>
+        <p:txBody>
+          <a:bodyPr wrap="none" rtlCol="0">
+            <a:spAutoFit/>
+          </a:bodyPr>
+          <a:lstStyle/>
+          <a:p>
+            <a:r>
+              <a:rPr lang="en-US" smtClean="0"/>
+              <a:t>LLVM IR </a:t>
+            </a:r>
+            <a:endParaRPr lang="en-US"/>
+          </a:p>
+        </p:txBody>
+      </p:sp>
+      <p:sp>
+        <p:nvSpPr>
+          <p:cNvPr id="19" name="TextBox 18"/>
+          <p:cNvSpPr txBox="1"/>
+          <p:nvPr/>
+        </p:nvSpPr>
+        <p:spPr>
+          <a:xfrm>
+            <a:off x="1723666" y="3657602"/>
+            <a:ext cx="980974" cy="369332"/>
+          </a:xfrm>
+          <a:prstGeom prst="rect">
+            <a:avLst/>
+          </a:prstGeom>
+          <a:noFill/>
+        </p:spPr>
+        <p:txBody>
+          <a:bodyPr wrap="none" rtlCol="0">
+            <a:spAutoFit/>
+          </a:bodyPr>
+          <a:lstStyle/>
+          <a:p>
+            <a:r>
+              <a:rPr lang="en-US" smtClean="0"/>
+              <a:t>LLVM IR </a:t>
+            </a:r>
+            <a:endParaRPr lang="en-US"/>
+          </a:p>
+        </p:txBody>
+      </p:sp>
+      <p:sp>
+        <p:nvSpPr>
+          <p:cNvPr id="20" name="Rectangle 19"/>
+          <p:cNvSpPr/>
+          <p:nvPr/>
+        </p:nvSpPr>
+        <p:spPr>
+          <a:xfrm>
+            <a:off x="6927773" y="539827"/>
+            <a:ext cx="3029638" cy="5662669"/>
+          </a:xfrm>
+          <a:prstGeom prst="rect">
+            <a:avLst/>
+          </a:prstGeom>
+          <a:solidFill>
+            <a:schemeClr val="bg1"/>
+          </a:solidFill>
+          <a:ln>
+            <a:solidFill>
+              <a:schemeClr val="tx1"/>
+            </a:solidFill>
+          </a:ln>
+        </p:spPr>
+        <p:style>
+          <a:lnRef idx="2">
+            <a:schemeClr val="accent1">
+              <a:shade val="50000"/>
+            </a:schemeClr>
+          </a:lnRef>
+          <a:fillRef idx="1">
+            <a:schemeClr val="accent1"/>
+          </a:fillRef>
+          <a:effectRef idx="0">
+            <a:schemeClr val="accent1"/>
+          </a:effectRef>
+          <a:fontRef idx="minor">
+            <a:schemeClr val="lt1"/>
+          </a:fontRef>
+        </p:style>
+        <p:txBody>
+          <a:bodyPr rtlCol="0" anchor="ctr"/>
+          <a:lstStyle/>
+          <a:p>
+            <a:pPr algn="ctr"/>
+            <a:endParaRPr lang="en-US" dirty="0">
+              <a:solidFill>
+                <a:schemeClr val="tx1"/>
+              </a:solidFill>
+            </a:endParaRPr>
+          </a:p>
+        </p:txBody>
+      </p:sp>
+      <p:sp>
+        <p:nvSpPr>
+          <p:cNvPr id="21" name="Rectangle 20"/>
+          <p:cNvSpPr/>
+          <p:nvPr/>
+        </p:nvSpPr>
+        <p:spPr>
+          <a:xfrm>
+            <a:off x="7126076" y="727113"/>
+            <a:ext cx="2633032" cy="1167788"/>
+          </a:xfrm>
+          <a:prstGeom prst="rect">
+            <a:avLst/>
+          </a:prstGeom>
+          <a:solidFill>
+            <a:schemeClr val="bg1"/>
+          </a:solidFill>
+          <a:ln>
+            <a:solidFill>
+              <a:schemeClr val="tx1"/>
+            </a:solidFill>
+          </a:ln>
+        </p:spPr>
+        <p:style>
+          <a:lnRef idx="2">
+            <a:schemeClr val="accent1">
+              <a:shade val="50000"/>
+            </a:schemeClr>
+          </a:lnRef>
+          <a:fillRef idx="1">
+            <a:schemeClr val="accent1"/>
+          </a:fillRef>
+          <a:effectRef idx="0">
+            <a:schemeClr val="accent1"/>
+          </a:effectRef>
+          <a:fontRef idx="minor">
+            <a:schemeClr val="lt1"/>
+          </a:fontRef>
+        </p:style>
+        <p:txBody>
+          <a:bodyPr rtlCol="0" anchor="ctr"/>
+          <a:lstStyle/>
+          <a:p>
+            <a:pPr algn="ctr"/>
+            <a:r>
+              <a:rPr lang="en-US" dirty="0" smtClean="0">
+                <a:solidFill>
+                  <a:schemeClr val="tx1"/>
+                </a:solidFill>
+              </a:rPr>
+              <a:t>LLVM </a:t>
+            </a:r>
+            <a:r>
+              <a:rPr lang="en-US" dirty="0" err="1" smtClean="0">
+                <a:solidFill>
+                  <a:schemeClr val="tx1"/>
+                </a:solidFill>
+              </a:rPr>
+              <a:t>CodeGen</a:t>
+            </a:r>
+            <a:endParaRPr lang="en-US" dirty="0">
+              <a:solidFill>
+                <a:schemeClr val="tx1"/>
+              </a:solidFill>
+            </a:endParaRPr>
+          </a:p>
+        </p:txBody>
+      </p:sp>
+      <p:sp>
+        <p:nvSpPr>
+          <p:cNvPr id="22" name="Rectangle 21"/>
+          <p:cNvSpPr/>
+          <p:nvPr/>
+        </p:nvSpPr>
+        <p:spPr>
+          <a:xfrm>
+            <a:off x="7126076" y="2421875"/>
+            <a:ext cx="2633032" cy="1167788"/>
+          </a:xfrm>
+          <a:prstGeom prst="rect">
+            <a:avLst/>
+          </a:prstGeom>
+          <a:solidFill>
+            <a:schemeClr val="bg1"/>
+          </a:solidFill>
+          <a:ln>
+            <a:solidFill>
+              <a:schemeClr val="tx1"/>
+            </a:solidFill>
+          </a:ln>
+        </p:spPr>
+        <p:style>
+          <a:lnRef idx="2">
+            <a:schemeClr val="accent1">
+              <a:shade val="50000"/>
+            </a:schemeClr>
+          </a:lnRef>
+          <a:fillRef idx="1">
+            <a:schemeClr val="accent1"/>
+          </a:fillRef>
+          <a:effectRef idx="0">
+            <a:schemeClr val="accent1"/>
+          </a:effectRef>
+          <a:fontRef idx="minor">
+            <a:schemeClr val="lt1"/>
+          </a:fontRef>
+        </p:style>
+        <p:txBody>
+          <a:bodyPr rtlCol="0" anchor="ctr"/>
+          <a:lstStyle/>
+          <a:p>
+            <a:pPr algn="ctr"/>
+            <a:r>
+              <a:rPr lang="en-US" dirty="0" smtClean="0">
+                <a:solidFill>
+                  <a:schemeClr val="tx1"/>
+                </a:solidFill>
+              </a:rPr>
+              <a:t>LLVM Optimizer</a:t>
+            </a:r>
+            <a:endParaRPr lang="en-US" dirty="0">
+              <a:solidFill>
+                <a:schemeClr val="tx1"/>
+              </a:solidFill>
+            </a:endParaRPr>
+          </a:p>
+        </p:txBody>
+      </p:sp>
+      <p:sp>
+        <p:nvSpPr>
+          <p:cNvPr id="23" name="Rectangle 22"/>
+          <p:cNvSpPr/>
+          <p:nvPr/>
+        </p:nvSpPr>
+        <p:spPr>
+          <a:xfrm>
+            <a:off x="7126076" y="5118631"/>
+            <a:ext cx="2633032" cy="455903"/>
+          </a:xfrm>
+          <a:prstGeom prst="rect">
+            <a:avLst/>
+          </a:prstGeom>
+          <a:solidFill>
+            <a:schemeClr val="bg1"/>
+          </a:solidFill>
+          <a:ln>
+            <a:solidFill>
+              <a:schemeClr val="tx1"/>
+            </a:solidFill>
+          </a:ln>
+        </p:spPr>
+        <p:style>
+          <a:lnRef idx="2">
+            <a:schemeClr val="accent1">
+              <a:shade val="50000"/>
+            </a:schemeClr>
+          </a:lnRef>
+          <a:fillRef idx="1">
+            <a:schemeClr val="accent1"/>
+          </a:fillRef>
+          <a:effectRef idx="0">
+            <a:schemeClr val="accent1"/>
+          </a:effectRef>
+          <a:fontRef idx="minor">
+            <a:schemeClr val="lt1"/>
+          </a:fontRef>
+        </p:style>
+        <p:txBody>
+          <a:bodyPr rtlCol="0" anchor="ctr"/>
+          <a:lstStyle/>
+          <a:p>
+            <a:pPr algn="ctr"/>
+            <a:r>
+              <a:rPr lang="en-US" dirty="0" smtClean="0">
+                <a:solidFill>
+                  <a:schemeClr val="tx1"/>
+                </a:solidFill>
+              </a:rPr>
+              <a:t>Target </a:t>
+            </a:r>
+            <a:r>
+              <a:rPr lang="en-US" dirty="0" err="1" smtClean="0">
+                <a:solidFill>
+                  <a:schemeClr val="tx1"/>
+                </a:solidFill>
+              </a:rPr>
+              <a:t>CodeGen</a:t>
+            </a:r>
+            <a:endParaRPr lang="en-US" dirty="0">
+              <a:solidFill>
+                <a:schemeClr val="tx1"/>
+              </a:solidFill>
+            </a:endParaRPr>
+          </a:p>
+        </p:txBody>
+      </p:sp>
+      <p:sp>
+        <p:nvSpPr>
+          <p:cNvPr id="24" name="TextBox 23"/>
+          <p:cNvSpPr txBox="1"/>
+          <p:nvPr/>
+        </p:nvSpPr>
+        <p:spPr>
+          <a:xfrm>
+            <a:off x="7728774" y="6281317"/>
+            <a:ext cx="1734899" cy="369332"/>
+          </a:xfrm>
+          <a:prstGeom prst="rect">
+            <a:avLst/>
+          </a:prstGeom>
+          <a:solidFill>
+            <a:schemeClr val="bg1"/>
+          </a:solidFill>
+          <a:ln>
+            <a:solidFill>
+              <a:schemeClr val="bg1"/>
+            </a:solidFill>
+          </a:ln>
+        </p:spPr>
+        <p:txBody>
+          <a:bodyPr wrap="none" rtlCol="0">
+            <a:spAutoFit/>
+          </a:bodyPr>
+          <a:lstStyle/>
+          <a:p>
+            <a:r>
+              <a:rPr lang="en-US" dirty="0" smtClean="0"/>
+              <a:t>b) Retrofitted JIT</a:t>
+            </a:r>
+            <a:endParaRPr lang="en-US" dirty="0"/>
+          </a:p>
+        </p:txBody>
+      </p:sp>
+      <p:cxnSp>
+        <p:nvCxnSpPr>
+          <p:cNvPr id="26" name="Straight Arrow Connector 25"/>
+          <p:cNvCxnSpPr>
+            <a:stCxn id="24" idx="2"/>
+          </p:cNvCxnSpPr>
+          <p:nvPr/>
+        </p:nvCxnSpPr>
+        <p:spPr>
+          <a:xfrm>
+            <a:off x="8442592" y="3589663"/>
+            <a:ext cx="0" cy="526974"/>
+          </a:xfrm>
+          <a:prstGeom prst="straightConnector1">
+            <a:avLst/>
+          </a:prstGeom>
+          <a:ln>
+            <a:solidFill>
+              <a:schemeClr val="tx1"/>
+            </a:solidFill>
+            <a:tailEnd type="triangle"/>
+          </a:ln>
+        </p:spPr>
+        <p:style>
+          <a:lnRef idx="1">
+            <a:schemeClr val="accent1"/>
+          </a:lnRef>
+          <a:fillRef idx="0">
+            <a:schemeClr val="accent1"/>
+          </a:fillRef>
+          <a:effectRef idx="0">
+            <a:schemeClr val="accent1"/>
+          </a:effectRef>
+          <a:fontRef idx="minor">
+            <a:schemeClr val="tx1"/>
+          </a:fontRef>
+        </p:style>
+      </p:cxnSp>
+      <p:cxnSp>
+        <p:nvCxnSpPr>
+          <p:cNvPr id="27" name="Straight Arrow Connector 26"/>
+          <p:cNvCxnSpPr>
+            <a:stCxn id="23" idx="2"/>
+          </p:cNvCxnSpPr>
+          <p:nvPr/>
+        </p:nvCxnSpPr>
+        <p:spPr>
+          <a:xfrm>
+            <a:off x="8442592" y="5574534"/>
+            <a:ext cx="0" cy="198305"/>
+          </a:xfrm>
+          <a:prstGeom prst="straightConnector1">
+            <a:avLst/>
+          </a:prstGeom>
+          <a:ln>
+            <a:solidFill>
+              <a:schemeClr val="tx1"/>
+            </a:solidFill>
+            <a:tailEnd type="triangle"/>
+          </a:ln>
+        </p:spPr>
+        <p:style>
+          <a:lnRef idx="1">
+            <a:schemeClr val="accent1"/>
+          </a:lnRef>
+          <a:fillRef idx="0">
+            <a:schemeClr val="accent1"/>
+          </a:fillRef>
+          <a:effectRef idx="0">
+            <a:schemeClr val="accent1"/>
+          </a:effectRef>
+          <a:fontRef idx="minor">
+            <a:schemeClr val="tx1"/>
+          </a:fontRef>
+        </p:style>
+      </p:cxnSp>
+      <p:sp>
+        <p:nvSpPr>
+          <p:cNvPr id="28" name="TextBox 27"/>
+          <p:cNvSpPr txBox="1"/>
+          <p:nvPr/>
+        </p:nvSpPr>
+        <p:spPr>
+          <a:xfrm>
+            <a:off x="7618809" y="5833164"/>
+            <a:ext cx="1537600" cy="369332"/>
+          </a:xfrm>
+          <a:prstGeom prst="rect">
+            <a:avLst/>
+          </a:prstGeom>
+          <a:noFill/>
+        </p:spPr>
+        <p:txBody>
+          <a:bodyPr wrap="none" rtlCol="0">
+            <a:spAutoFit/>
+          </a:bodyPr>
+          <a:lstStyle/>
+          <a:p>
+            <a:r>
+              <a:rPr lang="en-US" smtClean="0"/>
+              <a:t>Machine Code</a:t>
+            </a:r>
+            <a:endParaRPr lang="en-US"/>
+          </a:p>
+        </p:txBody>
+      </p:sp>
+      <p:sp>
+        <p:nvSpPr>
+          <p:cNvPr id="29" name="TextBox 28"/>
+          <p:cNvSpPr txBox="1"/>
+          <p:nvPr/>
+        </p:nvSpPr>
+        <p:spPr>
+          <a:xfrm>
+            <a:off x="7461617" y="1924797"/>
+            <a:ext cx="980974" cy="369332"/>
+          </a:xfrm>
+          <a:prstGeom prst="rect">
+            <a:avLst/>
+          </a:prstGeom>
+          <a:noFill/>
+        </p:spPr>
+        <p:txBody>
+          <a:bodyPr wrap="none" rtlCol="0">
+            <a:spAutoFit/>
+          </a:bodyPr>
+          <a:lstStyle/>
+          <a:p>
+            <a:r>
+              <a:rPr lang="en-US" smtClean="0"/>
+              <a:t>LLVM IR </a:t>
+            </a:r>
+            <a:endParaRPr lang="en-US"/>
+          </a:p>
+        </p:txBody>
+      </p:sp>
+      <p:sp>
+        <p:nvSpPr>
+          <p:cNvPr id="30" name="TextBox 29"/>
+          <p:cNvSpPr txBox="1"/>
+          <p:nvPr/>
+        </p:nvSpPr>
+        <p:spPr>
+          <a:xfrm>
+            <a:off x="7461617" y="3657602"/>
+            <a:ext cx="980974" cy="369332"/>
+          </a:xfrm>
+          <a:prstGeom prst="rect">
+            <a:avLst/>
+          </a:prstGeom>
+          <a:noFill/>
+        </p:spPr>
+        <p:txBody>
+          <a:bodyPr wrap="none" rtlCol="0">
+            <a:spAutoFit/>
+          </a:bodyPr>
+          <a:lstStyle/>
+          <a:p>
+            <a:r>
+              <a:rPr lang="en-US" smtClean="0"/>
+              <a:t>LLVM IR </a:t>
+            </a:r>
+            <a:endParaRPr lang="en-US"/>
+          </a:p>
+        </p:txBody>
+      </p:sp>
+      <p:sp>
+        <p:nvSpPr>
+          <p:cNvPr id="31" name="Rectangle 30"/>
+          <p:cNvSpPr/>
+          <p:nvPr/>
+        </p:nvSpPr>
+        <p:spPr>
+          <a:xfrm>
+            <a:off x="7214210" y="1498420"/>
+            <a:ext cx="2456762" cy="319489"/>
+          </a:xfrm>
+          <a:prstGeom prst="rect">
+            <a:avLst/>
+          </a:prstGeom>
+          <a:solidFill>
+            <a:schemeClr val="bg2">
+              <a:lumMod val="90000"/>
+            </a:schemeClr>
+          </a:solidFill>
+          <a:ln>
+            <a:solidFill>
+              <a:schemeClr val="tx1"/>
+            </a:solidFill>
+          </a:ln>
+        </p:spPr>
+        <p:style>
+          <a:lnRef idx="2">
+            <a:schemeClr val="accent1">
+              <a:shade val="50000"/>
+            </a:schemeClr>
+          </a:lnRef>
+          <a:fillRef idx="1">
+            <a:schemeClr val="accent1"/>
+          </a:fillRef>
+          <a:effectRef idx="0">
+            <a:schemeClr val="accent1"/>
+          </a:effectRef>
+          <a:fontRef idx="minor">
+            <a:schemeClr val="lt1"/>
+          </a:fontRef>
+        </p:style>
+        <p:txBody>
+          <a:bodyPr rtlCol="0" anchor="ctr"/>
+          <a:lstStyle/>
+          <a:p>
+            <a:pPr algn="ctr"/>
+            <a:r>
+              <a:rPr lang="en-US" dirty="0" smtClean="0">
+                <a:solidFill>
+                  <a:schemeClr val="tx1"/>
+                </a:solidFill>
+              </a:rPr>
+              <a:t>Inserter</a:t>
+            </a:r>
+            <a:endParaRPr lang="en-US" dirty="0">
+              <a:solidFill>
+                <a:schemeClr val="tx1"/>
+              </a:solidFill>
+            </a:endParaRPr>
+          </a:p>
+        </p:txBody>
+      </p:sp>
+      <p:sp>
+        <p:nvSpPr>
+          <p:cNvPr id="33" name="Rectangle 32"/>
+          <p:cNvSpPr/>
+          <p:nvPr/>
+        </p:nvSpPr>
+        <p:spPr>
+          <a:xfrm>
+            <a:off x="7126075" y="4122534"/>
+            <a:ext cx="2633032" cy="463227"/>
+          </a:xfrm>
+          <a:prstGeom prst="rect">
+            <a:avLst/>
+          </a:prstGeom>
+          <a:solidFill>
+            <a:schemeClr val="bg2">
+              <a:lumMod val="90000"/>
+            </a:schemeClr>
+          </a:solidFill>
+          <a:ln>
+            <a:solidFill>
+              <a:schemeClr val="tx1"/>
+            </a:solidFill>
+          </a:ln>
+        </p:spPr>
+        <p:style>
+          <a:lnRef idx="2">
+            <a:schemeClr val="accent1">
+              <a:shade val="50000"/>
+            </a:schemeClr>
+          </a:lnRef>
+          <a:fillRef idx="1">
+            <a:schemeClr val="accent1"/>
+          </a:fillRef>
+          <a:effectRef idx="0">
+            <a:schemeClr val="accent1"/>
+          </a:effectRef>
+          <a:fontRef idx="minor">
+            <a:schemeClr val="lt1"/>
+          </a:fontRef>
+        </p:style>
+        <p:txBody>
+          <a:bodyPr rtlCol="0" anchor="ctr"/>
+          <a:lstStyle/>
+          <a:p>
+            <a:pPr algn="ctr"/>
+            <a:r>
+              <a:rPr lang="en-US" smtClean="0">
+                <a:solidFill>
+                  <a:schemeClr val="tx1"/>
+                </a:solidFill>
+              </a:rPr>
+              <a:t>OSR Pass</a:t>
+            </a:r>
+            <a:endParaRPr lang="en-US" dirty="0">
+              <a:solidFill>
+                <a:schemeClr val="tx1"/>
+              </a:solidFill>
+            </a:endParaRPr>
+          </a:p>
+        </p:txBody>
+      </p:sp>
+      <p:cxnSp>
+        <p:nvCxnSpPr>
+          <p:cNvPr id="35" name="Straight Arrow Connector 34"/>
+          <p:cNvCxnSpPr>
+            <a:stCxn id="33" idx="2"/>
+            <a:endCxn id="23" idx="0"/>
+          </p:cNvCxnSpPr>
+          <p:nvPr/>
+        </p:nvCxnSpPr>
+        <p:spPr>
+          <a:xfrm>
+            <a:off x="8442591" y="4585761"/>
+            <a:ext cx="1" cy="532870"/>
+          </a:xfrm>
+          <a:prstGeom prst="straightConnector1">
+            <a:avLst/>
+          </a:prstGeom>
+          <a:ln>
+            <a:solidFill>
+              <a:schemeClr val="tx1"/>
+            </a:solidFill>
+            <a:tailEnd type="triangle"/>
+          </a:ln>
+        </p:spPr>
+        <p:style>
+          <a:lnRef idx="1">
+            <a:schemeClr val="accent1"/>
+          </a:lnRef>
+          <a:fillRef idx="0">
+            <a:schemeClr val="accent1"/>
+          </a:fillRef>
+          <a:effectRef idx="0">
+            <a:schemeClr val="accent1"/>
+          </a:effectRef>
+          <a:fontRef idx="minor">
+            <a:schemeClr val="tx1"/>
+          </a:fontRef>
+        </p:style>
+      </p:cxnSp>
+      <p:sp>
+        <p:nvSpPr>
+          <p:cNvPr id="40" name="TextBox 39"/>
+          <p:cNvSpPr txBox="1"/>
+          <p:nvPr/>
+        </p:nvSpPr>
+        <p:spPr>
+          <a:xfrm>
+            <a:off x="7461617" y="4692756"/>
+            <a:ext cx="980974" cy="369332"/>
+          </a:xfrm>
+          <a:prstGeom prst="rect">
+            <a:avLst/>
+          </a:prstGeom>
+          <a:noFill/>
+        </p:spPr>
+        <p:txBody>
+          <a:bodyPr wrap="none" rtlCol="0">
+            <a:spAutoFit/>
+          </a:bodyPr>
+          <a:lstStyle/>
+          <a:p>
+            <a:r>
+              <a:rPr lang="en-US" smtClean="0"/>
+              <a:t>LLVM IR </a:t>
+            </a:r>
+            <a:endParaRPr lang="en-US"/>
+          </a:p>
+        </p:txBody>
+      </p:sp>
+    </p:spTree>
+    <p:extLst>
+      <p:ext uri="{BB962C8B-B14F-4D97-AF65-F5344CB8AC3E}">
+        <p14:creationId xmlns:p14="http://schemas.microsoft.com/office/powerpoint/2010/main" val="698890916"/>
+      </p:ext>
+    </p:extLst>
+  </p:cSld>
+  <p:clrMapOvr>
+    <a:masterClrMapping/>
+  </p:clrMapOvr>
+</p:sld>
+</file>
+
+<file path=ppt/slides/slide7.xml><?xml version="1.0" encoding="utf-8"?>
+<p:sld xmlns:a="http://schemas.openxmlformats.org/drawingml/2006/main" xmlns:r="http://schemas.openxmlformats.org/officeDocument/2006/relationships" xmlns:p="http://schemas.openxmlformats.org/presentationml/2006/main">
+  <p:cSld>
+    <p:spTree>
+      <p:nvGrpSpPr>
+        <p:cNvPr id="1" name=""/>
+        <p:cNvGrpSpPr/>
+        <p:nvPr/>
+      </p:nvGrpSpPr>
+      <p:grpSpPr>
+        <a:xfrm>
+          <a:off x="0" y="0"/>
+          <a:ext cx="0" cy="0"/>
+          <a:chOff x="0" y="0"/>
+          <a:chExt cx="0" cy="0"/>
+        </a:xfrm>
+      </p:grpSpPr>
+      <p:sp>
+        <p:nvSpPr>
+          <p:cNvPr id="4" name="Rectangle 3"/>
+          <p:cNvSpPr/>
+          <p:nvPr/>
+        </p:nvSpPr>
+        <p:spPr>
+          <a:xfrm>
+            <a:off x="1983036" y="612357"/>
+            <a:ext cx="1123721" cy="451691"/>
+          </a:xfrm>
+          <a:prstGeom prst="rect">
+            <a:avLst/>
+          </a:prstGeom>
+          <a:solidFill>
+            <a:schemeClr val="bg1"/>
+          </a:solidFill>
+          <a:ln>
+            <a:solidFill>
+              <a:schemeClr val="tx1"/>
+            </a:solidFill>
+          </a:ln>
+        </p:spPr>
+        <p:style>
+          <a:lnRef idx="2">
+            <a:schemeClr val="accent1">
+              <a:shade val="50000"/>
+            </a:schemeClr>
+          </a:lnRef>
+          <a:fillRef idx="1">
+            <a:schemeClr val="accent1"/>
+          </a:fillRef>
+          <a:effectRef idx="0">
+            <a:schemeClr val="accent1"/>
+          </a:effectRef>
+          <a:fontRef idx="minor">
+            <a:schemeClr val="lt1"/>
+          </a:fontRef>
+        </p:style>
+        <p:txBody>
+          <a:bodyPr rtlCol="0" anchor="ctr"/>
+          <a:lstStyle/>
+          <a:p>
+            <a:pPr algn="ctr"/>
+            <a:r>
+              <a:rPr lang="en-US" sz="1400" dirty="0" smtClean="0">
+                <a:solidFill>
+                  <a:schemeClr val="tx1"/>
+                </a:solidFill>
+              </a:rPr>
+              <a:t>Entry:</a:t>
+            </a:r>
+          </a:p>
+          <a:p>
+            <a:pPr algn="ctr"/>
+            <a:r>
+              <a:rPr lang="is-IS" sz="1400" dirty="0" smtClean="0">
+                <a:solidFill>
+                  <a:schemeClr val="tx1"/>
+                </a:solidFill>
+              </a:rPr>
+              <a:t>….</a:t>
+            </a:r>
+            <a:endParaRPr lang="en-US" sz="1400" dirty="0">
+              <a:solidFill>
+                <a:schemeClr val="tx1"/>
+              </a:solidFill>
+            </a:endParaRPr>
+          </a:p>
+        </p:txBody>
+      </p:sp>
+      <p:sp>
+        <p:nvSpPr>
+          <p:cNvPr id="5" name="Rectangle 4"/>
+          <p:cNvSpPr/>
+          <p:nvPr/>
+        </p:nvSpPr>
+        <p:spPr>
+          <a:xfrm>
+            <a:off x="1520328" y="1368846"/>
+            <a:ext cx="2049138" cy="900629"/>
+          </a:xfrm>
+          <a:prstGeom prst="rect">
+            <a:avLst/>
+          </a:prstGeom>
+          <a:solidFill>
+            <a:schemeClr val="bg1"/>
+          </a:solidFill>
+          <a:ln>
+            <a:solidFill>
+              <a:schemeClr val="tx1"/>
+            </a:solidFill>
+          </a:ln>
+        </p:spPr>
+        <p:style>
+          <a:lnRef idx="2">
+            <a:schemeClr val="accent1">
+              <a:shade val="50000"/>
+            </a:schemeClr>
+          </a:lnRef>
+          <a:fillRef idx="1">
+            <a:schemeClr val="accent1"/>
+          </a:fillRef>
+          <a:effectRef idx="0">
+            <a:schemeClr val="accent1"/>
+          </a:effectRef>
+          <a:fontRef idx="minor">
+            <a:schemeClr val="lt1"/>
+          </a:fontRef>
+        </p:style>
+        <p:txBody>
+          <a:bodyPr rtlCol="0" anchor="ctr"/>
+          <a:lstStyle/>
+          <a:p>
+            <a:pPr algn="ctr"/>
+            <a:r>
+              <a:rPr lang="en-US" sz="1200" dirty="0" smtClean="0">
+                <a:solidFill>
+                  <a:schemeClr val="tx1"/>
+                </a:solidFill>
+              </a:rPr>
+              <a:t>LH1:</a:t>
+            </a:r>
+          </a:p>
+          <a:p>
+            <a:pPr algn="ctr"/>
+            <a:r>
+              <a:rPr lang="is-IS" sz="1200" dirty="0" smtClean="0">
+                <a:solidFill>
+                  <a:schemeClr val="tx1"/>
+                </a:solidFill>
+              </a:rPr>
+              <a:t>…</a:t>
+            </a:r>
+          </a:p>
+          <a:p>
+            <a:pPr algn="ctr"/>
+            <a:r>
+              <a:rPr lang="en-US" sz="1200" dirty="0" smtClean="0">
+                <a:solidFill>
+                  <a:schemeClr val="tx1"/>
+                </a:solidFill>
+              </a:rPr>
+              <a:t>B</a:t>
+            </a:r>
+            <a:r>
+              <a:rPr lang="is-IS" sz="1200" dirty="0" smtClean="0">
+                <a:solidFill>
+                  <a:schemeClr val="tx1"/>
+                </a:solidFill>
+              </a:rPr>
+              <a:t>r i1 %loopCond, label %LB, label %LE</a:t>
+            </a:r>
+            <a:endParaRPr lang="en-US" sz="1200" dirty="0">
+              <a:solidFill>
+                <a:schemeClr val="tx1"/>
+              </a:solidFill>
+            </a:endParaRPr>
+          </a:p>
+        </p:txBody>
+      </p:sp>
+      <p:sp>
+        <p:nvSpPr>
+          <p:cNvPr id="6" name="Rectangle 5"/>
+          <p:cNvSpPr/>
+          <p:nvPr/>
+        </p:nvSpPr>
+        <p:spPr>
+          <a:xfrm>
+            <a:off x="782196" y="2800117"/>
+            <a:ext cx="1123721" cy="451691"/>
+          </a:xfrm>
+          <a:prstGeom prst="rect">
+            <a:avLst/>
+          </a:prstGeom>
+          <a:solidFill>
+            <a:schemeClr val="bg1"/>
+          </a:solidFill>
+          <a:ln>
+            <a:solidFill>
+              <a:schemeClr val="tx1"/>
+            </a:solidFill>
+          </a:ln>
+        </p:spPr>
+        <p:style>
+          <a:lnRef idx="2">
+            <a:schemeClr val="accent1">
+              <a:shade val="50000"/>
+            </a:schemeClr>
+          </a:lnRef>
+          <a:fillRef idx="1">
+            <a:schemeClr val="accent1"/>
+          </a:fillRef>
+          <a:effectRef idx="0">
+            <a:schemeClr val="accent1"/>
+          </a:effectRef>
+          <a:fontRef idx="minor">
+            <a:schemeClr val="lt1"/>
+          </a:fontRef>
+        </p:style>
+        <p:txBody>
+          <a:bodyPr rtlCol="0" anchor="ctr"/>
+          <a:lstStyle/>
+          <a:p>
+            <a:pPr algn="ctr"/>
+            <a:r>
+              <a:rPr lang="en-US" sz="1400" dirty="0" smtClean="0">
+                <a:solidFill>
+                  <a:schemeClr val="tx1"/>
+                </a:solidFill>
+              </a:rPr>
+              <a:t>LE:</a:t>
+            </a:r>
+          </a:p>
+          <a:p>
+            <a:pPr algn="ctr"/>
+            <a:r>
+              <a:rPr lang="is-IS" sz="1400" dirty="0" smtClean="0">
+                <a:solidFill>
+                  <a:schemeClr val="tx1"/>
+                </a:solidFill>
+              </a:rPr>
+              <a:t>…</a:t>
+            </a:r>
+            <a:endParaRPr lang="en-US" sz="1400" dirty="0">
+              <a:solidFill>
+                <a:schemeClr val="tx1"/>
+              </a:solidFill>
+            </a:endParaRPr>
+          </a:p>
+        </p:txBody>
+      </p:sp>
+      <p:sp>
+        <p:nvSpPr>
+          <p:cNvPr id="7" name="Rectangle 6"/>
+          <p:cNvSpPr/>
+          <p:nvPr/>
+        </p:nvSpPr>
+        <p:spPr>
+          <a:xfrm>
+            <a:off x="3106757" y="2817558"/>
+            <a:ext cx="1386290" cy="674789"/>
+          </a:xfrm>
+          <a:prstGeom prst="rect">
+            <a:avLst/>
+          </a:prstGeom>
+          <a:solidFill>
+            <a:schemeClr val="bg1"/>
+          </a:solidFill>
+          <a:ln>
+            <a:solidFill>
+              <a:schemeClr val="tx1"/>
+            </a:solidFill>
+          </a:ln>
+        </p:spPr>
+        <p:style>
+          <a:lnRef idx="2">
+            <a:schemeClr val="accent1">
+              <a:shade val="50000"/>
+            </a:schemeClr>
+          </a:lnRef>
+          <a:fillRef idx="1">
+            <a:schemeClr val="accent1"/>
+          </a:fillRef>
+          <a:effectRef idx="0">
+            <a:schemeClr val="accent1"/>
+          </a:effectRef>
+          <a:fontRef idx="minor">
+            <a:schemeClr val="lt1"/>
+          </a:fontRef>
+        </p:style>
+        <p:txBody>
+          <a:bodyPr rtlCol="0" anchor="ctr"/>
+          <a:lstStyle/>
+          <a:p>
+            <a:pPr algn="ctr"/>
+            <a:r>
+              <a:rPr lang="en-US" sz="1200" dirty="0" smtClean="0">
+                <a:solidFill>
+                  <a:schemeClr val="tx1"/>
+                </a:solidFill>
+              </a:rPr>
+              <a:t>LB:</a:t>
+            </a:r>
+          </a:p>
+          <a:p>
+            <a:pPr algn="ctr"/>
+            <a:r>
+              <a:rPr lang="is-IS" sz="1200" dirty="0" smtClean="0">
+                <a:solidFill>
+                  <a:schemeClr val="tx1"/>
+                </a:solidFill>
+              </a:rPr>
+              <a:t>…</a:t>
+            </a:r>
+          </a:p>
+          <a:p>
+            <a:pPr algn="ctr"/>
+            <a:r>
+              <a:rPr lang="en-US" sz="1200" dirty="0" smtClean="0">
+                <a:solidFill>
+                  <a:schemeClr val="tx1"/>
+                </a:solidFill>
+              </a:rPr>
+              <a:t>B</a:t>
+            </a:r>
+            <a:r>
+              <a:rPr lang="is-IS" sz="1200" dirty="0" smtClean="0">
+                <a:solidFill>
+                  <a:schemeClr val="tx1"/>
+                </a:solidFill>
+              </a:rPr>
+              <a:t>r label %LH1</a:t>
+            </a:r>
+            <a:endParaRPr lang="en-US" sz="1200" dirty="0">
+              <a:solidFill>
+                <a:schemeClr val="tx1"/>
+              </a:solidFill>
+            </a:endParaRPr>
+          </a:p>
+        </p:txBody>
+      </p:sp>
+      <p:cxnSp>
+        <p:nvCxnSpPr>
+          <p:cNvPr id="9" name="Straight Arrow Connector 8"/>
+          <p:cNvCxnSpPr>
+            <a:stCxn id="4" idx="2"/>
+            <a:endCxn id="5" idx="0"/>
+          </p:cNvCxnSpPr>
+          <p:nvPr/>
+        </p:nvCxnSpPr>
+        <p:spPr>
+          <a:xfrm>
+            <a:off x="2544897" y="1064048"/>
+            <a:ext cx="0" cy="304798"/>
+          </a:xfrm>
+          <a:prstGeom prst="straightConnector1">
+            <a:avLst/>
+          </a:prstGeom>
+          <a:ln>
+            <a:solidFill>
+              <a:schemeClr val="tx1"/>
+            </a:solidFill>
+            <a:tailEnd type="triangle"/>
+          </a:ln>
+        </p:spPr>
+        <p:style>
+          <a:lnRef idx="1">
+            <a:schemeClr val="accent1"/>
+          </a:lnRef>
+          <a:fillRef idx="0">
+            <a:schemeClr val="accent1"/>
+          </a:fillRef>
+          <a:effectRef idx="0">
+            <a:schemeClr val="accent1"/>
+          </a:effectRef>
+          <a:fontRef idx="minor">
+            <a:schemeClr val="tx1"/>
+          </a:fontRef>
+        </p:style>
+      </p:cxnSp>
+      <p:cxnSp>
+        <p:nvCxnSpPr>
+          <p:cNvPr id="11" name="Straight Arrow Connector 10"/>
+          <p:cNvCxnSpPr>
+            <a:stCxn id="5" idx="2"/>
+            <a:endCxn id="6" idx="0"/>
+          </p:cNvCxnSpPr>
+          <p:nvPr/>
+        </p:nvCxnSpPr>
+        <p:spPr>
+          <a:xfrm flipH="1">
+            <a:off x="1344057" y="2269475"/>
+            <a:ext cx="1200840" cy="530642"/>
+          </a:xfrm>
+          <a:prstGeom prst="straightConnector1">
+            <a:avLst/>
+          </a:prstGeom>
+          <a:ln>
+            <a:solidFill>
+              <a:schemeClr val="tx1"/>
+            </a:solidFill>
+            <a:tailEnd type="triangle"/>
+          </a:ln>
+        </p:spPr>
+        <p:style>
+          <a:lnRef idx="1">
+            <a:schemeClr val="accent1"/>
+          </a:lnRef>
+          <a:fillRef idx="0">
+            <a:schemeClr val="accent1"/>
+          </a:fillRef>
+          <a:effectRef idx="0">
+            <a:schemeClr val="accent1"/>
+          </a:effectRef>
+          <a:fontRef idx="minor">
+            <a:schemeClr val="tx1"/>
+          </a:fontRef>
+        </p:style>
+      </p:cxnSp>
+      <p:cxnSp>
+        <p:nvCxnSpPr>
+          <p:cNvPr id="13" name="Straight Arrow Connector 12"/>
+          <p:cNvCxnSpPr>
+            <a:stCxn id="5" idx="2"/>
+            <a:endCxn id="7" idx="0"/>
+          </p:cNvCxnSpPr>
+          <p:nvPr/>
+        </p:nvCxnSpPr>
+        <p:spPr>
+          <a:xfrm>
+            <a:off x="2544897" y="2269475"/>
+            <a:ext cx="1255005" cy="548083"/>
+          </a:xfrm>
+          <a:prstGeom prst="straightConnector1">
+            <a:avLst/>
+          </a:prstGeom>
+          <a:ln>
+            <a:solidFill>
+              <a:schemeClr val="tx1"/>
+            </a:solidFill>
+            <a:tailEnd type="triangle"/>
+          </a:ln>
+        </p:spPr>
+        <p:style>
+          <a:lnRef idx="1">
+            <a:schemeClr val="accent1"/>
+          </a:lnRef>
+          <a:fillRef idx="0">
+            <a:schemeClr val="accent1"/>
+          </a:fillRef>
+          <a:effectRef idx="0">
+            <a:schemeClr val="accent1"/>
+          </a:effectRef>
+          <a:fontRef idx="minor">
+            <a:schemeClr val="tx1"/>
+          </a:fontRef>
+        </p:style>
+      </p:cxnSp>
+      <p:cxnSp>
+        <p:nvCxnSpPr>
+          <p:cNvPr id="15" name="Elbow Connector 14"/>
+          <p:cNvCxnSpPr>
+            <a:stCxn id="7" idx="2"/>
+            <a:endCxn id="5" idx="3"/>
+          </p:cNvCxnSpPr>
+          <p:nvPr/>
+        </p:nvCxnSpPr>
+        <p:spPr>
+          <a:xfrm rot="5400000" flipH="1">
+            <a:off x="2848091" y="2540536"/>
+            <a:ext cx="1673186" cy="230436"/>
+          </a:xfrm>
+          <a:prstGeom prst="bentConnector4">
+            <a:avLst>
+              <a:gd name="adj1" fmla="val -13663"/>
+              <a:gd name="adj2" fmla="val -400000"/>
+            </a:avLst>
+          </a:prstGeom>
+          <a:ln>
+            <a:solidFill>
+              <a:schemeClr val="tx1"/>
+            </a:solidFill>
+            <a:tailEnd type="triangle"/>
+          </a:ln>
+        </p:spPr>
+        <p:style>
+          <a:lnRef idx="1">
+            <a:schemeClr val="accent1"/>
+          </a:lnRef>
+          <a:fillRef idx="0">
+            <a:schemeClr val="accent1"/>
+          </a:fillRef>
+          <a:effectRef idx="0">
+            <a:schemeClr val="accent1"/>
+          </a:effectRef>
+          <a:fontRef idx="minor">
+            <a:schemeClr val="tx1"/>
+          </a:fontRef>
+        </p:style>
+      </p:cxnSp>
+    </p:spTree>
+    <p:extLst>
+      <p:ext uri="{BB962C8B-B14F-4D97-AF65-F5344CB8AC3E}">
+        <p14:creationId xmlns:p14="http://schemas.microsoft.com/office/powerpoint/2010/main" val="1783315400"/>
+      </p:ext>
+    </p:extLst>
+  </p:cSld>
+  <p:clrMapOvr>
+    <a:masterClrMapping/>
+  </p:clrMapOvr>
+</p:sld>
+</file>
+
+<file path=ppt/slides/slide8.xml><?xml version="1.0" encoding="utf-8"?>
+<p:sld xmlns:a="http://schemas.openxmlformats.org/drawingml/2006/main" xmlns:r="http://schemas.openxmlformats.org/officeDocument/2006/relationships" xmlns:p="http://schemas.openxmlformats.org/presentationml/2006/main">
+  <p:cSld>
+    <p:spTree>
+      <p:nvGrpSpPr>
+        <p:cNvPr id="1" name=""/>
+        <p:cNvGrpSpPr/>
+        <p:nvPr/>
+      </p:nvGrpSpPr>
+      <p:grpSpPr>
+        <a:xfrm>
+          <a:off x="0" y="0"/>
+          <a:ext cx="0" cy="0"/>
+          <a:chOff x="0" y="0"/>
+          <a:chExt cx="0" cy="0"/>
+        </a:xfrm>
+      </p:grpSpPr>
+      <p:sp>
+        <p:nvSpPr>
+          <p:cNvPr id="4" name="Rectangle 3"/>
+          <p:cNvSpPr/>
+          <p:nvPr/>
+        </p:nvSpPr>
+        <p:spPr>
+          <a:xfrm>
+            <a:off x="1983036" y="612357"/>
+            <a:ext cx="1123721" cy="451691"/>
+          </a:xfrm>
+          <a:prstGeom prst="rect">
+            <a:avLst/>
+          </a:prstGeom>
+          <a:solidFill>
+            <a:schemeClr val="bg1"/>
+          </a:solidFill>
+          <a:ln>
+            <a:solidFill>
+              <a:schemeClr val="tx1"/>
+            </a:solidFill>
+          </a:ln>
+        </p:spPr>
+        <p:style>
+          <a:lnRef idx="2">
+            <a:schemeClr val="accent1">
+              <a:shade val="50000"/>
+            </a:schemeClr>
+          </a:lnRef>
+          <a:fillRef idx="1">
+            <a:schemeClr val="accent1"/>
+          </a:fillRef>
+          <a:effectRef idx="0">
+            <a:schemeClr val="accent1"/>
+          </a:effectRef>
+          <a:fontRef idx="minor">
+            <a:schemeClr val="lt1"/>
+          </a:fontRef>
+        </p:style>
+        <p:txBody>
+          <a:bodyPr rtlCol="0" anchor="ctr"/>
+          <a:lstStyle/>
+          <a:p>
+            <a:pPr algn="ctr"/>
+            <a:r>
+              <a:rPr lang="en-US" sz="1400" dirty="0" smtClean="0">
+                <a:solidFill>
+                  <a:schemeClr val="tx1"/>
+                </a:solidFill>
+              </a:rPr>
+              <a:t>Entry:</a:t>
+            </a:r>
+          </a:p>
+          <a:p>
+            <a:pPr algn="ctr"/>
+            <a:r>
+              <a:rPr lang="is-IS" sz="1400" dirty="0" smtClean="0">
+                <a:solidFill>
+                  <a:schemeClr val="tx1"/>
+                </a:solidFill>
+              </a:rPr>
+              <a:t>….</a:t>
+            </a:r>
+            <a:endParaRPr lang="en-US" sz="1400" dirty="0">
+              <a:solidFill>
+                <a:schemeClr val="tx1"/>
+              </a:solidFill>
+            </a:endParaRPr>
+          </a:p>
+        </p:txBody>
+      </p:sp>
+      <p:sp>
+        <p:nvSpPr>
+          <p:cNvPr id="5" name="Rectangle 4"/>
+          <p:cNvSpPr/>
+          <p:nvPr/>
+        </p:nvSpPr>
+        <p:spPr>
+          <a:xfrm>
+            <a:off x="2791859" y="2842346"/>
+            <a:ext cx="2049138" cy="900629"/>
+          </a:xfrm>
+          <a:prstGeom prst="rect">
+            <a:avLst/>
+          </a:prstGeom>
+          <a:solidFill>
+            <a:schemeClr val="bg1"/>
+          </a:solidFill>
+          <a:ln>
+            <a:solidFill>
+              <a:schemeClr val="tx1"/>
+            </a:solidFill>
+          </a:ln>
+        </p:spPr>
+        <p:style>
+          <a:lnRef idx="2">
+            <a:schemeClr val="accent1">
+              <a:shade val="50000"/>
+            </a:schemeClr>
+          </a:lnRef>
+          <a:fillRef idx="1">
+            <a:schemeClr val="accent1"/>
+          </a:fillRef>
+          <a:effectRef idx="0">
+            <a:schemeClr val="accent1"/>
+          </a:effectRef>
+          <a:fontRef idx="minor">
+            <a:schemeClr val="lt1"/>
+          </a:fontRef>
+        </p:style>
+        <p:txBody>
+          <a:bodyPr rtlCol="0" anchor="ctr"/>
+          <a:lstStyle/>
+          <a:p>
+            <a:pPr algn="ctr"/>
+            <a:r>
+              <a:rPr lang="en-US" sz="1200" dirty="0" smtClean="0">
+                <a:solidFill>
+                  <a:schemeClr val="tx1"/>
+                </a:solidFill>
+              </a:rPr>
+              <a:t>LH1:</a:t>
+            </a:r>
+          </a:p>
+          <a:p>
+            <a:pPr algn="ctr"/>
+            <a:r>
+              <a:rPr lang="is-IS" sz="1200" dirty="0" smtClean="0">
+                <a:solidFill>
+                  <a:schemeClr val="tx1"/>
+                </a:solidFill>
+              </a:rPr>
+              <a:t>…</a:t>
+            </a:r>
+          </a:p>
+          <a:p>
+            <a:pPr algn="ctr"/>
+            <a:r>
+              <a:rPr lang="en-US" sz="1200" dirty="0" smtClean="0">
+                <a:solidFill>
+                  <a:schemeClr val="tx1"/>
+                </a:solidFill>
+              </a:rPr>
+              <a:t>B</a:t>
+            </a:r>
+            <a:r>
+              <a:rPr lang="is-IS" sz="1200" dirty="0" smtClean="0">
+                <a:solidFill>
+                  <a:schemeClr val="tx1"/>
+                </a:solidFill>
+              </a:rPr>
+              <a:t>r i1 %loopCond, label %LB, label %LE</a:t>
+            </a:r>
+            <a:endParaRPr lang="en-US" sz="1200" dirty="0">
+              <a:solidFill>
+                <a:schemeClr val="tx1"/>
+              </a:solidFill>
+            </a:endParaRPr>
+          </a:p>
+        </p:txBody>
+      </p:sp>
+      <p:sp>
+        <p:nvSpPr>
+          <p:cNvPr id="6" name="Rectangle 5"/>
+          <p:cNvSpPr/>
+          <p:nvPr/>
+        </p:nvSpPr>
+        <p:spPr>
+          <a:xfrm>
+            <a:off x="2522862" y="4402606"/>
+            <a:ext cx="1123721" cy="451691"/>
+          </a:xfrm>
+          <a:prstGeom prst="rect">
+            <a:avLst/>
+          </a:prstGeom>
+          <a:solidFill>
+            <a:schemeClr val="bg1"/>
+          </a:solidFill>
+          <a:ln>
+            <a:solidFill>
+              <a:schemeClr val="tx1"/>
+            </a:solidFill>
+          </a:ln>
+        </p:spPr>
+        <p:style>
+          <a:lnRef idx="2">
+            <a:schemeClr val="accent1">
+              <a:shade val="50000"/>
+            </a:schemeClr>
+          </a:lnRef>
+          <a:fillRef idx="1">
+            <a:schemeClr val="accent1"/>
+          </a:fillRef>
+          <a:effectRef idx="0">
+            <a:schemeClr val="accent1"/>
+          </a:effectRef>
+          <a:fontRef idx="minor">
+            <a:schemeClr val="lt1"/>
+          </a:fontRef>
+        </p:style>
+        <p:txBody>
+          <a:bodyPr rtlCol="0" anchor="ctr"/>
+          <a:lstStyle/>
+          <a:p>
+            <a:pPr algn="ctr"/>
+            <a:r>
+              <a:rPr lang="en-US" sz="1400" dirty="0" smtClean="0">
+                <a:solidFill>
+                  <a:schemeClr val="tx1"/>
+                </a:solidFill>
+              </a:rPr>
+              <a:t>LE:</a:t>
+            </a:r>
+          </a:p>
+          <a:p>
+            <a:pPr algn="ctr"/>
+            <a:r>
+              <a:rPr lang="is-IS" sz="1400" dirty="0" smtClean="0">
+                <a:solidFill>
+                  <a:schemeClr val="tx1"/>
+                </a:solidFill>
+              </a:rPr>
+              <a:t>…</a:t>
+            </a:r>
+            <a:endParaRPr lang="en-US" sz="1400" dirty="0">
+              <a:solidFill>
+                <a:schemeClr val="tx1"/>
+              </a:solidFill>
+            </a:endParaRPr>
+          </a:p>
+        </p:txBody>
+      </p:sp>
+      <p:sp>
+        <p:nvSpPr>
+          <p:cNvPr id="7" name="Rectangle 6"/>
+          <p:cNvSpPr/>
+          <p:nvPr/>
+        </p:nvSpPr>
+        <p:spPr>
+          <a:xfrm>
+            <a:off x="3939447" y="4402606"/>
+            <a:ext cx="1386290" cy="674789"/>
+          </a:xfrm>
+          <a:prstGeom prst="rect">
+            <a:avLst/>
+          </a:prstGeom>
+          <a:solidFill>
+            <a:schemeClr val="bg1"/>
+          </a:solidFill>
+          <a:ln>
+            <a:solidFill>
+              <a:schemeClr val="tx1"/>
+            </a:solidFill>
+          </a:ln>
+        </p:spPr>
+        <p:style>
+          <a:lnRef idx="2">
+            <a:schemeClr val="accent1">
+              <a:shade val="50000"/>
+            </a:schemeClr>
+          </a:lnRef>
+          <a:fillRef idx="1">
+            <a:schemeClr val="accent1"/>
+          </a:fillRef>
+          <a:effectRef idx="0">
+            <a:schemeClr val="accent1"/>
+          </a:effectRef>
+          <a:fontRef idx="minor">
+            <a:schemeClr val="lt1"/>
+          </a:fontRef>
+        </p:style>
+        <p:txBody>
+          <a:bodyPr rtlCol="0" anchor="ctr"/>
+          <a:lstStyle/>
+          <a:p>
+            <a:pPr algn="ctr"/>
+            <a:r>
+              <a:rPr lang="en-US" sz="1200" dirty="0" smtClean="0">
+                <a:solidFill>
+                  <a:schemeClr val="tx1"/>
+                </a:solidFill>
+              </a:rPr>
+              <a:t>LB:</a:t>
+            </a:r>
+          </a:p>
+          <a:p>
+            <a:pPr algn="ctr"/>
+            <a:r>
+              <a:rPr lang="is-IS" sz="1200" dirty="0" smtClean="0">
+                <a:solidFill>
+                  <a:schemeClr val="tx1"/>
+                </a:solidFill>
+              </a:rPr>
+              <a:t>…</a:t>
+            </a:r>
+          </a:p>
+          <a:p>
+            <a:pPr algn="ctr"/>
+            <a:r>
+              <a:rPr lang="en-US" sz="1200" dirty="0" smtClean="0">
+                <a:solidFill>
+                  <a:schemeClr val="tx1"/>
+                </a:solidFill>
+              </a:rPr>
+              <a:t>B</a:t>
+            </a:r>
+            <a:r>
+              <a:rPr lang="is-IS" sz="1200" dirty="0" smtClean="0">
+                <a:solidFill>
+                  <a:schemeClr val="tx1"/>
+                </a:solidFill>
+              </a:rPr>
+              <a:t>r label %LH1</a:t>
+            </a:r>
+            <a:endParaRPr lang="en-US" sz="1200" dirty="0">
+              <a:solidFill>
+                <a:schemeClr val="tx1"/>
+              </a:solidFill>
+            </a:endParaRPr>
+          </a:p>
+        </p:txBody>
+      </p:sp>
+      <p:sp>
+        <p:nvSpPr>
+          <p:cNvPr id="8" name="Rectangle 7"/>
+          <p:cNvSpPr/>
+          <p:nvPr/>
+        </p:nvSpPr>
+        <p:spPr>
+          <a:xfrm>
+            <a:off x="1443209" y="1290807"/>
+            <a:ext cx="2203374" cy="925417"/>
+          </a:xfrm>
+          <a:prstGeom prst="rect">
+            <a:avLst/>
+          </a:prstGeom>
+          <a:solidFill>
+            <a:schemeClr val="bg1"/>
+          </a:solidFill>
+          <a:ln>
+            <a:solidFill>
+              <a:schemeClr val="tx1"/>
+            </a:solidFill>
+          </a:ln>
+        </p:spPr>
+        <p:style>
+          <a:lnRef idx="2">
+            <a:schemeClr val="accent1">
+              <a:shade val="50000"/>
+            </a:schemeClr>
+          </a:lnRef>
+          <a:fillRef idx="1">
+            <a:schemeClr val="accent1"/>
+          </a:fillRef>
+          <a:effectRef idx="0">
+            <a:schemeClr val="accent1"/>
+          </a:effectRef>
+          <a:fontRef idx="minor">
+            <a:schemeClr val="lt1"/>
+          </a:fontRef>
+        </p:style>
+        <p:txBody>
+          <a:bodyPr rtlCol="0" anchor="ctr"/>
+          <a:lstStyle/>
+          <a:p>
+            <a:pPr algn="ctr"/>
+            <a:r>
+              <a:rPr lang="en-US" sz="1200" dirty="0" smtClean="0">
+                <a:solidFill>
+                  <a:schemeClr val="tx1"/>
+                </a:solidFill>
+              </a:rPr>
+              <a:t>LH0:</a:t>
+            </a:r>
+          </a:p>
+          <a:p>
+            <a:pPr algn="ctr"/>
+            <a:r>
+              <a:rPr lang="is-IS" sz="1200" dirty="0" smtClean="0">
+                <a:solidFill>
+                  <a:schemeClr val="tx1"/>
+                </a:solidFill>
+              </a:rPr>
+              <a:t>…</a:t>
+            </a:r>
+          </a:p>
+          <a:p>
+            <a:pPr algn="ctr"/>
+            <a:r>
+              <a:rPr lang="en-US" sz="1200" dirty="0" smtClean="0">
+                <a:solidFill>
+                  <a:schemeClr val="tx1"/>
+                </a:solidFill>
+              </a:rPr>
+              <a:t>B</a:t>
+            </a:r>
+            <a:r>
+              <a:rPr lang="is-IS" sz="1200" dirty="0" smtClean="0">
+                <a:solidFill>
+                  <a:schemeClr val="tx1"/>
+                </a:solidFill>
+              </a:rPr>
+              <a:t>r i1 %osrCond, label %OSR, label %LH1</a:t>
+            </a:r>
+            <a:endParaRPr lang="en-US" sz="1200" dirty="0">
+              <a:solidFill>
+                <a:schemeClr val="tx1"/>
+              </a:solidFill>
+            </a:endParaRPr>
+          </a:p>
+        </p:txBody>
+      </p:sp>
+      <p:cxnSp>
+        <p:nvCxnSpPr>
+          <p:cNvPr id="9" name="Straight Arrow Connector 8"/>
+          <p:cNvCxnSpPr>
+            <a:stCxn id="6" idx="2"/>
+          </p:cNvCxnSpPr>
+          <p:nvPr/>
+        </p:nvCxnSpPr>
+        <p:spPr>
+          <a:xfrm flipH="1">
+            <a:off x="2544896" y="1064048"/>
+            <a:ext cx="1" cy="226759"/>
+          </a:xfrm>
+          <a:prstGeom prst="straightConnector1">
+            <a:avLst/>
+          </a:prstGeom>
+          <a:ln>
+            <a:solidFill>
+              <a:schemeClr val="tx1"/>
+            </a:solidFill>
+            <a:tailEnd type="triangle"/>
+          </a:ln>
+        </p:spPr>
+        <p:style>
+          <a:lnRef idx="1">
+            <a:schemeClr val="accent1"/>
+          </a:lnRef>
+          <a:fillRef idx="0">
+            <a:schemeClr val="accent1"/>
+          </a:fillRef>
+          <a:effectRef idx="0">
+            <a:schemeClr val="accent1"/>
+          </a:effectRef>
+          <a:fontRef idx="minor">
+            <a:schemeClr val="tx1"/>
+          </a:fontRef>
+        </p:style>
+      </p:cxnSp>
+      <p:cxnSp>
+        <p:nvCxnSpPr>
+          <p:cNvPr id="10" name="Straight Arrow Connector 9"/>
+          <p:cNvCxnSpPr>
+            <a:endCxn id="7" idx="0"/>
+          </p:cNvCxnSpPr>
+          <p:nvPr/>
+        </p:nvCxnSpPr>
+        <p:spPr>
+          <a:xfrm>
+            <a:off x="2544896" y="2216224"/>
+            <a:ext cx="1271532" cy="626122"/>
+          </a:xfrm>
+          <a:prstGeom prst="straightConnector1">
+            <a:avLst/>
+          </a:prstGeom>
+          <a:ln>
+            <a:solidFill>
+              <a:schemeClr val="tx1"/>
+            </a:solidFill>
+            <a:tailEnd type="triangle"/>
+          </a:ln>
+        </p:spPr>
+        <p:style>
+          <a:lnRef idx="1">
+            <a:schemeClr val="accent1"/>
+          </a:lnRef>
+          <a:fillRef idx="0">
+            <a:schemeClr val="accent1"/>
+          </a:fillRef>
+          <a:effectRef idx="0">
+            <a:schemeClr val="accent1"/>
+          </a:effectRef>
+          <a:fontRef idx="minor">
+            <a:schemeClr val="tx1"/>
+          </a:fontRef>
+        </p:style>
+      </p:cxnSp>
+      <p:sp>
+        <p:nvSpPr>
+          <p:cNvPr id="11" name="Rectangle 10"/>
+          <p:cNvSpPr/>
+          <p:nvPr/>
+        </p:nvSpPr>
+        <p:spPr>
+          <a:xfrm>
+            <a:off x="214828" y="2842346"/>
+            <a:ext cx="2049138" cy="900629"/>
+          </a:xfrm>
+          <a:prstGeom prst="rect">
+            <a:avLst/>
+          </a:prstGeom>
+          <a:solidFill>
+            <a:schemeClr val="bg2"/>
+          </a:solidFill>
+          <a:ln>
+            <a:solidFill>
+              <a:schemeClr val="tx1"/>
+            </a:solidFill>
+          </a:ln>
+        </p:spPr>
+        <p:style>
+          <a:lnRef idx="2">
+            <a:schemeClr val="accent1">
+              <a:shade val="50000"/>
+            </a:schemeClr>
+          </a:lnRef>
+          <a:fillRef idx="1">
+            <a:schemeClr val="accent1"/>
+          </a:fillRef>
+          <a:effectRef idx="0">
+            <a:schemeClr val="accent1"/>
+          </a:effectRef>
+          <a:fontRef idx="minor">
+            <a:schemeClr val="lt1"/>
+          </a:fontRef>
+        </p:style>
+        <p:txBody>
+          <a:bodyPr rtlCol="0" anchor="ctr"/>
+          <a:lstStyle/>
+          <a:p>
+            <a:pPr algn="ctr"/>
+            <a:r>
+              <a:rPr lang="en-US" sz="1200" dirty="0" smtClean="0">
+                <a:solidFill>
+                  <a:schemeClr val="tx1"/>
+                </a:solidFill>
+              </a:rPr>
+              <a:t>OSR:</a:t>
+            </a:r>
+            <a:endParaRPr lang="en-US" sz="1200" dirty="0">
+              <a:solidFill>
+                <a:schemeClr val="tx1"/>
+              </a:solidFill>
+            </a:endParaRPr>
+          </a:p>
+          <a:p>
+            <a:r>
+              <a:rPr lang="en-US" sz="1200" dirty="0" smtClean="0">
+                <a:solidFill>
+                  <a:schemeClr val="tx1"/>
+                </a:solidFill>
+              </a:rPr>
+              <a:t>Call void @_</a:t>
+            </a:r>
+            <a:r>
+              <a:rPr lang="en-US" sz="1200" dirty="0" err="1" smtClean="0">
+                <a:solidFill>
+                  <a:schemeClr val="tx1"/>
+                </a:solidFill>
+              </a:rPr>
+              <a:t>osrSignal</a:t>
+            </a:r>
+            <a:r>
+              <a:rPr lang="en-US" sz="1200" dirty="0" smtClean="0">
+                <a:solidFill>
+                  <a:schemeClr val="tx1"/>
+                </a:solidFill>
+              </a:rPr>
+              <a:t>(</a:t>
+            </a:r>
+            <a:r>
+              <a:rPr lang="is-IS" sz="1200" dirty="0" smtClean="0">
+                <a:solidFill>
+                  <a:schemeClr val="tx1"/>
+                </a:solidFill>
+              </a:rPr>
+              <a:t>…</a:t>
+            </a:r>
+            <a:r>
+              <a:rPr lang="en-US" sz="1200" dirty="0" smtClean="0">
+                <a:solidFill>
+                  <a:schemeClr val="tx1"/>
+                </a:solidFill>
+              </a:rPr>
+              <a:t>)</a:t>
+            </a:r>
+          </a:p>
+          <a:p>
+            <a:r>
+              <a:rPr lang="en-US" sz="1200" dirty="0" smtClean="0">
+                <a:solidFill>
+                  <a:schemeClr val="tx1"/>
+                </a:solidFill>
+              </a:rPr>
+              <a:t>Br label %LH1</a:t>
+            </a:r>
+          </a:p>
+        </p:txBody>
+      </p:sp>
+      <p:cxnSp>
+        <p:nvCxnSpPr>
+          <p:cNvPr id="12" name="Straight Arrow Connector 11"/>
+          <p:cNvCxnSpPr>
+            <a:stCxn id="7" idx="2"/>
+            <a:endCxn id="8" idx="0"/>
+          </p:cNvCxnSpPr>
+          <p:nvPr/>
+        </p:nvCxnSpPr>
+        <p:spPr>
+          <a:xfrm flipH="1">
+            <a:off x="3084723" y="3742975"/>
+            <a:ext cx="731705" cy="659631"/>
+          </a:xfrm>
+          <a:prstGeom prst="straightConnector1">
+            <a:avLst/>
+          </a:prstGeom>
+          <a:ln>
+            <a:solidFill>
+              <a:schemeClr val="tx1"/>
+            </a:solidFill>
+            <a:tailEnd type="triangle"/>
+          </a:ln>
+        </p:spPr>
+        <p:style>
+          <a:lnRef idx="1">
+            <a:schemeClr val="accent1"/>
+          </a:lnRef>
+          <a:fillRef idx="0">
+            <a:schemeClr val="accent1"/>
+          </a:fillRef>
+          <a:effectRef idx="0">
+            <a:schemeClr val="accent1"/>
+          </a:effectRef>
+          <a:fontRef idx="minor">
+            <a:schemeClr val="tx1"/>
+          </a:fontRef>
+        </p:style>
+      </p:cxnSp>
+      <p:cxnSp>
+        <p:nvCxnSpPr>
+          <p:cNvPr id="13" name="Straight Arrow Connector 12"/>
+          <p:cNvCxnSpPr>
+            <a:stCxn id="7" idx="2"/>
+            <a:endCxn id="9" idx="0"/>
+          </p:cNvCxnSpPr>
+          <p:nvPr/>
+        </p:nvCxnSpPr>
+        <p:spPr>
+          <a:xfrm>
+            <a:off x="3816428" y="3742975"/>
+            <a:ext cx="816164" cy="659631"/>
+          </a:xfrm>
+          <a:prstGeom prst="straightConnector1">
+            <a:avLst/>
+          </a:prstGeom>
+          <a:ln>
+            <a:solidFill>
+              <a:schemeClr val="tx1"/>
+            </a:solidFill>
+            <a:tailEnd type="triangle"/>
+          </a:ln>
+        </p:spPr>
+        <p:style>
+          <a:lnRef idx="1">
+            <a:schemeClr val="accent1"/>
+          </a:lnRef>
+          <a:fillRef idx="0">
+            <a:schemeClr val="accent1"/>
+          </a:fillRef>
+          <a:effectRef idx="0">
+            <a:schemeClr val="accent1"/>
+          </a:effectRef>
+          <a:fontRef idx="minor">
+            <a:schemeClr val="tx1"/>
+          </a:fontRef>
+        </p:style>
+      </p:cxnSp>
+      <p:cxnSp>
+        <p:nvCxnSpPr>
+          <p:cNvPr id="14" name="Straight Arrow Connector 13"/>
+          <p:cNvCxnSpPr/>
+          <p:nvPr/>
+        </p:nvCxnSpPr>
+        <p:spPr>
+          <a:xfrm flipH="1">
+            <a:off x="1239397" y="2216224"/>
+            <a:ext cx="1305499" cy="626122"/>
+          </a:xfrm>
+          <a:prstGeom prst="straightConnector1">
+            <a:avLst/>
+          </a:prstGeom>
+          <a:ln>
+            <a:solidFill>
+              <a:schemeClr val="tx1"/>
+            </a:solidFill>
+            <a:tailEnd type="triangle"/>
+          </a:ln>
+        </p:spPr>
+        <p:style>
+          <a:lnRef idx="1">
+            <a:schemeClr val="accent1"/>
+          </a:lnRef>
+          <a:fillRef idx="0">
+            <a:schemeClr val="accent1"/>
+          </a:fillRef>
+          <a:effectRef idx="0">
+            <a:schemeClr val="accent1"/>
+          </a:effectRef>
+          <a:fontRef idx="minor">
+            <a:schemeClr val="tx1"/>
+          </a:fontRef>
+        </p:style>
+      </p:cxnSp>
+      <p:cxnSp>
+        <p:nvCxnSpPr>
+          <p:cNvPr id="16" name="Straight Arrow Connector 15"/>
+          <p:cNvCxnSpPr>
+            <a:stCxn id="11" idx="3"/>
+            <a:endCxn id="5" idx="1"/>
+          </p:cNvCxnSpPr>
+          <p:nvPr/>
+        </p:nvCxnSpPr>
+        <p:spPr>
+          <a:xfrm>
+            <a:off x="2263966" y="3292661"/>
+            <a:ext cx="527893" cy="0"/>
+          </a:xfrm>
+          <a:prstGeom prst="straightConnector1">
+            <a:avLst/>
+          </a:prstGeom>
+          <a:ln>
+            <a:solidFill>
+              <a:schemeClr val="tx1"/>
+            </a:solidFill>
+            <a:tailEnd type="triangle"/>
+          </a:ln>
+        </p:spPr>
+        <p:style>
+          <a:lnRef idx="1">
+            <a:schemeClr val="accent1"/>
+          </a:lnRef>
+          <a:fillRef idx="0">
+            <a:schemeClr val="accent1"/>
+          </a:fillRef>
+          <a:effectRef idx="0">
+            <a:schemeClr val="accent1"/>
+          </a:effectRef>
+          <a:fontRef idx="minor">
+            <a:schemeClr val="tx1"/>
+          </a:fontRef>
+        </p:style>
+      </p:cxnSp>
+    </p:spTree>
+    <p:extLst>
+      <p:ext uri="{BB962C8B-B14F-4D97-AF65-F5344CB8AC3E}">
+        <p14:creationId xmlns:p14="http://schemas.microsoft.com/office/powerpoint/2010/main" val="265950741"/>
+      </p:ext>
+    </p:extLst>
+  </p:cSld>
+  <p:clrMapOvr>
+    <a:masterClrMapping/>
+  </p:clrMapOvr>
+</p:sld>
+</file>
+
+<file path=ppt/slides/slide9.xml><?xml version="1.0" encoding="utf-8"?>
+<p:sld xmlns:a="http://schemas.openxmlformats.org/drawingml/2006/main" xmlns:r="http://schemas.openxmlformats.org/officeDocument/2006/relationships" xmlns:p="http://schemas.openxmlformats.org/presentationml/2006/main">
+  <p:cSld>
+    <p:spTree>
+      <p:nvGrpSpPr>
+        <p:cNvPr id="1" name=""/>
+        <p:cNvGrpSpPr/>
+        <p:nvPr/>
+      </p:nvGrpSpPr>
+      <p:grpSpPr>
+        <a:xfrm>
+          <a:off x="0" y="0"/>
+          <a:ext cx="0" cy="0"/>
+          <a:chOff x="0" y="0"/>
+          <a:chExt cx="0" cy="0"/>
+        </a:xfrm>
+      </p:grpSpPr>
+      <p:sp>
+        <p:nvSpPr>
+          <p:cNvPr id="4" name="Rectangle 3"/>
+          <p:cNvSpPr/>
+          <p:nvPr/>
+        </p:nvSpPr>
+        <p:spPr>
+          <a:xfrm>
+            <a:off x="1983036" y="612357"/>
+            <a:ext cx="1123721" cy="451691"/>
+          </a:xfrm>
+          <a:prstGeom prst="rect">
+            <a:avLst/>
+          </a:prstGeom>
+          <a:solidFill>
+            <a:schemeClr val="bg1"/>
+          </a:solidFill>
+          <a:ln>
+            <a:solidFill>
+              <a:schemeClr val="tx1"/>
+            </a:solidFill>
+          </a:ln>
+        </p:spPr>
+        <p:style>
+          <a:lnRef idx="2">
+            <a:schemeClr val="accent1">
+              <a:shade val="50000"/>
+            </a:schemeClr>
+          </a:lnRef>
+          <a:fillRef idx="1">
+            <a:schemeClr val="accent1"/>
+          </a:fillRef>
+          <a:effectRef idx="0">
+            <a:schemeClr val="accent1"/>
+          </a:effectRef>
+          <a:fontRef idx="minor">
+            <a:schemeClr val="lt1"/>
+          </a:fontRef>
+        </p:style>
+        <p:txBody>
+          <a:bodyPr rtlCol="0" anchor="ctr"/>
+          <a:lstStyle/>
+          <a:p>
+            <a:pPr algn="ctr"/>
+            <a:r>
+              <a:rPr lang="en-US" sz="1400" dirty="0" smtClean="0">
+                <a:solidFill>
+                  <a:schemeClr val="tx1"/>
+                </a:solidFill>
+              </a:rPr>
+              <a:t>Entry:</a:t>
+            </a:r>
+          </a:p>
+          <a:p>
+            <a:pPr algn="ctr"/>
+            <a:r>
+              <a:rPr lang="is-IS" sz="1400" dirty="0" smtClean="0">
+                <a:solidFill>
+                  <a:schemeClr val="tx1"/>
+                </a:solidFill>
+              </a:rPr>
+              <a:t>….</a:t>
+            </a:r>
+            <a:endParaRPr lang="en-US" sz="1400" dirty="0">
+              <a:solidFill>
+                <a:schemeClr val="tx1"/>
+              </a:solidFill>
+            </a:endParaRPr>
+          </a:p>
+        </p:txBody>
+      </p:sp>
+      <p:sp>
+        <p:nvSpPr>
+          <p:cNvPr id="5" name="Rectangle 4"/>
+          <p:cNvSpPr/>
+          <p:nvPr/>
+        </p:nvSpPr>
+        <p:spPr>
+          <a:xfrm>
+            <a:off x="2791859" y="2842346"/>
+            <a:ext cx="2049138" cy="900629"/>
+          </a:xfrm>
+          <a:prstGeom prst="rect">
+            <a:avLst/>
+          </a:prstGeom>
+          <a:solidFill>
+            <a:schemeClr val="bg1"/>
+          </a:solidFill>
+          <a:ln>
+            <a:solidFill>
+              <a:schemeClr val="tx1"/>
+            </a:solidFill>
+          </a:ln>
+        </p:spPr>
+        <p:style>
+          <a:lnRef idx="2">
+            <a:schemeClr val="accent1">
+              <a:shade val="50000"/>
+            </a:schemeClr>
+          </a:lnRef>
+          <a:fillRef idx="1">
+            <a:schemeClr val="accent1"/>
+          </a:fillRef>
+          <a:effectRef idx="0">
+            <a:schemeClr val="accent1"/>
+          </a:effectRef>
+          <a:fontRef idx="minor">
+            <a:schemeClr val="lt1"/>
+          </a:fontRef>
+        </p:style>
+        <p:txBody>
+          <a:bodyPr rtlCol="0" anchor="ctr"/>
+          <a:lstStyle/>
+          <a:p>
+            <a:pPr algn="ctr"/>
+            <a:r>
+              <a:rPr lang="en-US" sz="1200" dirty="0" smtClean="0">
+                <a:solidFill>
+                  <a:schemeClr val="tx1"/>
+                </a:solidFill>
+              </a:rPr>
+              <a:t>LH1:</a:t>
+            </a:r>
+          </a:p>
+          <a:p>
+            <a:pPr algn="ctr"/>
+            <a:r>
+              <a:rPr lang="is-IS" sz="1200" dirty="0" smtClean="0">
+                <a:solidFill>
+                  <a:schemeClr val="tx1"/>
+                </a:solidFill>
+              </a:rPr>
+              <a:t>…</a:t>
+            </a:r>
+          </a:p>
+          <a:p>
+            <a:pPr algn="ctr"/>
+            <a:r>
+              <a:rPr lang="en-US" sz="1200" dirty="0" smtClean="0">
+                <a:solidFill>
+                  <a:schemeClr val="tx1"/>
+                </a:solidFill>
+              </a:rPr>
+              <a:t>B</a:t>
+            </a:r>
+            <a:r>
+              <a:rPr lang="is-IS" sz="1200" dirty="0" smtClean="0">
+                <a:solidFill>
+                  <a:schemeClr val="tx1"/>
+                </a:solidFill>
+              </a:rPr>
+              <a:t>r i1 %loopCond, label %LB, label %LE</a:t>
+            </a:r>
+            <a:endParaRPr lang="en-US" sz="1200" dirty="0">
+              <a:solidFill>
+                <a:schemeClr val="tx1"/>
+              </a:solidFill>
+            </a:endParaRPr>
+          </a:p>
+        </p:txBody>
+      </p:sp>
+      <p:sp>
+        <p:nvSpPr>
+          <p:cNvPr id="6" name="Rectangle 5"/>
+          <p:cNvSpPr/>
+          <p:nvPr/>
+        </p:nvSpPr>
+        <p:spPr>
+          <a:xfrm>
+            <a:off x="2522862" y="4402606"/>
+            <a:ext cx="1123721" cy="451691"/>
+          </a:xfrm>
+          <a:prstGeom prst="rect">
+            <a:avLst/>
+          </a:prstGeom>
+          <a:solidFill>
+            <a:schemeClr val="bg1"/>
+          </a:solidFill>
+          <a:ln>
+            <a:solidFill>
+              <a:schemeClr val="tx1"/>
+            </a:solidFill>
+          </a:ln>
+        </p:spPr>
+        <p:style>
+          <a:lnRef idx="2">
+            <a:schemeClr val="accent1">
+              <a:shade val="50000"/>
+            </a:schemeClr>
+          </a:lnRef>
+          <a:fillRef idx="1">
+            <a:schemeClr val="accent1"/>
+          </a:fillRef>
+          <a:effectRef idx="0">
+            <a:schemeClr val="accent1"/>
+          </a:effectRef>
+          <a:fontRef idx="minor">
+            <a:schemeClr val="lt1"/>
+          </a:fontRef>
+        </p:style>
+        <p:txBody>
+          <a:bodyPr rtlCol="0" anchor="ctr"/>
+          <a:lstStyle/>
+          <a:p>
+            <a:pPr algn="ctr"/>
+            <a:r>
+              <a:rPr lang="en-US" sz="1400" dirty="0" smtClean="0">
+                <a:solidFill>
+                  <a:schemeClr val="tx1"/>
+                </a:solidFill>
+              </a:rPr>
+              <a:t>LE:</a:t>
+            </a:r>
+          </a:p>
+          <a:p>
+            <a:pPr algn="ctr"/>
+            <a:r>
+              <a:rPr lang="is-IS" sz="1400" dirty="0" smtClean="0">
+                <a:solidFill>
+                  <a:schemeClr val="tx1"/>
+                </a:solidFill>
+              </a:rPr>
+              <a:t>…</a:t>
+            </a:r>
+            <a:endParaRPr lang="en-US" sz="1400" dirty="0">
+              <a:solidFill>
+                <a:schemeClr val="tx1"/>
+              </a:solidFill>
+            </a:endParaRPr>
+          </a:p>
+        </p:txBody>
+      </p:sp>
+      <p:sp>
+        <p:nvSpPr>
+          <p:cNvPr id="7" name="Rectangle 6"/>
+          <p:cNvSpPr/>
+          <p:nvPr/>
+        </p:nvSpPr>
+        <p:spPr>
+          <a:xfrm>
+            <a:off x="3939447" y="4402606"/>
+            <a:ext cx="1386290" cy="674789"/>
+          </a:xfrm>
+          <a:prstGeom prst="rect">
+            <a:avLst/>
+          </a:prstGeom>
+          <a:solidFill>
+            <a:schemeClr val="bg1"/>
+          </a:solidFill>
+          <a:ln>
+            <a:solidFill>
+              <a:schemeClr val="tx1"/>
+            </a:solidFill>
+          </a:ln>
+        </p:spPr>
+        <p:style>
+          <a:lnRef idx="2">
+            <a:schemeClr val="accent1">
+              <a:shade val="50000"/>
+            </a:schemeClr>
+          </a:lnRef>
+          <a:fillRef idx="1">
+            <a:schemeClr val="accent1"/>
+          </a:fillRef>
+          <a:effectRef idx="0">
+            <a:schemeClr val="accent1"/>
+          </a:effectRef>
+          <a:fontRef idx="minor">
+            <a:schemeClr val="lt1"/>
+          </a:fontRef>
+        </p:style>
+        <p:txBody>
+          <a:bodyPr rtlCol="0" anchor="ctr"/>
+          <a:lstStyle/>
+          <a:p>
+            <a:pPr algn="ctr"/>
+            <a:r>
+              <a:rPr lang="en-US" sz="1200" dirty="0" smtClean="0">
+                <a:solidFill>
+                  <a:schemeClr val="tx1"/>
+                </a:solidFill>
+              </a:rPr>
+              <a:t>LB:</a:t>
+            </a:r>
+          </a:p>
+          <a:p>
+            <a:pPr algn="ctr"/>
+            <a:r>
+              <a:rPr lang="is-IS" sz="1200" dirty="0" smtClean="0">
+                <a:solidFill>
+                  <a:schemeClr val="tx1"/>
+                </a:solidFill>
+              </a:rPr>
+              <a:t>…</a:t>
+            </a:r>
+          </a:p>
+          <a:p>
+            <a:pPr algn="ctr"/>
+            <a:r>
+              <a:rPr lang="en-US" sz="1200" dirty="0" smtClean="0">
+                <a:solidFill>
+                  <a:schemeClr val="tx1"/>
+                </a:solidFill>
+              </a:rPr>
+              <a:t>B</a:t>
+            </a:r>
+            <a:r>
+              <a:rPr lang="is-IS" sz="1200" dirty="0" smtClean="0">
+                <a:solidFill>
+                  <a:schemeClr val="tx1"/>
+                </a:solidFill>
+              </a:rPr>
+              <a:t>r label %LH1</a:t>
+            </a:r>
+            <a:endParaRPr lang="en-US" sz="1200" dirty="0">
+              <a:solidFill>
+                <a:schemeClr val="tx1"/>
+              </a:solidFill>
+            </a:endParaRPr>
+          </a:p>
+        </p:txBody>
+      </p:sp>
+      <p:sp>
+        <p:nvSpPr>
+          <p:cNvPr id="15" name="Rectangle 14"/>
+          <p:cNvSpPr/>
+          <p:nvPr/>
+        </p:nvSpPr>
+        <p:spPr>
+          <a:xfrm>
+            <a:off x="1443209" y="1290807"/>
+            <a:ext cx="2203374" cy="925417"/>
+          </a:xfrm>
+          <a:prstGeom prst="rect">
+            <a:avLst/>
+          </a:prstGeom>
+          <a:solidFill>
+            <a:schemeClr val="bg1"/>
+          </a:solidFill>
+          <a:ln>
+            <a:solidFill>
+              <a:schemeClr val="tx1"/>
+            </a:solidFill>
+          </a:ln>
+        </p:spPr>
+        <p:style>
+          <a:lnRef idx="2">
+            <a:schemeClr val="accent1">
+              <a:shade val="50000"/>
+            </a:schemeClr>
+          </a:lnRef>
+          <a:fillRef idx="1">
+            <a:schemeClr val="accent1"/>
+          </a:fillRef>
+          <a:effectRef idx="0">
+            <a:schemeClr val="accent1"/>
+          </a:effectRef>
+          <a:fontRef idx="minor">
+            <a:schemeClr val="lt1"/>
+          </a:fontRef>
+        </p:style>
+        <p:txBody>
+          <a:bodyPr rtlCol="0" anchor="ctr"/>
+          <a:lstStyle/>
+          <a:p>
+            <a:pPr algn="ctr"/>
+            <a:r>
+              <a:rPr lang="en-US" sz="1200" dirty="0" smtClean="0">
+                <a:solidFill>
+                  <a:schemeClr val="tx1"/>
+                </a:solidFill>
+              </a:rPr>
+              <a:t>LH0:</a:t>
+            </a:r>
+          </a:p>
+          <a:p>
+            <a:pPr algn="ctr"/>
+            <a:r>
+              <a:rPr lang="is-IS" sz="1200" dirty="0" smtClean="0">
+                <a:solidFill>
+                  <a:schemeClr val="tx1"/>
+                </a:solidFill>
+              </a:rPr>
+              <a:t>…</a:t>
+            </a:r>
+          </a:p>
+          <a:p>
+            <a:pPr algn="ctr"/>
+            <a:r>
+              <a:rPr lang="en-US" sz="1200" dirty="0" smtClean="0">
+                <a:solidFill>
+                  <a:schemeClr val="tx1"/>
+                </a:solidFill>
+              </a:rPr>
+              <a:t>B</a:t>
+            </a:r>
+            <a:r>
+              <a:rPr lang="is-IS" sz="1200" dirty="0" smtClean="0">
+                <a:solidFill>
+                  <a:schemeClr val="tx1"/>
+                </a:solidFill>
+              </a:rPr>
+              <a:t>r i1 %osrCond, label %OSR, label %LH1</a:t>
+            </a:r>
+            <a:endParaRPr lang="en-US" sz="1200" dirty="0">
+              <a:solidFill>
+                <a:schemeClr val="tx1"/>
+              </a:solidFill>
+            </a:endParaRPr>
+          </a:p>
+        </p:txBody>
+      </p:sp>
+      <p:cxnSp>
+        <p:nvCxnSpPr>
+          <p:cNvPr id="19" name="Straight Arrow Connector 18"/>
+          <p:cNvCxnSpPr>
+            <a:stCxn id="4" idx="2"/>
+            <a:endCxn id="15" idx="0"/>
+          </p:cNvCxnSpPr>
+          <p:nvPr/>
+        </p:nvCxnSpPr>
+        <p:spPr>
+          <a:xfrm flipH="1">
+            <a:off x="2544896" y="1064048"/>
+            <a:ext cx="1" cy="226759"/>
+          </a:xfrm>
+          <a:prstGeom prst="straightConnector1">
+            <a:avLst/>
+          </a:prstGeom>
+          <a:ln>
+            <a:solidFill>
+              <a:schemeClr val="tx1"/>
+            </a:solidFill>
+            <a:tailEnd type="triangle"/>
+          </a:ln>
+        </p:spPr>
+        <p:style>
+          <a:lnRef idx="1">
+            <a:schemeClr val="accent1"/>
+          </a:lnRef>
+          <a:fillRef idx="0">
+            <a:schemeClr val="accent1"/>
+          </a:fillRef>
+          <a:effectRef idx="0">
+            <a:schemeClr val="accent1"/>
+          </a:effectRef>
+          <a:fontRef idx="minor">
+            <a:schemeClr val="tx1"/>
+          </a:fontRef>
+        </p:style>
+      </p:cxnSp>
+      <p:cxnSp>
+        <p:nvCxnSpPr>
+          <p:cNvPr id="21" name="Straight Arrow Connector 20"/>
+          <p:cNvCxnSpPr>
+            <a:stCxn id="15" idx="2"/>
+            <a:endCxn id="5" idx="0"/>
+          </p:cNvCxnSpPr>
+          <p:nvPr/>
+        </p:nvCxnSpPr>
+        <p:spPr>
+          <a:xfrm>
+            <a:off x="2544896" y="2216224"/>
+            <a:ext cx="1271532" cy="626122"/>
+          </a:xfrm>
+          <a:prstGeom prst="straightConnector1">
+            <a:avLst/>
+          </a:prstGeom>
+          <a:ln>
+            <a:solidFill>
+              <a:schemeClr val="tx1"/>
+            </a:solidFill>
+            <a:tailEnd type="triangle"/>
+          </a:ln>
+        </p:spPr>
+        <p:style>
+          <a:lnRef idx="1">
+            <a:schemeClr val="accent1"/>
+          </a:lnRef>
+          <a:fillRef idx="0">
+            <a:schemeClr val="accent1"/>
+          </a:fillRef>
+          <a:effectRef idx="0">
+            <a:schemeClr val="accent1"/>
+          </a:effectRef>
+          <a:fontRef idx="minor">
+            <a:schemeClr val="tx1"/>
+          </a:fontRef>
+        </p:style>
+      </p:cxnSp>
+      <p:sp>
+        <p:nvSpPr>
+          <p:cNvPr id="23" name="Rectangle 22"/>
+          <p:cNvSpPr/>
+          <p:nvPr/>
+        </p:nvSpPr>
+        <p:spPr>
+          <a:xfrm>
+            <a:off x="214828" y="2842346"/>
+            <a:ext cx="2049138" cy="1662633"/>
+          </a:xfrm>
+          <a:prstGeom prst="rect">
+            <a:avLst/>
+          </a:prstGeom>
+          <a:solidFill>
+            <a:schemeClr val="bg2"/>
+          </a:solidFill>
+          <a:ln>
+            <a:solidFill>
+              <a:schemeClr val="tx1"/>
+            </a:solidFill>
+          </a:ln>
+        </p:spPr>
+        <p:style>
+          <a:lnRef idx="2">
+            <a:schemeClr val="accent1">
+              <a:shade val="50000"/>
+            </a:schemeClr>
+          </a:lnRef>
+          <a:fillRef idx="1">
+            <a:schemeClr val="accent1"/>
+          </a:fillRef>
+          <a:effectRef idx="0">
+            <a:schemeClr val="accent1"/>
+          </a:effectRef>
+          <a:fontRef idx="minor">
+            <a:schemeClr val="lt1"/>
+          </a:fontRef>
+        </p:style>
+        <p:txBody>
+          <a:bodyPr rtlCol="0" anchor="ctr"/>
+          <a:lstStyle/>
+          <a:p>
+            <a:pPr algn="ctr"/>
+            <a:r>
+              <a:rPr lang="en-US" sz="1200" dirty="0" smtClean="0">
+                <a:solidFill>
+                  <a:schemeClr val="tx1"/>
+                </a:solidFill>
+              </a:rPr>
+              <a:t>OSR:</a:t>
+            </a:r>
+            <a:endParaRPr lang="en-US" sz="1200" dirty="0">
+              <a:solidFill>
+                <a:schemeClr val="tx1"/>
+              </a:solidFill>
+            </a:endParaRPr>
+          </a:p>
+          <a:p>
+            <a:r>
+              <a:rPr lang="en-US" sz="1200" dirty="0" smtClean="0">
+                <a:solidFill>
+                  <a:schemeClr val="tx1"/>
+                </a:solidFill>
+              </a:rPr>
+              <a:t>Call void @_</a:t>
+            </a:r>
+            <a:r>
+              <a:rPr lang="en-US" sz="1200" dirty="0" err="1" smtClean="0">
+                <a:solidFill>
+                  <a:schemeClr val="tx1"/>
+                </a:solidFill>
+              </a:rPr>
+              <a:t>osrSignal</a:t>
+            </a:r>
+            <a:r>
+              <a:rPr lang="en-US" sz="1200" dirty="0" smtClean="0">
+                <a:solidFill>
+                  <a:schemeClr val="tx1"/>
+                </a:solidFill>
+              </a:rPr>
+              <a:t>(</a:t>
+            </a:r>
+            <a:r>
+              <a:rPr lang="is-IS" sz="1200" dirty="0" smtClean="0">
+                <a:solidFill>
+                  <a:schemeClr val="tx1"/>
+                </a:solidFill>
+              </a:rPr>
+              <a:t>…</a:t>
+            </a:r>
+            <a:r>
+              <a:rPr lang="en-US" sz="1200" dirty="0" smtClean="0">
+                <a:solidFill>
+                  <a:schemeClr val="tx1"/>
+                </a:solidFill>
+              </a:rPr>
+              <a:t>)</a:t>
+            </a:r>
+          </a:p>
+          <a:p>
+            <a:r>
+              <a:rPr lang="en-US" sz="1200" dirty="0" smtClean="0">
+                <a:solidFill>
+                  <a:schemeClr val="tx1"/>
+                </a:solidFill>
+              </a:rPr>
+              <a:t>Store </a:t>
+            </a:r>
+            <a:r>
+              <a:rPr lang="is-IS" sz="1200" dirty="0" smtClean="0">
+                <a:solidFill>
+                  <a:schemeClr val="tx1"/>
+                </a:solidFill>
+              </a:rPr>
+              <a:t>…</a:t>
+            </a:r>
+          </a:p>
+          <a:p>
+            <a:r>
+              <a:rPr lang="is-IS" sz="1200" dirty="0" smtClean="0">
+                <a:solidFill>
+                  <a:schemeClr val="tx1"/>
+                </a:solidFill>
+              </a:rPr>
+              <a:t>....</a:t>
+            </a:r>
+          </a:p>
+          <a:p>
+            <a:r>
+              <a:rPr lang="en-US" sz="1200" dirty="0" smtClean="0">
+                <a:solidFill>
+                  <a:schemeClr val="tx1"/>
+                </a:solidFill>
+              </a:rPr>
+              <a:t>S</a:t>
+            </a:r>
+            <a:r>
+              <a:rPr lang="is-IS" sz="1200" dirty="0" smtClean="0">
+                <a:solidFill>
+                  <a:schemeClr val="tx1"/>
+                </a:solidFill>
+              </a:rPr>
+              <a:t>tore i32 1, i32 @osr_flag</a:t>
+            </a:r>
+          </a:p>
+          <a:p>
+            <a:r>
+              <a:rPr lang="en-US" sz="1200" dirty="0" smtClean="0">
+                <a:solidFill>
+                  <a:schemeClr val="tx1"/>
+                </a:solidFill>
+              </a:rPr>
+              <a:t>C</a:t>
+            </a:r>
+            <a:r>
+              <a:rPr lang="is-IS" sz="1200" dirty="0" smtClean="0">
+                <a:solidFill>
+                  <a:schemeClr val="tx1"/>
+                </a:solidFill>
+              </a:rPr>
+              <a:t>all void @_recompile(f,i32 1)</a:t>
+            </a:r>
+          </a:p>
+          <a:p>
+            <a:r>
+              <a:rPr lang="en-US" sz="1200" dirty="0" smtClean="0">
+                <a:solidFill>
+                  <a:schemeClr val="tx1"/>
+                </a:solidFill>
+              </a:rPr>
+              <a:t>C</a:t>
+            </a:r>
+            <a:r>
+              <a:rPr lang="is-IS" sz="1200" dirty="0" smtClean="0">
+                <a:solidFill>
+                  <a:schemeClr val="tx1"/>
+                </a:solidFill>
+              </a:rPr>
+              <a:t>all void @f(...)</a:t>
+            </a:r>
+          </a:p>
+          <a:p>
+            <a:r>
+              <a:rPr lang="en-US" sz="1200" dirty="0" smtClean="0">
+                <a:solidFill>
+                  <a:schemeClr val="tx1"/>
+                </a:solidFill>
+              </a:rPr>
+              <a:t>C</a:t>
+            </a:r>
+            <a:r>
+              <a:rPr lang="is-IS" sz="1200" dirty="0" smtClean="0">
+                <a:solidFill>
+                  <a:schemeClr val="tx1"/>
+                </a:solidFill>
+              </a:rPr>
+              <a:t>all void @_recompileOpt(f)</a:t>
+            </a:r>
+          </a:p>
+        </p:txBody>
+      </p:sp>
+      <p:cxnSp>
+        <p:nvCxnSpPr>
+          <p:cNvPr id="131" name="Straight Arrow Connector 130"/>
+          <p:cNvCxnSpPr>
+            <a:stCxn id="5" idx="2"/>
+            <a:endCxn id="6" idx="0"/>
+          </p:cNvCxnSpPr>
+          <p:nvPr/>
+        </p:nvCxnSpPr>
+        <p:spPr>
+          <a:xfrm flipH="1">
+            <a:off x="3084723" y="3742975"/>
+            <a:ext cx="731705" cy="659631"/>
+          </a:xfrm>
+          <a:prstGeom prst="straightConnector1">
+            <a:avLst/>
+          </a:prstGeom>
+          <a:ln>
+            <a:solidFill>
+              <a:schemeClr val="tx1"/>
+            </a:solidFill>
+            <a:tailEnd type="triangle"/>
+          </a:ln>
+        </p:spPr>
+        <p:style>
+          <a:lnRef idx="1">
+            <a:schemeClr val="accent1"/>
+          </a:lnRef>
+          <a:fillRef idx="0">
+            <a:schemeClr val="accent1"/>
+          </a:fillRef>
+          <a:effectRef idx="0">
+            <a:schemeClr val="accent1"/>
+          </a:effectRef>
+          <a:fontRef idx="minor">
+            <a:schemeClr val="tx1"/>
+          </a:fontRef>
+        </p:style>
+      </p:cxnSp>
+      <p:cxnSp>
+        <p:nvCxnSpPr>
+          <p:cNvPr id="133" name="Straight Arrow Connector 132"/>
+          <p:cNvCxnSpPr>
+            <a:stCxn id="5" idx="2"/>
+            <a:endCxn id="7" idx="0"/>
+          </p:cNvCxnSpPr>
+          <p:nvPr/>
+        </p:nvCxnSpPr>
+        <p:spPr>
+          <a:xfrm>
+            <a:off x="3816428" y="3742975"/>
+            <a:ext cx="816164" cy="659631"/>
+          </a:xfrm>
+          <a:prstGeom prst="straightConnector1">
+            <a:avLst/>
+          </a:prstGeom>
+          <a:ln>
+            <a:solidFill>
+              <a:schemeClr val="tx1"/>
+            </a:solidFill>
+            <a:tailEnd type="triangle"/>
+          </a:ln>
+        </p:spPr>
+        <p:style>
+          <a:lnRef idx="1">
+            <a:schemeClr val="accent1"/>
+          </a:lnRef>
+          <a:fillRef idx="0">
+            <a:schemeClr val="accent1"/>
+          </a:fillRef>
+          <a:effectRef idx="0">
+            <a:schemeClr val="accent1"/>
+          </a:effectRef>
+          <a:fontRef idx="minor">
+            <a:schemeClr val="tx1"/>
+          </a:fontRef>
+        </p:style>
+      </p:cxnSp>
+      <p:cxnSp>
+        <p:nvCxnSpPr>
+          <p:cNvPr id="136" name="Straight Arrow Connector 135"/>
+          <p:cNvCxnSpPr>
+            <a:stCxn id="15" idx="2"/>
+            <a:endCxn id="23" idx="0"/>
+          </p:cNvCxnSpPr>
+          <p:nvPr/>
+        </p:nvCxnSpPr>
+        <p:spPr>
+          <a:xfrm flipH="1">
+            <a:off x="1239397" y="2216224"/>
+            <a:ext cx="1305499" cy="626122"/>
+          </a:xfrm>
+          <a:prstGeom prst="straightConnector1">
+            <a:avLst/>
+          </a:prstGeom>
+          <a:ln>
+            <a:solidFill>
+              <a:schemeClr val="tx1"/>
+            </a:solidFill>
+            <a:tailEnd type="triangle"/>
+          </a:ln>
+        </p:spPr>
+        <p:style>
+          <a:lnRef idx="1">
+            <a:schemeClr val="accent1"/>
+          </a:lnRef>
+          <a:fillRef idx="0">
+            <a:schemeClr val="accent1"/>
+          </a:fillRef>
+          <a:effectRef idx="0">
+            <a:schemeClr val="accent1"/>
+          </a:effectRef>
+          <a:fontRef idx="minor">
+            <a:schemeClr val="tx1"/>
+          </a:fontRef>
+        </p:style>
+      </p:cxnSp>
+    </p:spTree>
+    <p:extLst>
+      <p:ext uri="{BB962C8B-B14F-4D97-AF65-F5344CB8AC3E}">
+        <p14:creationId xmlns:p14="http://schemas.microsoft.com/office/powerpoint/2010/main" val="1901107959"/>
+      </p:ext>
+    </p:extLst>
+  </p:cSld>
+  <p:clrMapOvr>
+    <a:masterClrMapping/>
+  </p:clrMapOvr>
+</p:sld>
+</file>
+
 <file path=ppt/theme/theme1.xml><?xml version="1.0" encoding="utf-8"?>
 <a:theme xmlns:a="http://schemas.openxmlformats.org/drawingml/2006/main" name="Office Theme">
   <a:themeElements>

</xml_diff>

<commit_message>
Finishing up the 2.2.2.
Next: do 2.2.1 and 2.3
</commit_message>
<xml_diff>
--- a/MasterThesis/Figures/holzle.pptx
+++ b/MasterThesis/Figures/holzle.pptx
@@ -14,6 +14,8 @@
     <p:sldId id="262" r:id="rId8"/>
     <p:sldId id="264" r:id="rId9"/>
     <p:sldId id="263" r:id="rId10"/>
+    <p:sldId id="266" r:id="rId11"/>
+    <p:sldId id="265" r:id="rId12"/>
   </p:sldIdLst>
   <p:sldSz cx="12192000" cy="6858000"/>
   <p:notesSz cx="6858000" cy="9144000"/>
@@ -3765,6 +3767,1717 @@
 </p:sld>
 </file>
 
+<file path=ppt/slides/slide10.xml><?xml version="1.0" encoding="utf-8"?>
+<p:sld xmlns:a="http://schemas.openxmlformats.org/drawingml/2006/main" xmlns:r="http://schemas.openxmlformats.org/officeDocument/2006/relationships" xmlns:p="http://schemas.openxmlformats.org/presentationml/2006/main">
+  <p:cSld>
+    <p:spTree>
+      <p:nvGrpSpPr>
+        <p:cNvPr id="1" name=""/>
+        <p:cNvGrpSpPr/>
+        <p:nvPr/>
+      </p:nvGrpSpPr>
+      <p:grpSpPr>
+        <a:xfrm>
+          <a:off x="0" y="0"/>
+          <a:ext cx="0" cy="0"/>
+          <a:chOff x="0" y="0"/>
+          <a:chExt cx="0" cy="0"/>
+        </a:xfrm>
+      </p:grpSpPr>
+      <p:sp>
+        <p:nvSpPr>
+          <p:cNvPr id="7" name="Rectangle 6"/>
+          <p:cNvSpPr/>
+          <p:nvPr/>
+        </p:nvSpPr>
+        <p:spPr>
+          <a:xfrm>
+            <a:off x="5916058" y="1948150"/>
+            <a:ext cx="2313542" cy="848298"/>
+          </a:xfrm>
+          <a:prstGeom prst="rect">
+            <a:avLst/>
+          </a:prstGeom>
+          <a:solidFill>
+            <a:schemeClr val="bg1"/>
+          </a:solidFill>
+          <a:ln>
+            <a:solidFill>
+              <a:schemeClr val="tx1"/>
+            </a:solidFill>
+          </a:ln>
+        </p:spPr>
+        <p:style>
+          <a:lnRef idx="2">
+            <a:schemeClr val="accent1">
+              <a:shade val="50000"/>
+            </a:schemeClr>
+          </a:lnRef>
+          <a:fillRef idx="1">
+            <a:schemeClr val="accent1"/>
+          </a:fillRef>
+          <a:effectRef idx="0">
+            <a:schemeClr val="accent1"/>
+          </a:effectRef>
+          <a:fontRef idx="minor">
+            <a:schemeClr val="lt1"/>
+          </a:fontRef>
+        </p:style>
+        <p:txBody>
+          <a:bodyPr rtlCol="0" anchor="ctr"/>
+          <a:lstStyle/>
+          <a:p>
+            <a:pPr algn="ctr"/>
+            <a:r>
+              <a:rPr lang="en-US" sz="1200" dirty="0" smtClean="0">
+                <a:solidFill>
+                  <a:schemeClr val="tx1"/>
+                </a:solidFill>
+              </a:rPr>
+              <a:t>ENTRY:</a:t>
+            </a:r>
+          </a:p>
+          <a:p>
+            <a:pPr algn="ctr"/>
+            <a:r>
+              <a:rPr lang="is-IS" sz="1200" dirty="0" smtClean="0">
+                <a:solidFill>
+                  <a:schemeClr val="tx1"/>
+                </a:solidFill>
+              </a:rPr>
+              <a:t>…</a:t>
+            </a:r>
+            <a:endParaRPr lang="en-US" sz="1200" dirty="0" smtClean="0">
+              <a:solidFill>
+                <a:schemeClr val="tx1"/>
+              </a:solidFill>
+            </a:endParaRPr>
+          </a:p>
+        </p:txBody>
+      </p:sp>
+      <p:sp>
+        <p:nvSpPr>
+          <p:cNvPr id="8" name="Rectangle 7"/>
+          <p:cNvSpPr/>
+          <p:nvPr/>
+        </p:nvSpPr>
+        <p:spPr>
+          <a:xfrm>
+            <a:off x="5916058" y="3102168"/>
+            <a:ext cx="2313542" cy="1154018"/>
+          </a:xfrm>
+          <a:prstGeom prst="rect">
+            <a:avLst/>
+          </a:prstGeom>
+          <a:solidFill>
+            <a:schemeClr val="bg1"/>
+          </a:solidFill>
+          <a:ln>
+            <a:solidFill>
+              <a:schemeClr val="tx1"/>
+            </a:solidFill>
+          </a:ln>
+        </p:spPr>
+        <p:style>
+          <a:lnRef idx="2">
+            <a:schemeClr val="accent1">
+              <a:shade val="50000"/>
+            </a:schemeClr>
+          </a:lnRef>
+          <a:fillRef idx="1">
+            <a:schemeClr val="accent1"/>
+          </a:fillRef>
+          <a:effectRef idx="0">
+            <a:schemeClr val="accent1"/>
+          </a:effectRef>
+          <a:fontRef idx="minor">
+            <a:schemeClr val="lt1"/>
+          </a:fontRef>
+        </p:style>
+        <p:txBody>
+          <a:bodyPr rtlCol="0" anchor="ctr"/>
+          <a:lstStyle/>
+          <a:p>
+            <a:pPr algn="ctr"/>
+            <a:r>
+              <a:rPr lang="en-US" sz="1200" dirty="0" smtClean="0">
+                <a:solidFill>
+                  <a:schemeClr val="tx1"/>
+                </a:solidFill>
+              </a:rPr>
+              <a:t>LH1:</a:t>
+            </a:r>
+          </a:p>
+          <a:p>
+            <a:r>
+              <a:rPr lang="en-US" sz="1200" dirty="0" smtClean="0">
+                <a:solidFill>
+                  <a:schemeClr val="tx1"/>
+                </a:solidFill>
+              </a:rPr>
+              <a:t>%</a:t>
+            </a:r>
+            <a:r>
+              <a:rPr lang="en-US" sz="1200" dirty="0" err="1" smtClean="0">
+                <a:solidFill>
+                  <a:schemeClr val="tx1"/>
+                </a:solidFill>
+              </a:rPr>
+              <a:t>i</a:t>
+            </a:r>
+            <a:r>
+              <a:rPr lang="en-US" sz="1200" dirty="0" smtClean="0">
+                <a:solidFill>
+                  <a:schemeClr val="tx1"/>
+                </a:solidFill>
+              </a:rPr>
+              <a:t> = phi I64</a:t>
+            </a:r>
+          </a:p>
+          <a:p>
+            <a:r>
+              <a:rPr lang="en-US" sz="1200" dirty="0" smtClean="0">
+                <a:solidFill>
+                  <a:schemeClr val="tx1"/>
+                </a:solidFill>
+              </a:rPr>
+              <a:t>[%_</a:t>
+            </a:r>
+            <a:r>
+              <a:rPr lang="en-US" sz="1200" dirty="0" err="1" smtClean="0">
+                <a:solidFill>
+                  <a:schemeClr val="tx1"/>
+                </a:solidFill>
+              </a:rPr>
+              <a:t>m_i</a:t>
+            </a:r>
+            <a:r>
+              <a:rPr lang="en-US" sz="1200" dirty="0" smtClean="0">
+                <a:solidFill>
+                  <a:schemeClr val="tx1"/>
+                </a:solidFill>
+              </a:rPr>
+              <a:t>, %PE], [%</a:t>
+            </a:r>
+            <a:r>
+              <a:rPr lang="en-US" sz="1200" dirty="0" err="1" smtClean="0">
+                <a:solidFill>
+                  <a:schemeClr val="tx1"/>
+                </a:solidFill>
+              </a:rPr>
+              <a:t>i.u</a:t>
+            </a:r>
+            <a:r>
+              <a:rPr lang="en-US" sz="1200" dirty="0" smtClean="0">
+                <a:solidFill>
+                  <a:schemeClr val="tx1"/>
+                </a:solidFill>
+              </a:rPr>
+              <a:t>, %LB]</a:t>
+            </a:r>
+          </a:p>
+          <a:p>
+            <a:pPr algn="ctr"/>
+            <a:r>
+              <a:rPr lang="is-IS" sz="1200" dirty="0" smtClean="0">
+                <a:solidFill>
+                  <a:schemeClr val="tx1"/>
+                </a:solidFill>
+              </a:rPr>
+              <a:t>…</a:t>
+            </a:r>
+          </a:p>
+          <a:p>
+            <a:r>
+              <a:rPr lang="en-US" sz="1200" dirty="0" smtClean="0">
+                <a:solidFill>
+                  <a:schemeClr val="tx1"/>
+                </a:solidFill>
+              </a:rPr>
+              <a:t>B</a:t>
+            </a:r>
+            <a:r>
+              <a:rPr lang="is-IS" sz="1200" dirty="0" smtClean="0">
+                <a:solidFill>
+                  <a:schemeClr val="tx1"/>
+                </a:solidFill>
+              </a:rPr>
+              <a:t>r i1 %loopCOnd, label %LB, label %LE</a:t>
+            </a:r>
+            <a:endParaRPr lang="en-US" sz="1200" dirty="0">
+              <a:solidFill>
+                <a:schemeClr val="tx1"/>
+              </a:solidFill>
+            </a:endParaRPr>
+          </a:p>
+        </p:txBody>
+      </p:sp>
+      <p:sp>
+        <p:nvSpPr>
+          <p:cNvPr id="9" name="Rectangle 8"/>
+          <p:cNvSpPr/>
+          <p:nvPr/>
+        </p:nvSpPr>
+        <p:spPr>
+          <a:xfrm>
+            <a:off x="5034707" y="4680335"/>
+            <a:ext cx="1531345" cy="662846"/>
+          </a:xfrm>
+          <a:prstGeom prst="rect">
+            <a:avLst/>
+          </a:prstGeom>
+          <a:solidFill>
+            <a:schemeClr val="bg1"/>
+          </a:solidFill>
+          <a:ln>
+            <a:solidFill>
+              <a:schemeClr val="tx1"/>
+            </a:solidFill>
+          </a:ln>
+        </p:spPr>
+        <p:style>
+          <a:lnRef idx="2">
+            <a:schemeClr val="accent1">
+              <a:shade val="50000"/>
+            </a:schemeClr>
+          </a:lnRef>
+          <a:fillRef idx="1">
+            <a:schemeClr val="accent1"/>
+          </a:fillRef>
+          <a:effectRef idx="0">
+            <a:schemeClr val="accent1"/>
+          </a:effectRef>
+          <a:fontRef idx="minor">
+            <a:schemeClr val="lt1"/>
+          </a:fontRef>
+        </p:style>
+        <p:txBody>
+          <a:bodyPr rtlCol="0" anchor="ctr"/>
+          <a:lstStyle/>
+          <a:p>
+            <a:pPr algn="ctr"/>
+            <a:r>
+              <a:rPr lang="en-US" sz="1200" dirty="0" smtClean="0">
+                <a:solidFill>
+                  <a:schemeClr val="tx1"/>
+                </a:solidFill>
+              </a:rPr>
+              <a:t>LE:</a:t>
+            </a:r>
+          </a:p>
+          <a:p>
+            <a:pPr algn="ctr"/>
+            <a:r>
+              <a:rPr lang="is-IS" sz="1200" dirty="0" smtClean="0">
+                <a:solidFill>
+                  <a:schemeClr val="tx1"/>
+                </a:solidFill>
+              </a:rPr>
+              <a:t>…</a:t>
+            </a:r>
+            <a:endParaRPr lang="en-US" sz="1200" dirty="0">
+              <a:solidFill>
+                <a:schemeClr val="tx1"/>
+              </a:solidFill>
+            </a:endParaRPr>
+          </a:p>
+        </p:txBody>
+      </p:sp>
+      <p:sp>
+        <p:nvSpPr>
+          <p:cNvPr id="10" name="Rectangle 9"/>
+          <p:cNvSpPr/>
+          <p:nvPr/>
+        </p:nvSpPr>
+        <p:spPr>
+          <a:xfrm>
+            <a:off x="7379465" y="4680335"/>
+            <a:ext cx="2313542" cy="993352"/>
+          </a:xfrm>
+          <a:prstGeom prst="rect">
+            <a:avLst/>
+          </a:prstGeom>
+          <a:solidFill>
+            <a:schemeClr val="bg1"/>
+          </a:solidFill>
+          <a:ln>
+            <a:solidFill>
+              <a:schemeClr val="tx1"/>
+            </a:solidFill>
+          </a:ln>
+        </p:spPr>
+        <p:style>
+          <a:lnRef idx="2">
+            <a:schemeClr val="accent1">
+              <a:shade val="50000"/>
+            </a:schemeClr>
+          </a:lnRef>
+          <a:fillRef idx="1">
+            <a:schemeClr val="accent1"/>
+          </a:fillRef>
+          <a:effectRef idx="0">
+            <a:schemeClr val="accent1"/>
+          </a:effectRef>
+          <a:fontRef idx="minor">
+            <a:schemeClr val="lt1"/>
+          </a:fontRef>
+        </p:style>
+        <p:txBody>
+          <a:bodyPr rtlCol="0" anchor="ctr"/>
+          <a:lstStyle/>
+          <a:p>
+            <a:pPr algn="ctr"/>
+            <a:r>
+              <a:rPr lang="en-US" sz="1200" dirty="0" smtClean="0">
+                <a:solidFill>
+                  <a:schemeClr val="tx1"/>
+                </a:solidFill>
+              </a:rPr>
+              <a:t>LB:</a:t>
+            </a:r>
+          </a:p>
+          <a:p>
+            <a:pPr algn="ctr"/>
+            <a:r>
+              <a:rPr lang="is-IS" sz="1200" dirty="0" smtClean="0">
+                <a:solidFill>
+                  <a:schemeClr val="tx1"/>
+                </a:solidFill>
+              </a:rPr>
+              <a:t>…</a:t>
+            </a:r>
+          </a:p>
+          <a:p>
+            <a:r>
+              <a:rPr lang="is-IS" sz="1200" dirty="0" smtClean="0">
+                <a:solidFill>
+                  <a:schemeClr val="tx1"/>
+                </a:solidFill>
+              </a:rPr>
+              <a:t>%i.u = add i64 %i, i</a:t>
+            </a:r>
+          </a:p>
+          <a:p>
+            <a:pPr algn="ctr"/>
+            <a:r>
+              <a:rPr lang="is-IS" sz="1200" dirty="0" smtClean="0">
+                <a:solidFill>
+                  <a:schemeClr val="tx1"/>
+                </a:solidFill>
+              </a:rPr>
+              <a:t>...</a:t>
+            </a:r>
+          </a:p>
+          <a:p>
+            <a:r>
+              <a:rPr lang="en-US" sz="1200" dirty="0" smtClean="0">
+                <a:solidFill>
+                  <a:schemeClr val="tx1"/>
+                </a:solidFill>
+              </a:rPr>
+              <a:t>B</a:t>
+            </a:r>
+            <a:r>
+              <a:rPr lang="is-IS" sz="1200" dirty="0" smtClean="0">
+                <a:solidFill>
+                  <a:schemeClr val="tx1"/>
+                </a:solidFill>
+              </a:rPr>
+              <a:t>r label %LH1</a:t>
+            </a:r>
+            <a:endParaRPr lang="en-US" sz="1200" dirty="0">
+              <a:solidFill>
+                <a:schemeClr val="tx1"/>
+              </a:solidFill>
+            </a:endParaRPr>
+          </a:p>
+        </p:txBody>
+      </p:sp>
+      <p:cxnSp>
+        <p:nvCxnSpPr>
+          <p:cNvPr id="16" name="Straight Arrow Connector 15"/>
+          <p:cNvCxnSpPr>
+            <a:stCxn id="10" idx="2"/>
+          </p:cNvCxnSpPr>
+          <p:nvPr/>
+        </p:nvCxnSpPr>
+        <p:spPr>
+          <a:xfrm flipH="1">
+            <a:off x="5800380" y="4256186"/>
+            <a:ext cx="1272449" cy="424149"/>
+          </a:xfrm>
+          <a:prstGeom prst="straightConnector1">
+            <a:avLst/>
+          </a:prstGeom>
+          <a:ln>
+            <a:solidFill>
+              <a:schemeClr val="tx1"/>
+            </a:solidFill>
+            <a:tailEnd type="triangle"/>
+          </a:ln>
+        </p:spPr>
+        <p:style>
+          <a:lnRef idx="1">
+            <a:schemeClr val="accent1"/>
+          </a:lnRef>
+          <a:fillRef idx="0">
+            <a:schemeClr val="accent1"/>
+          </a:fillRef>
+          <a:effectRef idx="0">
+            <a:schemeClr val="accent1"/>
+          </a:effectRef>
+          <a:fontRef idx="minor">
+            <a:schemeClr val="tx1"/>
+          </a:fontRef>
+        </p:style>
+      </p:cxnSp>
+      <p:cxnSp>
+        <p:nvCxnSpPr>
+          <p:cNvPr id="17" name="Straight Arrow Connector 16"/>
+          <p:cNvCxnSpPr>
+            <a:stCxn id="10" idx="2"/>
+          </p:cNvCxnSpPr>
+          <p:nvPr/>
+        </p:nvCxnSpPr>
+        <p:spPr>
+          <a:xfrm>
+            <a:off x="7072829" y="4256186"/>
+            <a:ext cx="1463407" cy="424149"/>
+          </a:xfrm>
+          <a:prstGeom prst="straightConnector1">
+            <a:avLst/>
+          </a:prstGeom>
+          <a:ln>
+            <a:solidFill>
+              <a:schemeClr val="tx1"/>
+            </a:solidFill>
+            <a:tailEnd type="triangle"/>
+          </a:ln>
+        </p:spPr>
+        <p:style>
+          <a:lnRef idx="1">
+            <a:schemeClr val="accent1"/>
+          </a:lnRef>
+          <a:fillRef idx="0">
+            <a:schemeClr val="accent1"/>
+          </a:fillRef>
+          <a:effectRef idx="0">
+            <a:schemeClr val="accent1"/>
+          </a:effectRef>
+          <a:fontRef idx="minor">
+            <a:schemeClr val="tx1"/>
+          </a:fontRef>
+        </p:style>
+      </p:cxnSp>
+      <p:cxnSp>
+        <p:nvCxnSpPr>
+          <p:cNvPr id="19" name="Straight Arrow Connector 18"/>
+          <p:cNvCxnSpPr>
+            <a:stCxn id="7" idx="2"/>
+            <a:endCxn id="8" idx="0"/>
+          </p:cNvCxnSpPr>
+          <p:nvPr/>
+        </p:nvCxnSpPr>
+        <p:spPr>
+          <a:xfrm>
+            <a:off x="7072829" y="2796448"/>
+            <a:ext cx="0" cy="305720"/>
+          </a:xfrm>
+          <a:prstGeom prst="straightConnector1">
+            <a:avLst/>
+          </a:prstGeom>
+          <a:ln>
+            <a:solidFill>
+              <a:schemeClr val="tx1"/>
+            </a:solidFill>
+            <a:tailEnd type="triangle"/>
+          </a:ln>
+        </p:spPr>
+        <p:style>
+          <a:lnRef idx="1">
+            <a:schemeClr val="accent1"/>
+          </a:lnRef>
+          <a:fillRef idx="0">
+            <a:schemeClr val="accent1"/>
+          </a:fillRef>
+          <a:effectRef idx="0">
+            <a:schemeClr val="accent1"/>
+          </a:effectRef>
+          <a:fontRef idx="minor">
+            <a:schemeClr val="tx1"/>
+          </a:fontRef>
+        </p:style>
+      </p:cxnSp>
+      <p:cxnSp>
+        <p:nvCxnSpPr>
+          <p:cNvPr id="21" name="Elbow Connector 20"/>
+          <p:cNvCxnSpPr>
+            <a:stCxn id="10" idx="2"/>
+            <a:endCxn id="8" idx="3"/>
+          </p:cNvCxnSpPr>
+          <p:nvPr/>
+        </p:nvCxnSpPr>
+        <p:spPr>
+          <a:xfrm rot="5400000" flipH="1">
+            <a:off x="7385663" y="4523114"/>
+            <a:ext cx="1994510" cy="306636"/>
+          </a:xfrm>
+          <a:prstGeom prst="bentConnector4">
+            <a:avLst>
+              <a:gd name="adj1" fmla="val -11461"/>
+              <a:gd name="adj2" fmla="val -451797"/>
+            </a:avLst>
+          </a:prstGeom>
+          <a:ln>
+            <a:solidFill>
+              <a:schemeClr val="tx1"/>
+            </a:solidFill>
+            <a:tailEnd type="triangle"/>
+          </a:ln>
+        </p:spPr>
+        <p:style>
+          <a:lnRef idx="1">
+            <a:schemeClr val="accent1"/>
+          </a:lnRef>
+          <a:fillRef idx="0">
+            <a:schemeClr val="accent1"/>
+          </a:fillRef>
+          <a:effectRef idx="0">
+            <a:schemeClr val="accent1"/>
+          </a:effectRef>
+          <a:fontRef idx="minor">
+            <a:schemeClr val="tx1"/>
+          </a:fontRef>
+        </p:style>
+      </p:cxnSp>
+    </p:spTree>
+    <p:extLst>
+      <p:ext uri="{BB962C8B-B14F-4D97-AF65-F5344CB8AC3E}">
+        <p14:creationId xmlns:p14="http://schemas.microsoft.com/office/powerpoint/2010/main" val="1124838229"/>
+      </p:ext>
+    </p:extLst>
+  </p:cSld>
+  <p:clrMapOvr>
+    <a:masterClrMapping/>
+  </p:clrMapOvr>
+</p:sld>
+</file>
+
+<file path=ppt/slides/slide11.xml><?xml version="1.0" encoding="utf-8"?>
+<p:sld xmlns:a="http://schemas.openxmlformats.org/drawingml/2006/main" xmlns:r="http://schemas.openxmlformats.org/officeDocument/2006/relationships" xmlns:p="http://schemas.openxmlformats.org/presentationml/2006/main">
+  <p:cSld>
+    <p:spTree>
+      <p:nvGrpSpPr>
+        <p:cNvPr id="1" name=""/>
+        <p:cNvGrpSpPr/>
+        <p:nvPr/>
+      </p:nvGrpSpPr>
+      <p:grpSpPr>
+        <a:xfrm>
+          <a:off x="0" y="0"/>
+          <a:ext cx="0" cy="0"/>
+          <a:chOff x="0" y="0"/>
+          <a:chExt cx="0" cy="0"/>
+        </a:xfrm>
+      </p:grpSpPr>
+      <p:sp>
+        <p:nvSpPr>
+          <p:cNvPr id="4" name="Rectangle 3"/>
+          <p:cNvSpPr/>
+          <p:nvPr/>
+        </p:nvSpPr>
+        <p:spPr>
+          <a:xfrm>
+            <a:off x="3602516" y="782198"/>
+            <a:ext cx="2313542" cy="848298"/>
+          </a:xfrm>
+          <a:prstGeom prst="rect">
+            <a:avLst/>
+          </a:prstGeom>
+          <a:solidFill>
+            <a:schemeClr val="bg1"/>
+          </a:solidFill>
+          <a:ln>
+            <a:solidFill>
+              <a:schemeClr val="tx1"/>
+            </a:solidFill>
+          </a:ln>
+        </p:spPr>
+        <p:style>
+          <a:lnRef idx="2">
+            <a:schemeClr val="accent1">
+              <a:shade val="50000"/>
+            </a:schemeClr>
+          </a:lnRef>
+          <a:fillRef idx="1">
+            <a:schemeClr val="accent1"/>
+          </a:fillRef>
+          <a:effectRef idx="0">
+            <a:schemeClr val="accent1"/>
+          </a:effectRef>
+          <a:fontRef idx="minor">
+            <a:schemeClr val="lt1"/>
+          </a:fontRef>
+        </p:style>
+        <p:txBody>
+          <a:bodyPr rtlCol="0" anchor="ctr"/>
+          <a:lstStyle/>
+          <a:p>
+            <a:pPr algn="ctr"/>
+            <a:r>
+              <a:rPr lang="en-US" sz="1200" dirty="0" err="1" smtClean="0">
+                <a:solidFill>
+                  <a:schemeClr val="tx1"/>
+                </a:solidFill>
+              </a:rPr>
+              <a:t>Prolog.entry</a:t>
+            </a:r>
+            <a:r>
+              <a:rPr lang="en-US" sz="1200" dirty="0" smtClean="0">
+                <a:solidFill>
+                  <a:schemeClr val="tx1"/>
+                </a:solidFill>
+              </a:rPr>
+              <a:t>:</a:t>
+            </a:r>
+          </a:p>
+          <a:p>
+            <a:pPr algn="ctr"/>
+            <a:r>
+              <a:rPr lang="is-IS" sz="1200" dirty="0" smtClean="0">
+                <a:solidFill>
+                  <a:schemeClr val="tx1"/>
+                </a:solidFill>
+              </a:rPr>
+              <a:t>…</a:t>
+            </a:r>
+          </a:p>
+          <a:p>
+            <a:r>
+              <a:rPr lang="en-US" sz="1200" dirty="0" smtClean="0">
+                <a:solidFill>
+                  <a:schemeClr val="tx1"/>
+                </a:solidFill>
+              </a:rPr>
+              <a:t>B</a:t>
+            </a:r>
+            <a:r>
+              <a:rPr lang="is-IS" sz="1200" dirty="0" smtClean="0">
+                <a:solidFill>
+                  <a:schemeClr val="tx1"/>
+                </a:solidFill>
+              </a:rPr>
+              <a:t>r i1 %ocond, label %ENTRY, label %prolog</a:t>
+            </a:r>
+            <a:endParaRPr lang="en-US" sz="1200" dirty="0">
+              <a:solidFill>
+                <a:schemeClr val="tx1"/>
+              </a:solidFill>
+            </a:endParaRPr>
+          </a:p>
+        </p:txBody>
+      </p:sp>
+      <p:sp>
+        <p:nvSpPr>
+          <p:cNvPr id="5" name="Rectangle 4"/>
+          <p:cNvSpPr/>
+          <p:nvPr/>
+        </p:nvSpPr>
+        <p:spPr>
+          <a:xfrm>
+            <a:off x="1288974" y="1948150"/>
+            <a:ext cx="2313542" cy="848298"/>
+          </a:xfrm>
+          <a:prstGeom prst="rect">
+            <a:avLst/>
+          </a:prstGeom>
+          <a:solidFill>
+            <a:schemeClr val="bg2"/>
+          </a:solidFill>
+          <a:ln>
+            <a:solidFill>
+              <a:schemeClr val="tx1"/>
+            </a:solidFill>
+          </a:ln>
+        </p:spPr>
+        <p:style>
+          <a:lnRef idx="2">
+            <a:schemeClr val="accent1">
+              <a:shade val="50000"/>
+            </a:schemeClr>
+          </a:lnRef>
+          <a:fillRef idx="1">
+            <a:schemeClr val="accent1"/>
+          </a:fillRef>
+          <a:effectRef idx="0">
+            <a:schemeClr val="accent1"/>
+          </a:effectRef>
+          <a:fontRef idx="minor">
+            <a:schemeClr val="lt1"/>
+          </a:fontRef>
+        </p:style>
+        <p:txBody>
+          <a:bodyPr rtlCol="0" anchor="ctr"/>
+          <a:lstStyle/>
+          <a:p>
+            <a:pPr algn="ctr"/>
+            <a:r>
+              <a:rPr lang="en-US" sz="1200" dirty="0" smtClean="0">
+                <a:solidFill>
+                  <a:schemeClr val="tx1"/>
+                </a:solidFill>
+              </a:rPr>
+              <a:t>Prolog:</a:t>
+            </a:r>
+          </a:p>
+          <a:p>
+            <a:r>
+              <a:rPr lang="en-US" sz="1200" dirty="0" smtClean="0">
+                <a:solidFill>
+                  <a:schemeClr val="tx1"/>
+                </a:solidFill>
+              </a:rPr>
+              <a:t>%_</a:t>
+            </a:r>
+            <a:r>
+              <a:rPr lang="en-US" sz="1200" dirty="0" err="1" smtClean="0">
+                <a:solidFill>
+                  <a:schemeClr val="tx1"/>
+                </a:solidFill>
+              </a:rPr>
+              <a:t>i</a:t>
+            </a:r>
+            <a:r>
+              <a:rPr lang="en-US" sz="1200" dirty="0" smtClean="0">
+                <a:solidFill>
+                  <a:schemeClr val="tx1"/>
+                </a:solidFill>
+              </a:rPr>
+              <a:t> = load i64* @</a:t>
+            </a:r>
+            <a:r>
+              <a:rPr lang="en-US" sz="1200" dirty="0" err="1" smtClean="0">
+                <a:solidFill>
+                  <a:schemeClr val="tx1"/>
+                </a:solidFill>
+              </a:rPr>
+              <a:t>live_i</a:t>
+            </a:r>
+            <a:endParaRPr lang="en-US" sz="1200" dirty="0" smtClean="0">
+              <a:solidFill>
+                <a:schemeClr val="tx1"/>
+              </a:solidFill>
+            </a:endParaRPr>
+          </a:p>
+          <a:p>
+            <a:pPr algn="ctr"/>
+            <a:r>
+              <a:rPr lang="is-IS" sz="1200" dirty="0" smtClean="0">
+                <a:solidFill>
+                  <a:schemeClr val="tx1"/>
+                </a:solidFill>
+              </a:rPr>
+              <a:t>…</a:t>
+            </a:r>
+            <a:endParaRPr lang="en-US" sz="1200" dirty="0" smtClean="0">
+              <a:solidFill>
+                <a:schemeClr val="tx1"/>
+              </a:solidFill>
+            </a:endParaRPr>
+          </a:p>
+          <a:p>
+            <a:r>
+              <a:rPr lang="en-US" sz="1200" dirty="0" smtClean="0">
+                <a:solidFill>
+                  <a:schemeClr val="tx1"/>
+                </a:solidFill>
+              </a:rPr>
+              <a:t>Br label %</a:t>
+            </a:r>
+            <a:r>
+              <a:rPr lang="en-US" sz="1200" dirty="0" err="1" smtClean="0">
+                <a:solidFill>
+                  <a:schemeClr val="tx1"/>
+                </a:solidFill>
+              </a:rPr>
+              <a:t>prolog.exit</a:t>
+            </a:r>
+            <a:endParaRPr lang="en-US" sz="1200" dirty="0" smtClean="0">
+              <a:solidFill>
+                <a:schemeClr val="tx1"/>
+              </a:solidFill>
+            </a:endParaRPr>
+          </a:p>
+        </p:txBody>
+      </p:sp>
+      <p:sp>
+        <p:nvSpPr>
+          <p:cNvPr id="6" name="Rectangle 5"/>
+          <p:cNvSpPr/>
+          <p:nvPr/>
+        </p:nvSpPr>
+        <p:spPr>
+          <a:xfrm>
+            <a:off x="2609161" y="3102168"/>
+            <a:ext cx="2313542" cy="848298"/>
+          </a:xfrm>
+          <a:prstGeom prst="rect">
+            <a:avLst/>
+          </a:prstGeom>
+          <a:solidFill>
+            <a:schemeClr val="bg1"/>
+          </a:solidFill>
+          <a:ln>
+            <a:solidFill>
+              <a:schemeClr val="tx1"/>
+            </a:solidFill>
+          </a:ln>
+        </p:spPr>
+        <p:style>
+          <a:lnRef idx="2">
+            <a:schemeClr val="accent1">
+              <a:shade val="50000"/>
+            </a:schemeClr>
+          </a:lnRef>
+          <a:fillRef idx="1">
+            <a:schemeClr val="accent1"/>
+          </a:fillRef>
+          <a:effectRef idx="0">
+            <a:schemeClr val="accent1"/>
+          </a:effectRef>
+          <a:fontRef idx="minor">
+            <a:schemeClr val="lt1"/>
+          </a:fontRef>
+        </p:style>
+        <p:txBody>
+          <a:bodyPr rtlCol="0" anchor="ctr"/>
+          <a:lstStyle/>
+          <a:p>
+            <a:pPr algn="ctr"/>
+            <a:r>
+              <a:rPr lang="en-US" sz="1200" dirty="0" err="1" smtClean="0">
+                <a:solidFill>
+                  <a:schemeClr val="tx1"/>
+                </a:solidFill>
+              </a:rPr>
+              <a:t>Prolog.exit</a:t>
+            </a:r>
+            <a:r>
+              <a:rPr lang="en-US" sz="1200" dirty="0" smtClean="0">
+                <a:solidFill>
+                  <a:schemeClr val="tx1"/>
+                </a:solidFill>
+              </a:rPr>
+              <a:t>(PE):</a:t>
+            </a:r>
+          </a:p>
+          <a:p>
+            <a:r>
+              <a:rPr lang="en-US" sz="1200" dirty="0" smtClean="0">
+                <a:solidFill>
+                  <a:schemeClr val="tx1"/>
+                </a:solidFill>
+              </a:rPr>
+              <a:t>%_</a:t>
+            </a:r>
+            <a:r>
+              <a:rPr lang="en-US" sz="1200" dirty="0" err="1" smtClean="0">
+                <a:solidFill>
+                  <a:schemeClr val="tx1"/>
+                </a:solidFill>
+              </a:rPr>
+              <a:t>m_i</a:t>
+            </a:r>
+            <a:r>
+              <a:rPr lang="en-US" sz="1200" dirty="0" smtClean="0">
+                <a:solidFill>
+                  <a:schemeClr val="tx1"/>
+                </a:solidFill>
+              </a:rPr>
+              <a:t> = phi i64</a:t>
+            </a:r>
+          </a:p>
+          <a:p>
+            <a:r>
+              <a:rPr lang="en-US" sz="1200" dirty="0" smtClean="0">
+                <a:solidFill>
+                  <a:schemeClr val="tx1"/>
+                </a:solidFill>
+              </a:rPr>
+              <a:t>[1, %Entry], [%_</a:t>
+            </a:r>
+            <a:r>
+              <a:rPr lang="en-US" sz="1200" dirty="0" err="1" smtClean="0">
+                <a:solidFill>
+                  <a:schemeClr val="tx1"/>
+                </a:solidFill>
+              </a:rPr>
+              <a:t>i</a:t>
+            </a:r>
+            <a:r>
+              <a:rPr lang="en-US" sz="1200" dirty="0" smtClean="0">
+                <a:solidFill>
+                  <a:schemeClr val="tx1"/>
+                </a:solidFill>
+              </a:rPr>
+              <a:t>, %prolog]</a:t>
+            </a:r>
+          </a:p>
+          <a:p>
+            <a:r>
+              <a:rPr lang="en-US" sz="1200" dirty="0" smtClean="0">
+                <a:solidFill>
+                  <a:schemeClr val="tx1"/>
+                </a:solidFill>
+              </a:rPr>
+              <a:t>Br label %LH1</a:t>
+            </a:r>
+            <a:endParaRPr lang="en-US" sz="1200" dirty="0">
+              <a:solidFill>
+                <a:schemeClr val="tx1"/>
+              </a:solidFill>
+            </a:endParaRPr>
+          </a:p>
+        </p:txBody>
+      </p:sp>
+      <p:sp>
+        <p:nvSpPr>
+          <p:cNvPr id="7" name="Rectangle 6"/>
+          <p:cNvSpPr/>
+          <p:nvPr/>
+        </p:nvSpPr>
+        <p:spPr>
+          <a:xfrm>
+            <a:off x="5916058" y="1948150"/>
+            <a:ext cx="2313542" cy="848298"/>
+          </a:xfrm>
+          <a:prstGeom prst="rect">
+            <a:avLst/>
+          </a:prstGeom>
+          <a:solidFill>
+            <a:schemeClr val="bg1"/>
+          </a:solidFill>
+          <a:ln>
+            <a:solidFill>
+              <a:schemeClr val="tx1"/>
+            </a:solidFill>
+          </a:ln>
+        </p:spPr>
+        <p:style>
+          <a:lnRef idx="2">
+            <a:schemeClr val="accent1">
+              <a:shade val="50000"/>
+            </a:schemeClr>
+          </a:lnRef>
+          <a:fillRef idx="1">
+            <a:schemeClr val="accent1"/>
+          </a:fillRef>
+          <a:effectRef idx="0">
+            <a:schemeClr val="accent1"/>
+          </a:effectRef>
+          <a:fontRef idx="minor">
+            <a:schemeClr val="lt1"/>
+          </a:fontRef>
+        </p:style>
+        <p:txBody>
+          <a:bodyPr rtlCol="0" anchor="ctr"/>
+          <a:lstStyle/>
+          <a:p>
+            <a:pPr algn="ctr"/>
+            <a:r>
+              <a:rPr lang="en-US" sz="1200" dirty="0" smtClean="0">
+                <a:solidFill>
+                  <a:schemeClr val="tx1"/>
+                </a:solidFill>
+              </a:rPr>
+              <a:t>ENTRY:</a:t>
+            </a:r>
+          </a:p>
+          <a:p>
+            <a:pPr algn="ctr"/>
+            <a:r>
+              <a:rPr lang="is-IS" sz="1200" dirty="0" smtClean="0">
+                <a:solidFill>
+                  <a:schemeClr val="tx1"/>
+                </a:solidFill>
+              </a:rPr>
+              <a:t>…</a:t>
+            </a:r>
+            <a:endParaRPr lang="en-US" sz="1200" dirty="0" smtClean="0">
+              <a:solidFill>
+                <a:schemeClr val="tx1"/>
+              </a:solidFill>
+            </a:endParaRPr>
+          </a:p>
+        </p:txBody>
+      </p:sp>
+      <p:sp>
+        <p:nvSpPr>
+          <p:cNvPr id="8" name="Rectangle 7"/>
+          <p:cNvSpPr/>
+          <p:nvPr/>
+        </p:nvSpPr>
+        <p:spPr>
+          <a:xfrm>
+            <a:off x="5916058" y="3102168"/>
+            <a:ext cx="2313542" cy="1154018"/>
+          </a:xfrm>
+          <a:prstGeom prst="rect">
+            <a:avLst/>
+          </a:prstGeom>
+          <a:solidFill>
+            <a:schemeClr val="bg1"/>
+          </a:solidFill>
+          <a:ln>
+            <a:solidFill>
+              <a:schemeClr val="tx1"/>
+            </a:solidFill>
+          </a:ln>
+        </p:spPr>
+        <p:style>
+          <a:lnRef idx="2">
+            <a:schemeClr val="accent1">
+              <a:shade val="50000"/>
+            </a:schemeClr>
+          </a:lnRef>
+          <a:fillRef idx="1">
+            <a:schemeClr val="accent1"/>
+          </a:fillRef>
+          <a:effectRef idx="0">
+            <a:schemeClr val="accent1"/>
+          </a:effectRef>
+          <a:fontRef idx="minor">
+            <a:schemeClr val="lt1"/>
+          </a:fontRef>
+        </p:style>
+        <p:txBody>
+          <a:bodyPr rtlCol="0" anchor="ctr"/>
+          <a:lstStyle/>
+          <a:p>
+            <a:pPr algn="ctr"/>
+            <a:r>
+              <a:rPr lang="en-US" sz="1200" dirty="0" smtClean="0">
+                <a:solidFill>
+                  <a:schemeClr val="tx1"/>
+                </a:solidFill>
+              </a:rPr>
+              <a:t>LH1:</a:t>
+            </a:r>
+          </a:p>
+          <a:p>
+            <a:r>
+              <a:rPr lang="en-US" sz="1200" dirty="0" smtClean="0">
+                <a:solidFill>
+                  <a:schemeClr val="tx1"/>
+                </a:solidFill>
+              </a:rPr>
+              <a:t>%</a:t>
+            </a:r>
+            <a:r>
+              <a:rPr lang="en-US" sz="1200" dirty="0" err="1" smtClean="0">
+                <a:solidFill>
+                  <a:schemeClr val="tx1"/>
+                </a:solidFill>
+              </a:rPr>
+              <a:t>i</a:t>
+            </a:r>
+            <a:r>
+              <a:rPr lang="en-US" sz="1200" dirty="0" smtClean="0">
+                <a:solidFill>
+                  <a:schemeClr val="tx1"/>
+                </a:solidFill>
+              </a:rPr>
+              <a:t> = phi I64</a:t>
+            </a:r>
+          </a:p>
+          <a:p>
+            <a:r>
+              <a:rPr lang="en-US" sz="1200" dirty="0" smtClean="0">
+                <a:solidFill>
+                  <a:schemeClr val="tx1"/>
+                </a:solidFill>
+              </a:rPr>
+              <a:t>[%_</a:t>
+            </a:r>
+            <a:r>
+              <a:rPr lang="en-US" sz="1200" dirty="0" err="1" smtClean="0">
+                <a:solidFill>
+                  <a:schemeClr val="tx1"/>
+                </a:solidFill>
+              </a:rPr>
+              <a:t>m_i</a:t>
+            </a:r>
+            <a:r>
+              <a:rPr lang="en-US" sz="1200" dirty="0" smtClean="0">
+                <a:solidFill>
+                  <a:schemeClr val="tx1"/>
+                </a:solidFill>
+              </a:rPr>
+              <a:t>, %PE], [%</a:t>
+            </a:r>
+            <a:r>
+              <a:rPr lang="en-US" sz="1200" dirty="0" err="1" smtClean="0">
+                <a:solidFill>
+                  <a:schemeClr val="tx1"/>
+                </a:solidFill>
+              </a:rPr>
+              <a:t>i.u</a:t>
+            </a:r>
+            <a:r>
+              <a:rPr lang="en-US" sz="1200" dirty="0" smtClean="0">
+                <a:solidFill>
+                  <a:schemeClr val="tx1"/>
+                </a:solidFill>
+              </a:rPr>
+              <a:t>, %LB]</a:t>
+            </a:r>
+          </a:p>
+          <a:p>
+            <a:pPr algn="ctr"/>
+            <a:r>
+              <a:rPr lang="is-IS" sz="1200" dirty="0" smtClean="0">
+                <a:solidFill>
+                  <a:schemeClr val="tx1"/>
+                </a:solidFill>
+              </a:rPr>
+              <a:t>…</a:t>
+            </a:r>
+          </a:p>
+          <a:p>
+            <a:r>
+              <a:rPr lang="en-US" sz="1200" dirty="0" smtClean="0">
+                <a:solidFill>
+                  <a:schemeClr val="tx1"/>
+                </a:solidFill>
+              </a:rPr>
+              <a:t>B</a:t>
+            </a:r>
+            <a:r>
+              <a:rPr lang="is-IS" sz="1200" dirty="0" smtClean="0">
+                <a:solidFill>
+                  <a:schemeClr val="tx1"/>
+                </a:solidFill>
+              </a:rPr>
+              <a:t>r i1 %loopCOnd, label %LB, label %LE</a:t>
+            </a:r>
+            <a:endParaRPr lang="en-US" sz="1200" dirty="0">
+              <a:solidFill>
+                <a:schemeClr val="tx1"/>
+              </a:solidFill>
+            </a:endParaRPr>
+          </a:p>
+        </p:txBody>
+      </p:sp>
+      <p:sp>
+        <p:nvSpPr>
+          <p:cNvPr id="9" name="Rectangle 8"/>
+          <p:cNvSpPr/>
+          <p:nvPr/>
+        </p:nvSpPr>
+        <p:spPr>
+          <a:xfrm>
+            <a:off x="5034707" y="4680335"/>
+            <a:ext cx="1531345" cy="662846"/>
+          </a:xfrm>
+          <a:prstGeom prst="rect">
+            <a:avLst/>
+          </a:prstGeom>
+          <a:solidFill>
+            <a:schemeClr val="bg1"/>
+          </a:solidFill>
+          <a:ln>
+            <a:solidFill>
+              <a:schemeClr val="tx1"/>
+            </a:solidFill>
+          </a:ln>
+        </p:spPr>
+        <p:style>
+          <a:lnRef idx="2">
+            <a:schemeClr val="accent1">
+              <a:shade val="50000"/>
+            </a:schemeClr>
+          </a:lnRef>
+          <a:fillRef idx="1">
+            <a:schemeClr val="accent1"/>
+          </a:fillRef>
+          <a:effectRef idx="0">
+            <a:schemeClr val="accent1"/>
+          </a:effectRef>
+          <a:fontRef idx="minor">
+            <a:schemeClr val="lt1"/>
+          </a:fontRef>
+        </p:style>
+        <p:txBody>
+          <a:bodyPr rtlCol="0" anchor="ctr"/>
+          <a:lstStyle/>
+          <a:p>
+            <a:pPr algn="ctr"/>
+            <a:r>
+              <a:rPr lang="en-US" sz="1200" dirty="0" smtClean="0">
+                <a:solidFill>
+                  <a:schemeClr val="tx1"/>
+                </a:solidFill>
+              </a:rPr>
+              <a:t>LE:</a:t>
+            </a:r>
+          </a:p>
+          <a:p>
+            <a:pPr algn="ctr"/>
+            <a:r>
+              <a:rPr lang="is-IS" sz="1200" dirty="0" smtClean="0">
+                <a:solidFill>
+                  <a:schemeClr val="tx1"/>
+                </a:solidFill>
+              </a:rPr>
+              <a:t>…</a:t>
+            </a:r>
+            <a:endParaRPr lang="en-US" sz="1200" dirty="0">
+              <a:solidFill>
+                <a:schemeClr val="tx1"/>
+              </a:solidFill>
+            </a:endParaRPr>
+          </a:p>
+        </p:txBody>
+      </p:sp>
+      <p:sp>
+        <p:nvSpPr>
+          <p:cNvPr id="10" name="Rectangle 9"/>
+          <p:cNvSpPr/>
+          <p:nvPr/>
+        </p:nvSpPr>
+        <p:spPr>
+          <a:xfrm>
+            <a:off x="7379465" y="4680335"/>
+            <a:ext cx="2313542" cy="993352"/>
+          </a:xfrm>
+          <a:prstGeom prst="rect">
+            <a:avLst/>
+          </a:prstGeom>
+          <a:solidFill>
+            <a:schemeClr val="bg1"/>
+          </a:solidFill>
+          <a:ln>
+            <a:solidFill>
+              <a:schemeClr val="tx1"/>
+            </a:solidFill>
+          </a:ln>
+        </p:spPr>
+        <p:style>
+          <a:lnRef idx="2">
+            <a:schemeClr val="accent1">
+              <a:shade val="50000"/>
+            </a:schemeClr>
+          </a:lnRef>
+          <a:fillRef idx="1">
+            <a:schemeClr val="accent1"/>
+          </a:fillRef>
+          <a:effectRef idx="0">
+            <a:schemeClr val="accent1"/>
+          </a:effectRef>
+          <a:fontRef idx="minor">
+            <a:schemeClr val="lt1"/>
+          </a:fontRef>
+        </p:style>
+        <p:txBody>
+          <a:bodyPr rtlCol="0" anchor="ctr"/>
+          <a:lstStyle/>
+          <a:p>
+            <a:pPr algn="ctr"/>
+            <a:r>
+              <a:rPr lang="en-US" sz="1200" dirty="0" smtClean="0">
+                <a:solidFill>
+                  <a:schemeClr val="tx1"/>
+                </a:solidFill>
+              </a:rPr>
+              <a:t>LB:</a:t>
+            </a:r>
+          </a:p>
+          <a:p>
+            <a:pPr algn="ctr"/>
+            <a:r>
+              <a:rPr lang="is-IS" sz="1200" dirty="0" smtClean="0">
+                <a:solidFill>
+                  <a:schemeClr val="tx1"/>
+                </a:solidFill>
+              </a:rPr>
+              <a:t>…</a:t>
+            </a:r>
+          </a:p>
+          <a:p>
+            <a:r>
+              <a:rPr lang="is-IS" sz="1200" dirty="0" smtClean="0">
+                <a:solidFill>
+                  <a:schemeClr val="tx1"/>
+                </a:solidFill>
+              </a:rPr>
+              <a:t>%i.u = add i64 %i, i</a:t>
+            </a:r>
+          </a:p>
+          <a:p>
+            <a:pPr algn="ctr"/>
+            <a:r>
+              <a:rPr lang="is-IS" sz="1200" dirty="0" smtClean="0">
+                <a:solidFill>
+                  <a:schemeClr val="tx1"/>
+                </a:solidFill>
+              </a:rPr>
+              <a:t>...</a:t>
+            </a:r>
+          </a:p>
+          <a:p>
+            <a:r>
+              <a:rPr lang="en-US" sz="1200" dirty="0" smtClean="0">
+                <a:solidFill>
+                  <a:schemeClr val="tx1"/>
+                </a:solidFill>
+              </a:rPr>
+              <a:t>B</a:t>
+            </a:r>
+            <a:r>
+              <a:rPr lang="is-IS" sz="1200" dirty="0" smtClean="0">
+                <a:solidFill>
+                  <a:schemeClr val="tx1"/>
+                </a:solidFill>
+              </a:rPr>
+              <a:t>r label %LH1</a:t>
+            </a:r>
+            <a:endParaRPr lang="en-US" sz="1200" dirty="0">
+              <a:solidFill>
+                <a:schemeClr val="tx1"/>
+              </a:solidFill>
+            </a:endParaRPr>
+          </a:p>
+        </p:txBody>
+      </p:sp>
+      <p:cxnSp>
+        <p:nvCxnSpPr>
+          <p:cNvPr id="14" name="Straight Arrow Connector 13"/>
+          <p:cNvCxnSpPr>
+            <a:stCxn id="4" idx="2"/>
+            <a:endCxn id="5" idx="0"/>
+          </p:cNvCxnSpPr>
+          <p:nvPr/>
+        </p:nvCxnSpPr>
+        <p:spPr>
+          <a:xfrm flipH="1">
+            <a:off x="2445745" y="1630496"/>
+            <a:ext cx="2313542" cy="317654"/>
+          </a:xfrm>
+          <a:prstGeom prst="straightConnector1">
+            <a:avLst/>
+          </a:prstGeom>
+          <a:ln>
+            <a:solidFill>
+              <a:schemeClr val="tx1"/>
+            </a:solidFill>
+            <a:tailEnd type="triangle"/>
+          </a:ln>
+        </p:spPr>
+        <p:style>
+          <a:lnRef idx="1">
+            <a:schemeClr val="accent1"/>
+          </a:lnRef>
+          <a:fillRef idx="0">
+            <a:schemeClr val="accent1"/>
+          </a:fillRef>
+          <a:effectRef idx="0">
+            <a:schemeClr val="accent1"/>
+          </a:effectRef>
+          <a:fontRef idx="minor">
+            <a:schemeClr val="tx1"/>
+          </a:fontRef>
+        </p:style>
+      </p:cxnSp>
+      <p:cxnSp>
+        <p:nvCxnSpPr>
+          <p:cNvPr id="16" name="Straight Arrow Connector 15"/>
+          <p:cNvCxnSpPr>
+            <a:stCxn id="4" idx="2"/>
+            <a:endCxn id="7" idx="0"/>
+          </p:cNvCxnSpPr>
+          <p:nvPr/>
+        </p:nvCxnSpPr>
+        <p:spPr>
+          <a:xfrm>
+            <a:off x="4759287" y="1630496"/>
+            <a:ext cx="2313542" cy="317654"/>
+          </a:xfrm>
+          <a:prstGeom prst="straightConnector1">
+            <a:avLst/>
+          </a:prstGeom>
+          <a:ln>
+            <a:solidFill>
+              <a:schemeClr val="tx1"/>
+            </a:solidFill>
+            <a:tailEnd type="triangle"/>
+          </a:ln>
+        </p:spPr>
+        <p:style>
+          <a:lnRef idx="1">
+            <a:schemeClr val="accent1"/>
+          </a:lnRef>
+          <a:fillRef idx="0">
+            <a:schemeClr val="accent1"/>
+          </a:fillRef>
+          <a:effectRef idx="0">
+            <a:schemeClr val="accent1"/>
+          </a:effectRef>
+          <a:fontRef idx="minor">
+            <a:schemeClr val="tx1"/>
+          </a:fontRef>
+        </p:style>
+      </p:cxnSp>
+      <p:cxnSp>
+        <p:nvCxnSpPr>
+          <p:cNvPr id="18" name="Straight Arrow Connector 17"/>
+          <p:cNvCxnSpPr>
+            <a:stCxn id="5" idx="2"/>
+            <a:endCxn id="6" idx="0"/>
+          </p:cNvCxnSpPr>
+          <p:nvPr/>
+        </p:nvCxnSpPr>
+        <p:spPr>
+          <a:xfrm>
+            <a:off x="2445745" y="2796448"/>
+            <a:ext cx="1320187" cy="305720"/>
+          </a:xfrm>
+          <a:prstGeom prst="straightConnector1">
+            <a:avLst/>
+          </a:prstGeom>
+          <a:ln>
+            <a:solidFill>
+              <a:schemeClr val="tx1"/>
+            </a:solidFill>
+            <a:tailEnd type="triangle"/>
+          </a:ln>
+        </p:spPr>
+        <p:style>
+          <a:lnRef idx="1">
+            <a:schemeClr val="accent1"/>
+          </a:lnRef>
+          <a:fillRef idx="0">
+            <a:schemeClr val="accent1"/>
+          </a:fillRef>
+          <a:effectRef idx="0">
+            <a:schemeClr val="accent1"/>
+          </a:effectRef>
+          <a:fontRef idx="minor">
+            <a:schemeClr val="tx1"/>
+          </a:fontRef>
+        </p:style>
+      </p:cxnSp>
+      <p:cxnSp>
+        <p:nvCxnSpPr>
+          <p:cNvPr id="20" name="Straight Arrow Connector 19"/>
+          <p:cNvCxnSpPr>
+            <a:stCxn id="7" idx="2"/>
+            <a:endCxn id="6" idx="0"/>
+          </p:cNvCxnSpPr>
+          <p:nvPr/>
+        </p:nvCxnSpPr>
+        <p:spPr>
+          <a:xfrm flipH="1">
+            <a:off x="3765932" y="2796448"/>
+            <a:ext cx="3306897" cy="305720"/>
+          </a:xfrm>
+          <a:prstGeom prst="straightConnector1">
+            <a:avLst/>
+          </a:prstGeom>
+          <a:ln>
+            <a:solidFill>
+              <a:schemeClr val="tx1"/>
+            </a:solidFill>
+            <a:prstDash val="dash"/>
+            <a:tailEnd type="triangle"/>
+          </a:ln>
+        </p:spPr>
+        <p:style>
+          <a:lnRef idx="1">
+            <a:schemeClr val="accent1"/>
+          </a:lnRef>
+          <a:fillRef idx="0">
+            <a:schemeClr val="accent1"/>
+          </a:fillRef>
+          <a:effectRef idx="0">
+            <a:schemeClr val="accent1"/>
+          </a:effectRef>
+          <a:fontRef idx="minor">
+            <a:schemeClr val="tx1"/>
+          </a:fontRef>
+        </p:style>
+      </p:cxnSp>
+      <p:cxnSp>
+        <p:nvCxnSpPr>
+          <p:cNvPr id="22" name="Straight Arrow Connector 21"/>
+          <p:cNvCxnSpPr>
+            <a:stCxn id="6" idx="3"/>
+            <a:endCxn id="8" idx="1"/>
+          </p:cNvCxnSpPr>
+          <p:nvPr/>
+        </p:nvCxnSpPr>
+        <p:spPr>
+          <a:xfrm>
+            <a:off x="4922703" y="3526317"/>
+            <a:ext cx="993355" cy="152860"/>
+          </a:xfrm>
+          <a:prstGeom prst="straightConnector1">
+            <a:avLst/>
+          </a:prstGeom>
+          <a:ln>
+            <a:solidFill>
+              <a:schemeClr val="tx1"/>
+            </a:solidFill>
+            <a:tailEnd type="triangle"/>
+          </a:ln>
+        </p:spPr>
+        <p:style>
+          <a:lnRef idx="1">
+            <a:schemeClr val="accent1"/>
+          </a:lnRef>
+          <a:fillRef idx="0">
+            <a:schemeClr val="accent1"/>
+          </a:fillRef>
+          <a:effectRef idx="0">
+            <a:schemeClr val="accent1"/>
+          </a:effectRef>
+          <a:fontRef idx="minor">
+            <a:schemeClr val="tx1"/>
+          </a:fontRef>
+        </p:style>
+      </p:cxnSp>
+      <p:cxnSp>
+        <p:nvCxnSpPr>
+          <p:cNvPr id="24" name="Straight Arrow Connector 23"/>
+          <p:cNvCxnSpPr>
+            <a:stCxn id="8" idx="2"/>
+            <a:endCxn id="9" idx="0"/>
+          </p:cNvCxnSpPr>
+          <p:nvPr/>
+        </p:nvCxnSpPr>
+        <p:spPr>
+          <a:xfrm flipH="1">
+            <a:off x="5800380" y="4256186"/>
+            <a:ext cx="1272449" cy="424149"/>
+          </a:xfrm>
+          <a:prstGeom prst="straightConnector1">
+            <a:avLst/>
+          </a:prstGeom>
+          <a:ln>
+            <a:solidFill>
+              <a:schemeClr val="tx1"/>
+            </a:solidFill>
+            <a:tailEnd type="triangle"/>
+          </a:ln>
+        </p:spPr>
+        <p:style>
+          <a:lnRef idx="1">
+            <a:schemeClr val="accent1"/>
+          </a:lnRef>
+          <a:fillRef idx="0">
+            <a:schemeClr val="accent1"/>
+          </a:fillRef>
+          <a:effectRef idx="0">
+            <a:schemeClr val="accent1"/>
+          </a:effectRef>
+          <a:fontRef idx="minor">
+            <a:schemeClr val="tx1"/>
+          </a:fontRef>
+        </p:style>
+      </p:cxnSp>
+      <p:cxnSp>
+        <p:nvCxnSpPr>
+          <p:cNvPr id="26" name="Straight Arrow Connector 25"/>
+          <p:cNvCxnSpPr>
+            <a:stCxn id="8" idx="2"/>
+            <a:endCxn id="10" idx="0"/>
+          </p:cNvCxnSpPr>
+          <p:nvPr/>
+        </p:nvCxnSpPr>
+        <p:spPr>
+          <a:xfrm>
+            <a:off x="7072829" y="4256186"/>
+            <a:ext cx="1463407" cy="424149"/>
+          </a:xfrm>
+          <a:prstGeom prst="straightConnector1">
+            <a:avLst/>
+          </a:prstGeom>
+          <a:ln>
+            <a:solidFill>
+              <a:schemeClr val="tx1"/>
+            </a:solidFill>
+            <a:tailEnd type="triangle"/>
+          </a:ln>
+        </p:spPr>
+        <p:style>
+          <a:lnRef idx="1">
+            <a:schemeClr val="accent1"/>
+          </a:lnRef>
+          <a:fillRef idx="0">
+            <a:schemeClr val="accent1"/>
+          </a:fillRef>
+          <a:effectRef idx="0">
+            <a:schemeClr val="accent1"/>
+          </a:effectRef>
+          <a:fontRef idx="minor">
+            <a:schemeClr val="tx1"/>
+          </a:fontRef>
+        </p:style>
+      </p:cxnSp>
+      <p:cxnSp>
+        <p:nvCxnSpPr>
+          <p:cNvPr id="28" name="Elbow Connector 27"/>
+          <p:cNvCxnSpPr>
+            <a:stCxn id="10" idx="2"/>
+            <a:endCxn id="8" idx="3"/>
+          </p:cNvCxnSpPr>
+          <p:nvPr/>
+        </p:nvCxnSpPr>
+        <p:spPr>
+          <a:xfrm rot="5400000" flipH="1">
+            <a:off x="7385663" y="4523114"/>
+            <a:ext cx="1994510" cy="306636"/>
+          </a:xfrm>
+          <a:prstGeom prst="bentConnector4">
+            <a:avLst>
+              <a:gd name="adj1" fmla="val -11461"/>
+              <a:gd name="adj2" fmla="val -451797"/>
+            </a:avLst>
+          </a:prstGeom>
+          <a:ln>
+            <a:solidFill>
+              <a:schemeClr val="tx1"/>
+            </a:solidFill>
+            <a:tailEnd type="triangle"/>
+          </a:ln>
+        </p:spPr>
+        <p:style>
+          <a:lnRef idx="1">
+            <a:schemeClr val="accent1"/>
+          </a:lnRef>
+          <a:fillRef idx="0">
+            <a:schemeClr val="accent1"/>
+          </a:fillRef>
+          <a:effectRef idx="0">
+            <a:schemeClr val="accent1"/>
+          </a:effectRef>
+          <a:fontRef idx="minor">
+            <a:schemeClr val="tx1"/>
+          </a:fontRef>
+        </p:style>
+      </p:cxnSp>
+    </p:spTree>
+    <p:extLst>
+      <p:ext uri="{BB962C8B-B14F-4D97-AF65-F5344CB8AC3E}">
+        <p14:creationId xmlns:p14="http://schemas.microsoft.com/office/powerpoint/2010/main" val="89082870"/>
+      </p:ext>
+    </p:extLst>
+  </p:cSld>
+  <p:clrMapOvr>
+    <a:masterClrMapping/>
+  </p:clrMapOvr>
+</p:sld>
+</file>
+
 <file path=ppt/slides/slide2.xml><?xml version="1.0" encoding="utf-8"?>
 <p:sld xmlns:a="http://schemas.openxmlformats.org/drawingml/2006/main" xmlns:r="http://schemas.openxmlformats.org/officeDocument/2006/relationships" xmlns:p="http://schemas.openxmlformats.org/presentationml/2006/main">
   <p:cSld>

</xml_diff>

<commit_message>
Working on chapter 2
</commit_message>
<xml_diff>
--- a/MasterThesis/Figures/holzle.pptx
+++ b/MasterThesis/Figures/holzle.pptx
@@ -16,6 +16,7 @@
     <p:sldId id="263" r:id="rId10"/>
     <p:sldId id="266" r:id="rId11"/>
     <p:sldId id="265" r:id="rId12"/>
+    <p:sldId id="267" r:id="rId13"/>
   </p:sldIdLst>
   <p:sldSz cx="12192000" cy="6858000"/>
   <p:notesSz cx="6858000" cy="9144000"/>
@@ -253,7 +254,7 @@
           <a:p>
             <a:fld id="{39514751-6C89-194E-A652-4BD3C8EB45FC}" type="datetimeFigureOut">
               <a:rPr lang="en-US" smtClean="0"/>
-              <a:t>12/29/15</a:t>
+              <a:t>1/21/16</a:t>
             </a:fld>
             <a:endParaRPr lang="en-US"/>
           </a:p>
@@ -423,7 +424,7 @@
           <a:p>
             <a:fld id="{39514751-6C89-194E-A652-4BD3C8EB45FC}" type="datetimeFigureOut">
               <a:rPr lang="en-US" smtClean="0"/>
-              <a:t>12/29/15</a:t>
+              <a:t>1/21/16</a:t>
             </a:fld>
             <a:endParaRPr lang="en-US"/>
           </a:p>
@@ -603,7 +604,7 @@
           <a:p>
             <a:fld id="{39514751-6C89-194E-A652-4BD3C8EB45FC}" type="datetimeFigureOut">
               <a:rPr lang="en-US" smtClean="0"/>
-              <a:t>12/29/15</a:t>
+              <a:t>1/21/16</a:t>
             </a:fld>
             <a:endParaRPr lang="en-US"/>
           </a:p>
@@ -773,7 +774,7 @@
           <a:p>
             <a:fld id="{39514751-6C89-194E-A652-4BD3C8EB45FC}" type="datetimeFigureOut">
               <a:rPr lang="en-US" smtClean="0"/>
-              <a:t>12/29/15</a:t>
+              <a:t>1/21/16</a:t>
             </a:fld>
             <a:endParaRPr lang="en-US"/>
           </a:p>
@@ -1019,7 +1020,7 @@
           <a:p>
             <a:fld id="{39514751-6C89-194E-A652-4BD3C8EB45FC}" type="datetimeFigureOut">
               <a:rPr lang="en-US" smtClean="0"/>
-              <a:t>12/29/15</a:t>
+              <a:t>1/21/16</a:t>
             </a:fld>
             <a:endParaRPr lang="en-US"/>
           </a:p>
@@ -1251,7 +1252,7 @@
           <a:p>
             <a:fld id="{39514751-6C89-194E-A652-4BD3C8EB45FC}" type="datetimeFigureOut">
               <a:rPr lang="en-US" smtClean="0"/>
-              <a:t>12/29/15</a:t>
+              <a:t>1/21/16</a:t>
             </a:fld>
             <a:endParaRPr lang="en-US"/>
           </a:p>
@@ -1618,7 +1619,7 @@
           <a:p>
             <a:fld id="{39514751-6C89-194E-A652-4BD3C8EB45FC}" type="datetimeFigureOut">
               <a:rPr lang="en-US" smtClean="0"/>
-              <a:t>12/29/15</a:t>
+              <a:t>1/21/16</a:t>
             </a:fld>
             <a:endParaRPr lang="en-US"/>
           </a:p>
@@ -1736,7 +1737,7 @@
           <a:p>
             <a:fld id="{39514751-6C89-194E-A652-4BD3C8EB45FC}" type="datetimeFigureOut">
               <a:rPr lang="en-US" smtClean="0"/>
-              <a:t>12/29/15</a:t>
+              <a:t>1/21/16</a:t>
             </a:fld>
             <a:endParaRPr lang="en-US"/>
           </a:p>
@@ -1831,7 +1832,7 @@
           <a:p>
             <a:fld id="{39514751-6C89-194E-A652-4BD3C8EB45FC}" type="datetimeFigureOut">
               <a:rPr lang="en-US" smtClean="0"/>
-              <a:t>12/29/15</a:t>
+              <a:t>1/21/16</a:t>
             </a:fld>
             <a:endParaRPr lang="en-US"/>
           </a:p>
@@ -2108,7 +2109,7 @@
           <a:p>
             <a:fld id="{39514751-6C89-194E-A652-4BD3C8EB45FC}" type="datetimeFigureOut">
               <a:rPr lang="en-US" smtClean="0"/>
-              <a:t>12/29/15</a:t>
+              <a:t>1/21/16</a:t>
             </a:fld>
             <a:endParaRPr lang="en-US"/>
           </a:p>
@@ -2361,7 +2362,7 @@
           <a:p>
             <a:fld id="{39514751-6C89-194E-A652-4BD3C8EB45FC}" type="datetimeFigureOut">
               <a:rPr lang="en-US" smtClean="0"/>
-              <a:t>12/29/15</a:t>
+              <a:t>1/21/16</a:t>
             </a:fld>
             <a:endParaRPr lang="en-US"/>
           </a:p>
@@ -2574,7 +2575,7 @@
           <a:p>
             <a:fld id="{39514751-6C89-194E-A652-4BD3C8EB45FC}" type="datetimeFigureOut">
               <a:rPr lang="en-US" smtClean="0"/>
-              <a:t>12/29/15</a:t>
+              <a:t>1/21/16</a:t>
             </a:fld>
             <a:endParaRPr lang="en-US"/>
           </a:p>
@@ -5478,6 +5479,356 @@
 </p:sld>
 </file>
 
+<file path=ppt/slides/slide12.xml><?xml version="1.0" encoding="utf-8"?>
+<p:sld xmlns:a="http://schemas.openxmlformats.org/drawingml/2006/main" xmlns:r="http://schemas.openxmlformats.org/officeDocument/2006/relationships" xmlns:p="http://schemas.openxmlformats.org/presentationml/2006/main">
+  <p:cSld>
+    <p:spTree>
+      <p:nvGrpSpPr>
+        <p:cNvPr id="1" name=""/>
+        <p:cNvGrpSpPr/>
+        <p:nvPr/>
+      </p:nvGrpSpPr>
+      <p:grpSpPr>
+        <a:xfrm>
+          <a:off x="0" y="0"/>
+          <a:ext cx="0" cy="0"/>
+          <a:chOff x="0" y="0"/>
+          <a:chExt cx="0" cy="0"/>
+        </a:xfrm>
+      </p:grpSpPr>
+      <p:sp>
+        <p:nvSpPr>
+          <p:cNvPr id="4" name="Rectangle 3"/>
+          <p:cNvSpPr/>
+          <p:nvPr/>
+        </p:nvSpPr>
+        <p:spPr>
+          <a:xfrm>
+            <a:off x="640080" y="978408"/>
+            <a:ext cx="3209544" cy="5166360"/>
+          </a:xfrm>
+          <a:prstGeom prst="rect">
+            <a:avLst/>
+          </a:prstGeom>
+          <a:solidFill>
+            <a:schemeClr val="bg1"/>
+          </a:solidFill>
+          <a:ln>
+            <a:solidFill>
+              <a:schemeClr val="tx1"/>
+            </a:solidFill>
+          </a:ln>
+        </p:spPr>
+        <p:style>
+          <a:lnRef idx="2">
+            <a:schemeClr val="accent1">
+              <a:shade val="50000"/>
+            </a:schemeClr>
+          </a:lnRef>
+          <a:fillRef idx="1">
+            <a:schemeClr val="accent1"/>
+          </a:fillRef>
+          <a:effectRef idx="0">
+            <a:schemeClr val="accent1"/>
+          </a:effectRef>
+          <a:fontRef idx="minor">
+            <a:schemeClr val="lt1"/>
+          </a:fontRef>
+        </p:style>
+        <p:txBody>
+          <a:bodyPr rtlCol="0" anchor="ctr"/>
+          <a:lstStyle/>
+          <a:p>
+            <a:pPr algn="ctr"/>
+            <a:endParaRPr lang="en-US"/>
+          </a:p>
+        </p:txBody>
+      </p:sp>
+      <p:sp>
+        <p:nvSpPr>
+          <p:cNvPr id="5" name="Rectangle 4"/>
+          <p:cNvSpPr/>
+          <p:nvPr/>
+        </p:nvSpPr>
+        <p:spPr>
+          <a:xfrm>
+            <a:off x="4268724" y="978408"/>
+            <a:ext cx="3209544" cy="5166360"/>
+          </a:xfrm>
+          <a:prstGeom prst="rect">
+            <a:avLst/>
+          </a:prstGeom>
+          <a:solidFill>
+            <a:schemeClr val="bg1"/>
+          </a:solidFill>
+          <a:ln>
+            <a:solidFill>
+              <a:schemeClr val="tx1"/>
+            </a:solidFill>
+          </a:ln>
+        </p:spPr>
+        <p:style>
+          <a:lnRef idx="2">
+            <a:schemeClr val="accent1">
+              <a:shade val="50000"/>
+            </a:schemeClr>
+          </a:lnRef>
+          <a:fillRef idx="1">
+            <a:schemeClr val="accent1"/>
+          </a:fillRef>
+          <a:effectRef idx="0">
+            <a:schemeClr val="accent1"/>
+          </a:effectRef>
+          <a:fontRef idx="minor">
+            <a:schemeClr val="lt1"/>
+          </a:fontRef>
+        </p:style>
+        <p:txBody>
+          <a:bodyPr rtlCol="0" anchor="ctr"/>
+          <a:lstStyle/>
+          <a:p>
+            <a:pPr algn="ctr"/>
+            <a:endParaRPr lang="en-US"/>
+          </a:p>
+        </p:txBody>
+      </p:sp>
+      <p:sp>
+        <p:nvSpPr>
+          <p:cNvPr id="6" name="Rectangle 5"/>
+          <p:cNvSpPr/>
+          <p:nvPr/>
+        </p:nvSpPr>
+        <p:spPr>
+          <a:xfrm>
+            <a:off x="7897368" y="978408"/>
+            <a:ext cx="3209544" cy="5166360"/>
+          </a:xfrm>
+          <a:prstGeom prst="rect">
+            <a:avLst/>
+          </a:prstGeom>
+          <a:solidFill>
+            <a:schemeClr val="bg1"/>
+          </a:solidFill>
+          <a:ln>
+            <a:solidFill>
+              <a:schemeClr val="tx1"/>
+            </a:solidFill>
+          </a:ln>
+        </p:spPr>
+        <p:style>
+          <a:lnRef idx="2">
+            <a:schemeClr val="accent1">
+              <a:shade val="50000"/>
+            </a:schemeClr>
+          </a:lnRef>
+          <a:fillRef idx="1">
+            <a:schemeClr val="accent1"/>
+          </a:fillRef>
+          <a:effectRef idx="0">
+            <a:schemeClr val="accent1"/>
+          </a:effectRef>
+          <a:fontRef idx="minor">
+            <a:schemeClr val="lt1"/>
+          </a:fontRef>
+        </p:style>
+        <p:txBody>
+          <a:bodyPr rtlCol="0" anchor="ctr"/>
+          <a:lstStyle/>
+          <a:p>
+            <a:pPr algn="ctr"/>
+            <a:endParaRPr lang="en-US"/>
+          </a:p>
+        </p:txBody>
+      </p:sp>
+      <p:sp>
+        <p:nvSpPr>
+          <p:cNvPr id="7" name="Rectangle 6"/>
+          <p:cNvSpPr/>
+          <p:nvPr/>
+        </p:nvSpPr>
+        <p:spPr>
+          <a:xfrm>
+            <a:off x="640080" y="978408"/>
+            <a:ext cx="3209544" cy="603504"/>
+          </a:xfrm>
+          <a:prstGeom prst="rect">
+            <a:avLst/>
+          </a:prstGeom>
+          <a:solidFill>
+            <a:schemeClr val="bg1"/>
+          </a:solidFill>
+          <a:ln>
+            <a:solidFill>
+              <a:schemeClr val="tx1"/>
+            </a:solidFill>
+          </a:ln>
+        </p:spPr>
+        <p:style>
+          <a:lnRef idx="2">
+            <a:schemeClr val="accent1">
+              <a:shade val="50000"/>
+            </a:schemeClr>
+          </a:lnRef>
+          <a:fillRef idx="1">
+            <a:schemeClr val="accent1"/>
+          </a:fillRef>
+          <a:effectRef idx="0">
+            <a:schemeClr val="accent1"/>
+          </a:effectRef>
+          <a:fontRef idx="minor">
+            <a:schemeClr val="lt1"/>
+          </a:fontRef>
+        </p:style>
+        <p:txBody>
+          <a:bodyPr rtlCol="0" anchor="ctr"/>
+          <a:lstStyle/>
+          <a:p>
+            <a:pPr algn="ctr"/>
+            <a:r>
+              <a:rPr lang="en-US" dirty="0" smtClean="0">
+                <a:solidFill>
+                  <a:schemeClr val="tx1"/>
+                </a:solidFill>
+              </a:rPr>
+              <a:t>From </a:t>
+            </a:r>
+            <a:r>
+              <a:rPr lang="en-US" smtClean="0">
+                <a:solidFill>
+                  <a:schemeClr val="tx1"/>
+                </a:solidFill>
+              </a:rPr>
+              <a:t>function </a:t>
+            </a:r>
+            <a:endParaRPr lang="en-US" dirty="0">
+              <a:solidFill>
+                <a:schemeClr val="tx1"/>
+              </a:solidFill>
+            </a:endParaRPr>
+          </a:p>
+        </p:txBody>
+      </p:sp>
+      <p:sp>
+        <p:nvSpPr>
+          <p:cNvPr id="8" name="Rectangle 7"/>
+          <p:cNvSpPr/>
+          <p:nvPr/>
+        </p:nvSpPr>
+        <p:spPr>
+          <a:xfrm>
+            <a:off x="4268724" y="978408"/>
+            <a:ext cx="3209544" cy="603504"/>
+          </a:xfrm>
+          <a:prstGeom prst="rect">
+            <a:avLst/>
+          </a:prstGeom>
+          <a:solidFill>
+            <a:schemeClr val="bg1"/>
+          </a:solidFill>
+          <a:ln>
+            <a:solidFill>
+              <a:schemeClr val="tx1"/>
+            </a:solidFill>
+          </a:ln>
+        </p:spPr>
+        <p:style>
+          <a:lnRef idx="2">
+            <a:schemeClr val="accent1">
+              <a:shade val="50000"/>
+            </a:schemeClr>
+          </a:lnRef>
+          <a:fillRef idx="1">
+            <a:schemeClr val="accent1"/>
+          </a:fillRef>
+          <a:effectRef idx="0">
+            <a:schemeClr val="accent1"/>
+          </a:effectRef>
+          <a:fontRef idx="minor">
+            <a:schemeClr val="lt1"/>
+          </a:fontRef>
+        </p:style>
+        <p:txBody>
+          <a:bodyPr rtlCol="0" anchor="ctr"/>
+          <a:lstStyle/>
+          <a:p>
+            <a:pPr algn="ctr"/>
+            <a:r>
+              <a:rPr lang="en-US" dirty="0" smtClean="0">
+                <a:solidFill>
+                  <a:schemeClr val="tx1"/>
+                </a:solidFill>
+              </a:rPr>
+              <a:t>Continuation Function </a:t>
+            </a:r>
+            <a:endParaRPr lang="en-US" dirty="0">
+              <a:solidFill>
+                <a:schemeClr val="tx1"/>
+              </a:solidFill>
+            </a:endParaRPr>
+          </a:p>
+        </p:txBody>
+      </p:sp>
+      <p:sp>
+        <p:nvSpPr>
+          <p:cNvPr id="9" name="Rectangle 8"/>
+          <p:cNvSpPr/>
+          <p:nvPr/>
+        </p:nvSpPr>
+        <p:spPr>
+          <a:xfrm>
+            <a:off x="7897368" y="978408"/>
+            <a:ext cx="3209544" cy="603504"/>
+          </a:xfrm>
+          <a:prstGeom prst="rect">
+            <a:avLst/>
+          </a:prstGeom>
+          <a:solidFill>
+            <a:schemeClr val="bg1"/>
+          </a:solidFill>
+          <a:ln>
+            <a:solidFill>
+              <a:schemeClr val="tx1"/>
+            </a:solidFill>
+          </a:ln>
+        </p:spPr>
+        <p:style>
+          <a:lnRef idx="2">
+            <a:schemeClr val="accent1">
+              <a:shade val="50000"/>
+            </a:schemeClr>
+          </a:lnRef>
+          <a:fillRef idx="1">
+            <a:schemeClr val="accent1"/>
+          </a:fillRef>
+          <a:effectRef idx="0">
+            <a:schemeClr val="accent1"/>
+          </a:effectRef>
+          <a:fontRef idx="minor">
+            <a:schemeClr val="lt1"/>
+          </a:fontRef>
+        </p:style>
+        <p:txBody>
+          <a:bodyPr rtlCol="0" anchor="ctr"/>
+          <a:lstStyle/>
+          <a:p>
+            <a:pPr algn="ctr"/>
+            <a:endParaRPr lang="en-US"/>
+          </a:p>
+        </p:txBody>
+      </p:sp>
+    </p:spTree>
+    <p:extLst>
+      <p:ext uri="{BB962C8B-B14F-4D97-AF65-F5344CB8AC3E}">
+        <p14:creationId xmlns:p14="http://schemas.microsoft.com/office/powerpoint/2010/main" val="490975485"/>
+      </p:ext>
+    </p:extLst>
+  </p:cSld>
+  <p:clrMapOvr>
+    <a:masterClrMapping/>
+  </p:clrMapOvr>
+</p:sld>
+</file>
+
 <file path=ppt/slides/slide2.xml><?xml version="1.0" encoding="utf-8"?>
 <p:sld xmlns:a="http://schemas.openxmlformats.org/drawingml/2006/main" xmlns:r="http://schemas.openxmlformats.org/officeDocument/2006/relationships" xmlns:p="http://schemas.openxmlformats.org/presentationml/2006/main">
   <p:cSld>

</xml_diff>

<commit_message>
Cleaning up a little
</commit_message>
<xml_diff>
--- a/MasterThesis/Figures/holzle.pptx
+++ b/MasterThesis/Figures/holzle.pptx
@@ -5498,14 +5498,14 @@
       </p:grpSpPr>
       <p:sp>
         <p:nvSpPr>
-          <p:cNvPr id="4" name="Rectangle 3"/>
+          <p:cNvPr id="2" name="Rectangle 1"/>
           <p:cNvSpPr/>
           <p:nvPr/>
         </p:nvSpPr>
         <p:spPr>
           <a:xfrm>
-            <a:off x="640080" y="978408"/>
-            <a:ext cx="3209544" cy="5166360"/>
+            <a:off x="552261" y="1584356"/>
+            <a:ext cx="1584357" cy="832919"/>
           </a:xfrm>
           <a:prstGeom prst="rect">
             <a:avLst/>
@@ -5540,165 +5540,24 @@
           <a:lstStyle/>
           <a:p>
             <a:pPr algn="ctr"/>
-            <a:endParaRPr lang="en-US"/>
-          </a:p>
-        </p:txBody>
-      </p:sp>
-      <p:sp>
-        <p:nvSpPr>
-          <p:cNvPr id="5" name="Rectangle 4"/>
-          <p:cNvSpPr/>
-          <p:nvPr/>
-        </p:nvSpPr>
-        <p:spPr>
-          <a:xfrm>
-            <a:off x="4268724" y="978408"/>
-            <a:ext cx="3209544" cy="5166360"/>
-          </a:xfrm>
-          <a:prstGeom prst="rect">
-            <a:avLst/>
-          </a:prstGeom>
-          <a:solidFill>
-            <a:schemeClr val="bg1"/>
-          </a:solidFill>
-          <a:ln>
-            <a:solidFill>
-              <a:schemeClr val="tx1"/>
-            </a:solidFill>
-          </a:ln>
-        </p:spPr>
-        <p:style>
-          <a:lnRef idx="2">
-            <a:schemeClr val="accent1">
-              <a:shade val="50000"/>
-            </a:schemeClr>
-          </a:lnRef>
-          <a:fillRef idx="1">
-            <a:schemeClr val="accent1"/>
-          </a:fillRef>
-          <a:effectRef idx="0">
-            <a:schemeClr val="accent1"/>
-          </a:effectRef>
-          <a:fontRef idx="minor">
-            <a:schemeClr val="lt1"/>
-          </a:fontRef>
-        </p:style>
-        <p:txBody>
-          <a:bodyPr rtlCol="0" anchor="ctr"/>
-          <a:lstStyle/>
-          <a:p>
-            <a:pPr algn="ctr"/>
-            <a:endParaRPr lang="en-US"/>
-          </a:p>
-        </p:txBody>
-      </p:sp>
-      <p:sp>
-        <p:nvSpPr>
-          <p:cNvPr id="6" name="Rectangle 5"/>
-          <p:cNvSpPr/>
-          <p:nvPr/>
-        </p:nvSpPr>
-        <p:spPr>
-          <a:xfrm>
-            <a:off x="7897368" y="978408"/>
-            <a:ext cx="3209544" cy="5166360"/>
-          </a:xfrm>
-          <a:prstGeom prst="rect">
-            <a:avLst/>
-          </a:prstGeom>
-          <a:solidFill>
-            <a:schemeClr val="bg1"/>
-          </a:solidFill>
-          <a:ln>
-            <a:solidFill>
-              <a:schemeClr val="tx1"/>
-            </a:solidFill>
-          </a:ln>
-        </p:spPr>
-        <p:style>
-          <a:lnRef idx="2">
-            <a:schemeClr val="accent1">
-              <a:shade val="50000"/>
-            </a:schemeClr>
-          </a:lnRef>
-          <a:fillRef idx="1">
-            <a:schemeClr val="accent1"/>
-          </a:fillRef>
-          <a:effectRef idx="0">
-            <a:schemeClr val="accent1"/>
-          </a:effectRef>
-          <a:fontRef idx="minor">
-            <a:schemeClr val="lt1"/>
-          </a:fontRef>
-        </p:style>
-        <p:txBody>
-          <a:bodyPr rtlCol="0" anchor="ctr"/>
-          <a:lstStyle/>
-          <a:p>
-            <a:pPr algn="ctr"/>
-            <a:endParaRPr lang="en-US"/>
-          </a:p>
-        </p:txBody>
-      </p:sp>
-      <p:sp>
-        <p:nvSpPr>
-          <p:cNvPr id="7" name="Rectangle 6"/>
-          <p:cNvSpPr/>
-          <p:nvPr/>
-        </p:nvSpPr>
-        <p:spPr>
-          <a:xfrm>
-            <a:off x="640080" y="978408"/>
-            <a:ext cx="3209544" cy="603504"/>
-          </a:xfrm>
-          <a:prstGeom prst="rect">
-            <a:avLst/>
-          </a:prstGeom>
-          <a:solidFill>
-            <a:schemeClr val="bg1"/>
-          </a:solidFill>
-          <a:ln>
-            <a:solidFill>
-              <a:schemeClr val="tx1"/>
-            </a:solidFill>
-          </a:ln>
-        </p:spPr>
-        <p:style>
-          <a:lnRef idx="2">
-            <a:schemeClr val="accent1">
-              <a:shade val="50000"/>
-            </a:schemeClr>
-          </a:lnRef>
-          <a:fillRef idx="1">
-            <a:schemeClr val="accent1"/>
-          </a:fillRef>
-          <a:effectRef idx="0">
-            <a:schemeClr val="accent1"/>
-          </a:effectRef>
-          <a:fontRef idx="minor">
-            <a:schemeClr val="lt1"/>
-          </a:fontRef>
-        </p:style>
-        <p:txBody>
-          <a:bodyPr rtlCol="0" anchor="ctr"/>
-          <a:lstStyle/>
-          <a:p>
-            <a:pPr algn="ctr"/>
             <a:r>
               <a:rPr lang="en-US" dirty="0" smtClean="0">
                 <a:solidFill>
                   <a:schemeClr val="tx1"/>
                 </a:solidFill>
               </a:rPr>
-              <a:t>From </a:t>
-            </a:r>
-            <a:r>
-              <a:rPr lang="en-US" smtClean="0">
-                <a:solidFill>
-                  <a:schemeClr val="tx1"/>
-                </a:solidFill>
-              </a:rPr>
-              <a:t>function </a:t>
+              <a:t>Interpreted</a:t>
+            </a:r>
+          </a:p>
+          <a:p>
+            <a:pPr algn="ctr"/>
+            <a:r>
+              <a:rPr lang="en-US" dirty="0">
+                <a:solidFill>
+                  <a:schemeClr val="tx1"/>
+                </a:solidFill>
+              </a:rPr>
+              <a:t>f</a:t>
             </a:r>
             <a:endParaRPr lang="en-US" dirty="0">
               <a:solidFill>
@@ -5710,14 +5569,14 @@
       </p:sp>
       <p:sp>
         <p:nvSpPr>
-          <p:cNvPr id="8" name="Rectangle 7"/>
+          <p:cNvPr id="10" name="Rectangle 9"/>
           <p:cNvSpPr/>
           <p:nvPr/>
         </p:nvSpPr>
         <p:spPr>
           <a:xfrm>
-            <a:off x="4268724" y="978408"/>
-            <a:ext cx="3209544" cy="603504"/>
+            <a:off x="2560622" y="1584356"/>
+            <a:ext cx="1584357" cy="832919"/>
           </a:xfrm>
           <a:prstGeom prst="rect">
             <a:avLst/>
@@ -5758,7 +5617,26 @@
                   <a:schemeClr val="tx1"/>
                 </a:solidFill>
               </a:rPr>
-              <a:t>Continuation Function </a:t>
+              <a:t>Base </a:t>
+            </a:r>
+            <a:r>
+              <a:rPr lang="en-US" dirty="0" smtClean="0">
+                <a:solidFill>
+                  <a:schemeClr val="tx1"/>
+                </a:solidFill>
+              </a:rPr>
+              <a:t>Compiled</a:t>
+            </a:r>
+          </a:p>
+          <a:p>
+            <a:pPr algn="ctr"/>
+            <a:r>
+              <a:rPr lang="en-US" dirty="0">
+                <a:solidFill>
+                  <a:schemeClr val="tx1"/>
+                </a:solidFill>
+              </a:rPr>
+              <a:t>f</a:t>
             </a:r>
             <a:endParaRPr lang="en-US" dirty="0">
               <a:solidFill>
@@ -5770,16 +5648,16 @@
       </p:sp>
       <p:sp>
         <p:nvSpPr>
-          <p:cNvPr id="9" name="Rectangle 8"/>
+          <p:cNvPr id="3" name="Oval 2"/>
           <p:cNvSpPr/>
           <p:nvPr/>
         </p:nvSpPr>
         <p:spPr>
           <a:xfrm>
-            <a:off x="7897368" y="978408"/>
-            <a:ext cx="3209544" cy="603504"/>
-          </a:xfrm>
-          <a:prstGeom prst="rect">
+            <a:off x="4568983" y="1416866"/>
+            <a:ext cx="1186004" cy="1167897"/>
+          </a:xfrm>
+          <a:prstGeom prst="ellipse">
             <a:avLst/>
           </a:prstGeom>
           <a:solidFill>
@@ -5812,7 +5690,823 @@
           <a:lstStyle/>
           <a:p>
             <a:pPr algn="ctr"/>
+            <a:r>
+              <a:rPr lang="en-US" sz="1400" dirty="0">
+                <a:solidFill>
+                  <a:schemeClr val="tx1"/>
+                </a:solidFill>
+              </a:rPr>
+              <a:t>O</a:t>
+            </a:r>
+            <a:r>
+              <a:rPr lang="en-US" sz="1400" dirty="0" smtClean="0">
+                <a:solidFill>
+                  <a:schemeClr val="tx1"/>
+                </a:solidFill>
+              </a:rPr>
+              <a:t>1(f)</a:t>
+            </a:r>
+            <a:endParaRPr lang="en-US" sz="1400" dirty="0">
+              <a:solidFill>
+                <a:schemeClr val="tx1"/>
+              </a:solidFill>
+            </a:endParaRPr>
+          </a:p>
+        </p:txBody>
+      </p:sp>
+      <p:sp>
+        <p:nvSpPr>
+          <p:cNvPr id="13" name="Oval 12"/>
+          <p:cNvSpPr/>
+          <p:nvPr/>
+        </p:nvSpPr>
+        <p:spPr>
+          <a:xfrm>
+            <a:off x="6178991" y="1416865"/>
+            <a:ext cx="1186004" cy="1167897"/>
+          </a:xfrm>
+          <a:prstGeom prst="ellipse">
+            <a:avLst/>
+          </a:prstGeom>
+          <a:solidFill>
+            <a:schemeClr val="bg1"/>
+          </a:solidFill>
+          <a:ln>
+            <a:solidFill>
+              <a:schemeClr val="tx1"/>
+            </a:solidFill>
+          </a:ln>
+        </p:spPr>
+        <p:style>
+          <a:lnRef idx="2">
+            <a:schemeClr val="accent1">
+              <a:shade val="50000"/>
+            </a:schemeClr>
+          </a:lnRef>
+          <a:fillRef idx="1">
+            <a:schemeClr val="accent1"/>
+          </a:fillRef>
+          <a:effectRef idx="0">
+            <a:schemeClr val="accent1"/>
+          </a:effectRef>
+          <a:fontRef idx="minor">
+            <a:schemeClr val="lt1"/>
+          </a:fontRef>
+        </p:style>
+        <p:txBody>
+          <a:bodyPr rtlCol="0" anchor="ctr"/>
+          <a:lstStyle/>
+          <a:p>
+            <a:pPr algn="ctr"/>
+            <a:endParaRPr lang="en-US" dirty="0">
+              <a:solidFill>
+                <a:schemeClr val="tx1"/>
+              </a:solidFill>
+            </a:endParaRPr>
+          </a:p>
+        </p:txBody>
+      </p:sp>
+      <p:sp>
+        <p:nvSpPr>
+          <p:cNvPr id="14" name="Oval 13"/>
+          <p:cNvSpPr/>
+          <p:nvPr/>
+        </p:nvSpPr>
+        <p:spPr>
+          <a:xfrm>
+            <a:off x="7788999" y="1416865"/>
+            <a:ext cx="1186004" cy="1167897"/>
+          </a:xfrm>
+          <a:prstGeom prst="ellipse">
+            <a:avLst/>
+          </a:prstGeom>
+          <a:solidFill>
+            <a:schemeClr val="bg1"/>
+          </a:solidFill>
+          <a:ln>
+            <a:solidFill>
+              <a:schemeClr val="tx1"/>
+            </a:solidFill>
+          </a:ln>
+        </p:spPr>
+        <p:style>
+          <a:lnRef idx="2">
+            <a:schemeClr val="accent1">
+              <a:shade val="50000"/>
+            </a:schemeClr>
+          </a:lnRef>
+          <a:fillRef idx="1">
+            <a:schemeClr val="accent1"/>
+          </a:fillRef>
+          <a:effectRef idx="0">
+            <a:schemeClr val="accent1"/>
+          </a:effectRef>
+          <a:fontRef idx="minor">
+            <a:schemeClr val="lt1"/>
+          </a:fontRef>
+        </p:style>
+        <p:txBody>
+          <a:bodyPr rtlCol="0" anchor="ctr"/>
+          <a:lstStyle/>
+          <a:p>
+            <a:pPr algn="ctr"/>
+            <a:endParaRPr lang="en-US" sz="1400" dirty="0" smtClean="0">
+              <a:solidFill>
+                <a:schemeClr val="tx1"/>
+              </a:solidFill>
+            </a:endParaRPr>
+          </a:p>
+          <a:p>
+            <a:pPr algn="ctr"/>
+            <a:r>
+              <a:rPr lang="en-US" sz="1400" dirty="0" smtClean="0">
+                <a:solidFill>
+                  <a:schemeClr val="tx1"/>
+                </a:solidFill>
+              </a:rPr>
+              <a:t>(</a:t>
+            </a:r>
+            <a:r>
+              <a:rPr lang="en-US" sz="1400" dirty="0" smtClean="0">
+                <a:solidFill>
+                  <a:schemeClr val="tx1"/>
+                </a:solidFill>
+              </a:rPr>
+              <a:t>current)</a:t>
+            </a:r>
+            <a:endParaRPr lang="en-US" sz="1400" dirty="0">
+              <a:solidFill>
+                <a:schemeClr val="tx1"/>
+              </a:solidFill>
+            </a:endParaRPr>
+          </a:p>
+        </p:txBody>
+      </p:sp>
+      <p:sp>
+        <p:nvSpPr>
+          <p:cNvPr id="15" name="Right Arrow 14"/>
+          <p:cNvSpPr/>
+          <p:nvPr/>
+        </p:nvSpPr>
+        <p:spPr>
+          <a:xfrm>
+            <a:off x="2136618" y="1842377"/>
+            <a:ext cx="497940" cy="316872"/>
+          </a:xfrm>
+          <a:prstGeom prst="rightArrow">
+            <a:avLst/>
+          </a:prstGeom>
+          <a:solidFill>
+            <a:schemeClr val="tx1"/>
+          </a:solidFill>
+          <a:ln>
+            <a:solidFill>
+              <a:schemeClr val="tx1"/>
+            </a:solidFill>
+          </a:ln>
+        </p:spPr>
+        <p:style>
+          <a:lnRef idx="2">
+            <a:schemeClr val="accent1">
+              <a:shade val="50000"/>
+            </a:schemeClr>
+          </a:lnRef>
+          <a:fillRef idx="1">
+            <a:schemeClr val="accent1"/>
+          </a:fillRef>
+          <a:effectRef idx="0">
+            <a:schemeClr val="accent1"/>
+          </a:effectRef>
+          <a:fontRef idx="minor">
+            <a:schemeClr val="lt1"/>
+          </a:fontRef>
+        </p:style>
+        <p:txBody>
+          <a:bodyPr rtlCol="0" anchor="ctr"/>
+          <a:lstStyle/>
+          <a:p>
+            <a:pPr algn="ctr"/>
             <a:endParaRPr lang="en-US"/>
+          </a:p>
+        </p:txBody>
+      </p:sp>
+      <p:sp>
+        <p:nvSpPr>
+          <p:cNvPr id="16" name="Right Arrow 15"/>
+          <p:cNvSpPr/>
+          <p:nvPr/>
+        </p:nvSpPr>
+        <p:spPr>
+          <a:xfrm>
+            <a:off x="4144979" y="1842377"/>
+            <a:ext cx="497940" cy="316872"/>
+          </a:xfrm>
+          <a:prstGeom prst="rightArrow">
+            <a:avLst/>
+          </a:prstGeom>
+          <a:solidFill>
+            <a:schemeClr val="tx1"/>
+          </a:solidFill>
+          <a:ln>
+            <a:solidFill>
+              <a:schemeClr val="tx1"/>
+            </a:solidFill>
+          </a:ln>
+        </p:spPr>
+        <p:style>
+          <a:lnRef idx="2">
+            <a:schemeClr val="accent1">
+              <a:shade val="50000"/>
+            </a:schemeClr>
+          </a:lnRef>
+          <a:fillRef idx="1">
+            <a:schemeClr val="accent1"/>
+          </a:fillRef>
+          <a:effectRef idx="0">
+            <a:schemeClr val="accent1"/>
+          </a:effectRef>
+          <a:fontRef idx="minor">
+            <a:schemeClr val="lt1"/>
+          </a:fontRef>
+        </p:style>
+        <p:txBody>
+          <a:bodyPr rtlCol="0" anchor="ctr"/>
+          <a:lstStyle/>
+          <a:p>
+            <a:pPr algn="ctr"/>
+            <a:endParaRPr lang="en-US"/>
+          </a:p>
+        </p:txBody>
+      </p:sp>
+      <p:sp>
+        <p:nvSpPr>
+          <p:cNvPr id="17" name="Right Arrow 16"/>
+          <p:cNvSpPr/>
+          <p:nvPr/>
+        </p:nvSpPr>
+        <p:spPr>
+          <a:xfrm>
+            <a:off x="5754987" y="1842377"/>
+            <a:ext cx="497940" cy="316872"/>
+          </a:xfrm>
+          <a:prstGeom prst="rightArrow">
+            <a:avLst/>
+          </a:prstGeom>
+          <a:solidFill>
+            <a:schemeClr val="tx1"/>
+          </a:solidFill>
+          <a:ln>
+            <a:solidFill>
+              <a:schemeClr val="tx1"/>
+            </a:solidFill>
+          </a:ln>
+        </p:spPr>
+        <p:style>
+          <a:lnRef idx="2">
+            <a:schemeClr val="accent1">
+              <a:shade val="50000"/>
+            </a:schemeClr>
+          </a:lnRef>
+          <a:fillRef idx="1">
+            <a:schemeClr val="accent1"/>
+          </a:fillRef>
+          <a:effectRef idx="0">
+            <a:schemeClr val="accent1"/>
+          </a:effectRef>
+          <a:fontRef idx="minor">
+            <a:schemeClr val="lt1"/>
+          </a:fontRef>
+        </p:style>
+        <p:txBody>
+          <a:bodyPr rtlCol="0" anchor="ctr"/>
+          <a:lstStyle/>
+          <a:p>
+            <a:pPr algn="ctr"/>
+            <a:endParaRPr lang="en-US"/>
+          </a:p>
+        </p:txBody>
+      </p:sp>
+      <p:sp>
+        <p:nvSpPr>
+          <p:cNvPr id="18" name="Right Arrow 17"/>
+          <p:cNvSpPr/>
+          <p:nvPr/>
+        </p:nvSpPr>
+        <p:spPr>
+          <a:xfrm>
+            <a:off x="7355188" y="1842377"/>
+            <a:ext cx="497940" cy="316872"/>
+          </a:xfrm>
+          <a:prstGeom prst="rightArrow">
+            <a:avLst/>
+          </a:prstGeom>
+          <a:solidFill>
+            <a:schemeClr val="tx1"/>
+          </a:solidFill>
+          <a:ln>
+            <a:solidFill>
+              <a:schemeClr val="tx1"/>
+            </a:solidFill>
+          </a:ln>
+        </p:spPr>
+        <p:style>
+          <a:lnRef idx="2">
+            <a:schemeClr val="accent1">
+              <a:shade val="50000"/>
+            </a:schemeClr>
+          </a:lnRef>
+          <a:fillRef idx="1">
+            <a:schemeClr val="accent1"/>
+          </a:fillRef>
+          <a:effectRef idx="0">
+            <a:schemeClr val="accent1"/>
+          </a:effectRef>
+          <a:fontRef idx="minor">
+            <a:schemeClr val="lt1"/>
+          </a:fontRef>
+        </p:style>
+        <p:txBody>
+          <a:bodyPr rtlCol="0" anchor="ctr"/>
+          <a:lstStyle/>
+          <a:p>
+            <a:pPr algn="ctr"/>
+            <a:endParaRPr lang="en-US"/>
+          </a:p>
+        </p:txBody>
+      </p:sp>
+      <p:sp>
+        <p:nvSpPr>
+          <p:cNvPr id="19" name="Right Arrow 18"/>
+          <p:cNvSpPr/>
+          <p:nvPr/>
+        </p:nvSpPr>
+        <p:spPr>
+          <a:xfrm>
+            <a:off x="9514100" y="1599660"/>
+            <a:ext cx="497940" cy="316872"/>
+          </a:xfrm>
+          <a:prstGeom prst="rightArrow">
+            <a:avLst/>
+          </a:prstGeom>
+          <a:solidFill>
+            <a:schemeClr val="tx1"/>
+          </a:solidFill>
+          <a:ln>
+            <a:solidFill>
+              <a:schemeClr val="tx1"/>
+            </a:solidFill>
+          </a:ln>
+        </p:spPr>
+        <p:style>
+          <a:lnRef idx="2">
+            <a:schemeClr val="accent1">
+              <a:shade val="50000"/>
+            </a:schemeClr>
+          </a:lnRef>
+          <a:fillRef idx="1">
+            <a:schemeClr val="accent1"/>
+          </a:fillRef>
+          <a:effectRef idx="0">
+            <a:schemeClr val="accent1"/>
+          </a:effectRef>
+          <a:fontRef idx="minor">
+            <a:schemeClr val="lt1"/>
+          </a:fontRef>
+        </p:style>
+        <p:txBody>
+          <a:bodyPr rtlCol="0" anchor="ctr"/>
+          <a:lstStyle/>
+          <a:p>
+            <a:pPr algn="ctr"/>
+            <a:endParaRPr lang="en-US"/>
+          </a:p>
+        </p:txBody>
+      </p:sp>
+      <p:sp>
+        <p:nvSpPr>
+          <p:cNvPr id="20" name="TextBox 19"/>
+          <p:cNvSpPr txBox="1"/>
+          <p:nvPr/>
+        </p:nvSpPr>
+        <p:spPr>
+          <a:xfrm>
+            <a:off x="10012040" y="1573430"/>
+            <a:ext cx="1118063" cy="369332"/>
+          </a:xfrm>
+          <a:prstGeom prst="rect">
+            <a:avLst/>
+          </a:prstGeom>
+          <a:noFill/>
+        </p:spPr>
+        <p:txBody>
+          <a:bodyPr wrap="none" rtlCol="0">
+            <a:spAutoFit/>
+          </a:bodyPr>
+          <a:lstStyle/>
+          <a:p>
+            <a:r>
+              <a:rPr lang="en-US" smtClean="0"/>
+              <a:t>OSR entry</a:t>
+            </a:r>
+            <a:endParaRPr lang="en-US"/>
+          </a:p>
+        </p:txBody>
+      </p:sp>
+      <p:sp>
+        <p:nvSpPr>
+          <p:cNvPr id="21" name="Curved Down Arrow 20"/>
+          <p:cNvSpPr/>
+          <p:nvPr/>
+        </p:nvSpPr>
+        <p:spPr>
+          <a:xfrm rot="10800000">
+            <a:off x="3798497" y="2417270"/>
+            <a:ext cx="4760987" cy="1083871"/>
+          </a:xfrm>
+          <a:prstGeom prst="curvedDownArrow">
+            <a:avLst>
+              <a:gd name="adj1" fmla="val 25000"/>
+              <a:gd name="adj2" fmla="val 47777"/>
+              <a:gd name="adj3" fmla="val 25000"/>
+            </a:avLst>
+          </a:prstGeom>
+          <a:solidFill>
+            <a:schemeClr val="tx1"/>
+          </a:solidFill>
+          <a:ln>
+            <a:solidFill>
+              <a:schemeClr val="tx1"/>
+            </a:solidFill>
+          </a:ln>
+        </p:spPr>
+        <p:style>
+          <a:lnRef idx="2">
+            <a:schemeClr val="accent1">
+              <a:shade val="50000"/>
+            </a:schemeClr>
+          </a:lnRef>
+          <a:fillRef idx="1">
+            <a:schemeClr val="accent1"/>
+          </a:fillRef>
+          <a:effectRef idx="0">
+            <a:schemeClr val="accent1"/>
+          </a:effectRef>
+          <a:fontRef idx="minor">
+            <a:schemeClr val="lt1"/>
+          </a:fontRef>
+        </p:style>
+        <p:txBody>
+          <a:bodyPr rtlCol="0" anchor="ctr"/>
+          <a:lstStyle/>
+          <a:p>
+            <a:pPr algn="ctr"/>
+            <a:endParaRPr lang="en-US">
+              <a:solidFill>
+                <a:schemeClr val="tx1"/>
+              </a:solidFill>
+            </a:endParaRPr>
+          </a:p>
+        </p:txBody>
+      </p:sp>
+      <p:sp>
+        <p:nvSpPr>
+          <p:cNvPr id="23" name="Curved Left Arrow 22"/>
+          <p:cNvSpPr/>
+          <p:nvPr/>
+        </p:nvSpPr>
+        <p:spPr>
+          <a:xfrm rot="5400000">
+            <a:off x="7244284" y="2057567"/>
+            <a:ext cx="591493" cy="1294643"/>
+          </a:xfrm>
+          <a:prstGeom prst="curvedLeftArrow">
+            <a:avLst/>
+          </a:prstGeom>
+          <a:solidFill>
+            <a:schemeClr val="tx1"/>
+          </a:solidFill>
+          <a:ln>
+            <a:solidFill>
+              <a:schemeClr val="tx1"/>
+            </a:solidFill>
+          </a:ln>
+        </p:spPr>
+        <p:style>
+          <a:lnRef idx="2">
+            <a:schemeClr val="accent1">
+              <a:shade val="50000"/>
+            </a:schemeClr>
+          </a:lnRef>
+          <a:fillRef idx="1">
+            <a:schemeClr val="accent1"/>
+          </a:fillRef>
+          <a:effectRef idx="0">
+            <a:schemeClr val="accent1"/>
+          </a:effectRef>
+          <a:fontRef idx="minor">
+            <a:schemeClr val="lt1"/>
+          </a:fontRef>
+        </p:style>
+        <p:txBody>
+          <a:bodyPr rtlCol="0" anchor="ctr"/>
+          <a:lstStyle/>
+          <a:p>
+            <a:pPr algn="ctr"/>
+            <a:endParaRPr lang="en-US">
+              <a:solidFill>
+                <a:schemeClr val="tx1"/>
+              </a:solidFill>
+            </a:endParaRPr>
+          </a:p>
+        </p:txBody>
+      </p:sp>
+      <p:sp>
+        <p:nvSpPr>
+          <p:cNvPr id="24" name="Curved Right Arrow 23"/>
+          <p:cNvSpPr/>
+          <p:nvPr/>
+        </p:nvSpPr>
+        <p:spPr>
+          <a:xfrm rot="5400000">
+            <a:off x="4563518" y="-2299015"/>
+            <a:ext cx="668814" cy="7097917"/>
+          </a:xfrm>
+          <a:prstGeom prst="curvedRightArrow">
+            <a:avLst/>
+          </a:prstGeom>
+          <a:solidFill>
+            <a:schemeClr val="tx1"/>
+          </a:solidFill>
+          <a:ln>
+            <a:solidFill>
+              <a:schemeClr val="tx1"/>
+            </a:solidFill>
+          </a:ln>
+        </p:spPr>
+        <p:style>
+          <a:lnRef idx="2">
+            <a:schemeClr val="accent1">
+              <a:shade val="50000"/>
+            </a:schemeClr>
+          </a:lnRef>
+          <a:fillRef idx="1">
+            <a:schemeClr val="accent1"/>
+          </a:fillRef>
+          <a:effectRef idx="0">
+            <a:schemeClr val="accent1"/>
+          </a:effectRef>
+          <a:fontRef idx="minor">
+            <a:schemeClr val="lt1"/>
+          </a:fontRef>
+        </p:style>
+        <p:txBody>
+          <a:bodyPr rtlCol="0" anchor="ctr"/>
+          <a:lstStyle/>
+          <a:p>
+            <a:pPr algn="ctr"/>
+            <a:endParaRPr lang="en-US">
+              <a:solidFill>
+                <a:schemeClr val="tx1"/>
+              </a:solidFill>
+            </a:endParaRPr>
+          </a:p>
+        </p:txBody>
+      </p:sp>
+      <p:sp>
+        <p:nvSpPr>
+          <p:cNvPr id="28" name="Curved Left Arrow 27"/>
+          <p:cNvSpPr/>
+          <p:nvPr/>
+        </p:nvSpPr>
+        <p:spPr>
+          <a:xfrm rot="5400000">
+            <a:off x="9482140" y="2049619"/>
+            <a:ext cx="497940" cy="561860"/>
+          </a:xfrm>
+          <a:prstGeom prst="curvedLeftArrow">
+            <a:avLst/>
+          </a:prstGeom>
+          <a:solidFill>
+            <a:schemeClr val="tx1"/>
+          </a:solidFill>
+          <a:ln>
+            <a:solidFill>
+              <a:schemeClr val="tx1"/>
+            </a:solidFill>
+          </a:ln>
+        </p:spPr>
+        <p:style>
+          <a:lnRef idx="2">
+            <a:schemeClr val="accent1">
+              <a:shade val="50000"/>
+            </a:schemeClr>
+          </a:lnRef>
+          <a:fillRef idx="1">
+            <a:schemeClr val="accent1"/>
+          </a:fillRef>
+          <a:effectRef idx="0">
+            <a:schemeClr val="accent1"/>
+          </a:effectRef>
+          <a:fontRef idx="minor">
+            <a:schemeClr val="lt1"/>
+          </a:fontRef>
+        </p:style>
+        <p:txBody>
+          <a:bodyPr rtlCol="0" anchor="ctr"/>
+          <a:lstStyle/>
+          <a:p>
+            <a:pPr algn="ctr"/>
+            <a:endParaRPr lang="en-US">
+              <a:solidFill>
+                <a:schemeClr val="tx1"/>
+              </a:solidFill>
+            </a:endParaRPr>
+          </a:p>
+        </p:txBody>
+      </p:sp>
+      <p:sp>
+        <p:nvSpPr>
+          <p:cNvPr id="29" name="TextBox 28"/>
+          <p:cNvSpPr txBox="1"/>
+          <p:nvPr/>
+        </p:nvSpPr>
+        <p:spPr>
+          <a:xfrm>
+            <a:off x="10012040" y="2172255"/>
+            <a:ext cx="961866" cy="369332"/>
+          </a:xfrm>
+          <a:prstGeom prst="rect">
+            <a:avLst/>
+          </a:prstGeom>
+          <a:noFill/>
+        </p:spPr>
+        <p:txBody>
+          <a:bodyPr wrap="none" rtlCol="0">
+            <a:spAutoFit/>
+          </a:bodyPr>
+          <a:lstStyle/>
+          <a:p>
+            <a:r>
+              <a:rPr lang="en-US" smtClean="0"/>
+              <a:t>OSR exit</a:t>
+            </a:r>
+            <a:endParaRPr lang="en-US"/>
+          </a:p>
+        </p:txBody>
+      </p:sp>
+      <p:sp>
+        <p:nvSpPr>
+          <p:cNvPr id="30" name="TextBox 29"/>
+          <p:cNvSpPr txBox="1"/>
+          <p:nvPr/>
+        </p:nvSpPr>
+        <p:spPr>
+          <a:xfrm>
+            <a:off x="4897925" y="583891"/>
+            <a:ext cx="301686" cy="369332"/>
+          </a:xfrm>
+          <a:prstGeom prst="rect">
+            <a:avLst/>
+          </a:prstGeom>
+          <a:noFill/>
+        </p:spPr>
+        <p:txBody>
+          <a:bodyPr wrap="none" rtlCol="0">
+            <a:spAutoFit/>
+          </a:bodyPr>
+          <a:lstStyle/>
+          <a:p>
+            <a:r>
+              <a:rPr lang="en-US" smtClean="0"/>
+              <a:t>1</a:t>
+            </a:r>
+            <a:endParaRPr lang="en-US"/>
+          </a:p>
+        </p:txBody>
+      </p:sp>
+      <p:sp>
+        <p:nvSpPr>
+          <p:cNvPr id="32" name="TextBox 31"/>
+          <p:cNvSpPr txBox="1"/>
+          <p:nvPr/>
+        </p:nvSpPr>
+        <p:spPr>
+          <a:xfrm>
+            <a:off x="6114361" y="3183880"/>
+            <a:ext cx="301686" cy="369332"/>
+          </a:xfrm>
+          <a:prstGeom prst="rect">
+            <a:avLst/>
+          </a:prstGeom>
+          <a:noFill/>
+        </p:spPr>
+        <p:txBody>
+          <a:bodyPr wrap="none" rtlCol="0">
+            <a:spAutoFit/>
+          </a:bodyPr>
+          <a:lstStyle/>
+          <a:p>
+            <a:r>
+              <a:rPr lang="en-US" smtClean="0"/>
+              <a:t>2</a:t>
+            </a:r>
+            <a:endParaRPr lang="en-US"/>
+          </a:p>
+        </p:txBody>
+      </p:sp>
+      <p:sp>
+        <p:nvSpPr>
+          <p:cNvPr id="33" name="TextBox 32"/>
+          <p:cNvSpPr txBox="1"/>
+          <p:nvPr/>
+        </p:nvSpPr>
+        <p:spPr>
+          <a:xfrm>
+            <a:off x="7436384" y="2655064"/>
+            <a:ext cx="301686" cy="369332"/>
+          </a:xfrm>
+          <a:prstGeom prst="rect">
+            <a:avLst/>
+          </a:prstGeom>
+          <a:noFill/>
+        </p:spPr>
+        <p:txBody>
+          <a:bodyPr wrap="none" rtlCol="0">
+            <a:spAutoFit/>
+          </a:bodyPr>
+          <a:lstStyle/>
+          <a:p>
+            <a:r>
+              <a:rPr lang="en-US" smtClean="0"/>
+              <a:t>3</a:t>
+            </a:r>
+            <a:endParaRPr lang="en-US"/>
+          </a:p>
+        </p:txBody>
+      </p:sp>
+      <p:sp>
+        <p:nvSpPr>
+          <p:cNvPr id="4" name="TextBox 3"/>
+          <p:cNvSpPr txBox="1"/>
+          <p:nvPr/>
+        </p:nvSpPr>
+        <p:spPr>
+          <a:xfrm>
+            <a:off x="6274821" y="1821904"/>
+            <a:ext cx="984180" cy="861774"/>
+          </a:xfrm>
+          <a:prstGeom prst="rect">
+            <a:avLst/>
+          </a:prstGeom>
+          <a:noFill/>
+        </p:spPr>
+        <p:txBody>
+          <a:bodyPr wrap="none" rtlCol="0">
+            <a:spAutoFit/>
+          </a:bodyPr>
+          <a:lstStyle/>
+          <a:p>
+            <a:pPr algn="ctr"/>
+            <a:r>
+              <a:rPr lang="en-US" sz="1400" dirty="0"/>
+              <a:t>O2(O1(f))</a:t>
+            </a:r>
+          </a:p>
+          <a:p>
+            <a:pPr algn="ctr"/>
+            <a:endParaRPr lang="en-US" dirty="0"/>
+          </a:p>
+          <a:p>
+            <a:endParaRPr lang="en-US" dirty="0"/>
+          </a:p>
+        </p:txBody>
+      </p:sp>
+      <p:sp>
+        <p:nvSpPr>
+          <p:cNvPr id="5" name="TextBox 4"/>
+          <p:cNvSpPr txBox="1"/>
+          <p:nvPr/>
+        </p:nvSpPr>
+        <p:spPr>
+          <a:xfrm>
+            <a:off x="7825544" y="1811809"/>
+            <a:ext cx="1198661" cy="307777"/>
+          </a:xfrm>
+          <a:prstGeom prst="rect">
+            <a:avLst/>
+          </a:prstGeom>
+          <a:noFill/>
+        </p:spPr>
+        <p:txBody>
+          <a:bodyPr wrap="none" rtlCol="0">
+            <a:spAutoFit/>
+          </a:bodyPr>
+          <a:lstStyle/>
+          <a:p>
+            <a:r>
+              <a:rPr lang="en-US" sz="1400" dirty="0"/>
+              <a:t>O3(O2(O1(f)))</a:t>
+            </a:r>
           </a:p>
         </p:txBody>
       </p:sp>

</xml_diff>

<commit_message>
Adding figures to chapter4
</commit_message>
<xml_diff>
--- a/MasterThesis/Figures/holzle.pptx
+++ b/MasterThesis/Figures/holzle.pptx
@@ -17,6 +17,7 @@
     <p:sldId id="266" r:id="rId11"/>
     <p:sldId id="265" r:id="rId12"/>
     <p:sldId id="267" r:id="rId13"/>
+    <p:sldId id="268" r:id="rId14"/>
   </p:sldIdLst>
   <p:sldSz cx="12192000" cy="6858000"/>
   <p:notesSz cx="6858000" cy="9144000"/>
@@ -254,7 +255,7 @@
           <a:p>
             <a:fld id="{39514751-6C89-194E-A652-4BD3C8EB45FC}" type="datetimeFigureOut">
               <a:rPr lang="en-US" smtClean="0"/>
-              <a:t>1/28/16</a:t>
+              <a:t>2/1/16</a:t>
             </a:fld>
             <a:endParaRPr lang="en-US"/>
           </a:p>
@@ -424,7 +425,7 @@
           <a:p>
             <a:fld id="{39514751-6C89-194E-A652-4BD3C8EB45FC}" type="datetimeFigureOut">
               <a:rPr lang="en-US" smtClean="0"/>
-              <a:t>1/28/16</a:t>
+              <a:t>2/1/16</a:t>
             </a:fld>
             <a:endParaRPr lang="en-US"/>
           </a:p>
@@ -604,7 +605,7 @@
           <a:p>
             <a:fld id="{39514751-6C89-194E-A652-4BD3C8EB45FC}" type="datetimeFigureOut">
               <a:rPr lang="en-US" smtClean="0"/>
-              <a:t>1/28/16</a:t>
+              <a:t>2/1/16</a:t>
             </a:fld>
             <a:endParaRPr lang="en-US"/>
           </a:p>
@@ -774,7 +775,7 @@
           <a:p>
             <a:fld id="{39514751-6C89-194E-A652-4BD3C8EB45FC}" type="datetimeFigureOut">
               <a:rPr lang="en-US" smtClean="0"/>
-              <a:t>1/28/16</a:t>
+              <a:t>2/1/16</a:t>
             </a:fld>
             <a:endParaRPr lang="en-US"/>
           </a:p>
@@ -1020,7 +1021,7 @@
           <a:p>
             <a:fld id="{39514751-6C89-194E-A652-4BD3C8EB45FC}" type="datetimeFigureOut">
               <a:rPr lang="en-US" smtClean="0"/>
-              <a:t>1/28/16</a:t>
+              <a:t>2/1/16</a:t>
             </a:fld>
             <a:endParaRPr lang="en-US"/>
           </a:p>
@@ -1252,7 +1253,7 @@
           <a:p>
             <a:fld id="{39514751-6C89-194E-A652-4BD3C8EB45FC}" type="datetimeFigureOut">
               <a:rPr lang="en-US" smtClean="0"/>
-              <a:t>1/28/16</a:t>
+              <a:t>2/1/16</a:t>
             </a:fld>
             <a:endParaRPr lang="en-US"/>
           </a:p>
@@ -1619,7 +1620,7 @@
           <a:p>
             <a:fld id="{39514751-6C89-194E-A652-4BD3C8EB45FC}" type="datetimeFigureOut">
               <a:rPr lang="en-US" smtClean="0"/>
-              <a:t>1/28/16</a:t>
+              <a:t>2/1/16</a:t>
             </a:fld>
             <a:endParaRPr lang="en-US"/>
           </a:p>
@@ -1737,7 +1738,7 @@
           <a:p>
             <a:fld id="{39514751-6C89-194E-A652-4BD3C8EB45FC}" type="datetimeFigureOut">
               <a:rPr lang="en-US" smtClean="0"/>
-              <a:t>1/28/16</a:t>
+              <a:t>2/1/16</a:t>
             </a:fld>
             <a:endParaRPr lang="en-US"/>
           </a:p>
@@ -1832,7 +1833,7 @@
           <a:p>
             <a:fld id="{39514751-6C89-194E-A652-4BD3C8EB45FC}" type="datetimeFigureOut">
               <a:rPr lang="en-US" smtClean="0"/>
-              <a:t>1/28/16</a:t>
+              <a:t>2/1/16</a:t>
             </a:fld>
             <a:endParaRPr lang="en-US"/>
           </a:p>
@@ -2109,7 +2110,7 @@
           <a:p>
             <a:fld id="{39514751-6C89-194E-A652-4BD3C8EB45FC}" type="datetimeFigureOut">
               <a:rPr lang="en-US" smtClean="0"/>
-              <a:t>1/28/16</a:t>
+              <a:t>2/1/16</a:t>
             </a:fld>
             <a:endParaRPr lang="en-US"/>
           </a:p>
@@ -2362,7 +2363,7 @@
           <a:p>
             <a:fld id="{39514751-6C89-194E-A652-4BD3C8EB45FC}" type="datetimeFigureOut">
               <a:rPr lang="en-US" smtClean="0"/>
-              <a:t>1/28/16</a:t>
+              <a:t>2/1/16</a:t>
             </a:fld>
             <a:endParaRPr lang="en-US"/>
           </a:p>
@@ -2575,7 +2576,7 @@
           <a:p>
             <a:fld id="{39514751-6C89-194E-A652-4BD3C8EB45FC}" type="datetimeFigureOut">
               <a:rPr lang="en-US" smtClean="0"/>
-              <a:t>1/28/16</a:t>
+              <a:t>2/1/16</a:t>
             </a:fld>
             <a:endParaRPr lang="en-US"/>
           </a:p>
@@ -6497,6 +6498,833 @@
 </p:sld>
 </file>
 
+<file path=ppt/slides/slide13.xml><?xml version="1.0" encoding="utf-8"?>
+<p:sld xmlns:a="http://schemas.openxmlformats.org/drawingml/2006/main" xmlns:r="http://schemas.openxmlformats.org/officeDocument/2006/relationships" xmlns:p="http://schemas.openxmlformats.org/presentationml/2006/main">
+  <p:cSld>
+    <p:spTree>
+      <p:nvGrpSpPr>
+        <p:cNvPr id="1" name=""/>
+        <p:cNvGrpSpPr/>
+        <p:nvPr/>
+      </p:nvGrpSpPr>
+      <p:grpSpPr>
+        <a:xfrm>
+          <a:off x="0" y="0"/>
+          <a:ext cx="0" cy="0"/>
+          <a:chOff x="0" y="0"/>
+          <a:chExt cx="0" cy="0"/>
+        </a:xfrm>
+      </p:grpSpPr>
+      <p:sp>
+        <p:nvSpPr>
+          <p:cNvPr id="4" name="Rectangle 3"/>
+          <p:cNvSpPr/>
+          <p:nvPr/>
+        </p:nvSpPr>
+        <p:spPr>
+          <a:xfrm>
+            <a:off x="887240" y="1240325"/>
+            <a:ext cx="4011033" cy="2181885"/>
+          </a:xfrm>
+          <a:prstGeom prst="rect">
+            <a:avLst/>
+          </a:prstGeom>
+          <a:solidFill>
+            <a:schemeClr val="bg1"/>
+          </a:solidFill>
+          <a:ln>
+            <a:solidFill>
+              <a:schemeClr val="tx1"/>
+            </a:solidFill>
+          </a:ln>
+        </p:spPr>
+        <p:style>
+          <a:lnRef idx="2">
+            <a:schemeClr val="accent1">
+              <a:shade val="50000"/>
+            </a:schemeClr>
+          </a:lnRef>
+          <a:fillRef idx="1">
+            <a:schemeClr val="accent1"/>
+          </a:fillRef>
+          <a:effectRef idx="0">
+            <a:schemeClr val="accent1"/>
+          </a:effectRef>
+          <a:fontRef idx="minor">
+            <a:schemeClr val="lt1"/>
+          </a:fontRef>
+        </p:style>
+        <p:txBody>
+          <a:bodyPr rtlCol="0" anchor="ctr"/>
+          <a:lstStyle/>
+          <a:p>
+            <a:endParaRPr lang="en-US">
+              <a:solidFill>
+                <a:schemeClr val="tx1"/>
+              </a:solidFill>
+            </a:endParaRPr>
+          </a:p>
+        </p:txBody>
+      </p:sp>
+      <p:sp>
+        <p:nvSpPr>
+          <p:cNvPr id="5" name="Rectangle 4"/>
+          <p:cNvSpPr/>
+          <p:nvPr/>
+        </p:nvSpPr>
+        <p:spPr>
+          <a:xfrm>
+            <a:off x="6218223" y="1240325"/>
+            <a:ext cx="2653290" cy="2181885"/>
+          </a:xfrm>
+          <a:prstGeom prst="rect">
+            <a:avLst/>
+          </a:prstGeom>
+          <a:solidFill>
+            <a:schemeClr val="bg1"/>
+          </a:solidFill>
+          <a:ln>
+            <a:solidFill>
+              <a:schemeClr val="tx1"/>
+            </a:solidFill>
+          </a:ln>
+        </p:spPr>
+        <p:style>
+          <a:lnRef idx="2">
+            <a:schemeClr val="accent1">
+              <a:shade val="50000"/>
+            </a:schemeClr>
+          </a:lnRef>
+          <a:fillRef idx="1">
+            <a:schemeClr val="accent1"/>
+          </a:fillRef>
+          <a:effectRef idx="0">
+            <a:schemeClr val="accent1"/>
+          </a:effectRef>
+          <a:fontRef idx="minor">
+            <a:schemeClr val="lt1"/>
+          </a:fontRef>
+        </p:style>
+        <p:txBody>
+          <a:bodyPr rtlCol="0" anchor="ctr"/>
+          <a:lstStyle/>
+          <a:p>
+            <a:pPr algn="ctr"/>
+            <a:endParaRPr lang="en-US">
+              <a:solidFill>
+                <a:schemeClr val="tx1"/>
+              </a:solidFill>
+            </a:endParaRPr>
+          </a:p>
+        </p:txBody>
+      </p:sp>
+      <p:sp>
+        <p:nvSpPr>
+          <p:cNvPr id="6" name="TextBox 5"/>
+          <p:cNvSpPr txBox="1"/>
+          <p:nvPr/>
+        </p:nvSpPr>
+        <p:spPr>
+          <a:xfrm>
+            <a:off x="887240" y="1240324"/>
+            <a:ext cx="4011034" cy="1569660"/>
+          </a:xfrm>
+          <a:prstGeom prst="rect">
+            <a:avLst/>
+          </a:prstGeom>
+          <a:noFill/>
+        </p:spPr>
+        <p:txBody>
+          <a:bodyPr wrap="none" rtlCol="0">
+            <a:spAutoFit/>
+          </a:bodyPr>
+          <a:lstStyle/>
+          <a:p>
+            <a:r>
+              <a:rPr lang="en-US" sz="1600" dirty="0" err="1">
+                <a:latin typeface="Courier New" charset="0"/>
+                <a:ea typeface="Courier New" charset="0"/>
+                <a:cs typeface="Courier New" charset="0"/>
+              </a:rPr>
+              <a:t>f</a:t>
+            </a:r>
+            <a:r>
+              <a:rPr lang="en-US" sz="1600" dirty="0" err="1" smtClean="0">
+                <a:latin typeface="Courier New" charset="0"/>
+                <a:ea typeface="Courier New" charset="0"/>
+                <a:cs typeface="Courier New" charset="0"/>
+              </a:rPr>
+              <a:t>_from</a:t>
+            </a:r>
+            <a:r>
+              <a:rPr lang="en-US" sz="1600" dirty="0" smtClean="0">
+                <a:latin typeface="Courier New" charset="0"/>
+                <a:ea typeface="Courier New" charset="0"/>
+                <a:cs typeface="Courier New" charset="0"/>
+              </a:rPr>
+              <a:t>(</a:t>
+            </a:r>
+            <a:r>
+              <a:rPr lang="en-US" sz="1600" dirty="0" err="1" smtClean="0">
+                <a:latin typeface="Courier New" charset="0"/>
+                <a:ea typeface="Courier New" charset="0"/>
+                <a:cs typeface="Courier New" charset="0"/>
+              </a:rPr>
+              <a:t>param</a:t>
+            </a:r>
+            <a:r>
+              <a:rPr lang="en-US" sz="1600" dirty="0" smtClean="0">
+                <a:latin typeface="Courier New" charset="0"/>
+                <a:ea typeface="Courier New" charset="0"/>
+                <a:cs typeface="Courier New" charset="0"/>
+              </a:rPr>
+              <a:t>){</a:t>
+            </a:r>
+          </a:p>
+          <a:p>
+            <a:r>
+              <a:rPr lang="en-US" sz="1600" dirty="0">
+                <a:latin typeface="Courier New" charset="0"/>
+                <a:ea typeface="Courier New" charset="0"/>
+                <a:cs typeface="Courier New" charset="0"/>
+              </a:rPr>
+              <a:t> </a:t>
+            </a:r>
+            <a:r>
+              <a:rPr lang="en-US" sz="1600" dirty="0" smtClean="0">
+                <a:latin typeface="Courier New" charset="0"/>
+                <a:ea typeface="Courier New" charset="0"/>
+                <a:cs typeface="Courier New" charset="0"/>
+              </a:rPr>
+              <a:t>  A</a:t>
+            </a:r>
+          </a:p>
+          <a:p>
+            <a:r>
+              <a:rPr lang="en-US" sz="1600" dirty="0" smtClean="0">
+                <a:latin typeface="Courier New" charset="0"/>
+                <a:ea typeface="Courier New" charset="0"/>
+                <a:cs typeface="Courier New" charset="0"/>
+              </a:rPr>
+              <a:t>L: if(</a:t>
+            </a:r>
+            <a:r>
+              <a:rPr lang="en-US" sz="1600" dirty="0" err="1" smtClean="0">
+                <a:latin typeface="Courier New" charset="0"/>
+                <a:ea typeface="Courier New" charset="0"/>
+                <a:cs typeface="Courier New" charset="0"/>
+              </a:rPr>
+              <a:t>osr_cond</a:t>
+            </a:r>
+            <a:r>
+              <a:rPr lang="en-US" sz="1600" dirty="0" smtClean="0">
+                <a:latin typeface="Courier New" charset="0"/>
+                <a:ea typeface="Courier New" charset="0"/>
+                <a:cs typeface="Courier New" charset="0"/>
+              </a:rPr>
+              <a:t>)</a:t>
+            </a:r>
+          </a:p>
+          <a:p>
+            <a:r>
+              <a:rPr lang="en-US" sz="1600" dirty="0">
+                <a:latin typeface="Courier New" charset="0"/>
+                <a:ea typeface="Courier New" charset="0"/>
+                <a:cs typeface="Courier New" charset="0"/>
+              </a:rPr>
+              <a:t> </a:t>
+            </a:r>
+            <a:r>
+              <a:rPr lang="en-US" sz="1600" dirty="0" smtClean="0">
+                <a:latin typeface="Courier New" charset="0"/>
+                <a:ea typeface="Courier New" charset="0"/>
+                <a:cs typeface="Courier New" charset="0"/>
+              </a:rPr>
+              <a:t>    return </a:t>
+            </a:r>
+            <a:r>
+              <a:rPr lang="en-US" sz="1600" dirty="0" err="1" smtClean="0">
+                <a:latin typeface="Courier New" charset="0"/>
+                <a:ea typeface="Courier New" charset="0"/>
+                <a:cs typeface="Courier New" charset="0"/>
+              </a:rPr>
+              <a:t>f_cont</a:t>
+            </a:r>
+            <a:r>
+              <a:rPr lang="en-US" sz="1600" dirty="0" smtClean="0">
+                <a:latin typeface="Courier New" charset="0"/>
+                <a:ea typeface="Courier New" charset="0"/>
+                <a:cs typeface="Courier New" charset="0"/>
+              </a:rPr>
+              <a:t>(live </a:t>
+            </a:r>
+            <a:r>
+              <a:rPr lang="en-US" sz="1600" dirty="0" err="1" smtClean="0">
+                <a:latin typeface="Courier New" charset="0"/>
+                <a:ea typeface="Courier New" charset="0"/>
+                <a:cs typeface="Courier New" charset="0"/>
+              </a:rPr>
+              <a:t>vars@L</a:t>
+            </a:r>
+            <a:r>
+              <a:rPr lang="en-US" sz="1600" dirty="0" smtClean="0">
+                <a:latin typeface="Courier New" charset="0"/>
+                <a:ea typeface="Courier New" charset="0"/>
+                <a:cs typeface="Courier New" charset="0"/>
+              </a:rPr>
+              <a:t>)</a:t>
+            </a:r>
+            <a:endParaRPr lang="en-US" sz="1600" dirty="0">
+              <a:latin typeface="Courier New" charset="0"/>
+              <a:ea typeface="Courier New" charset="0"/>
+              <a:cs typeface="Courier New" charset="0"/>
+            </a:endParaRPr>
+          </a:p>
+          <a:p>
+            <a:r>
+              <a:rPr lang="en-US" sz="1600" dirty="0">
+                <a:latin typeface="Courier New" charset="0"/>
+                <a:ea typeface="Courier New" charset="0"/>
+                <a:cs typeface="Courier New" charset="0"/>
+              </a:rPr>
+              <a:t> </a:t>
+            </a:r>
+            <a:r>
+              <a:rPr lang="en-US" sz="1600" dirty="0" smtClean="0">
+                <a:latin typeface="Courier New" charset="0"/>
+                <a:ea typeface="Courier New" charset="0"/>
+                <a:cs typeface="Courier New" charset="0"/>
+              </a:rPr>
+              <a:t>  B</a:t>
+            </a:r>
+          </a:p>
+          <a:p>
+            <a:r>
+              <a:rPr lang="en-US" sz="1600" dirty="0" smtClean="0">
+                <a:latin typeface="Courier New" charset="0"/>
+                <a:ea typeface="Courier New" charset="0"/>
+                <a:cs typeface="Courier New" charset="0"/>
+              </a:rPr>
+              <a:t>}</a:t>
+            </a:r>
+            <a:endParaRPr lang="en-US" sz="1600" dirty="0">
+              <a:latin typeface="Courier New" charset="0"/>
+              <a:ea typeface="Courier New" charset="0"/>
+              <a:cs typeface="Courier New" charset="0"/>
+            </a:endParaRPr>
+          </a:p>
+        </p:txBody>
+      </p:sp>
+      <p:sp>
+        <p:nvSpPr>
+          <p:cNvPr id="7" name="TextBox 6"/>
+          <p:cNvSpPr txBox="1"/>
+          <p:nvPr/>
+        </p:nvSpPr>
+        <p:spPr>
+          <a:xfrm>
+            <a:off x="6218223" y="1240324"/>
+            <a:ext cx="2653290" cy="1815882"/>
+          </a:xfrm>
+          <a:prstGeom prst="rect">
+            <a:avLst/>
+          </a:prstGeom>
+          <a:noFill/>
+        </p:spPr>
+        <p:txBody>
+          <a:bodyPr wrap="none" rtlCol="0">
+            <a:spAutoFit/>
+          </a:bodyPr>
+          <a:lstStyle/>
+          <a:p>
+            <a:r>
+              <a:rPr lang="en-US" sz="1600" dirty="0" err="1" smtClean="0">
+                <a:latin typeface="Courier New" charset="0"/>
+                <a:ea typeface="Courier New" charset="0"/>
+                <a:cs typeface="Courier New" charset="0"/>
+              </a:rPr>
+              <a:t>f_cont</a:t>
+            </a:r>
+            <a:r>
+              <a:rPr lang="en-US" sz="1600" dirty="0" smtClean="0">
+                <a:latin typeface="Courier New" charset="0"/>
+                <a:ea typeface="Courier New" charset="0"/>
+                <a:cs typeface="Courier New" charset="0"/>
+              </a:rPr>
+              <a:t>(live </a:t>
+            </a:r>
+            <a:r>
+              <a:rPr lang="en-US" sz="1600" dirty="0" err="1" smtClean="0">
+                <a:latin typeface="Courier New" charset="0"/>
+                <a:ea typeface="Courier New" charset="0"/>
+                <a:cs typeface="Courier New" charset="0"/>
+              </a:rPr>
+              <a:t>vars@L</a:t>
+            </a:r>
+            <a:r>
+              <a:rPr lang="en-US" sz="1600" dirty="0" smtClean="0">
+                <a:latin typeface="Courier New" charset="0"/>
+                <a:ea typeface="Courier New" charset="0"/>
+                <a:cs typeface="Courier New" charset="0"/>
+              </a:rPr>
+              <a:t>){</a:t>
+            </a:r>
+          </a:p>
+          <a:p>
+            <a:r>
+              <a:rPr lang="en-US" sz="1600" dirty="0">
+                <a:latin typeface="Courier New" charset="0"/>
+                <a:ea typeface="Courier New" charset="0"/>
+                <a:cs typeface="Courier New" charset="0"/>
+              </a:rPr>
+              <a:t> </a:t>
+            </a:r>
+            <a:r>
+              <a:rPr lang="en-US" sz="1600" dirty="0" smtClean="0">
+                <a:latin typeface="Courier New" charset="0"/>
+                <a:ea typeface="Courier New" charset="0"/>
+                <a:cs typeface="Courier New" charset="0"/>
+              </a:rPr>
+              <a:t>   </a:t>
+            </a:r>
+            <a:r>
+              <a:rPr lang="en-US" sz="1600" dirty="0" err="1" smtClean="0">
+                <a:latin typeface="Courier New" charset="0"/>
+                <a:ea typeface="Courier New" charset="0"/>
+                <a:cs typeface="Courier New" charset="0"/>
+              </a:rPr>
+              <a:t>comp_code</a:t>
+            </a:r>
+            <a:endParaRPr lang="en-US" sz="1600" dirty="0" smtClean="0">
+              <a:latin typeface="Courier New" charset="0"/>
+              <a:ea typeface="Courier New" charset="0"/>
+              <a:cs typeface="Courier New" charset="0"/>
+            </a:endParaRPr>
+          </a:p>
+          <a:p>
+            <a:r>
+              <a:rPr lang="en-US" sz="1600" dirty="0">
+                <a:latin typeface="Courier New" charset="0"/>
+                <a:ea typeface="Courier New" charset="0"/>
+                <a:cs typeface="Courier New" charset="0"/>
+              </a:rPr>
+              <a:t> </a:t>
+            </a:r>
+            <a:r>
+              <a:rPr lang="en-US" sz="1600" dirty="0" smtClean="0">
+                <a:latin typeface="Courier New" charset="0"/>
+                <a:ea typeface="Courier New" charset="0"/>
+                <a:cs typeface="Courier New" charset="0"/>
+              </a:rPr>
+              <a:t>   </a:t>
+            </a:r>
+            <a:r>
+              <a:rPr lang="en-US" sz="1600" dirty="0" err="1" smtClean="0">
+                <a:latin typeface="Courier New" charset="0"/>
+                <a:ea typeface="Courier New" charset="0"/>
+                <a:cs typeface="Courier New" charset="0"/>
+              </a:rPr>
+              <a:t>goto</a:t>
+            </a:r>
+            <a:r>
+              <a:rPr lang="en-US" sz="1600" dirty="0" smtClean="0">
+                <a:latin typeface="Courier New" charset="0"/>
+                <a:ea typeface="Courier New" charset="0"/>
+                <a:cs typeface="Courier New" charset="0"/>
+              </a:rPr>
+              <a:t> L’</a:t>
+            </a:r>
+          </a:p>
+          <a:p>
+            <a:r>
+              <a:rPr lang="en-US" sz="1600" dirty="0">
+                <a:latin typeface="Courier New" charset="0"/>
+                <a:ea typeface="Courier New" charset="0"/>
+                <a:cs typeface="Courier New" charset="0"/>
+              </a:rPr>
+              <a:t> </a:t>
+            </a:r>
+            <a:r>
+              <a:rPr lang="en-US" sz="1600" dirty="0" smtClean="0">
+                <a:latin typeface="Courier New" charset="0"/>
+                <a:ea typeface="Courier New" charset="0"/>
+                <a:cs typeface="Courier New" charset="0"/>
+              </a:rPr>
+              <a:t>   A’</a:t>
+            </a:r>
+          </a:p>
+          <a:p>
+            <a:r>
+              <a:rPr lang="en-US" sz="1600" dirty="0" smtClean="0">
+                <a:latin typeface="Courier New" charset="0"/>
+                <a:ea typeface="Courier New" charset="0"/>
+                <a:cs typeface="Courier New" charset="0"/>
+              </a:rPr>
+              <a:t>L’: </a:t>
+            </a:r>
+          </a:p>
+          <a:p>
+            <a:r>
+              <a:rPr lang="en-US" sz="1600" dirty="0">
+                <a:latin typeface="Courier New" charset="0"/>
+                <a:ea typeface="Courier New" charset="0"/>
+                <a:cs typeface="Courier New" charset="0"/>
+              </a:rPr>
+              <a:t> </a:t>
+            </a:r>
+            <a:r>
+              <a:rPr lang="en-US" sz="1600" dirty="0" smtClean="0">
+                <a:latin typeface="Courier New" charset="0"/>
+                <a:ea typeface="Courier New" charset="0"/>
+                <a:cs typeface="Courier New" charset="0"/>
+              </a:rPr>
+              <a:t>   B’</a:t>
+            </a:r>
+          </a:p>
+          <a:p>
+            <a:r>
+              <a:rPr lang="en-US" sz="1600" dirty="0" smtClean="0">
+                <a:latin typeface="Courier New" charset="0"/>
+                <a:ea typeface="Courier New" charset="0"/>
+                <a:cs typeface="Courier New" charset="0"/>
+              </a:rPr>
+              <a:t>}</a:t>
+            </a:r>
+            <a:endParaRPr lang="en-US" sz="1600" dirty="0">
+              <a:latin typeface="Courier New" charset="0"/>
+              <a:ea typeface="Courier New" charset="0"/>
+              <a:cs typeface="Courier New" charset="0"/>
+            </a:endParaRPr>
+          </a:p>
+        </p:txBody>
+      </p:sp>
+      <p:sp>
+        <p:nvSpPr>
+          <p:cNvPr id="8" name="TextBox 7"/>
+          <p:cNvSpPr txBox="1"/>
+          <p:nvPr/>
+        </p:nvSpPr>
+        <p:spPr>
+          <a:xfrm>
+            <a:off x="1878953" y="3422210"/>
+            <a:ext cx="2027606" cy="369332"/>
+          </a:xfrm>
+          <a:prstGeom prst="rect">
+            <a:avLst/>
+          </a:prstGeom>
+          <a:noFill/>
+        </p:spPr>
+        <p:txBody>
+          <a:bodyPr wrap="none" rtlCol="0">
+            <a:spAutoFit/>
+          </a:bodyPr>
+          <a:lstStyle/>
+          <a:p>
+            <a:r>
+              <a:rPr lang="en-US" dirty="0" smtClean="0"/>
+              <a:t>Base, </a:t>
+            </a:r>
+            <a:r>
+              <a:rPr lang="en-US" smtClean="0"/>
+              <a:t>from function</a:t>
+            </a:r>
+            <a:endParaRPr lang="en-US"/>
+          </a:p>
+        </p:txBody>
+      </p:sp>
+      <p:sp>
+        <p:nvSpPr>
+          <p:cNvPr id="9" name="TextBox 8"/>
+          <p:cNvSpPr txBox="1"/>
+          <p:nvPr/>
+        </p:nvSpPr>
+        <p:spPr>
+          <a:xfrm>
+            <a:off x="6423054" y="3422210"/>
+            <a:ext cx="2243628" cy="369332"/>
+          </a:xfrm>
+          <a:prstGeom prst="rect">
+            <a:avLst/>
+          </a:prstGeom>
+          <a:noFill/>
+        </p:spPr>
+        <p:txBody>
+          <a:bodyPr wrap="none" rtlCol="0">
+            <a:spAutoFit/>
+          </a:bodyPr>
+          <a:lstStyle/>
+          <a:p>
+            <a:r>
+              <a:rPr lang="en-US" dirty="0" smtClean="0"/>
+              <a:t>Continuation function</a:t>
+            </a:r>
+            <a:endParaRPr lang="en-US" dirty="0"/>
+          </a:p>
+        </p:txBody>
+      </p:sp>
+      <p:cxnSp>
+        <p:nvCxnSpPr>
+          <p:cNvPr id="16" name="Elbow Connector 15"/>
+          <p:cNvCxnSpPr/>
+          <p:nvPr/>
+        </p:nvCxnSpPr>
+        <p:spPr>
+          <a:xfrm rot="10800000" flipV="1">
+            <a:off x="660904" y="2263366"/>
+            <a:ext cx="2231853" cy="715224"/>
+          </a:xfrm>
+          <a:prstGeom prst="bentConnector3">
+            <a:avLst>
+              <a:gd name="adj1" fmla="val -300"/>
+            </a:avLst>
+          </a:prstGeom>
+          <a:ln>
+            <a:solidFill>
+              <a:schemeClr val="tx1"/>
+            </a:solidFill>
+            <a:tailEnd type="triangle"/>
+          </a:ln>
+        </p:spPr>
+        <p:style>
+          <a:lnRef idx="1">
+            <a:schemeClr val="accent1"/>
+          </a:lnRef>
+          <a:fillRef idx="0">
+            <a:schemeClr val="accent1"/>
+          </a:fillRef>
+          <a:effectRef idx="0">
+            <a:schemeClr val="accent1"/>
+          </a:effectRef>
+          <a:fontRef idx="minor">
+            <a:schemeClr val="tx1"/>
+          </a:fontRef>
+        </p:style>
+      </p:cxnSp>
+      <p:cxnSp>
+        <p:nvCxnSpPr>
+          <p:cNvPr id="19" name="Straight Arrow Connector 18"/>
+          <p:cNvCxnSpPr/>
+          <p:nvPr/>
+        </p:nvCxnSpPr>
+        <p:spPr>
+          <a:xfrm>
+            <a:off x="660903" y="1403287"/>
+            <a:ext cx="334978" cy="0"/>
+          </a:xfrm>
+          <a:prstGeom prst="straightConnector1">
+            <a:avLst/>
+          </a:prstGeom>
+          <a:ln>
+            <a:solidFill>
+              <a:schemeClr val="tx1"/>
+            </a:solidFill>
+            <a:tailEnd type="triangle"/>
+          </a:ln>
+        </p:spPr>
+        <p:style>
+          <a:lnRef idx="1">
+            <a:schemeClr val="accent1"/>
+          </a:lnRef>
+          <a:fillRef idx="0">
+            <a:schemeClr val="accent1"/>
+          </a:fillRef>
+          <a:effectRef idx="0">
+            <a:schemeClr val="accent1"/>
+          </a:effectRef>
+          <a:fontRef idx="minor">
+            <a:schemeClr val="tx1"/>
+          </a:fontRef>
+        </p:style>
+      </p:cxnSp>
+      <p:cxnSp>
+        <p:nvCxnSpPr>
+          <p:cNvPr id="21" name="Straight Arrow Connector 20"/>
+          <p:cNvCxnSpPr/>
+          <p:nvPr/>
+        </p:nvCxnSpPr>
+        <p:spPr>
+          <a:xfrm flipH="1">
+            <a:off x="660903" y="2620978"/>
+            <a:ext cx="334978" cy="0"/>
+          </a:xfrm>
+          <a:prstGeom prst="straightConnector1">
+            <a:avLst/>
+          </a:prstGeom>
+          <a:ln>
+            <a:solidFill>
+              <a:schemeClr val="tx1"/>
+            </a:solidFill>
+            <a:tailEnd type="triangle"/>
+          </a:ln>
+        </p:spPr>
+        <p:style>
+          <a:lnRef idx="1">
+            <a:schemeClr val="accent1"/>
+          </a:lnRef>
+          <a:fillRef idx="0">
+            <a:schemeClr val="accent1"/>
+          </a:fillRef>
+          <a:effectRef idx="0">
+            <a:schemeClr val="accent1"/>
+          </a:effectRef>
+          <a:fontRef idx="minor">
+            <a:schemeClr val="tx1"/>
+          </a:fontRef>
+        </p:style>
+      </p:cxnSp>
+      <p:cxnSp>
+        <p:nvCxnSpPr>
+          <p:cNvPr id="23" name="Elbow Connector 22"/>
+          <p:cNvCxnSpPr/>
+          <p:nvPr/>
+        </p:nvCxnSpPr>
+        <p:spPr>
+          <a:xfrm flipV="1">
+            <a:off x="4780230" y="1403287"/>
+            <a:ext cx="1548142" cy="744978"/>
+          </a:xfrm>
+          <a:prstGeom prst="bentConnector3">
+            <a:avLst/>
+          </a:prstGeom>
+          <a:ln>
+            <a:solidFill>
+              <a:schemeClr val="tx1"/>
+            </a:solidFill>
+            <a:tailEnd type="triangle"/>
+          </a:ln>
+        </p:spPr>
+        <p:style>
+          <a:lnRef idx="1">
+            <a:schemeClr val="accent1"/>
+          </a:lnRef>
+          <a:fillRef idx="0">
+            <a:schemeClr val="accent1"/>
+          </a:fillRef>
+          <a:effectRef idx="0">
+            <a:schemeClr val="accent1"/>
+          </a:effectRef>
+          <a:fontRef idx="minor">
+            <a:schemeClr val="tx1"/>
+          </a:fontRef>
+        </p:style>
+      </p:cxnSp>
+      <p:cxnSp>
+        <p:nvCxnSpPr>
+          <p:cNvPr id="25" name="Elbow Connector 24"/>
+          <p:cNvCxnSpPr/>
+          <p:nvPr/>
+        </p:nvCxnSpPr>
+        <p:spPr>
+          <a:xfrm rot="10800000">
+            <a:off x="4784178" y="2263367"/>
+            <a:ext cx="1544195" cy="603353"/>
+          </a:xfrm>
+          <a:prstGeom prst="bentConnector3">
+            <a:avLst/>
+          </a:prstGeom>
+          <a:ln>
+            <a:solidFill>
+              <a:schemeClr val="tx1"/>
+            </a:solidFill>
+            <a:tailEnd type="triangle"/>
+          </a:ln>
+        </p:spPr>
+        <p:style>
+          <a:lnRef idx="1">
+            <a:schemeClr val="accent1"/>
+          </a:lnRef>
+          <a:fillRef idx="0">
+            <a:schemeClr val="accent1"/>
+          </a:fillRef>
+          <a:effectRef idx="0">
+            <a:schemeClr val="accent1"/>
+          </a:effectRef>
+          <a:fontRef idx="minor">
+            <a:schemeClr val="tx1"/>
+          </a:fontRef>
+        </p:style>
+      </p:cxnSp>
+      <p:cxnSp>
+        <p:nvCxnSpPr>
+          <p:cNvPr id="27" name="Elbow Connector 26"/>
+          <p:cNvCxnSpPr/>
+          <p:nvPr/>
+        </p:nvCxnSpPr>
+        <p:spPr>
+          <a:xfrm rot="5400000">
+            <a:off x="7045860" y="1980445"/>
+            <a:ext cx="710697" cy="570368"/>
+          </a:xfrm>
+          <a:prstGeom prst="bentConnector3">
+            <a:avLst>
+              <a:gd name="adj1" fmla="val 99681"/>
+            </a:avLst>
+          </a:prstGeom>
+          <a:ln>
+            <a:solidFill>
+              <a:schemeClr val="tx1"/>
+            </a:solidFill>
+            <a:tailEnd type="triangle"/>
+          </a:ln>
+        </p:spPr>
+        <p:style>
+          <a:lnRef idx="1">
+            <a:schemeClr val="accent1"/>
+          </a:lnRef>
+          <a:fillRef idx="0">
+            <a:schemeClr val="accent1"/>
+          </a:fillRef>
+          <a:effectRef idx="0">
+            <a:schemeClr val="accent1"/>
+          </a:effectRef>
+          <a:fontRef idx="minor">
+            <a:schemeClr val="tx1"/>
+          </a:fontRef>
+        </p:style>
+      </p:cxnSp>
+      <p:sp>
+        <p:nvSpPr>
+          <p:cNvPr id="30" name="TextBox 29"/>
+          <p:cNvSpPr txBox="1"/>
+          <p:nvPr/>
+        </p:nvSpPr>
+        <p:spPr>
+          <a:xfrm rot="16200000">
+            <a:off x="5146679" y="1605324"/>
+            <a:ext cx="567784" cy="369332"/>
+          </a:xfrm>
+          <a:prstGeom prst="rect">
+            <a:avLst/>
+          </a:prstGeom>
+          <a:noFill/>
+        </p:spPr>
+        <p:txBody>
+          <a:bodyPr wrap="none" rtlCol="0">
+            <a:spAutoFit/>
+          </a:bodyPr>
+          <a:lstStyle/>
+          <a:p>
+            <a:r>
+              <a:rPr lang="en-US" smtClean="0"/>
+              <a:t>OSR</a:t>
+            </a:r>
+            <a:endParaRPr lang="en-US"/>
+          </a:p>
+        </p:txBody>
+      </p:sp>
+    </p:spTree>
+    <p:extLst>
+      <p:ext uri="{BB962C8B-B14F-4D97-AF65-F5344CB8AC3E}">
+        <p14:creationId xmlns:p14="http://schemas.microsoft.com/office/powerpoint/2010/main" val="984989154"/>
+      </p:ext>
+    </p:extLst>
+  </p:cSld>
+  <p:clrMapOvr>
+    <a:masterClrMapping/>
+  </p:clrMapOvr>
+</p:sld>
+</file>
+
 <file path=ppt/slides/slide2.xml><?xml version="1.0" encoding="utf-8"?>
 <p:sld xmlns:a="http://schemas.openxmlformats.org/drawingml/2006/main" xmlns:r="http://schemas.openxmlformats.org/officeDocument/2006/relationships" xmlns:p="http://schemas.openxmlformats.org/presentationml/2006/main">
   <p:cSld>

</xml_diff>

<commit_message>
Fixing lstlisting to appear as figure
</commit_message>
<xml_diff>
--- a/MasterThesis/Figures/holzle.pptx
+++ b/MasterThesis/Figures/holzle.pptx
@@ -18,6 +18,7 @@
     <p:sldId id="265" r:id="rId12"/>
     <p:sldId id="267" r:id="rId13"/>
     <p:sldId id="268" r:id="rId14"/>
+    <p:sldId id="269" r:id="rId15"/>
   </p:sldIdLst>
   <p:sldSz cx="12192000" cy="6858000"/>
   <p:notesSz cx="6858000" cy="9144000"/>
@@ -255,7 +256,7 @@
           <a:p>
             <a:fld id="{39514751-6C89-194E-A652-4BD3C8EB45FC}" type="datetimeFigureOut">
               <a:rPr lang="en-US" smtClean="0"/>
-              <a:t>2/1/16</a:t>
+              <a:t>2/17/16</a:t>
             </a:fld>
             <a:endParaRPr lang="en-US"/>
           </a:p>
@@ -425,7 +426,7 @@
           <a:p>
             <a:fld id="{39514751-6C89-194E-A652-4BD3C8EB45FC}" type="datetimeFigureOut">
               <a:rPr lang="en-US" smtClean="0"/>
-              <a:t>2/1/16</a:t>
+              <a:t>2/17/16</a:t>
             </a:fld>
             <a:endParaRPr lang="en-US"/>
           </a:p>
@@ -605,7 +606,7 @@
           <a:p>
             <a:fld id="{39514751-6C89-194E-A652-4BD3C8EB45FC}" type="datetimeFigureOut">
               <a:rPr lang="en-US" smtClean="0"/>
-              <a:t>2/1/16</a:t>
+              <a:t>2/17/16</a:t>
             </a:fld>
             <a:endParaRPr lang="en-US"/>
           </a:p>
@@ -775,7 +776,7 @@
           <a:p>
             <a:fld id="{39514751-6C89-194E-A652-4BD3C8EB45FC}" type="datetimeFigureOut">
               <a:rPr lang="en-US" smtClean="0"/>
-              <a:t>2/1/16</a:t>
+              <a:t>2/17/16</a:t>
             </a:fld>
             <a:endParaRPr lang="en-US"/>
           </a:p>
@@ -1021,7 +1022,7 @@
           <a:p>
             <a:fld id="{39514751-6C89-194E-A652-4BD3C8EB45FC}" type="datetimeFigureOut">
               <a:rPr lang="en-US" smtClean="0"/>
-              <a:t>2/1/16</a:t>
+              <a:t>2/17/16</a:t>
             </a:fld>
             <a:endParaRPr lang="en-US"/>
           </a:p>
@@ -1253,7 +1254,7 @@
           <a:p>
             <a:fld id="{39514751-6C89-194E-A652-4BD3C8EB45FC}" type="datetimeFigureOut">
               <a:rPr lang="en-US" smtClean="0"/>
-              <a:t>2/1/16</a:t>
+              <a:t>2/17/16</a:t>
             </a:fld>
             <a:endParaRPr lang="en-US"/>
           </a:p>
@@ -1620,7 +1621,7 @@
           <a:p>
             <a:fld id="{39514751-6C89-194E-A652-4BD3C8EB45FC}" type="datetimeFigureOut">
               <a:rPr lang="en-US" smtClean="0"/>
-              <a:t>2/1/16</a:t>
+              <a:t>2/17/16</a:t>
             </a:fld>
             <a:endParaRPr lang="en-US"/>
           </a:p>
@@ -1738,7 +1739,7 @@
           <a:p>
             <a:fld id="{39514751-6C89-194E-A652-4BD3C8EB45FC}" type="datetimeFigureOut">
               <a:rPr lang="en-US" smtClean="0"/>
-              <a:t>2/1/16</a:t>
+              <a:t>2/17/16</a:t>
             </a:fld>
             <a:endParaRPr lang="en-US"/>
           </a:p>
@@ -1833,7 +1834,7 @@
           <a:p>
             <a:fld id="{39514751-6C89-194E-A652-4BD3C8EB45FC}" type="datetimeFigureOut">
               <a:rPr lang="en-US" smtClean="0"/>
-              <a:t>2/1/16</a:t>
+              <a:t>2/17/16</a:t>
             </a:fld>
             <a:endParaRPr lang="en-US"/>
           </a:p>
@@ -2110,7 +2111,7 @@
           <a:p>
             <a:fld id="{39514751-6C89-194E-A652-4BD3C8EB45FC}" type="datetimeFigureOut">
               <a:rPr lang="en-US" smtClean="0"/>
-              <a:t>2/1/16</a:t>
+              <a:t>2/17/16</a:t>
             </a:fld>
             <a:endParaRPr lang="en-US"/>
           </a:p>
@@ -2363,7 +2364,7 @@
           <a:p>
             <a:fld id="{39514751-6C89-194E-A652-4BD3C8EB45FC}" type="datetimeFigureOut">
               <a:rPr lang="en-US" smtClean="0"/>
-              <a:t>2/1/16</a:t>
+              <a:t>2/17/16</a:t>
             </a:fld>
             <a:endParaRPr lang="en-US"/>
           </a:p>
@@ -2576,7 +2577,7 @@
           <a:p>
             <a:fld id="{39514751-6C89-194E-A652-4BD3C8EB45FC}" type="datetimeFigureOut">
               <a:rPr lang="en-US" smtClean="0"/>
-              <a:t>2/1/16</a:t>
+              <a:t>2/17/16</a:t>
             </a:fld>
             <a:endParaRPr lang="en-US"/>
           </a:p>
@@ -7325,6 +7326,701 @@
 </p:sld>
 </file>
 
+<file path=ppt/slides/slide14.xml><?xml version="1.0" encoding="utf-8"?>
+<p:sld xmlns:a="http://schemas.openxmlformats.org/drawingml/2006/main" xmlns:r="http://schemas.openxmlformats.org/officeDocument/2006/relationships" xmlns:p="http://schemas.openxmlformats.org/presentationml/2006/main">
+  <p:cSld>
+    <p:spTree>
+      <p:nvGrpSpPr>
+        <p:cNvPr id="1" name=""/>
+        <p:cNvGrpSpPr/>
+        <p:nvPr/>
+      </p:nvGrpSpPr>
+      <p:grpSpPr>
+        <a:xfrm>
+          <a:off x="0" y="0"/>
+          <a:ext cx="0" cy="0"/>
+          <a:chOff x="0" y="0"/>
+          <a:chExt cx="0" cy="0"/>
+        </a:xfrm>
+      </p:grpSpPr>
+      <p:sp>
+        <p:nvSpPr>
+          <p:cNvPr id="4" name="Rectangle 3"/>
+          <p:cNvSpPr/>
+          <p:nvPr/>
+        </p:nvSpPr>
+        <p:spPr>
+          <a:xfrm>
+            <a:off x="688063" y="1892174"/>
+            <a:ext cx="1702052" cy="878186"/>
+          </a:xfrm>
+          <a:prstGeom prst="rect">
+            <a:avLst/>
+          </a:prstGeom>
+          <a:solidFill>
+            <a:schemeClr val="bg1"/>
+          </a:solidFill>
+          <a:ln>
+            <a:solidFill>
+              <a:schemeClr val="tx1"/>
+            </a:solidFill>
+          </a:ln>
+        </p:spPr>
+        <p:style>
+          <a:lnRef idx="2">
+            <a:schemeClr val="accent1">
+              <a:shade val="50000"/>
+            </a:schemeClr>
+          </a:lnRef>
+          <a:fillRef idx="1">
+            <a:schemeClr val="accent1"/>
+          </a:fillRef>
+          <a:effectRef idx="0">
+            <a:schemeClr val="accent1"/>
+          </a:effectRef>
+          <a:fontRef idx="minor">
+            <a:schemeClr val="lt1"/>
+          </a:fontRef>
+        </p:style>
+        <p:txBody>
+          <a:bodyPr rtlCol="0" anchor="ctr"/>
+          <a:lstStyle/>
+          <a:p>
+            <a:pPr algn="ctr"/>
+            <a:r>
+              <a:rPr lang="en-US" sz="1600" dirty="0" smtClean="0">
+                <a:solidFill>
+                  <a:schemeClr val="tx1"/>
+                </a:solidFill>
+              </a:rPr>
+              <a:t>R program</a:t>
+            </a:r>
+            <a:endParaRPr lang="en-US" sz="1600" dirty="0">
+              <a:solidFill>
+                <a:schemeClr val="tx1"/>
+              </a:solidFill>
+            </a:endParaRPr>
+          </a:p>
+        </p:txBody>
+      </p:sp>
+      <p:sp>
+        <p:nvSpPr>
+          <p:cNvPr id="5" name="Rectangle 4"/>
+          <p:cNvSpPr/>
+          <p:nvPr/>
+        </p:nvSpPr>
+        <p:spPr>
+          <a:xfrm>
+            <a:off x="3710412" y="1892174"/>
+            <a:ext cx="1702052" cy="878186"/>
+          </a:xfrm>
+          <a:prstGeom prst="rect">
+            <a:avLst/>
+          </a:prstGeom>
+          <a:solidFill>
+            <a:schemeClr val="bg1"/>
+          </a:solidFill>
+          <a:ln>
+            <a:solidFill>
+              <a:schemeClr val="tx1"/>
+            </a:solidFill>
+          </a:ln>
+        </p:spPr>
+        <p:style>
+          <a:lnRef idx="2">
+            <a:schemeClr val="accent1">
+              <a:shade val="50000"/>
+            </a:schemeClr>
+          </a:lnRef>
+          <a:fillRef idx="1">
+            <a:schemeClr val="accent1"/>
+          </a:fillRef>
+          <a:effectRef idx="0">
+            <a:schemeClr val="accent1"/>
+          </a:effectRef>
+          <a:fontRef idx="minor">
+            <a:schemeClr val="lt1"/>
+          </a:fontRef>
+        </p:style>
+        <p:txBody>
+          <a:bodyPr rtlCol="0" anchor="ctr"/>
+          <a:lstStyle/>
+          <a:p>
+            <a:pPr algn="ctr"/>
+            <a:r>
+              <a:rPr lang="en-US" sz="1600" dirty="0" smtClean="0">
+                <a:solidFill>
+                  <a:schemeClr val="tx1"/>
+                </a:solidFill>
+              </a:rPr>
+              <a:t>GNUR</a:t>
+            </a:r>
+            <a:endParaRPr lang="en-US" sz="1600" dirty="0">
+              <a:solidFill>
+                <a:schemeClr val="tx1"/>
+              </a:solidFill>
+            </a:endParaRPr>
+          </a:p>
+        </p:txBody>
+      </p:sp>
+      <p:sp>
+        <p:nvSpPr>
+          <p:cNvPr id="6" name="Rectangle 5"/>
+          <p:cNvSpPr/>
+          <p:nvPr/>
+        </p:nvSpPr>
+        <p:spPr>
+          <a:xfrm>
+            <a:off x="6732761" y="1892174"/>
+            <a:ext cx="1702052" cy="878186"/>
+          </a:xfrm>
+          <a:prstGeom prst="rect">
+            <a:avLst/>
+          </a:prstGeom>
+          <a:solidFill>
+            <a:schemeClr val="bg1"/>
+          </a:solidFill>
+          <a:ln>
+            <a:solidFill>
+              <a:schemeClr val="tx1"/>
+            </a:solidFill>
+          </a:ln>
+        </p:spPr>
+        <p:style>
+          <a:lnRef idx="2">
+            <a:schemeClr val="accent1">
+              <a:shade val="50000"/>
+            </a:schemeClr>
+          </a:lnRef>
+          <a:fillRef idx="1">
+            <a:schemeClr val="accent1"/>
+          </a:fillRef>
+          <a:effectRef idx="0">
+            <a:schemeClr val="accent1"/>
+          </a:effectRef>
+          <a:fontRef idx="minor">
+            <a:schemeClr val="lt1"/>
+          </a:fontRef>
+        </p:style>
+        <p:txBody>
+          <a:bodyPr rtlCol="0" anchor="ctr"/>
+          <a:lstStyle/>
+          <a:p>
+            <a:pPr algn="ctr"/>
+            <a:r>
+              <a:rPr lang="en-US" sz="1600" dirty="0" smtClean="0">
+                <a:solidFill>
+                  <a:schemeClr val="tx1"/>
+                </a:solidFill>
+              </a:rPr>
+              <a:t>RJIT</a:t>
+            </a:r>
+            <a:endParaRPr lang="en-US" sz="1600" dirty="0">
+              <a:solidFill>
+                <a:schemeClr val="tx1"/>
+              </a:solidFill>
+            </a:endParaRPr>
+          </a:p>
+        </p:txBody>
+      </p:sp>
+      <p:cxnSp>
+        <p:nvCxnSpPr>
+          <p:cNvPr id="8" name="Straight Arrow Connector 7"/>
+          <p:cNvCxnSpPr>
+            <a:stCxn id="4" idx="3"/>
+            <a:endCxn id="5" idx="1"/>
+          </p:cNvCxnSpPr>
+          <p:nvPr/>
+        </p:nvCxnSpPr>
+        <p:spPr>
+          <a:xfrm>
+            <a:off x="2390115" y="2331267"/>
+            <a:ext cx="1320297" cy="0"/>
+          </a:xfrm>
+          <a:prstGeom prst="straightConnector1">
+            <a:avLst/>
+          </a:prstGeom>
+          <a:ln>
+            <a:solidFill>
+              <a:schemeClr val="tx1"/>
+            </a:solidFill>
+            <a:tailEnd type="triangle"/>
+          </a:ln>
+        </p:spPr>
+        <p:style>
+          <a:lnRef idx="1">
+            <a:schemeClr val="accent1"/>
+          </a:lnRef>
+          <a:fillRef idx="0">
+            <a:schemeClr val="accent1"/>
+          </a:fillRef>
+          <a:effectRef idx="0">
+            <a:schemeClr val="accent1"/>
+          </a:effectRef>
+          <a:fontRef idx="minor">
+            <a:schemeClr val="tx1"/>
+          </a:fontRef>
+        </p:style>
+      </p:cxnSp>
+      <p:cxnSp>
+        <p:nvCxnSpPr>
+          <p:cNvPr id="10" name="Straight Arrow Connector 9"/>
+          <p:cNvCxnSpPr>
+            <a:stCxn id="5" idx="3"/>
+            <a:endCxn id="6" idx="1"/>
+          </p:cNvCxnSpPr>
+          <p:nvPr/>
+        </p:nvCxnSpPr>
+        <p:spPr>
+          <a:xfrm>
+            <a:off x="5412464" y="2331267"/>
+            <a:ext cx="1320297" cy="0"/>
+          </a:xfrm>
+          <a:prstGeom prst="straightConnector1">
+            <a:avLst/>
+          </a:prstGeom>
+          <a:ln>
+            <a:solidFill>
+              <a:schemeClr val="tx1"/>
+            </a:solidFill>
+            <a:tailEnd type="triangle"/>
+          </a:ln>
+        </p:spPr>
+        <p:style>
+          <a:lnRef idx="1">
+            <a:schemeClr val="accent1"/>
+          </a:lnRef>
+          <a:fillRef idx="0">
+            <a:schemeClr val="accent1"/>
+          </a:fillRef>
+          <a:effectRef idx="0">
+            <a:schemeClr val="accent1"/>
+          </a:effectRef>
+          <a:fontRef idx="minor">
+            <a:schemeClr val="tx1"/>
+          </a:fontRef>
+        </p:style>
+      </p:cxnSp>
+      <p:sp>
+        <p:nvSpPr>
+          <p:cNvPr id="11" name="TextBox 10"/>
+          <p:cNvSpPr txBox="1"/>
+          <p:nvPr/>
+        </p:nvSpPr>
+        <p:spPr>
+          <a:xfrm>
+            <a:off x="2561376" y="2064190"/>
+            <a:ext cx="827534" cy="338554"/>
+          </a:xfrm>
+          <a:prstGeom prst="rect">
+            <a:avLst/>
+          </a:prstGeom>
+          <a:noFill/>
+        </p:spPr>
+        <p:txBody>
+          <a:bodyPr wrap="none" rtlCol="0">
+            <a:spAutoFit/>
+          </a:bodyPr>
+          <a:lstStyle/>
+          <a:p>
+            <a:r>
+              <a:rPr lang="en-US" sz="1600" smtClean="0"/>
+              <a:t>Text file</a:t>
+            </a:r>
+            <a:endParaRPr lang="en-US" sz="1600"/>
+          </a:p>
+        </p:txBody>
+      </p:sp>
+      <p:sp>
+        <p:nvSpPr>
+          <p:cNvPr id="12" name="TextBox 11"/>
+          <p:cNvSpPr txBox="1"/>
+          <p:nvPr/>
+        </p:nvSpPr>
+        <p:spPr>
+          <a:xfrm>
+            <a:off x="5597770" y="2064190"/>
+            <a:ext cx="949684" cy="338554"/>
+          </a:xfrm>
+          <a:prstGeom prst="rect">
+            <a:avLst/>
+          </a:prstGeom>
+          <a:noFill/>
+        </p:spPr>
+        <p:txBody>
+          <a:bodyPr wrap="none" rtlCol="0">
+            <a:spAutoFit/>
+          </a:bodyPr>
+          <a:lstStyle/>
+          <a:p>
+            <a:r>
+              <a:rPr lang="en-US" sz="1600" smtClean="0"/>
+              <a:t>SEXP AST</a:t>
+            </a:r>
+            <a:endParaRPr lang="en-US" sz="1600"/>
+          </a:p>
+        </p:txBody>
+      </p:sp>
+      <p:sp>
+        <p:nvSpPr>
+          <p:cNvPr id="13" name="Rectangle 12"/>
+          <p:cNvSpPr/>
+          <p:nvPr/>
+        </p:nvSpPr>
+        <p:spPr>
+          <a:xfrm>
+            <a:off x="3710412" y="3195873"/>
+            <a:ext cx="1702051" cy="905348"/>
+          </a:xfrm>
+          <a:prstGeom prst="rect">
+            <a:avLst/>
+          </a:prstGeom>
+          <a:solidFill>
+            <a:schemeClr val="bg1"/>
+          </a:solidFill>
+          <a:ln>
+            <a:solidFill>
+              <a:schemeClr val="tx1"/>
+            </a:solidFill>
+          </a:ln>
+        </p:spPr>
+        <p:style>
+          <a:lnRef idx="2">
+            <a:schemeClr val="accent1">
+              <a:shade val="50000"/>
+            </a:schemeClr>
+          </a:lnRef>
+          <a:fillRef idx="1">
+            <a:schemeClr val="accent1"/>
+          </a:fillRef>
+          <a:effectRef idx="0">
+            <a:schemeClr val="accent1"/>
+          </a:effectRef>
+          <a:fontRef idx="minor">
+            <a:schemeClr val="lt1"/>
+          </a:fontRef>
+        </p:style>
+        <p:txBody>
+          <a:bodyPr rtlCol="0" anchor="ctr"/>
+          <a:lstStyle/>
+          <a:p>
+            <a:pPr marL="285750" marR="0" lvl="0" indent="-285750" defTabSz="914400" eaLnBrk="1" fontAlgn="auto" latinLnBrk="0" hangingPunct="1">
+              <a:lnSpc>
+                <a:spcPct val="100000"/>
+              </a:lnSpc>
+              <a:spcBef>
+                <a:spcPts val="0"/>
+              </a:spcBef>
+              <a:spcAft>
+                <a:spcPts val="0"/>
+              </a:spcAft>
+              <a:buClrTx/>
+              <a:buSzTx/>
+              <a:buFont typeface="Arial" charset="0"/>
+              <a:buChar char="•"/>
+              <a:tabLst/>
+              <a:defRPr/>
+            </a:pPr>
+            <a:r>
+              <a:rPr lang="en-US" sz="1600" dirty="0" smtClean="0">
+                <a:solidFill>
+                  <a:schemeClr val="tx1"/>
+                </a:solidFill>
+              </a:rPr>
+              <a:t>Parses text</a:t>
+            </a:r>
+          </a:p>
+          <a:p>
+            <a:pPr marL="285750" marR="0" lvl="0" indent="-285750" defTabSz="914400" eaLnBrk="1" fontAlgn="auto" latinLnBrk="0" hangingPunct="1">
+              <a:lnSpc>
+                <a:spcPct val="100000"/>
+              </a:lnSpc>
+              <a:spcBef>
+                <a:spcPts val="0"/>
+              </a:spcBef>
+              <a:spcAft>
+                <a:spcPts val="0"/>
+              </a:spcAft>
+              <a:buClrTx/>
+              <a:buSzTx/>
+              <a:buFont typeface="Arial" charset="0"/>
+              <a:buChar char="•"/>
+              <a:tabLst/>
+              <a:defRPr/>
+            </a:pPr>
+            <a:r>
+              <a:rPr lang="en-US" sz="1600" dirty="0" smtClean="0">
+                <a:solidFill>
+                  <a:schemeClr val="tx1"/>
+                </a:solidFill>
+              </a:rPr>
+              <a:t>Creates SEXP</a:t>
+            </a:r>
+          </a:p>
+        </p:txBody>
+      </p:sp>
+      <p:cxnSp>
+        <p:nvCxnSpPr>
+          <p:cNvPr id="15" name="Straight Connector 14"/>
+          <p:cNvCxnSpPr>
+            <a:stCxn id="5" idx="2"/>
+            <a:endCxn id="13" idx="0"/>
+          </p:cNvCxnSpPr>
+          <p:nvPr/>
+        </p:nvCxnSpPr>
+        <p:spPr>
+          <a:xfrm>
+            <a:off x="4561438" y="2770360"/>
+            <a:ext cx="0" cy="425513"/>
+          </a:xfrm>
+          <a:prstGeom prst="line">
+            <a:avLst/>
+          </a:prstGeom>
+          <a:ln>
+            <a:solidFill>
+              <a:schemeClr val="tx1"/>
+            </a:solidFill>
+          </a:ln>
+        </p:spPr>
+        <p:style>
+          <a:lnRef idx="1">
+            <a:schemeClr val="accent1"/>
+          </a:lnRef>
+          <a:fillRef idx="0">
+            <a:schemeClr val="accent1"/>
+          </a:fillRef>
+          <a:effectRef idx="0">
+            <a:schemeClr val="accent1"/>
+          </a:effectRef>
+          <a:fontRef idx="minor">
+            <a:schemeClr val="tx1"/>
+          </a:fontRef>
+        </p:style>
+      </p:cxnSp>
+      <p:sp>
+        <p:nvSpPr>
+          <p:cNvPr id="16" name="Rectangle 15"/>
+          <p:cNvSpPr/>
+          <p:nvPr/>
+        </p:nvSpPr>
+        <p:spPr>
+          <a:xfrm>
+            <a:off x="6732760" y="3195873"/>
+            <a:ext cx="1702051" cy="905348"/>
+          </a:xfrm>
+          <a:prstGeom prst="rect">
+            <a:avLst/>
+          </a:prstGeom>
+          <a:solidFill>
+            <a:schemeClr val="bg1"/>
+          </a:solidFill>
+          <a:ln>
+            <a:solidFill>
+              <a:schemeClr val="tx1"/>
+            </a:solidFill>
+          </a:ln>
+        </p:spPr>
+        <p:style>
+          <a:lnRef idx="2">
+            <a:schemeClr val="accent1">
+              <a:shade val="50000"/>
+            </a:schemeClr>
+          </a:lnRef>
+          <a:fillRef idx="1">
+            <a:schemeClr val="accent1"/>
+          </a:fillRef>
+          <a:effectRef idx="0">
+            <a:schemeClr val="accent1"/>
+          </a:effectRef>
+          <a:fontRef idx="minor">
+            <a:schemeClr val="lt1"/>
+          </a:fontRef>
+        </p:style>
+        <p:txBody>
+          <a:bodyPr rtlCol="0" anchor="ctr"/>
+          <a:lstStyle/>
+          <a:p>
+            <a:pPr marL="285750" marR="0" lvl="0" indent="-285750" defTabSz="914400" eaLnBrk="1" fontAlgn="auto" latinLnBrk="0" hangingPunct="1">
+              <a:lnSpc>
+                <a:spcPct val="100000"/>
+              </a:lnSpc>
+              <a:spcBef>
+                <a:spcPts val="0"/>
+              </a:spcBef>
+              <a:spcAft>
+                <a:spcPts val="0"/>
+              </a:spcAft>
+              <a:buClrTx/>
+              <a:buSzTx/>
+              <a:buFont typeface="Arial" charset="0"/>
+              <a:buChar char="•"/>
+              <a:tabLst/>
+              <a:defRPr/>
+            </a:pPr>
+            <a:r>
+              <a:rPr lang="en-US" sz="1600" dirty="0" smtClean="0">
+                <a:solidFill>
+                  <a:schemeClr val="tx1"/>
+                </a:solidFill>
+              </a:rPr>
+              <a:t>Compiles AST</a:t>
+            </a:r>
+          </a:p>
+          <a:p>
+            <a:pPr marL="285750" marR="0" lvl="0" indent="-285750" defTabSz="914400" eaLnBrk="1" fontAlgn="auto" latinLnBrk="0" hangingPunct="1">
+              <a:lnSpc>
+                <a:spcPct val="100000"/>
+              </a:lnSpc>
+              <a:spcBef>
+                <a:spcPts val="0"/>
+              </a:spcBef>
+              <a:spcAft>
+                <a:spcPts val="0"/>
+              </a:spcAft>
+              <a:buClrTx/>
+              <a:buSzTx/>
+              <a:buFont typeface="Arial" charset="0"/>
+              <a:buChar char="•"/>
+              <a:tabLst/>
+              <a:defRPr/>
+            </a:pPr>
+            <a:r>
+              <a:rPr lang="en-US" sz="1600" dirty="0" smtClean="0">
+                <a:solidFill>
+                  <a:schemeClr val="tx1"/>
+                </a:solidFill>
+              </a:rPr>
+              <a:t>Wraps native code in SEXP</a:t>
+            </a:r>
+          </a:p>
+        </p:txBody>
+      </p:sp>
+      <p:cxnSp>
+        <p:nvCxnSpPr>
+          <p:cNvPr id="18" name="Straight Connector 17"/>
+          <p:cNvCxnSpPr>
+            <a:stCxn id="6" idx="2"/>
+            <a:endCxn id="16" idx="0"/>
+          </p:cNvCxnSpPr>
+          <p:nvPr/>
+        </p:nvCxnSpPr>
+        <p:spPr>
+          <a:xfrm flipH="1">
+            <a:off x="7583786" y="2770360"/>
+            <a:ext cx="1" cy="425513"/>
+          </a:xfrm>
+          <a:prstGeom prst="line">
+            <a:avLst/>
+          </a:prstGeom>
+          <a:ln>
+            <a:solidFill>
+              <a:schemeClr val="tx1"/>
+            </a:solidFill>
+          </a:ln>
+        </p:spPr>
+        <p:style>
+          <a:lnRef idx="1">
+            <a:schemeClr val="accent1"/>
+          </a:lnRef>
+          <a:fillRef idx="0">
+            <a:schemeClr val="accent1"/>
+          </a:fillRef>
+          <a:effectRef idx="0">
+            <a:schemeClr val="accent1"/>
+          </a:effectRef>
+          <a:fontRef idx="minor">
+            <a:schemeClr val="tx1"/>
+          </a:fontRef>
+        </p:style>
+      </p:cxnSp>
+      <p:cxnSp>
+        <p:nvCxnSpPr>
+          <p:cNvPr id="20" name="Elbow Connector 19"/>
+          <p:cNvCxnSpPr>
+            <a:stCxn id="6" idx="0"/>
+            <a:endCxn id="5" idx="0"/>
+          </p:cNvCxnSpPr>
+          <p:nvPr/>
+        </p:nvCxnSpPr>
+        <p:spPr>
+          <a:xfrm rot="16200000" flipV="1">
+            <a:off x="6072613" y="380999"/>
+            <a:ext cx="12700" cy="3022349"/>
+          </a:xfrm>
+          <a:prstGeom prst="bentConnector3">
+            <a:avLst>
+              <a:gd name="adj1" fmla="val 1800000"/>
+            </a:avLst>
+          </a:prstGeom>
+          <a:ln>
+            <a:solidFill>
+              <a:schemeClr val="tx1"/>
+            </a:solidFill>
+            <a:tailEnd type="triangle"/>
+          </a:ln>
+        </p:spPr>
+        <p:style>
+          <a:lnRef idx="1">
+            <a:schemeClr val="accent1"/>
+          </a:lnRef>
+          <a:fillRef idx="0">
+            <a:schemeClr val="accent1"/>
+          </a:fillRef>
+          <a:effectRef idx="0">
+            <a:schemeClr val="accent1"/>
+          </a:effectRef>
+          <a:fontRef idx="minor">
+            <a:schemeClr val="tx1"/>
+          </a:fontRef>
+        </p:style>
+      </p:cxnSp>
+      <p:sp>
+        <p:nvSpPr>
+          <p:cNvPr id="21" name="TextBox 20"/>
+          <p:cNvSpPr txBox="1"/>
+          <p:nvPr/>
+        </p:nvSpPr>
+        <p:spPr>
+          <a:xfrm>
+            <a:off x="4861711" y="1374817"/>
+            <a:ext cx="2611741" cy="338554"/>
+          </a:xfrm>
+          <a:prstGeom prst="rect">
+            <a:avLst/>
+          </a:prstGeom>
+          <a:noFill/>
+        </p:spPr>
+        <p:txBody>
+          <a:bodyPr wrap="none" rtlCol="0">
+            <a:spAutoFit/>
+          </a:bodyPr>
+          <a:lstStyle/>
+          <a:p>
+            <a:r>
+              <a:rPr lang="en-US" sz="1600" dirty="0" smtClean="0"/>
+              <a:t>Native code </a:t>
+            </a:r>
+            <a:r>
+              <a:rPr lang="en-US" sz="1600" smtClean="0"/>
+              <a:t>wrapped in SEXP</a:t>
+            </a:r>
+            <a:endParaRPr lang="en-US" sz="1600" dirty="0"/>
+          </a:p>
+        </p:txBody>
+      </p:sp>
+    </p:spTree>
+    <p:extLst>
+      <p:ext uri="{BB962C8B-B14F-4D97-AF65-F5344CB8AC3E}">
+        <p14:creationId xmlns:p14="http://schemas.microsoft.com/office/powerpoint/2010/main" val="719285488"/>
+      </p:ext>
+    </p:extLst>
+  </p:cSld>
+  <p:clrMapOvr>
+    <a:masterClrMapping/>
+  </p:clrMapOvr>
+</p:sld>
+</file>
+
 <file path=ppt/slides/slide2.xml><?xml version="1.0" encoding="utf-8"?>
 <p:sld xmlns:a="http://schemas.openxmlformats.org/drawingml/2006/main" xmlns:r="http://schemas.openxmlformats.org/officeDocument/2006/relationships" xmlns:p="http://schemas.openxmlformats.org/presentationml/2006/main">
   <p:cSld>

</xml_diff>

<commit_message>
Improving the figures quality
</commit_message>
<xml_diff>
--- a/MasterThesis/Figures/holzle.pptx
+++ b/MasterThesis/Figures/holzle.pptx
@@ -4,6 +4,9 @@
   <p:sldMasterIdLst>
     <p:sldMasterId id="2147483648" r:id="rId1"/>
   </p:sldMasterIdLst>
+  <p:notesMasterIdLst>
+    <p:notesMasterId r:id="rId17"/>
+  </p:notesMasterIdLst>
   <p:sldIdLst>
     <p:sldId id="256" r:id="rId2"/>
     <p:sldId id="257" r:id="rId3"/>
@@ -126,6 +129,440 @@
 </p:presentation>
 </file>
 
+<file path=ppt/notesMasters/notesMaster1.xml><?xml version="1.0" encoding="utf-8"?>
+<p:notesMaster xmlns:a="http://schemas.openxmlformats.org/drawingml/2006/main" xmlns:r="http://schemas.openxmlformats.org/officeDocument/2006/relationships" xmlns:p="http://schemas.openxmlformats.org/presentationml/2006/main">
+  <p:cSld>
+    <p:bg>
+      <p:bgRef idx="1001">
+        <a:schemeClr val="bg1"/>
+      </p:bgRef>
+    </p:bg>
+    <p:spTree>
+      <p:nvGrpSpPr>
+        <p:cNvPr id="1" name=""/>
+        <p:cNvGrpSpPr/>
+        <p:nvPr/>
+      </p:nvGrpSpPr>
+      <p:grpSpPr>
+        <a:xfrm>
+          <a:off x="0" y="0"/>
+          <a:ext cx="0" cy="0"/>
+          <a:chOff x="0" y="0"/>
+          <a:chExt cx="0" cy="0"/>
+        </a:xfrm>
+      </p:grpSpPr>
+      <p:sp>
+        <p:nvSpPr>
+          <p:cNvPr id="2" name="Header Placeholder 1"/>
+          <p:cNvSpPr>
+            <a:spLocks noGrp="1"/>
+          </p:cNvSpPr>
+          <p:nvPr>
+            <p:ph type="hdr" sz="quarter"/>
+          </p:nvPr>
+        </p:nvSpPr>
+        <p:spPr>
+          <a:xfrm>
+            <a:off x="0" y="0"/>
+            <a:ext cx="2971800" cy="458788"/>
+          </a:xfrm>
+          <a:prstGeom prst="rect">
+            <a:avLst/>
+          </a:prstGeom>
+        </p:spPr>
+        <p:txBody>
+          <a:bodyPr vert="horz" lIns="91440" tIns="45720" rIns="91440" bIns="45720" rtlCol="0"/>
+          <a:lstStyle>
+            <a:lvl1pPr algn="l">
+              <a:defRPr sz="1200"/>
+            </a:lvl1pPr>
+          </a:lstStyle>
+          <a:p>
+            <a:endParaRPr lang="en-US"/>
+          </a:p>
+        </p:txBody>
+      </p:sp>
+      <p:sp>
+        <p:nvSpPr>
+          <p:cNvPr id="3" name="Date Placeholder 2"/>
+          <p:cNvSpPr>
+            <a:spLocks noGrp="1"/>
+          </p:cNvSpPr>
+          <p:nvPr>
+            <p:ph type="dt" idx="1"/>
+          </p:nvPr>
+        </p:nvSpPr>
+        <p:spPr>
+          <a:xfrm>
+            <a:off x="3884613" y="0"/>
+            <a:ext cx="2971800" cy="458788"/>
+          </a:xfrm>
+          <a:prstGeom prst="rect">
+            <a:avLst/>
+          </a:prstGeom>
+        </p:spPr>
+        <p:txBody>
+          <a:bodyPr vert="horz" lIns="91440" tIns="45720" rIns="91440" bIns="45720" rtlCol="0"/>
+          <a:lstStyle>
+            <a:lvl1pPr algn="r">
+              <a:defRPr sz="1200"/>
+            </a:lvl1pPr>
+          </a:lstStyle>
+          <a:p>
+            <a:fld id="{65949CC2-EDA3-354B-9D27-5C7EECBC59F6}" type="datetimeFigureOut">
+              <a:rPr lang="en-US" smtClean="0"/>
+              <a:t>3/9/16</a:t>
+            </a:fld>
+            <a:endParaRPr lang="en-US"/>
+          </a:p>
+        </p:txBody>
+      </p:sp>
+      <p:sp>
+        <p:nvSpPr>
+          <p:cNvPr id="4" name="Slide Image Placeholder 3"/>
+          <p:cNvSpPr>
+            <a:spLocks noGrp="1" noRot="1" noChangeAspect="1"/>
+          </p:cNvSpPr>
+          <p:nvPr>
+            <p:ph type="sldImg" idx="2"/>
+          </p:nvPr>
+        </p:nvSpPr>
+        <p:spPr>
+          <a:xfrm>
+            <a:off x="685800" y="1143000"/>
+            <a:ext cx="5486400" cy="3086100"/>
+          </a:xfrm>
+          <a:prstGeom prst="rect">
+            <a:avLst/>
+          </a:prstGeom>
+          <a:noFill/>
+          <a:ln w="12700">
+            <a:solidFill>
+              <a:prstClr val="black"/>
+            </a:solidFill>
+          </a:ln>
+        </p:spPr>
+        <p:txBody>
+          <a:bodyPr vert="horz" lIns="91440" tIns="45720" rIns="91440" bIns="45720" rtlCol="0" anchor="ctr"/>
+          <a:lstStyle/>
+          <a:p>
+            <a:endParaRPr lang="en-US"/>
+          </a:p>
+        </p:txBody>
+      </p:sp>
+      <p:sp>
+        <p:nvSpPr>
+          <p:cNvPr id="5" name="Notes Placeholder 4"/>
+          <p:cNvSpPr>
+            <a:spLocks noGrp="1"/>
+          </p:cNvSpPr>
+          <p:nvPr>
+            <p:ph type="body" sz="quarter" idx="3"/>
+          </p:nvPr>
+        </p:nvSpPr>
+        <p:spPr>
+          <a:xfrm>
+            <a:off x="685800" y="4400550"/>
+            <a:ext cx="5486400" cy="3600450"/>
+          </a:xfrm>
+          <a:prstGeom prst="rect">
+            <a:avLst/>
+          </a:prstGeom>
+        </p:spPr>
+        <p:txBody>
+          <a:bodyPr vert="horz" lIns="91440" tIns="45720" rIns="91440" bIns="45720" rtlCol="0"/>
+          <a:lstStyle/>
+          <a:p>
+            <a:pPr lvl="0"/>
+            <a:r>
+              <a:rPr lang="en-US" smtClean="0"/>
+              <a:t>Click to edit Master text styles</a:t>
+            </a:r>
+          </a:p>
+          <a:p>
+            <a:pPr lvl="1"/>
+            <a:r>
+              <a:rPr lang="en-US" smtClean="0"/>
+              <a:t>Second level</a:t>
+            </a:r>
+          </a:p>
+          <a:p>
+            <a:pPr lvl="2"/>
+            <a:r>
+              <a:rPr lang="en-US" smtClean="0"/>
+              <a:t>Third level</a:t>
+            </a:r>
+          </a:p>
+          <a:p>
+            <a:pPr lvl="3"/>
+            <a:r>
+              <a:rPr lang="en-US" smtClean="0"/>
+              <a:t>Fourth level</a:t>
+            </a:r>
+          </a:p>
+          <a:p>
+            <a:pPr lvl="4"/>
+            <a:r>
+              <a:rPr lang="en-US" smtClean="0"/>
+              <a:t>Fifth level</a:t>
+            </a:r>
+            <a:endParaRPr lang="en-US"/>
+          </a:p>
+        </p:txBody>
+      </p:sp>
+      <p:sp>
+        <p:nvSpPr>
+          <p:cNvPr id="6" name="Footer Placeholder 5"/>
+          <p:cNvSpPr>
+            <a:spLocks noGrp="1"/>
+          </p:cNvSpPr>
+          <p:nvPr>
+            <p:ph type="ftr" sz="quarter" idx="4"/>
+          </p:nvPr>
+        </p:nvSpPr>
+        <p:spPr>
+          <a:xfrm>
+            <a:off x="0" y="8685213"/>
+            <a:ext cx="2971800" cy="458787"/>
+          </a:xfrm>
+          <a:prstGeom prst="rect">
+            <a:avLst/>
+          </a:prstGeom>
+        </p:spPr>
+        <p:txBody>
+          <a:bodyPr vert="horz" lIns="91440" tIns="45720" rIns="91440" bIns="45720" rtlCol="0" anchor="b"/>
+          <a:lstStyle>
+            <a:lvl1pPr algn="l">
+              <a:defRPr sz="1200"/>
+            </a:lvl1pPr>
+          </a:lstStyle>
+          <a:p>
+            <a:endParaRPr lang="en-US"/>
+          </a:p>
+        </p:txBody>
+      </p:sp>
+      <p:sp>
+        <p:nvSpPr>
+          <p:cNvPr id="7" name="Slide Number Placeholder 6"/>
+          <p:cNvSpPr>
+            <a:spLocks noGrp="1"/>
+          </p:cNvSpPr>
+          <p:nvPr>
+            <p:ph type="sldNum" sz="quarter" idx="5"/>
+          </p:nvPr>
+        </p:nvSpPr>
+        <p:spPr>
+          <a:xfrm>
+            <a:off x="3884613" y="8685213"/>
+            <a:ext cx="2971800" cy="458787"/>
+          </a:xfrm>
+          <a:prstGeom prst="rect">
+            <a:avLst/>
+          </a:prstGeom>
+        </p:spPr>
+        <p:txBody>
+          <a:bodyPr vert="horz" lIns="91440" tIns="45720" rIns="91440" bIns="45720" rtlCol="0" anchor="b"/>
+          <a:lstStyle>
+            <a:lvl1pPr algn="r">
+              <a:defRPr sz="1200"/>
+            </a:lvl1pPr>
+          </a:lstStyle>
+          <a:p>
+            <a:fld id="{2DB57ED4-5E18-B048-AF6F-17D848A0A545}" type="slidenum">
+              <a:rPr lang="en-US" smtClean="0"/>
+              <a:t>‹#›</a:t>
+            </a:fld>
+            <a:endParaRPr lang="en-US"/>
+          </a:p>
+        </p:txBody>
+      </p:sp>
+    </p:spTree>
+    <p:extLst>
+      <p:ext uri="{BB962C8B-B14F-4D97-AF65-F5344CB8AC3E}">
+        <p14:creationId xmlns:p14="http://schemas.microsoft.com/office/powerpoint/2010/main" val="112104349"/>
+      </p:ext>
+    </p:extLst>
+  </p:cSld>
+  <p:clrMap bg1="lt1" tx1="dk1" bg2="lt2" tx2="dk2" accent1="accent1" accent2="accent2" accent3="accent3" accent4="accent4" accent5="accent5" accent6="accent6" hlink="hlink" folHlink="folHlink"/>
+  <p:notesStyle>
+    <a:lvl1pPr marL="0" algn="l" defTabSz="914400" rtl="0" eaLnBrk="1" latinLnBrk="0" hangingPunct="1">
+      <a:defRPr sz="1200" kern="1200">
+        <a:solidFill>
+          <a:schemeClr val="tx1"/>
+        </a:solidFill>
+        <a:latin typeface="+mn-lt"/>
+        <a:ea typeface="+mn-ea"/>
+        <a:cs typeface="+mn-cs"/>
+      </a:defRPr>
+    </a:lvl1pPr>
+    <a:lvl2pPr marL="457200" algn="l" defTabSz="914400" rtl="0" eaLnBrk="1" latinLnBrk="0" hangingPunct="1">
+      <a:defRPr sz="1200" kern="1200">
+        <a:solidFill>
+          <a:schemeClr val="tx1"/>
+        </a:solidFill>
+        <a:latin typeface="+mn-lt"/>
+        <a:ea typeface="+mn-ea"/>
+        <a:cs typeface="+mn-cs"/>
+      </a:defRPr>
+    </a:lvl2pPr>
+    <a:lvl3pPr marL="914400" algn="l" defTabSz="914400" rtl="0" eaLnBrk="1" latinLnBrk="0" hangingPunct="1">
+      <a:defRPr sz="1200" kern="1200">
+        <a:solidFill>
+          <a:schemeClr val="tx1"/>
+        </a:solidFill>
+        <a:latin typeface="+mn-lt"/>
+        <a:ea typeface="+mn-ea"/>
+        <a:cs typeface="+mn-cs"/>
+      </a:defRPr>
+    </a:lvl3pPr>
+    <a:lvl4pPr marL="1371600" algn="l" defTabSz="914400" rtl="0" eaLnBrk="1" latinLnBrk="0" hangingPunct="1">
+      <a:defRPr sz="1200" kern="1200">
+        <a:solidFill>
+          <a:schemeClr val="tx1"/>
+        </a:solidFill>
+        <a:latin typeface="+mn-lt"/>
+        <a:ea typeface="+mn-ea"/>
+        <a:cs typeface="+mn-cs"/>
+      </a:defRPr>
+    </a:lvl4pPr>
+    <a:lvl5pPr marL="1828800" algn="l" defTabSz="914400" rtl="0" eaLnBrk="1" latinLnBrk="0" hangingPunct="1">
+      <a:defRPr sz="1200" kern="1200">
+        <a:solidFill>
+          <a:schemeClr val="tx1"/>
+        </a:solidFill>
+        <a:latin typeface="+mn-lt"/>
+        <a:ea typeface="+mn-ea"/>
+        <a:cs typeface="+mn-cs"/>
+      </a:defRPr>
+    </a:lvl5pPr>
+    <a:lvl6pPr marL="2286000" algn="l" defTabSz="914400" rtl="0" eaLnBrk="1" latinLnBrk="0" hangingPunct="1">
+      <a:defRPr sz="1200" kern="1200">
+        <a:solidFill>
+          <a:schemeClr val="tx1"/>
+        </a:solidFill>
+        <a:latin typeface="+mn-lt"/>
+        <a:ea typeface="+mn-ea"/>
+        <a:cs typeface="+mn-cs"/>
+      </a:defRPr>
+    </a:lvl6pPr>
+    <a:lvl7pPr marL="2743200" algn="l" defTabSz="914400" rtl="0" eaLnBrk="1" latinLnBrk="0" hangingPunct="1">
+      <a:defRPr sz="1200" kern="1200">
+        <a:solidFill>
+          <a:schemeClr val="tx1"/>
+        </a:solidFill>
+        <a:latin typeface="+mn-lt"/>
+        <a:ea typeface="+mn-ea"/>
+        <a:cs typeface="+mn-cs"/>
+      </a:defRPr>
+    </a:lvl7pPr>
+    <a:lvl8pPr marL="3200400" algn="l" defTabSz="914400" rtl="0" eaLnBrk="1" latinLnBrk="0" hangingPunct="1">
+      <a:defRPr sz="1200" kern="1200">
+        <a:solidFill>
+          <a:schemeClr val="tx1"/>
+        </a:solidFill>
+        <a:latin typeface="+mn-lt"/>
+        <a:ea typeface="+mn-ea"/>
+        <a:cs typeface="+mn-cs"/>
+      </a:defRPr>
+    </a:lvl8pPr>
+    <a:lvl9pPr marL="3657600" algn="l" defTabSz="914400" rtl="0" eaLnBrk="1" latinLnBrk="0" hangingPunct="1">
+      <a:defRPr sz="1200" kern="1200">
+        <a:solidFill>
+          <a:schemeClr val="tx1"/>
+        </a:solidFill>
+        <a:latin typeface="+mn-lt"/>
+        <a:ea typeface="+mn-ea"/>
+        <a:cs typeface="+mn-cs"/>
+      </a:defRPr>
+    </a:lvl9pPr>
+  </p:notesStyle>
+</p:notesMaster>
+</file>
+
+<file path=ppt/notesSlides/notesSlide1.xml><?xml version="1.0" encoding="utf-8"?>
+<p:notes xmlns:a="http://schemas.openxmlformats.org/drawingml/2006/main" xmlns:r="http://schemas.openxmlformats.org/officeDocument/2006/relationships" xmlns:p="http://schemas.openxmlformats.org/presentationml/2006/main">
+  <p:cSld>
+    <p:spTree>
+      <p:nvGrpSpPr>
+        <p:cNvPr id="1" name=""/>
+        <p:cNvGrpSpPr/>
+        <p:nvPr/>
+      </p:nvGrpSpPr>
+      <p:grpSpPr>
+        <a:xfrm>
+          <a:off x="0" y="0"/>
+          <a:ext cx="0" cy="0"/>
+          <a:chOff x="0" y="0"/>
+          <a:chExt cx="0" cy="0"/>
+        </a:xfrm>
+      </p:grpSpPr>
+      <p:sp>
+        <p:nvSpPr>
+          <p:cNvPr id="2" name="Slide Image Placeholder 1"/>
+          <p:cNvSpPr>
+            <a:spLocks noGrp="1" noRot="1" noChangeAspect="1"/>
+          </p:cNvSpPr>
+          <p:nvPr>
+            <p:ph type="sldImg"/>
+          </p:nvPr>
+        </p:nvSpPr>
+        <p:spPr/>
+      </p:sp>
+      <p:sp>
+        <p:nvSpPr>
+          <p:cNvPr id="3" name="Notes Placeholder 2"/>
+          <p:cNvSpPr>
+            <a:spLocks noGrp="1"/>
+          </p:cNvSpPr>
+          <p:nvPr>
+            <p:ph type="body" idx="1"/>
+          </p:nvPr>
+        </p:nvSpPr>
+        <p:spPr/>
+        <p:txBody>
+          <a:bodyPr/>
+          <a:lstStyle/>
+          <a:p>
+            <a:endParaRPr lang="en-US" dirty="0"/>
+          </a:p>
+        </p:txBody>
+      </p:sp>
+      <p:sp>
+        <p:nvSpPr>
+          <p:cNvPr id="4" name="Slide Number Placeholder 3"/>
+          <p:cNvSpPr>
+            <a:spLocks noGrp="1"/>
+          </p:cNvSpPr>
+          <p:nvPr>
+            <p:ph type="sldNum" sz="quarter" idx="10"/>
+          </p:nvPr>
+        </p:nvSpPr>
+        <p:spPr/>
+        <p:txBody>
+          <a:bodyPr/>
+          <a:lstStyle/>
+          <a:p>
+            <a:fld id="{2DB57ED4-5E18-B048-AF6F-17D848A0A545}" type="slidenum">
+              <a:rPr lang="en-US" smtClean="0"/>
+              <a:t>11</a:t>
+            </a:fld>
+            <a:endParaRPr lang="en-US"/>
+          </a:p>
+        </p:txBody>
+      </p:sp>
+    </p:spTree>
+    <p:extLst>
+      <p:ext uri="{BB962C8B-B14F-4D97-AF65-F5344CB8AC3E}">
+        <p14:creationId xmlns:p14="http://schemas.microsoft.com/office/powerpoint/2010/main" val="794635224"/>
+      </p:ext>
+    </p:extLst>
+  </p:cSld>
+  <p:clrMapOvr>
+    <a:masterClrMapping/>
+  </p:clrMapOvr>
+</p:notes>
+</file>
+
 <file path=ppt/slideLayouts/slideLayout1.xml><?xml version="1.0" encoding="utf-8"?>
 <p:sldLayout xmlns:a="http://schemas.openxmlformats.org/drawingml/2006/main" xmlns:r="http://schemas.openxmlformats.org/officeDocument/2006/relationships" xmlns:p="http://schemas.openxmlformats.org/presentationml/2006/main" type="title" preserve="1">
   <p:cSld name="Title Slide">
@@ -257,7 +694,7 @@
           <a:p>
             <a:fld id="{39514751-6C89-194E-A652-4BD3C8EB45FC}" type="datetimeFigureOut">
               <a:rPr lang="en-US" smtClean="0"/>
-              <a:t>3/8/16</a:t>
+              <a:t>3/9/16</a:t>
             </a:fld>
             <a:endParaRPr lang="en-US"/>
           </a:p>
@@ -427,7 +864,7 @@
           <a:p>
             <a:fld id="{39514751-6C89-194E-A652-4BD3C8EB45FC}" type="datetimeFigureOut">
               <a:rPr lang="en-US" smtClean="0"/>
-              <a:t>3/8/16</a:t>
+              <a:t>3/9/16</a:t>
             </a:fld>
             <a:endParaRPr lang="en-US"/>
           </a:p>
@@ -607,7 +1044,7 @@
           <a:p>
             <a:fld id="{39514751-6C89-194E-A652-4BD3C8EB45FC}" type="datetimeFigureOut">
               <a:rPr lang="en-US" smtClean="0"/>
-              <a:t>3/8/16</a:t>
+              <a:t>3/9/16</a:t>
             </a:fld>
             <a:endParaRPr lang="en-US"/>
           </a:p>
@@ -777,7 +1214,7 @@
           <a:p>
             <a:fld id="{39514751-6C89-194E-A652-4BD3C8EB45FC}" type="datetimeFigureOut">
               <a:rPr lang="en-US" smtClean="0"/>
-              <a:t>3/8/16</a:t>
+              <a:t>3/9/16</a:t>
             </a:fld>
             <a:endParaRPr lang="en-US"/>
           </a:p>
@@ -1023,7 +1460,7 @@
           <a:p>
             <a:fld id="{39514751-6C89-194E-A652-4BD3C8EB45FC}" type="datetimeFigureOut">
               <a:rPr lang="en-US" smtClean="0"/>
-              <a:t>3/8/16</a:t>
+              <a:t>3/9/16</a:t>
             </a:fld>
             <a:endParaRPr lang="en-US"/>
           </a:p>
@@ -1255,7 +1692,7 @@
           <a:p>
             <a:fld id="{39514751-6C89-194E-A652-4BD3C8EB45FC}" type="datetimeFigureOut">
               <a:rPr lang="en-US" smtClean="0"/>
-              <a:t>3/8/16</a:t>
+              <a:t>3/9/16</a:t>
             </a:fld>
             <a:endParaRPr lang="en-US"/>
           </a:p>
@@ -1622,7 +2059,7 @@
           <a:p>
             <a:fld id="{39514751-6C89-194E-A652-4BD3C8EB45FC}" type="datetimeFigureOut">
               <a:rPr lang="en-US" smtClean="0"/>
-              <a:t>3/8/16</a:t>
+              <a:t>3/9/16</a:t>
             </a:fld>
             <a:endParaRPr lang="en-US"/>
           </a:p>
@@ -1740,7 +2177,7 @@
           <a:p>
             <a:fld id="{39514751-6C89-194E-A652-4BD3C8EB45FC}" type="datetimeFigureOut">
               <a:rPr lang="en-US" smtClean="0"/>
-              <a:t>3/8/16</a:t>
+              <a:t>3/9/16</a:t>
             </a:fld>
             <a:endParaRPr lang="en-US"/>
           </a:p>
@@ -1835,7 +2272,7 @@
           <a:p>
             <a:fld id="{39514751-6C89-194E-A652-4BD3C8EB45FC}" type="datetimeFigureOut">
               <a:rPr lang="en-US" smtClean="0"/>
-              <a:t>3/8/16</a:t>
+              <a:t>3/9/16</a:t>
             </a:fld>
             <a:endParaRPr lang="en-US"/>
           </a:p>
@@ -2112,7 +2549,7 @@
           <a:p>
             <a:fld id="{39514751-6C89-194E-A652-4BD3C8EB45FC}" type="datetimeFigureOut">
               <a:rPr lang="en-US" smtClean="0"/>
-              <a:t>3/8/16</a:t>
+              <a:t>3/9/16</a:t>
             </a:fld>
             <a:endParaRPr lang="en-US"/>
           </a:p>
@@ -2365,7 +2802,7 @@
           <a:p>
             <a:fld id="{39514751-6C89-194E-A652-4BD3C8EB45FC}" type="datetimeFigureOut">
               <a:rPr lang="en-US" smtClean="0"/>
-              <a:t>3/8/16</a:t>
+              <a:t>3/9/16</a:t>
             </a:fld>
             <a:endParaRPr lang="en-US"/>
           </a:p>
@@ -2578,7 +3015,7 @@
           <a:p>
             <a:fld id="{39514751-6C89-194E-A652-4BD3C8EB45FC}" type="datetimeFigureOut">
               <a:rPr lang="en-US" smtClean="0"/>
-              <a:t>3/8/16</a:t>
+              <a:t>3/9/16</a:t>
             </a:fld>
             <a:endParaRPr lang="en-US"/>
           </a:p>
@@ -17381,4 +17818,265 @@
     </a:ext>
   </a:extLst>
 </a:theme>
+</file>
+
+<file path=ppt/theme/theme2.xml><?xml version="1.0" encoding="utf-8"?>
+<a:theme xmlns:a="http://schemas.openxmlformats.org/drawingml/2006/main" name="Office Theme">
+  <a:themeElements>
+    <a:clrScheme name="Office">
+      <a:dk1>
+        <a:sysClr val="windowText" lastClr="000000"/>
+      </a:dk1>
+      <a:lt1>
+        <a:sysClr val="window" lastClr="FFFFFF"/>
+      </a:lt1>
+      <a:dk2>
+        <a:srgbClr val="44546A"/>
+      </a:dk2>
+      <a:lt2>
+        <a:srgbClr val="E7E6E6"/>
+      </a:lt2>
+      <a:accent1>
+        <a:srgbClr val="5B9BD5"/>
+      </a:accent1>
+      <a:accent2>
+        <a:srgbClr val="ED7D31"/>
+      </a:accent2>
+      <a:accent3>
+        <a:srgbClr val="A5A5A5"/>
+      </a:accent3>
+      <a:accent4>
+        <a:srgbClr val="FFC000"/>
+      </a:accent4>
+      <a:accent5>
+        <a:srgbClr val="4472C4"/>
+      </a:accent5>
+      <a:accent6>
+        <a:srgbClr val="70AD47"/>
+      </a:accent6>
+      <a:hlink>
+        <a:srgbClr val="0563C1"/>
+      </a:hlink>
+      <a:folHlink>
+        <a:srgbClr val="954F72"/>
+      </a:folHlink>
+    </a:clrScheme>
+    <a:fontScheme name="Office">
+      <a:majorFont>
+        <a:latin typeface="Calibri Light" panose="020F0302020204030204"/>
+        <a:ea typeface=""/>
+        <a:cs typeface=""/>
+        <a:font script="Jpan" typeface="Yu Gothic Light"/>
+        <a:font script="Hang" typeface="맑은 고딕"/>
+        <a:font script="Hans" typeface="DengXian Light"/>
+        <a:font script="Hant" typeface="新細明體"/>
+        <a:font script="Arab" typeface="Times New Roman"/>
+        <a:font script="Hebr" typeface="Times New Roman"/>
+        <a:font script="Thai" typeface="Angsana New"/>
+        <a:font script="Ethi" typeface="Nyala"/>
+        <a:font script="Beng" typeface="Vrinda"/>
+        <a:font script="Gujr" typeface="Shruti"/>
+        <a:font script="Khmr" typeface="MoolBoran"/>
+        <a:font script="Knda" typeface="Tunga"/>
+        <a:font script="Guru" typeface="Raavi"/>
+        <a:font script="Cans" typeface="Euphemia"/>
+        <a:font script="Cher" typeface="Plantagenet Cherokee"/>
+        <a:font script="Yiii" typeface="Microsoft Yi Baiti"/>
+        <a:font script="Tibt" typeface="Microsoft Himalaya"/>
+        <a:font script="Thaa" typeface="MV Boli"/>
+        <a:font script="Deva" typeface="Mangal"/>
+        <a:font script="Telu" typeface="Gautami"/>
+        <a:font script="Taml" typeface="Latha"/>
+        <a:font script="Syrc" typeface="Estrangelo Edessa"/>
+        <a:font script="Orya" typeface="Kalinga"/>
+        <a:font script="Mlym" typeface="Kartika"/>
+        <a:font script="Laoo" typeface="DokChampa"/>
+        <a:font script="Sinh" typeface="Iskoola Pota"/>
+        <a:font script="Mong" typeface="Mongolian Baiti"/>
+        <a:font script="Viet" typeface="Times New Roman"/>
+        <a:font script="Uigh" typeface="Microsoft Uighur"/>
+        <a:font script="Geor" typeface="Sylfaen"/>
+      </a:majorFont>
+      <a:minorFont>
+        <a:latin typeface="Calibri" panose="020F0502020204030204"/>
+        <a:ea typeface=""/>
+        <a:cs typeface=""/>
+        <a:font script="Jpan" typeface="Yu Gothic"/>
+        <a:font script="Hang" typeface="맑은 고딕"/>
+        <a:font script="Hans" typeface="DengXian"/>
+        <a:font script="Hant" typeface="新細明體"/>
+        <a:font script="Arab" typeface="Arial"/>
+        <a:font script="Hebr" typeface="Arial"/>
+        <a:font script="Thai" typeface="Cordia New"/>
+        <a:font script="Ethi" typeface="Nyala"/>
+        <a:font script="Beng" typeface="Vrinda"/>
+        <a:font script="Gujr" typeface="Shruti"/>
+        <a:font script="Khmr" typeface="DaunPenh"/>
+        <a:font script="Knda" typeface="Tunga"/>
+        <a:font script="Guru" typeface="Raavi"/>
+        <a:font script="Cans" typeface="Euphemia"/>
+        <a:font script="Cher" typeface="Plantagenet Cherokee"/>
+        <a:font script="Yiii" typeface="Microsoft Yi Baiti"/>
+        <a:font script="Tibt" typeface="Microsoft Himalaya"/>
+        <a:font script="Thaa" typeface="MV Boli"/>
+        <a:font script="Deva" typeface="Mangal"/>
+        <a:font script="Telu" typeface="Gautami"/>
+        <a:font script="Taml" typeface="Latha"/>
+        <a:font script="Syrc" typeface="Estrangelo Edessa"/>
+        <a:font script="Orya" typeface="Kalinga"/>
+        <a:font script="Mlym" typeface="Kartika"/>
+        <a:font script="Laoo" typeface="DokChampa"/>
+        <a:font script="Sinh" typeface="Iskoola Pota"/>
+        <a:font script="Mong" typeface="Mongolian Baiti"/>
+        <a:font script="Viet" typeface="Arial"/>
+        <a:font script="Uigh" typeface="Microsoft Uighur"/>
+        <a:font script="Geor" typeface="Sylfaen"/>
+      </a:minorFont>
+    </a:fontScheme>
+    <a:fmtScheme name="Office">
+      <a:fillStyleLst>
+        <a:solidFill>
+          <a:schemeClr val="phClr"/>
+        </a:solidFill>
+        <a:gradFill rotWithShape="1">
+          <a:gsLst>
+            <a:gs pos="0">
+              <a:schemeClr val="phClr">
+                <a:lumMod val="110000"/>
+                <a:satMod val="105000"/>
+                <a:tint val="67000"/>
+              </a:schemeClr>
+            </a:gs>
+            <a:gs pos="50000">
+              <a:schemeClr val="phClr">
+                <a:lumMod val="105000"/>
+                <a:satMod val="103000"/>
+                <a:tint val="73000"/>
+              </a:schemeClr>
+            </a:gs>
+            <a:gs pos="100000">
+              <a:schemeClr val="phClr">
+                <a:lumMod val="105000"/>
+                <a:satMod val="109000"/>
+                <a:tint val="81000"/>
+              </a:schemeClr>
+            </a:gs>
+          </a:gsLst>
+          <a:lin ang="5400000" scaled="0"/>
+        </a:gradFill>
+        <a:gradFill rotWithShape="1">
+          <a:gsLst>
+            <a:gs pos="0">
+              <a:schemeClr val="phClr">
+                <a:satMod val="103000"/>
+                <a:lumMod val="102000"/>
+                <a:tint val="94000"/>
+              </a:schemeClr>
+            </a:gs>
+            <a:gs pos="50000">
+              <a:schemeClr val="phClr">
+                <a:satMod val="110000"/>
+                <a:lumMod val="100000"/>
+                <a:shade val="100000"/>
+              </a:schemeClr>
+            </a:gs>
+            <a:gs pos="100000">
+              <a:schemeClr val="phClr">
+                <a:lumMod val="99000"/>
+                <a:satMod val="120000"/>
+                <a:shade val="78000"/>
+              </a:schemeClr>
+            </a:gs>
+          </a:gsLst>
+          <a:lin ang="5400000" scaled="0"/>
+        </a:gradFill>
+      </a:fillStyleLst>
+      <a:lnStyleLst>
+        <a:ln w="6350" cap="flat" cmpd="sng" algn="ctr">
+          <a:solidFill>
+            <a:schemeClr val="phClr"/>
+          </a:solidFill>
+          <a:prstDash val="solid"/>
+          <a:miter lim="800000"/>
+        </a:ln>
+        <a:ln w="12700" cap="flat" cmpd="sng" algn="ctr">
+          <a:solidFill>
+            <a:schemeClr val="phClr"/>
+          </a:solidFill>
+          <a:prstDash val="solid"/>
+          <a:miter lim="800000"/>
+        </a:ln>
+        <a:ln w="19050" cap="flat" cmpd="sng" algn="ctr">
+          <a:solidFill>
+            <a:schemeClr val="phClr"/>
+          </a:solidFill>
+          <a:prstDash val="solid"/>
+          <a:miter lim="800000"/>
+        </a:ln>
+      </a:lnStyleLst>
+      <a:effectStyleLst>
+        <a:effectStyle>
+          <a:effectLst/>
+        </a:effectStyle>
+        <a:effectStyle>
+          <a:effectLst/>
+        </a:effectStyle>
+        <a:effectStyle>
+          <a:effectLst>
+            <a:outerShdw blurRad="57150" dist="19050" dir="5400000" algn="ctr" rotWithShape="0">
+              <a:srgbClr val="000000">
+                <a:alpha val="63000"/>
+              </a:srgbClr>
+            </a:outerShdw>
+          </a:effectLst>
+        </a:effectStyle>
+      </a:effectStyleLst>
+      <a:bgFillStyleLst>
+        <a:solidFill>
+          <a:schemeClr val="phClr"/>
+        </a:solidFill>
+        <a:solidFill>
+          <a:schemeClr val="phClr">
+            <a:tint val="95000"/>
+            <a:satMod val="170000"/>
+          </a:schemeClr>
+        </a:solidFill>
+        <a:gradFill rotWithShape="1">
+          <a:gsLst>
+            <a:gs pos="0">
+              <a:schemeClr val="phClr">
+                <a:tint val="93000"/>
+                <a:satMod val="150000"/>
+                <a:shade val="98000"/>
+                <a:lumMod val="102000"/>
+              </a:schemeClr>
+            </a:gs>
+            <a:gs pos="50000">
+              <a:schemeClr val="phClr">
+                <a:tint val="98000"/>
+                <a:satMod val="130000"/>
+                <a:shade val="90000"/>
+                <a:lumMod val="103000"/>
+              </a:schemeClr>
+            </a:gs>
+            <a:gs pos="100000">
+              <a:schemeClr val="phClr">
+                <a:shade val="63000"/>
+                <a:satMod val="120000"/>
+              </a:schemeClr>
+            </a:gs>
+          </a:gsLst>
+          <a:lin ang="5400000" scaled="0"/>
+        </a:gradFill>
+      </a:bgFillStyleLst>
+    </a:fmtScheme>
+  </a:themeElements>
+  <a:objectDefaults/>
+  <a:extraClrSchemeLst/>
+  <a:extLst>
+    <a:ext uri="{05A4C25C-085E-4340-85A3-A5531E510DB2}">
+      <thm15:themeFamily xmlns:thm15="http://schemas.microsoft.com/office/thememl/2012/main" name="Office Theme" id="{62F939B6-93AF-4DB8-9C6B-D6C7DFDC589F}" vid="{4A3C46E8-61CC-4603-A589-7422A47A8E4A}"/>
+    </a:ext>
+  </a:extLst>
+</a:theme>
 </file>
</xml_diff>